<commit_message>
Starting Issue728 [index.html --> emphasize the content above the fold] Update Issue 728
</commit_message>
<xml_diff>
--- a/doc/mockups/homepage image.pptx
+++ b/doc/mockups/homepage image.pptx
@@ -1,6 +1,6 @@
 
 <file path=ppt/presentation.xml><?xml version="1.0" encoding="utf-8"?>
-<p:presentation xmlns:a="http://schemas.openxmlformats.org/drawingml/2006/main" xmlns:r="http://schemas.openxmlformats.org/officeDocument/2006/relationships" xmlns:p="http://schemas.openxmlformats.org/presentationml/2006/main" embedTrueTypeFonts="1">
+<p:presentation xmlns:a="http://schemas.openxmlformats.org/drawingml/2006/main" xmlns:r="http://schemas.openxmlformats.org/officeDocument/2006/relationships" xmlns:p="http://schemas.openxmlformats.org/presentationml/2006/main" saveSubsetFonts="1">
   <p:sldMasterIdLst>
     <p:sldMasterId id="2147483648" r:id="rId1"/>
   </p:sldMasterIdLst>
@@ -12,17 +12,8 @@
   </p:sldIdLst>
   <p:sldSz cx="7740650" cy="2879725"/>
   <p:notesSz cx="6858000" cy="9144000"/>
-  <p:embeddedFontLst>
-    <p:embeddedFont>
-      <p:font typeface="Calibri" pitchFamily="34" charset="0"/>
-      <p:regular r:id="rId4"/>
-      <p:bold r:id="rId5"/>
-      <p:italic r:id="rId6"/>
-      <p:boldItalic r:id="rId7"/>
-    </p:embeddedFont>
-  </p:embeddedFontLst>
   <p:custDataLst>
-    <p:tags r:id="rId8"/>
+    <p:tags r:id="rId4"/>
   </p:custDataLst>
   <p:defaultTextStyle>
     <a:defPPr>
@@ -204,7 +195,7 @@
           <a:p>
             <a:fld id="{A4537E34-E1A6-4BBF-AF99-84C669929841}" type="datetimeFigureOut">
               <a:rPr lang="en-SG" smtClean="0"/>
-              <a:t>20/3/2013</a:t>
+              <a:t>21/3/2013</a:t>
             </a:fld>
             <a:endParaRPr lang="en-SG"/>
           </a:p>
@@ -738,7 +729,7 @@
             <a:fld id="{1D8BD707-D9CF-40AE-B4C6-C98DA3205C09}" type="datetimeFigureOut">
               <a:rPr lang="en-US" smtClean="0"/>
               <a:pPr/>
-              <a:t>3/20/2013</a:t>
+              <a:t>3/21/2013</a:t>
             </a:fld>
             <a:endParaRPr lang="en-US"/>
           </a:p>
@@ -905,7 +896,7 @@
             <a:fld id="{1D8BD707-D9CF-40AE-B4C6-C98DA3205C09}" type="datetimeFigureOut">
               <a:rPr lang="en-US" smtClean="0"/>
               <a:pPr/>
-              <a:t>3/20/2013</a:t>
+              <a:t>3/21/2013</a:t>
             </a:fld>
             <a:endParaRPr lang="en-US"/>
           </a:p>
@@ -1082,7 +1073,7 @@
             <a:fld id="{1D8BD707-D9CF-40AE-B4C6-C98DA3205C09}" type="datetimeFigureOut">
               <a:rPr lang="en-US" smtClean="0"/>
               <a:pPr/>
-              <a:t>3/20/2013</a:t>
+              <a:t>3/21/2013</a:t>
             </a:fld>
             <a:endParaRPr lang="en-US"/>
           </a:p>
@@ -1249,7 +1240,7 @@
             <a:fld id="{1D8BD707-D9CF-40AE-B4C6-C98DA3205C09}" type="datetimeFigureOut">
               <a:rPr lang="en-US" smtClean="0"/>
               <a:pPr/>
-              <a:t>3/20/2013</a:t>
+              <a:t>3/21/2013</a:t>
             </a:fld>
             <a:endParaRPr lang="en-US"/>
           </a:p>
@@ -1492,7 +1483,7 @@
             <a:fld id="{1D8BD707-D9CF-40AE-B4C6-C98DA3205C09}" type="datetimeFigureOut">
               <a:rPr lang="en-US" smtClean="0"/>
               <a:pPr/>
-              <a:t>3/20/2013</a:t>
+              <a:t>3/21/2013</a:t>
             </a:fld>
             <a:endParaRPr lang="en-US"/>
           </a:p>
@@ -1777,7 +1768,7 @@
             <a:fld id="{1D8BD707-D9CF-40AE-B4C6-C98DA3205C09}" type="datetimeFigureOut">
               <a:rPr lang="en-US" smtClean="0"/>
               <a:pPr/>
-              <a:t>3/20/2013</a:t>
+              <a:t>3/21/2013</a:t>
             </a:fld>
             <a:endParaRPr lang="en-US"/>
           </a:p>
@@ -2196,7 +2187,7 @@
             <a:fld id="{1D8BD707-D9CF-40AE-B4C6-C98DA3205C09}" type="datetimeFigureOut">
               <a:rPr lang="en-US" smtClean="0"/>
               <a:pPr/>
-              <a:t>3/20/2013</a:t>
+              <a:t>3/21/2013</a:t>
             </a:fld>
             <a:endParaRPr lang="en-US"/>
           </a:p>
@@ -2311,7 +2302,7 @@
             <a:fld id="{1D8BD707-D9CF-40AE-B4C6-C98DA3205C09}" type="datetimeFigureOut">
               <a:rPr lang="en-US" smtClean="0"/>
               <a:pPr/>
-              <a:t>3/20/2013</a:t>
+              <a:t>3/21/2013</a:t>
             </a:fld>
             <a:endParaRPr lang="en-US"/>
           </a:p>
@@ -2403,7 +2394,7 @@
             <a:fld id="{1D8BD707-D9CF-40AE-B4C6-C98DA3205C09}" type="datetimeFigureOut">
               <a:rPr lang="en-US" smtClean="0"/>
               <a:pPr/>
-              <a:t>3/20/2013</a:t>
+              <a:t>3/21/2013</a:t>
             </a:fld>
             <a:endParaRPr lang="en-US"/>
           </a:p>
@@ -2677,7 +2668,7 @@
             <a:fld id="{1D8BD707-D9CF-40AE-B4C6-C98DA3205C09}" type="datetimeFigureOut">
               <a:rPr lang="en-US" smtClean="0"/>
               <a:pPr/>
-              <a:t>3/20/2013</a:t>
+              <a:t>3/21/2013</a:t>
             </a:fld>
             <a:endParaRPr lang="en-US"/>
           </a:p>
@@ -2927,7 +2918,7 @@
             <a:fld id="{1D8BD707-D9CF-40AE-B4C6-C98DA3205C09}" type="datetimeFigureOut">
               <a:rPr lang="en-US" smtClean="0"/>
               <a:pPr/>
-              <a:t>3/20/2013</a:t>
+              <a:t>3/21/2013</a:t>
             </a:fld>
             <a:endParaRPr lang="en-US"/>
           </a:p>
@@ -3137,7 +3128,7 @@
             <a:fld id="{1D8BD707-D9CF-40AE-B4C6-C98DA3205C09}" type="datetimeFigureOut">
               <a:rPr lang="en-US" smtClean="0"/>
               <a:pPr/>
-              <a:t>3/20/2013</a:t>
+              <a:t>3/21/2013</a:t>
             </a:fld>
             <a:endParaRPr lang="en-US"/>
           </a:p>
@@ -3508,6 +3499,58 @@
           <a:chExt cx="0" cy="0"/>
         </a:xfrm>
       </p:grpSpPr>
+      <p:sp>
+        <p:nvSpPr>
+          <p:cNvPr id="23" name="Rounded Rectangle 22"/>
+          <p:cNvSpPr/>
+          <p:nvPr/>
+        </p:nvSpPr>
+        <p:spPr>
+          <a:xfrm>
+            <a:off x="136525" y="166476"/>
+            <a:ext cx="2117725" cy="2584344"/>
+          </a:xfrm>
+          <a:prstGeom prst="roundRect">
+            <a:avLst>
+              <a:gd name="adj" fmla="val 7667"/>
+            </a:avLst>
+          </a:prstGeom>
+          <a:noFill/>
+          <a:ln w="107950">
+            <a:solidFill>
+              <a:schemeClr val="accent6">
+                <a:lumMod val="60000"/>
+                <a:lumOff val="40000"/>
+              </a:schemeClr>
+            </a:solidFill>
+          </a:ln>
+          <a:effectLst/>
+        </p:spPr>
+        <p:style>
+          <a:lnRef idx="2">
+            <a:schemeClr val="accent1">
+              <a:shade val="50000"/>
+            </a:schemeClr>
+          </a:lnRef>
+          <a:fillRef idx="1">
+            <a:schemeClr val="accent1"/>
+          </a:fillRef>
+          <a:effectRef idx="0">
+            <a:schemeClr val="accent1"/>
+          </a:effectRef>
+          <a:fontRef idx="minor">
+            <a:schemeClr val="lt1"/>
+          </a:fontRef>
+        </p:style>
+        <p:txBody>
+          <a:bodyPr rtlCol="0" anchor="ctr"/>
+          <a:lstStyle/>
+          <a:p>
+            <a:pPr algn="ctr"/>
+            <a:endParaRPr lang="en-US"/>
+          </a:p>
+        </p:txBody>
+      </p:sp>
       <p:sp>
         <p:nvSpPr>
           <p:cNvPr id="31" name="Flowchart: Delay 30"/>
@@ -4235,69 +4278,13 @@
           <a:noFill/>
           <a:ln w="107950">
             <a:solidFill>
-              <a:schemeClr val="accent1">
-                <a:lumMod val="20000"/>
-                <a:lumOff val="80000"/>
+              <a:schemeClr val="tx2">
+                <a:lumMod val="40000"/>
+                <a:lumOff val="60000"/>
               </a:schemeClr>
             </a:solidFill>
           </a:ln>
-          <a:effectLst>
-            <a:softEdge rad="31750"/>
-          </a:effectLst>
-        </p:spPr>
-        <p:style>
-          <a:lnRef idx="2">
-            <a:schemeClr val="accent1">
-              <a:shade val="50000"/>
-            </a:schemeClr>
-          </a:lnRef>
-          <a:fillRef idx="1">
-            <a:schemeClr val="accent1"/>
-          </a:fillRef>
-          <a:effectRef idx="0">
-            <a:schemeClr val="accent1"/>
-          </a:effectRef>
-          <a:fontRef idx="minor">
-            <a:schemeClr val="lt1"/>
-          </a:fontRef>
-        </p:style>
-        <p:txBody>
-          <a:bodyPr rtlCol="0" anchor="ctr"/>
-          <a:lstStyle/>
-          <a:p>
-            <a:pPr algn="ctr"/>
-            <a:endParaRPr lang="en-US"/>
-          </a:p>
-        </p:txBody>
-      </p:sp>
-      <p:sp>
-        <p:nvSpPr>
-          <p:cNvPr id="23" name="Rounded Rectangle 22"/>
-          <p:cNvSpPr/>
-          <p:nvPr/>
-        </p:nvSpPr>
-        <p:spPr>
-          <a:xfrm>
-            <a:off x="136525" y="166476"/>
-            <a:ext cx="2117725" cy="2584344"/>
-          </a:xfrm>
-          <a:prstGeom prst="roundRect">
-            <a:avLst>
-              <a:gd name="adj" fmla="val 7667"/>
-            </a:avLst>
-          </a:prstGeom>
-          <a:noFill/>
-          <a:ln w="107950">
-            <a:solidFill>
-              <a:schemeClr val="accent6">
-                <a:lumMod val="20000"/>
-                <a:lumOff val="80000"/>
-              </a:schemeClr>
-            </a:solidFill>
-          </a:ln>
-          <a:effectLst>
-            <a:softEdge rad="31750"/>
-          </a:effectLst>
+          <a:effectLst/>
         </p:spPr>
         <p:style>
           <a:lnRef idx="2">
@@ -4384,8 +4371,8 @@
         </p:nvSpPr>
         <p:spPr>
           <a:xfrm rot="3148928">
-            <a:off x="3750367" y="1837621"/>
-            <a:ext cx="650104" cy="899883"/>
+            <a:off x="3703148" y="1794751"/>
+            <a:ext cx="650104" cy="1018950"/>
           </a:xfrm>
           <a:prstGeom prst="triangle">
             <a:avLst>
@@ -4396,6 +4383,7 @@
             <a:schemeClr val="accent6">
               <a:lumMod val="40000"/>
               <a:lumOff val="60000"/>
+              <a:alpha val="65000"/>
             </a:schemeClr>
           </a:solidFill>
           <a:ln>
@@ -4435,7 +4423,7 @@
         </p:nvSpPr>
         <p:spPr>
           <a:xfrm rot="4843798">
-            <a:off x="3307100" y="1214943"/>
+            <a:off x="3307100" y="1195350"/>
             <a:ext cx="672349" cy="1283148"/>
           </a:xfrm>
           <a:prstGeom prst="triangle">
@@ -4445,6 +4433,7 @@
             <a:schemeClr val="accent6">
               <a:lumMod val="40000"/>
               <a:lumOff val="60000"/>
+              <a:alpha val="65000"/>
             </a:schemeClr>
           </a:solidFill>
           <a:ln>
@@ -4582,7 +4571,7 @@
           </a:bodyPr>
           <a:lstStyle/>
           <a:p>
-            <a:pPr algn="ctr"/>
+            <a:pPr algn="r"/>
             <a:r>
               <a:rPr lang="en-US" sz="1100" dirty="0" smtClean="0">
                 <a:solidFill>
@@ -4716,7 +4705,7 @@
         </p:nvSpPr>
         <p:spPr>
           <a:xfrm>
-            <a:off x="5767678" y="1822729"/>
+            <a:off x="5767678" y="2049462"/>
             <a:ext cx="1371600" cy="457200"/>
           </a:xfrm>
           <a:prstGeom prst="roundRect">
@@ -4780,14 +4769,12 @@
           <a:ln w="107950">
             <a:solidFill>
               <a:schemeClr val="accent6">
-                <a:lumMod val="20000"/>
-                <a:lumOff val="80000"/>
+                <a:lumMod val="60000"/>
+                <a:lumOff val="40000"/>
               </a:schemeClr>
             </a:solidFill>
           </a:ln>
-          <a:effectLst>
-            <a:softEdge rad="31750"/>
-          </a:effectLst>
+          <a:effectLst/>
         </p:spPr>
         <p:style>
           <a:lnRef idx="2">
@@ -5396,7 +5383,7 @@
         </p:nvSpPr>
         <p:spPr>
           <a:xfrm rot="5400000" flipH="1">
-            <a:off x="4290496" y="1819658"/>
+            <a:off x="4290496" y="1800065"/>
             <a:ext cx="280353" cy="298983"/>
           </a:xfrm>
           <a:prstGeom prst="flowChartDelay">
@@ -5446,7 +5433,7 @@
         </p:nvGrpSpPr>
         <p:grpSpPr>
           <a:xfrm rot="3372795">
-            <a:off x="4286547" y="1588795"/>
+            <a:off x="4286547" y="1569202"/>
             <a:ext cx="254457" cy="220662"/>
             <a:chOff x="4335990" y="1588795"/>
             <a:chExt cx="254457" cy="220662"/>
@@ -5677,7 +5664,7 @@
         </p:nvSpPr>
         <p:spPr>
           <a:xfrm rot="5400000" flipH="1">
-            <a:off x="3732363" y="2369394"/>
+            <a:off x="3732363" y="2349801"/>
             <a:ext cx="280353" cy="298983"/>
           </a:xfrm>
           <a:prstGeom prst="flowChartDelay">
@@ -5727,7 +5714,7 @@
         </p:nvGrpSpPr>
         <p:grpSpPr>
           <a:xfrm rot="2886978">
-            <a:off x="3728414" y="2144246"/>
+            <a:off x="3728414" y="2124653"/>
             <a:ext cx="254457" cy="220662"/>
             <a:chOff x="3791084" y="2070419"/>
             <a:chExt cx="254457" cy="220662"/>
@@ -5958,7 +5945,7 @@
         </p:nvSpPr>
         <p:spPr>
           <a:xfrm rot="16200000">
-            <a:off x="3193840" y="2006887"/>
+            <a:off x="3193840" y="1987294"/>
             <a:ext cx="280353" cy="298983"/>
           </a:xfrm>
           <a:prstGeom prst="flowChartDelay">
@@ -6008,7 +5995,7 @@
         </p:nvGrpSpPr>
         <p:grpSpPr>
           <a:xfrm rot="1483511">
-            <a:off x="3226182" y="1790579"/>
+            <a:off x="3226182" y="1770986"/>
             <a:ext cx="267922" cy="220662"/>
             <a:chOff x="786805" y="1760534"/>
             <a:chExt cx="267922" cy="220662"/>
@@ -6520,7 +6507,7 @@
         </p:nvSpPr>
         <p:spPr>
           <a:xfrm rot="16200000">
-            <a:off x="6851720" y="954795"/>
+            <a:off x="6845012" y="862936"/>
             <a:ext cx="280353" cy="298983"/>
           </a:xfrm>
           <a:prstGeom prst="flowChartDelay">
@@ -6563,7 +6550,7 @@
         </p:nvSpPr>
         <p:spPr>
           <a:xfrm rot="326821">
-            <a:off x="6940759" y="967464"/>
+            <a:off x="6934051" y="875605"/>
             <a:ext cx="102393" cy="235744"/>
           </a:xfrm>
           <a:custGeom>
@@ -6657,7 +6644,7 @@
         </p:nvSpPr>
         <p:spPr>
           <a:xfrm rot="11865946">
-            <a:off x="6914554" y="729088"/>
+            <a:off x="6907846" y="637229"/>
             <a:ext cx="220662" cy="220662"/>
           </a:xfrm>
           <a:prstGeom prst="flowChartConnector">
@@ -6700,7 +6687,7 @@
         </p:nvSpPr>
         <p:spPr>
           <a:xfrm rot="11865946">
-            <a:off x="6904559" y="736995"/>
+            <a:off x="6897851" y="645136"/>
             <a:ext cx="50006" cy="19050"/>
           </a:xfrm>
           <a:custGeom>
@@ -6809,7 +6796,7 @@
         </p:nvSpPr>
         <p:spPr>
           <a:xfrm rot="11865946">
-            <a:off x="7031245" y="783890"/>
+            <a:off x="7024537" y="692031"/>
             <a:ext cx="45719" cy="45719"/>
           </a:xfrm>
           <a:prstGeom prst="flowChartConnector">
@@ -7202,8 +7189,8 @@
         </p:nvSpPr>
         <p:spPr>
           <a:xfrm>
-            <a:off x="797728" y="989315"/>
-            <a:ext cx="982980" cy="726012"/>
+            <a:off x="797728" y="989167"/>
+            <a:ext cx="975836" cy="726159"/>
           </a:xfrm>
           <a:custGeom>
             <a:avLst/>
@@ -7240,6 +7227,30 @@
               <a:gd name="connsiteY2" fmla="*/ 194517 h 726012"/>
               <a:gd name="connsiteX3" fmla="*/ 0 w 982980"/>
               <a:gd name="connsiteY3" fmla="*/ 726012 h 726012"/>
+              <a:gd name="connsiteX0" fmla="*/ 982980 w 982980"/>
+              <a:gd name="connsiteY0" fmla="*/ 206475 h 709395"/>
+              <a:gd name="connsiteX1" fmla="*/ 546259 w 982980"/>
+              <a:gd name="connsiteY1" fmla="*/ 258 h 709395"/>
+              <a:gd name="connsiteX2" fmla="*/ 217170 w 982980"/>
+              <a:gd name="connsiteY2" fmla="*/ 177900 h 709395"/>
+              <a:gd name="connsiteX3" fmla="*/ 0 w 982980"/>
+              <a:gd name="connsiteY3" fmla="*/ 709395 h 709395"/>
+              <a:gd name="connsiteX0" fmla="*/ 975836 w 975836"/>
+              <a:gd name="connsiteY0" fmla="*/ 216179 h 709574"/>
+              <a:gd name="connsiteX1" fmla="*/ 546259 w 975836"/>
+              <a:gd name="connsiteY1" fmla="*/ 437 h 709574"/>
+              <a:gd name="connsiteX2" fmla="*/ 217170 w 975836"/>
+              <a:gd name="connsiteY2" fmla="*/ 178079 h 709574"/>
+              <a:gd name="connsiteX3" fmla="*/ 0 w 975836"/>
+              <a:gd name="connsiteY3" fmla="*/ 709574 h 709574"/>
+              <a:gd name="connsiteX0" fmla="*/ 975836 w 975836"/>
+              <a:gd name="connsiteY0" fmla="*/ 232764 h 726159"/>
+              <a:gd name="connsiteX1" fmla="*/ 577216 w 975836"/>
+              <a:gd name="connsiteY1" fmla="*/ 353 h 726159"/>
+              <a:gd name="connsiteX2" fmla="*/ 217170 w 975836"/>
+              <a:gd name="connsiteY2" fmla="*/ 194664 h 726159"/>
+              <a:gd name="connsiteX3" fmla="*/ 0 w 975836"/>
+              <a:gd name="connsiteY3" fmla="*/ 726159 h 726159"/>
             </a:gdLst>
             <a:ahLst/>
             <a:cxnLst>
@@ -7258,24 +7269,24 @@
             </a:cxnLst>
             <a:rect l="l" t="t" r="r" b="b"/>
             <a:pathLst>
-              <a:path w="982980" h="726012">
+              <a:path w="975836" h="726159">
                 <a:moveTo>
-                  <a:pt x="982980" y="223092"/>
+                  <a:pt x="975836" y="232764"/>
                 </a:moveTo>
                 <a:cubicBezTo>
-                  <a:pt x="929640" y="132128"/>
-                  <a:pt x="676275" y="4969"/>
-                  <a:pt x="548640" y="207"/>
+                  <a:pt x="922496" y="141800"/>
+                  <a:pt x="703660" y="6703"/>
+                  <a:pt x="577216" y="353"/>
                 </a:cubicBezTo>
                 <a:cubicBezTo>
-                  <a:pt x="421005" y="-4555"/>
-                  <a:pt x="308610" y="73550"/>
-                  <a:pt x="217170" y="194517"/>
+                  <a:pt x="450772" y="-5997"/>
+                  <a:pt x="308610" y="73697"/>
+                  <a:pt x="217170" y="194664"/>
                 </a:cubicBezTo>
                 <a:cubicBezTo>
-                  <a:pt x="125730" y="315484"/>
-                  <a:pt x="62865" y="495507"/>
-                  <a:pt x="0" y="726012"/>
+                  <a:pt x="125730" y="315631"/>
+                  <a:pt x="62865" y="495654"/>
+                  <a:pt x="0" y="726159"/>
                 </a:cubicBezTo>
               </a:path>
             </a:pathLst>
@@ -7316,6 +7327,3480 @@
           </a:p>
         </p:txBody>
       </p:sp>
+      <p:sp>
+        <p:nvSpPr>
+          <p:cNvPr id="6" name="Freeform 7"/>
+          <p:cNvSpPr>
+            <a:spLocks/>
+          </p:cNvSpPr>
+          <p:nvPr/>
+        </p:nvSpPr>
+        <p:spPr bwMode="auto">
+          <a:xfrm>
+            <a:off x="6311900" y="1476375"/>
+            <a:ext cx="177800" cy="258763"/>
+          </a:xfrm>
+          <a:custGeom>
+            <a:avLst/>
+            <a:gdLst>
+              <a:gd name="T0" fmla="*/ 475 w 900"/>
+              <a:gd name="T1" fmla="*/ 204 h 1469"/>
+              <a:gd name="T2" fmla="*/ 527 w 900"/>
+              <a:gd name="T3" fmla="*/ 239 h 1469"/>
+              <a:gd name="T4" fmla="*/ 573 w 900"/>
+              <a:gd name="T5" fmla="*/ 280 h 1469"/>
+              <a:gd name="T6" fmla="*/ 601 w 900"/>
+              <a:gd name="T7" fmla="*/ 330 h 1469"/>
+              <a:gd name="T8" fmla="*/ 604 w 900"/>
+              <a:gd name="T9" fmla="*/ 437 h 1469"/>
+              <a:gd name="T10" fmla="*/ 579 w 900"/>
+              <a:gd name="T11" fmla="*/ 589 h 1469"/>
+              <a:gd name="T12" fmla="*/ 540 w 900"/>
+              <a:gd name="T13" fmla="*/ 739 h 1469"/>
+              <a:gd name="T14" fmla="*/ 500 w 900"/>
+              <a:gd name="T15" fmla="*/ 891 h 1469"/>
+              <a:gd name="T16" fmla="*/ 474 w 900"/>
+              <a:gd name="T17" fmla="*/ 1077 h 1469"/>
+              <a:gd name="T18" fmla="*/ 469 w 900"/>
+              <a:gd name="T19" fmla="*/ 1362 h 1469"/>
+              <a:gd name="T20" fmla="*/ 476 w 900"/>
+              <a:gd name="T21" fmla="*/ 1469 h 1469"/>
+              <a:gd name="T22" fmla="*/ 505 w 900"/>
+              <a:gd name="T23" fmla="*/ 1467 h 1469"/>
+              <a:gd name="T24" fmla="*/ 555 w 900"/>
+              <a:gd name="T25" fmla="*/ 1462 h 1469"/>
+              <a:gd name="T26" fmla="*/ 617 w 900"/>
+              <a:gd name="T27" fmla="*/ 1454 h 1469"/>
+              <a:gd name="T28" fmla="*/ 685 w 900"/>
+              <a:gd name="T29" fmla="*/ 1444 h 1469"/>
+              <a:gd name="T30" fmla="*/ 748 w 900"/>
+              <a:gd name="T31" fmla="*/ 1429 h 1469"/>
+              <a:gd name="T32" fmla="*/ 801 w 900"/>
+              <a:gd name="T33" fmla="*/ 1410 h 1469"/>
+              <a:gd name="T34" fmla="*/ 833 w 900"/>
+              <a:gd name="T35" fmla="*/ 1388 h 1469"/>
+              <a:gd name="T36" fmla="*/ 863 w 900"/>
+              <a:gd name="T37" fmla="*/ 1204 h 1469"/>
+              <a:gd name="T38" fmla="*/ 894 w 900"/>
+              <a:gd name="T39" fmla="*/ 903 h 1469"/>
+              <a:gd name="T40" fmla="*/ 899 w 900"/>
+              <a:gd name="T41" fmla="*/ 640 h 1469"/>
+              <a:gd name="T42" fmla="*/ 871 w 900"/>
+              <a:gd name="T43" fmla="*/ 395 h 1469"/>
+              <a:gd name="T44" fmla="*/ 834 w 900"/>
+              <a:gd name="T45" fmla="*/ 248 h 1469"/>
+              <a:gd name="T46" fmla="*/ 803 w 900"/>
+              <a:gd name="T47" fmla="*/ 201 h 1469"/>
+              <a:gd name="T48" fmla="*/ 763 w 900"/>
+              <a:gd name="T49" fmla="*/ 159 h 1469"/>
+              <a:gd name="T50" fmla="*/ 718 w 900"/>
+              <a:gd name="T51" fmla="*/ 121 h 1469"/>
+              <a:gd name="T52" fmla="*/ 665 w 900"/>
+              <a:gd name="T53" fmla="*/ 86 h 1469"/>
+              <a:gd name="T54" fmla="*/ 611 w 900"/>
+              <a:gd name="T55" fmla="*/ 56 h 1469"/>
+              <a:gd name="T56" fmla="*/ 554 w 900"/>
+              <a:gd name="T57" fmla="*/ 31 h 1469"/>
+              <a:gd name="T58" fmla="*/ 497 w 900"/>
+              <a:gd name="T59" fmla="*/ 10 h 1469"/>
+              <a:gd name="T60" fmla="*/ 439 w 900"/>
+              <a:gd name="T61" fmla="*/ 0 h 1469"/>
+              <a:gd name="T62" fmla="*/ 371 w 900"/>
+              <a:gd name="T63" fmla="*/ 3 h 1469"/>
+              <a:gd name="T64" fmla="*/ 300 w 900"/>
+              <a:gd name="T65" fmla="*/ 11 h 1469"/>
+              <a:gd name="T66" fmla="*/ 228 w 900"/>
+              <a:gd name="T67" fmla="*/ 26 h 1469"/>
+              <a:gd name="T68" fmla="*/ 159 w 900"/>
+              <a:gd name="T69" fmla="*/ 50 h 1469"/>
+              <a:gd name="T70" fmla="*/ 97 w 900"/>
+              <a:gd name="T71" fmla="*/ 82 h 1469"/>
+              <a:gd name="T72" fmla="*/ 47 w 900"/>
+              <a:gd name="T73" fmla="*/ 124 h 1469"/>
+              <a:gd name="T74" fmla="*/ 12 w 900"/>
+              <a:gd name="T75" fmla="*/ 176 h 1469"/>
+              <a:gd name="T76" fmla="*/ 4 w 900"/>
+              <a:gd name="T77" fmla="*/ 206 h 1469"/>
+              <a:gd name="T78" fmla="*/ 29 w 900"/>
+              <a:gd name="T79" fmla="*/ 204 h 1469"/>
+              <a:gd name="T80" fmla="*/ 77 w 900"/>
+              <a:gd name="T81" fmla="*/ 199 h 1469"/>
+              <a:gd name="T82" fmla="*/ 140 w 900"/>
+              <a:gd name="T83" fmla="*/ 192 h 1469"/>
+              <a:gd name="T84" fmla="*/ 213 w 900"/>
+              <a:gd name="T85" fmla="*/ 185 h 1469"/>
+              <a:gd name="T86" fmla="*/ 288 w 900"/>
+              <a:gd name="T87" fmla="*/ 181 h 1469"/>
+              <a:gd name="T88" fmla="*/ 361 w 900"/>
+              <a:gd name="T89" fmla="*/ 180 h 1469"/>
+              <a:gd name="T90" fmla="*/ 424 w 900"/>
+              <a:gd name="T91" fmla="*/ 184 h 1469"/>
+            </a:gdLst>
+            <a:ahLst/>
+            <a:cxnLst>
+              <a:cxn ang="0">
+                <a:pos x="T0" y="T1"/>
+              </a:cxn>
+              <a:cxn ang="0">
+                <a:pos x="T2" y="T3"/>
+              </a:cxn>
+              <a:cxn ang="0">
+                <a:pos x="T4" y="T5"/>
+              </a:cxn>
+              <a:cxn ang="0">
+                <a:pos x="T6" y="T7"/>
+              </a:cxn>
+              <a:cxn ang="0">
+                <a:pos x="T8" y="T9"/>
+              </a:cxn>
+              <a:cxn ang="0">
+                <a:pos x="T10" y="T11"/>
+              </a:cxn>
+              <a:cxn ang="0">
+                <a:pos x="T12" y="T13"/>
+              </a:cxn>
+              <a:cxn ang="0">
+                <a:pos x="T14" y="T15"/>
+              </a:cxn>
+              <a:cxn ang="0">
+                <a:pos x="T16" y="T17"/>
+              </a:cxn>
+              <a:cxn ang="0">
+                <a:pos x="T18" y="T19"/>
+              </a:cxn>
+              <a:cxn ang="0">
+                <a:pos x="T20" y="T21"/>
+              </a:cxn>
+              <a:cxn ang="0">
+                <a:pos x="T22" y="T23"/>
+              </a:cxn>
+              <a:cxn ang="0">
+                <a:pos x="T24" y="T25"/>
+              </a:cxn>
+              <a:cxn ang="0">
+                <a:pos x="T26" y="T27"/>
+              </a:cxn>
+              <a:cxn ang="0">
+                <a:pos x="T28" y="T29"/>
+              </a:cxn>
+              <a:cxn ang="0">
+                <a:pos x="T30" y="T31"/>
+              </a:cxn>
+              <a:cxn ang="0">
+                <a:pos x="T32" y="T33"/>
+              </a:cxn>
+              <a:cxn ang="0">
+                <a:pos x="T34" y="T35"/>
+              </a:cxn>
+              <a:cxn ang="0">
+                <a:pos x="T36" y="T37"/>
+              </a:cxn>
+              <a:cxn ang="0">
+                <a:pos x="T38" y="T39"/>
+              </a:cxn>
+              <a:cxn ang="0">
+                <a:pos x="T40" y="T41"/>
+              </a:cxn>
+              <a:cxn ang="0">
+                <a:pos x="T42" y="T43"/>
+              </a:cxn>
+              <a:cxn ang="0">
+                <a:pos x="T44" y="T45"/>
+              </a:cxn>
+              <a:cxn ang="0">
+                <a:pos x="T46" y="T47"/>
+              </a:cxn>
+              <a:cxn ang="0">
+                <a:pos x="T48" y="T49"/>
+              </a:cxn>
+              <a:cxn ang="0">
+                <a:pos x="T50" y="T51"/>
+              </a:cxn>
+              <a:cxn ang="0">
+                <a:pos x="T52" y="T53"/>
+              </a:cxn>
+              <a:cxn ang="0">
+                <a:pos x="T54" y="T55"/>
+              </a:cxn>
+              <a:cxn ang="0">
+                <a:pos x="T56" y="T57"/>
+              </a:cxn>
+              <a:cxn ang="0">
+                <a:pos x="T58" y="T59"/>
+              </a:cxn>
+              <a:cxn ang="0">
+                <a:pos x="T60" y="T61"/>
+              </a:cxn>
+              <a:cxn ang="0">
+                <a:pos x="T62" y="T63"/>
+              </a:cxn>
+              <a:cxn ang="0">
+                <a:pos x="T64" y="T65"/>
+              </a:cxn>
+              <a:cxn ang="0">
+                <a:pos x="T66" y="T67"/>
+              </a:cxn>
+              <a:cxn ang="0">
+                <a:pos x="T68" y="T69"/>
+              </a:cxn>
+              <a:cxn ang="0">
+                <a:pos x="T70" y="T71"/>
+              </a:cxn>
+              <a:cxn ang="0">
+                <a:pos x="T72" y="T73"/>
+              </a:cxn>
+              <a:cxn ang="0">
+                <a:pos x="T74" y="T75"/>
+              </a:cxn>
+              <a:cxn ang="0">
+                <a:pos x="T76" y="T77"/>
+              </a:cxn>
+              <a:cxn ang="0">
+                <a:pos x="T78" y="T79"/>
+              </a:cxn>
+              <a:cxn ang="0">
+                <a:pos x="T80" y="T81"/>
+              </a:cxn>
+              <a:cxn ang="0">
+                <a:pos x="T82" y="T83"/>
+              </a:cxn>
+              <a:cxn ang="0">
+                <a:pos x="T84" y="T85"/>
+              </a:cxn>
+              <a:cxn ang="0">
+                <a:pos x="T86" y="T87"/>
+              </a:cxn>
+              <a:cxn ang="0">
+                <a:pos x="T88" y="T89"/>
+              </a:cxn>
+              <a:cxn ang="0">
+                <a:pos x="T90" y="T91"/>
+              </a:cxn>
+            </a:cxnLst>
+            <a:rect l="0" t="0" r="r" b="b"/>
+            <a:pathLst>
+              <a:path w="900" h="1469">
+                <a:moveTo>
+                  <a:pt x="450" y="188"/>
+                </a:moveTo>
+                <a:lnTo>
+                  <a:pt x="475" y="204"/>
+                </a:lnTo>
+                <a:lnTo>
+                  <a:pt x="502" y="221"/>
+                </a:lnTo>
+                <a:lnTo>
+                  <a:pt x="527" y="239"/>
+                </a:lnTo>
+                <a:lnTo>
+                  <a:pt x="552" y="258"/>
+                </a:lnTo>
+                <a:lnTo>
+                  <a:pt x="573" y="280"/>
+                </a:lnTo>
+                <a:lnTo>
+                  <a:pt x="590" y="303"/>
+                </a:lnTo>
+                <a:lnTo>
+                  <a:pt x="601" y="330"/>
+                </a:lnTo>
+                <a:lnTo>
+                  <a:pt x="606" y="359"/>
+                </a:lnTo>
+                <a:lnTo>
+                  <a:pt x="604" y="437"/>
+                </a:lnTo>
+                <a:lnTo>
+                  <a:pt x="593" y="514"/>
+                </a:lnTo>
+                <a:lnTo>
+                  <a:pt x="579" y="589"/>
+                </a:lnTo>
+                <a:lnTo>
+                  <a:pt x="560" y="664"/>
+                </a:lnTo>
+                <a:lnTo>
+                  <a:pt x="540" y="739"/>
+                </a:lnTo>
+                <a:lnTo>
+                  <a:pt x="519" y="815"/>
+                </a:lnTo>
+                <a:lnTo>
+                  <a:pt x="500" y="891"/>
+                </a:lnTo>
+                <a:lnTo>
+                  <a:pt x="484" y="969"/>
+                </a:lnTo>
+                <a:lnTo>
+                  <a:pt x="474" y="1077"/>
+                </a:lnTo>
+                <a:lnTo>
+                  <a:pt x="469" y="1220"/>
+                </a:lnTo>
+                <a:lnTo>
+                  <a:pt x="469" y="1362"/>
+                </a:lnTo>
+                <a:lnTo>
+                  <a:pt x="472" y="1469"/>
+                </a:lnTo>
+                <a:lnTo>
+                  <a:pt x="476" y="1469"/>
+                </a:lnTo>
+                <a:lnTo>
+                  <a:pt x="486" y="1468"/>
+                </a:lnTo>
+                <a:lnTo>
+                  <a:pt x="505" y="1467"/>
+                </a:lnTo>
+                <a:lnTo>
+                  <a:pt x="527" y="1465"/>
+                </a:lnTo>
+                <a:lnTo>
+                  <a:pt x="555" y="1462"/>
+                </a:lnTo>
+                <a:lnTo>
+                  <a:pt x="584" y="1459"/>
+                </a:lnTo>
+                <a:lnTo>
+                  <a:pt x="617" y="1454"/>
+                </a:lnTo>
+                <a:lnTo>
+                  <a:pt x="650" y="1449"/>
+                </a:lnTo>
+                <a:lnTo>
+                  <a:pt x="685" y="1444"/>
+                </a:lnTo>
+                <a:lnTo>
+                  <a:pt x="718" y="1436"/>
+                </a:lnTo>
+                <a:lnTo>
+                  <a:pt x="748" y="1429"/>
+                </a:lnTo>
+                <a:lnTo>
+                  <a:pt x="776" y="1421"/>
+                </a:lnTo>
+                <a:lnTo>
+                  <a:pt x="801" y="1410"/>
+                </a:lnTo>
+                <a:lnTo>
+                  <a:pt x="819" y="1400"/>
+                </a:lnTo>
+                <a:lnTo>
+                  <a:pt x="833" y="1388"/>
+                </a:lnTo>
+                <a:lnTo>
+                  <a:pt x="838" y="1374"/>
+                </a:lnTo>
+                <a:lnTo>
+                  <a:pt x="863" y="1204"/>
+                </a:lnTo>
+                <a:lnTo>
+                  <a:pt x="881" y="1048"/>
+                </a:lnTo>
+                <a:lnTo>
+                  <a:pt x="894" y="903"/>
+                </a:lnTo>
+                <a:lnTo>
+                  <a:pt x="900" y="769"/>
+                </a:lnTo>
+                <a:lnTo>
+                  <a:pt x="899" y="640"/>
+                </a:lnTo>
+                <a:lnTo>
+                  <a:pt x="888" y="517"/>
+                </a:lnTo>
+                <a:lnTo>
+                  <a:pt x="871" y="395"/>
+                </a:lnTo>
+                <a:lnTo>
+                  <a:pt x="845" y="273"/>
+                </a:lnTo>
+                <a:lnTo>
+                  <a:pt x="834" y="248"/>
+                </a:lnTo>
+                <a:lnTo>
+                  <a:pt x="819" y="224"/>
+                </a:lnTo>
+                <a:lnTo>
+                  <a:pt x="803" y="201"/>
+                </a:lnTo>
+                <a:lnTo>
+                  <a:pt x="784" y="180"/>
+                </a:lnTo>
+                <a:lnTo>
+                  <a:pt x="763" y="159"/>
+                </a:lnTo>
+                <a:lnTo>
+                  <a:pt x="741" y="139"/>
+                </a:lnTo>
+                <a:lnTo>
+                  <a:pt x="718" y="121"/>
+                </a:lnTo>
+                <a:lnTo>
+                  <a:pt x="691" y="103"/>
+                </a:lnTo>
+                <a:lnTo>
+                  <a:pt x="665" y="86"/>
+                </a:lnTo>
+                <a:lnTo>
+                  <a:pt x="638" y="71"/>
+                </a:lnTo>
+                <a:lnTo>
+                  <a:pt x="611" y="56"/>
+                </a:lnTo>
+                <a:lnTo>
+                  <a:pt x="582" y="43"/>
+                </a:lnTo>
+                <a:lnTo>
+                  <a:pt x="554" y="31"/>
+                </a:lnTo>
+                <a:lnTo>
+                  <a:pt x="525" y="20"/>
+                </a:lnTo>
+                <a:lnTo>
+                  <a:pt x="497" y="10"/>
+                </a:lnTo>
+                <a:lnTo>
+                  <a:pt x="469" y="1"/>
+                </a:lnTo>
+                <a:lnTo>
+                  <a:pt x="439" y="0"/>
+                </a:lnTo>
+                <a:lnTo>
+                  <a:pt x="406" y="0"/>
+                </a:lnTo>
+                <a:lnTo>
+                  <a:pt x="371" y="3"/>
+                </a:lnTo>
+                <a:lnTo>
+                  <a:pt x="336" y="6"/>
+                </a:lnTo>
+                <a:lnTo>
+                  <a:pt x="300" y="11"/>
+                </a:lnTo>
+                <a:lnTo>
+                  <a:pt x="263" y="17"/>
+                </a:lnTo>
+                <a:lnTo>
+                  <a:pt x="228" y="26"/>
+                </a:lnTo>
+                <a:lnTo>
+                  <a:pt x="193" y="37"/>
+                </a:lnTo>
+                <a:lnTo>
+                  <a:pt x="159" y="50"/>
+                </a:lnTo>
+                <a:lnTo>
+                  <a:pt x="127" y="65"/>
+                </a:lnTo>
+                <a:lnTo>
+                  <a:pt x="97" y="82"/>
+                </a:lnTo>
+                <a:lnTo>
+                  <a:pt x="71" y="102"/>
+                </a:lnTo>
+                <a:lnTo>
+                  <a:pt x="47" y="124"/>
+                </a:lnTo>
+                <a:lnTo>
+                  <a:pt x="26" y="148"/>
+                </a:lnTo>
+                <a:lnTo>
+                  <a:pt x="12" y="176"/>
+                </a:lnTo>
+                <a:lnTo>
+                  <a:pt x="0" y="206"/>
+                </a:lnTo>
+                <a:lnTo>
+                  <a:pt x="4" y="206"/>
+                </a:lnTo>
+                <a:lnTo>
+                  <a:pt x="13" y="206"/>
+                </a:lnTo>
+                <a:lnTo>
+                  <a:pt x="29" y="204"/>
+                </a:lnTo>
+                <a:lnTo>
+                  <a:pt x="50" y="202"/>
+                </a:lnTo>
+                <a:lnTo>
+                  <a:pt x="77" y="199"/>
+                </a:lnTo>
+                <a:lnTo>
+                  <a:pt x="107" y="196"/>
+                </a:lnTo>
+                <a:lnTo>
+                  <a:pt x="140" y="192"/>
+                </a:lnTo>
+                <a:lnTo>
+                  <a:pt x="176" y="188"/>
+                </a:lnTo>
+                <a:lnTo>
+                  <a:pt x="213" y="185"/>
+                </a:lnTo>
+                <a:lnTo>
+                  <a:pt x="251" y="183"/>
+                </a:lnTo>
+                <a:lnTo>
+                  <a:pt x="288" y="181"/>
+                </a:lnTo>
+                <a:lnTo>
+                  <a:pt x="325" y="180"/>
+                </a:lnTo>
+                <a:lnTo>
+                  <a:pt x="361" y="180"/>
+                </a:lnTo>
+                <a:lnTo>
+                  <a:pt x="394" y="181"/>
+                </a:lnTo>
+                <a:lnTo>
+                  <a:pt x="424" y="184"/>
+                </a:lnTo>
+                <a:lnTo>
+                  <a:pt x="450" y="188"/>
+                </a:lnTo>
+                <a:close/>
+              </a:path>
+            </a:pathLst>
+          </a:custGeom>
+          <a:solidFill>
+            <a:srgbClr val="FFFFEA"/>
+          </a:solidFill>
+          <a:ln>
+            <a:noFill/>
+          </a:ln>
+          <a:extLst>
+            <a:ext uri="{91240B29-F687-4F45-9708-019B960494DF}">
+              <a14:hiddenLine xmlns:a14="http://schemas.microsoft.com/office/drawing/2010/main" w="9525">
+                <a:solidFill>
+                  <a:srgbClr val="000000"/>
+                </a:solidFill>
+                <a:round/>
+                <a:headEnd/>
+                <a:tailEnd/>
+              </a14:hiddenLine>
+            </a:ext>
+          </a:extLst>
+        </p:spPr>
+        <p:txBody>
+          <a:bodyPr vert="horz" wrap="square" lIns="91440" tIns="45720" rIns="91440" bIns="45720" numCol="1" anchor="t" anchorCtr="0" compatLnSpc="1">
+            <a:prstTxWarp prst="textNoShape">
+              <a:avLst/>
+            </a:prstTxWarp>
+          </a:bodyPr>
+          <a:lstStyle/>
+          <a:p>
+            <a:endParaRPr lang="en-SG"/>
+          </a:p>
+        </p:txBody>
+      </p:sp>
+      <p:sp>
+        <p:nvSpPr>
+          <p:cNvPr id="7" name="Freeform 8"/>
+          <p:cNvSpPr>
+            <a:spLocks/>
+          </p:cNvSpPr>
+          <p:nvPr/>
+        </p:nvSpPr>
+        <p:spPr bwMode="auto">
+          <a:xfrm>
+            <a:off x="6364288" y="1446213"/>
+            <a:ext cx="15875" cy="25400"/>
+          </a:xfrm>
+          <a:custGeom>
+            <a:avLst/>
+            <a:gdLst>
+              <a:gd name="T0" fmla="*/ 2 w 81"/>
+              <a:gd name="T1" fmla="*/ 11 h 146"/>
+              <a:gd name="T2" fmla="*/ 0 w 81"/>
+              <a:gd name="T3" fmla="*/ 44 h 146"/>
+              <a:gd name="T4" fmla="*/ 1 w 81"/>
+              <a:gd name="T5" fmla="*/ 76 h 146"/>
+              <a:gd name="T6" fmla="*/ 7 w 81"/>
+              <a:gd name="T7" fmla="*/ 109 h 146"/>
+              <a:gd name="T8" fmla="*/ 21 w 81"/>
+              <a:gd name="T9" fmla="*/ 140 h 146"/>
+              <a:gd name="T10" fmla="*/ 25 w 81"/>
+              <a:gd name="T11" fmla="*/ 144 h 146"/>
+              <a:gd name="T12" fmla="*/ 33 w 81"/>
+              <a:gd name="T13" fmla="*/ 146 h 146"/>
+              <a:gd name="T14" fmla="*/ 43 w 81"/>
+              <a:gd name="T15" fmla="*/ 145 h 146"/>
+              <a:gd name="T16" fmla="*/ 55 w 81"/>
+              <a:gd name="T17" fmla="*/ 143 h 146"/>
+              <a:gd name="T18" fmla="*/ 65 w 81"/>
+              <a:gd name="T19" fmla="*/ 139 h 146"/>
+              <a:gd name="T20" fmla="*/ 74 w 81"/>
+              <a:gd name="T21" fmla="*/ 133 h 146"/>
+              <a:gd name="T22" fmla="*/ 80 w 81"/>
+              <a:gd name="T23" fmla="*/ 128 h 146"/>
+              <a:gd name="T24" fmla="*/ 81 w 81"/>
+              <a:gd name="T25" fmla="*/ 122 h 146"/>
+              <a:gd name="T26" fmla="*/ 77 w 81"/>
+              <a:gd name="T27" fmla="*/ 106 h 146"/>
+              <a:gd name="T28" fmla="*/ 73 w 81"/>
+              <a:gd name="T29" fmla="*/ 90 h 146"/>
+              <a:gd name="T30" fmla="*/ 68 w 81"/>
+              <a:gd name="T31" fmla="*/ 75 h 146"/>
+              <a:gd name="T32" fmla="*/ 63 w 81"/>
+              <a:gd name="T33" fmla="*/ 60 h 146"/>
+              <a:gd name="T34" fmla="*/ 56 w 81"/>
+              <a:gd name="T35" fmla="*/ 45 h 146"/>
+              <a:gd name="T36" fmla="*/ 48 w 81"/>
+              <a:gd name="T37" fmla="*/ 30 h 146"/>
+              <a:gd name="T38" fmla="*/ 40 w 81"/>
+              <a:gd name="T39" fmla="*/ 16 h 146"/>
+              <a:gd name="T40" fmla="*/ 31 w 81"/>
+              <a:gd name="T41" fmla="*/ 3 h 146"/>
+              <a:gd name="T42" fmla="*/ 25 w 81"/>
+              <a:gd name="T43" fmla="*/ 0 h 146"/>
+              <a:gd name="T44" fmla="*/ 15 w 81"/>
+              <a:gd name="T45" fmla="*/ 1 h 146"/>
+              <a:gd name="T46" fmla="*/ 6 w 81"/>
+              <a:gd name="T47" fmla="*/ 6 h 146"/>
+              <a:gd name="T48" fmla="*/ 2 w 81"/>
+              <a:gd name="T49" fmla="*/ 11 h 146"/>
+              <a:gd name="T50" fmla="*/ 2 w 81"/>
+              <a:gd name="T51" fmla="*/ 11 h 146"/>
+            </a:gdLst>
+            <a:ahLst/>
+            <a:cxnLst>
+              <a:cxn ang="0">
+                <a:pos x="T0" y="T1"/>
+              </a:cxn>
+              <a:cxn ang="0">
+                <a:pos x="T2" y="T3"/>
+              </a:cxn>
+              <a:cxn ang="0">
+                <a:pos x="T4" y="T5"/>
+              </a:cxn>
+              <a:cxn ang="0">
+                <a:pos x="T6" y="T7"/>
+              </a:cxn>
+              <a:cxn ang="0">
+                <a:pos x="T8" y="T9"/>
+              </a:cxn>
+              <a:cxn ang="0">
+                <a:pos x="T10" y="T11"/>
+              </a:cxn>
+              <a:cxn ang="0">
+                <a:pos x="T12" y="T13"/>
+              </a:cxn>
+              <a:cxn ang="0">
+                <a:pos x="T14" y="T15"/>
+              </a:cxn>
+              <a:cxn ang="0">
+                <a:pos x="T16" y="T17"/>
+              </a:cxn>
+              <a:cxn ang="0">
+                <a:pos x="T18" y="T19"/>
+              </a:cxn>
+              <a:cxn ang="0">
+                <a:pos x="T20" y="T21"/>
+              </a:cxn>
+              <a:cxn ang="0">
+                <a:pos x="T22" y="T23"/>
+              </a:cxn>
+              <a:cxn ang="0">
+                <a:pos x="T24" y="T25"/>
+              </a:cxn>
+              <a:cxn ang="0">
+                <a:pos x="T26" y="T27"/>
+              </a:cxn>
+              <a:cxn ang="0">
+                <a:pos x="T28" y="T29"/>
+              </a:cxn>
+              <a:cxn ang="0">
+                <a:pos x="T30" y="T31"/>
+              </a:cxn>
+              <a:cxn ang="0">
+                <a:pos x="T32" y="T33"/>
+              </a:cxn>
+              <a:cxn ang="0">
+                <a:pos x="T34" y="T35"/>
+              </a:cxn>
+              <a:cxn ang="0">
+                <a:pos x="T36" y="T37"/>
+              </a:cxn>
+              <a:cxn ang="0">
+                <a:pos x="T38" y="T39"/>
+              </a:cxn>
+              <a:cxn ang="0">
+                <a:pos x="T40" y="T41"/>
+              </a:cxn>
+              <a:cxn ang="0">
+                <a:pos x="T42" y="T43"/>
+              </a:cxn>
+              <a:cxn ang="0">
+                <a:pos x="T44" y="T45"/>
+              </a:cxn>
+              <a:cxn ang="0">
+                <a:pos x="T46" y="T47"/>
+              </a:cxn>
+              <a:cxn ang="0">
+                <a:pos x="T48" y="T49"/>
+              </a:cxn>
+              <a:cxn ang="0">
+                <a:pos x="T50" y="T51"/>
+              </a:cxn>
+            </a:cxnLst>
+            <a:rect l="0" t="0" r="r" b="b"/>
+            <a:pathLst>
+              <a:path w="81" h="146">
+                <a:moveTo>
+                  <a:pt x="2" y="11"/>
+                </a:moveTo>
+                <a:lnTo>
+                  <a:pt x="0" y="44"/>
+                </a:lnTo>
+                <a:lnTo>
+                  <a:pt x="1" y="76"/>
+                </a:lnTo>
+                <a:lnTo>
+                  <a:pt x="7" y="109"/>
+                </a:lnTo>
+                <a:lnTo>
+                  <a:pt x="21" y="140"/>
+                </a:lnTo>
+                <a:lnTo>
+                  <a:pt x="25" y="144"/>
+                </a:lnTo>
+                <a:lnTo>
+                  <a:pt x="33" y="146"/>
+                </a:lnTo>
+                <a:lnTo>
+                  <a:pt x="43" y="145"/>
+                </a:lnTo>
+                <a:lnTo>
+                  <a:pt x="55" y="143"/>
+                </a:lnTo>
+                <a:lnTo>
+                  <a:pt x="65" y="139"/>
+                </a:lnTo>
+                <a:lnTo>
+                  <a:pt x="74" y="133"/>
+                </a:lnTo>
+                <a:lnTo>
+                  <a:pt x="80" y="128"/>
+                </a:lnTo>
+                <a:lnTo>
+                  <a:pt x="81" y="122"/>
+                </a:lnTo>
+                <a:lnTo>
+                  <a:pt x="77" y="106"/>
+                </a:lnTo>
+                <a:lnTo>
+                  <a:pt x="73" y="90"/>
+                </a:lnTo>
+                <a:lnTo>
+                  <a:pt x="68" y="75"/>
+                </a:lnTo>
+                <a:lnTo>
+                  <a:pt x="63" y="60"/>
+                </a:lnTo>
+                <a:lnTo>
+                  <a:pt x="56" y="45"/>
+                </a:lnTo>
+                <a:lnTo>
+                  <a:pt x="48" y="30"/>
+                </a:lnTo>
+                <a:lnTo>
+                  <a:pt x="40" y="16"/>
+                </a:lnTo>
+                <a:lnTo>
+                  <a:pt x="31" y="3"/>
+                </a:lnTo>
+                <a:lnTo>
+                  <a:pt x="25" y="0"/>
+                </a:lnTo>
+                <a:lnTo>
+                  <a:pt x="15" y="1"/>
+                </a:lnTo>
+                <a:lnTo>
+                  <a:pt x="6" y="6"/>
+                </a:lnTo>
+                <a:lnTo>
+                  <a:pt x="2" y="11"/>
+                </a:lnTo>
+                <a:lnTo>
+                  <a:pt x="2" y="11"/>
+                </a:lnTo>
+                <a:close/>
+              </a:path>
+            </a:pathLst>
+          </a:custGeom>
+          <a:solidFill>
+            <a:srgbClr val="FFFFEA"/>
+          </a:solidFill>
+          <a:ln>
+            <a:noFill/>
+          </a:ln>
+          <a:extLst>
+            <a:ext uri="{91240B29-F687-4F45-9708-019B960494DF}">
+              <a14:hiddenLine xmlns:a14="http://schemas.microsoft.com/office/drawing/2010/main" w="9525">
+                <a:solidFill>
+                  <a:srgbClr val="000000"/>
+                </a:solidFill>
+                <a:round/>
+                <a:headEnd/>
+                <a:tailEnd/>
+              </a14:hiddenLine>
+            </a:ext>
+          </a:extLst>
+        </p:spPr>
+        <p:txBody>
+          <a:bodyPr vert="horz" wrap="square" lIns="91440" tIns="45720" rIns="91440" bIns="45720" numCol="1" anchor="t" anchorCtr="0" compatLnSpc="1">
+            <a:prstTxWarp prst="textNoShape">
+              <a:avLst/>
+            </a:prstTxWarp>
+          </a:bodyPr>
+          <a:lstStyle/>
+          <a:p>
+            <a:endParaRPr lang="en-SG"/>
+          </a:p>
+        </p:txBody>
+      </p:sp>
+      <p:sp>
+        <p:nvSpPr>
+          <p:cNvPr id="8" name="Freeform 9"/>
+          <p:cNvSpPr>
+            <a:spLocks/>
+          </p:cNvSpPr>
+          <p:nvPr/>
+        </p:nvSpPr>
+        <p:spPr bwMode="auto">
+          <a:xfrm rot="2760171" flipH="1">
+            <a:off x="6071869" y="1628232"/>
+            <a:ext cx="403225" cy="376238"/>
+          </a:xfrm>
+          <a:custGeom>
+            <a:avLst/>
+            <a:gdLst>
+              <a:gd name="T0" fmla="*/ 1726 w 2029"/>
+              <a:gd name="T1" fmla="*/ 1943 h 2127"/>
+              <a:gd name="T2" fmla="*/ 1429 w 2029"/>
+              <a:gd name="T3" fmla="*/ 2016 h 2127"/>
+              <a:gd name="T4" fmla="*/ 1211 w 2029"/>
+              <a:gd name="T5" fmla="*/ 1616 h 2127"/>
+              <a:gd name="T6" fmla="*/ 1104 w 2029"/>
+              <a:gd name="T7" fmla="*/ 1279 h 2127"/>
+              <a:gd name="T8" fmla="*/ 1307 w 2029"/>
+              <a:gd name="T9" fmla="*/ 1164 h 2127"/>
+              <a:gd name="T10" fmla="*/ 1527 w 2029"/>
+              <a:gd name="T11" fmla="*/ 1092 h 2127"/>
+              <a:gd name="T12" fmla="*/ 1764 w 2029"/>
+              <a:gd name="T13" fmla="*/ 1084 h 2127"/>
+              <a:gd name="T14" fmla="*/ 1610 w 2029"/>
+              <a:gd name="T15" fmla="*/ 1008 h 2127"/>
+              <a:gd name="T16" fmla="*/ 1487 w 2029"/>
+              <a:gd name="T17" fmla="*/ 957 h 2127"/>
+              <a:gd name="T18" fmla="*/ 1403 w 2029"/>
+              <a:gd name="T19" fmla="*/ 1048 h 2127"/>
+              <a:gd name="T20" fmla="*/ 1249 w 2029"/>
+              <a:gd name="T21" fmla="*/ 1107 h 2127"/>
+              <a:gd name="T22" fmla="*/ 1057 w 2029"/>
+              <a:gd name="T23" fmla="*/ 1220 h 2127"/>
+              <a:gd name="T24" fmla="*/ 1094 w 2029"/>
+              <a:gd name="T25" fmla="*/ 755 h 2127"/>
+              <a:gd name="T26" fmla="*/ 1276 w 2029"/>
+              <a:gd name="T27" fmla="*/ 614 h 2127"/>
+              <a:gd name="T28" fmla="*/ 1401 w 2029"/>
+              <a:gd name="T29" fmla="*/ 847 h 2127"/>
+              <a:gd name="T30" fmla="*/ 1407 w 2029"/>
+              <a:gd name="T31" fmla="*/ 620 h 2127"/>
+              <a:gd name="T32" fmla="*/ 1658 w 2029"/>
+              <a:gd name="T33" fmla="*/ 597 h 2127"/>
+              <a:gd name="T34" fmla="*/ 1886 w 2029"/>
+              <a:gd name="T35" fmla="*/ 836 h 2127"/>
+              <a:gd name="T36" fmla="*/ 1833 w 2029"/>
+              <a:gd name="T37" fmla="*/ 1019 h 2127"/>
+              <a:gd name="T38" fmla="*/ 1897 w 2029"/>
+              <a:gd name="T39" fmla="*/ 1095 h 2127"/>
+              <a:gd name="T40" fmla="*/ 1891 w 2029"/>
+              <a:gd name="T41" fmla="*/ 1639 h 2127"/>
+              <a:gd name="T42" fmla="*/ 1890 w 2029"/>
+              <a:gd name="T43" fmla="*/ 668 h 2127"/>
+              <a:gd name="T44" fmla="*/ 1745 w 2029"/>
+              <a:gd name="T45" fmla="*/ 555 h 2127"/>
+              <a:gd name="T46" fmla="*/ 1603 w 2029"/>
+              <a:gd name="T47" fmla="*/ 501 h 2127"/>
+              <a:gd name="T48" fmla="*/ 1481 w 2029"/>
+              <a:gd name="T49" fmla="*/ 485 h 2127"/>
+              <a:gd name="T50" fmla="*/ 1399 w 2029"/>
+              <a:gd name="T51" fmla="*/ 453 h 2127"/>
+              <a:gd name="T52" fmla="*/ 1343 w 2029"/>
+              <a:gd name="T53" fmla="*/ 503 h 2127"/>
+              <a:gd name="T54" fmla="*/ 1374 w 2029"/>
+              <a:gd name="T55" fmla="*/ 399 h 2127"/>
+              <a:gd name="T56" fmla="*/ 1409 w 2029"/>
+              <a:gd name="T57" fmla="*/ 328 h 2127"/>
+              <a:gd name="T58" fmla="*/ 1371 w 2029"/>
+              <a:gd name="T59" fmla="*/ 317 h 2127"/>
+              <a:gd name="T60" fmla="*/ 1297 w 2029"/>
+              <a:gd name="T61" fmla="*/ 155 h 2127"/>
+              <a:gd name="T62" fmla="*/ 1142 w 2029"/>
+              <a:gd name="T63" fmla="*/ 34 h 2127"/>
+              <a:gd name="T64" fmla="*/ 1014 w 2029"/>
+              <a:gd name="T65" fmla="*/ 1 h 2127"/>
+              <a:gd name="T66" fmla="*/ 844 w 2029"/>
+              <a:gd name="T67" fmla="*/ 16 h 2127"/>
+              <a:gd name="T68" fmla="*/ 655 w 2029"/>
+              <a:gd name="T69" fmla="*/ 87 h 2127"/>
+              <a:gd name="T70" fmla="*/ 486 w 2029"/>
+              <a:gd name="T71" fmla="*/ 199 h 2127"/>
+              <a:gd name="T72" fmla="*/ 310 w 2029"/>
+              <a:gd name="T73" fmla="*/ 520 h 2127"/>
+              <a:gd name="T74" fmla="*/ 474 w 2029"/>
+              <a:gd name="T75" fmla="*/ 980 h 2127"/>
+              <a:gd name="T76" fmla="*/ 702 w 2029"/>
+              <a:gd name="T77" fmla="*/ 1291 h 2127"/>
+              <a:gd name="T78" fmla="*/ 551 w 2029"/>
+              <a:gd name="T79" fmla="*/ 1622 h 2127"/>
+              <a:gd name="T80" fmla="*/ 239 w 2029"/>
+              <a:gd name="T81" fmla="*/ 1637 h 2127"/>
+              <a:gd name="T82" fmla="*/ 43 w 2029"/>
+              <a:gd name="T83" fmla="*/ 1652 h 2127"/>
+              <a:gd name="T84" fmla="*/ 186 w 2029"/>
+              <a:gd name="T85" fmla="*/ 1716 h 2127"/>
+              <a:gd name="T86" fmla="*/ 311 w 2029"/>
+              <a:gd name="T87" fmla="*/ 1731 h 2127"/>
+              <a:gd name="T88" fmla="*/ 560 w 2029"/>
+              <a:gd name="T89" fmla="*/ 1709 h 2127"/>
+              <a:gd name="T90" fmla="*/ 819 w 2029"/>
+              <a:gd name="T91" fmla="*/ 1410 h 2127"/>
+              <a:gd name="T92" fmla="*/ 751 w 2029"/>
+              <a:gd name="T93" fmla="*/ 1202 h 2127"/>
+              <a:gd name="T94" fmla="*/ 613 w 2029"/>
+              <a:gd name="T95" fmla="*/ 974 h 2127"/>
+              <a:gd name="T96" fmla="*/ 419 w 2029"/>
+              <a:gd name="T97" fmla="*/ 599 h 2127"/>
+              <a:gd name="T98" fmla="*/ 498 w 2029"/>
+              <a:gd name="T99" fmla="*/ 304 h 2127"/>
+              <a:gd name="T100" fmla="*/ 783 w 2029"/>
+              <a:gd name="T101" fmla="*/ 110 h 2127"/>
+              <a:gd name="T102" fmla="*/ 1044 w 2029"/>
+              <a:gd name="T103" fmla="*/ 85 h 2127"/>
+              <a:gd name="T104" fmla="*/ 1215 w 2029"/>
+              <a:gd name="T105" fmla="*/ 188 h 2127"/>
+              <a:gd name="T106" fmla="*/ 1249 w 2029"/>
+              <a:gd name="T107" fmla="*/ 392 h 2127"/>
+              <a:gd name="T108" fmla="*/ 1123 w 2029"/>
+              <a:gd name="T109" fmla="*/ 615 h 2127"/>
+              <a:gd name="T110" fmla="*/ 989 w 2029"/>
+              <a:gd name="T111" fmla="*/ 850 h 2127"/>
+              <a:gd name="T112" fmla="*/ 986 w 2029"/>
+              <a:gd name="T113" fmla="*/ 1327 h 2127"/>
+              <a:gd name="T114" fmla="*/ 1152 w 2029"/>
+              <a:gd name="T115" fmla="*/ 1757 h 2127"/>
+              <a:gd name="T116" fmla="*/ 1365 w 2029"/>
+              <a:gd name="T117" fmla="*/ 2118 h 2127"/>
+              <a:gd name="T118" fmla="*/ 1989 w 2029"/>
+              <a:gd name="T119" fmla="*/ 1639 h 2127"/>
+            </a:gdLst>
+            <a:ahLst/>
+            <a:cxnLst>
+              <a:cxn ang="0">
+                <a:pos x="T0" y="T1"/>
+              </a:cxn>
+              <a:cxn ang="0">
+                <a:pos x="T2" y="T3"/>
+              </a:cxn>
+              <a:cxn ang="0">
+                <a:pos x="T4" y="T5"/>
+              </a:cxn>
+              <a:cxn ang="0">
+                <a:pos x="T6" y="T7"/>
+              </a:cxn>
+              <a:cxn ang="0">
+                <a:pos x="T8" y="T9"/>
+              </a:cxn>
+              <a:cxn ang="0">
+                <a:pos x="T10" y="T11"/>
+              </a:cxn>
+              <a:cxn ang="0">
+                <a:pos x="T12" y="T13"/>
+              </a:cxn>
+              <a:cxn ang="0">
+                <a:pos x="T14" y="T15"/>
+              </a:cxn>
+              <a:cxn ang="0">
+                <a:pos x="T16" y="T17"/>
+              </a:cxn>
+              <a:cxn ang="0">
+                <a:pos x="T18" y="T19"/>
+              </a:cxn>
+              <a:cxn ang="0">
+                <a:pos x="T20" y="T21"/>
+              </a:cxn>
+              <a:cxn ang="0">
+                <a:pos x="T22" y="T23"/>
+              </a:cxn>
+              <a:cxn ang="0">
+                <a:pos x="T24" y="T25"/>
+              </a:cxn>
+              <a:cxn ang="0">
+                <a:pos x="T26" y="T27"/>
+              </a:cxn>
+              <a:cxn ang="0">
+                <a:pos x="T28" y="T29"/>
+              </a:cxn>
+              <a:cxn ang="0">
+                <a:pos x="T30" y="T31"/>
+              </a:cxn>
+              <a:cxn ang="0">
+                <a:pos x="T32" y="T33"/>
+              </a:cxn>
+              <a:cxn ang="0">
+                <a:pos x="T34" y="T35"/>
+              </a:cxn>
+              <a:cxn ang="0">
+                <a:pos x="T36" y="T37"/>
+              </a:cxn>
+              <a:cxn ang="0">
+                <a:pos x="T38" y="T39"/>
+              </a:cxn>
+              <a:cxn ang="0">
+                <a:pos x="T40" y="T41"/>
+              </a:cxn>
+              <a:cxn ang="0">
+                <a:pos x="T42" y="T43"/>
+              </a:cxn>
+              <a:cxn ang="0">
+                <a:pos x="T44" y="T45"/>
+              </a:cxn>
+              <a:cxn ang="0">
+                <a:pos x="T46" y="T47"/>
+              </a:cxn>
+              <a:cxn ang="0">
+                <a:pos x="T48" y="T49"/>
+              </a:cxn>
+              <a:cxn ang="0">
+                <a:pos x="T50" y="T51"/>
+              </a:cxn>
+              <a:cxn ang="0">
+                <a:pos x="T52" y="T53"/>
+              </a:cxn>
+              <a:cxn ang="0">
+                <a:pos x="T54" y="T55"/>
+              </a:cxn>
+              <a:cxn ang="0">
+                <a:pos x="T56" y="T57"/>
+              </a:cxn>
+              <a:cxn ang="0">
+                <a:pos x="T58" y="T59"/>
+              </a:cxn>
+              <a:cxn ang="0">
+                <a:pos x="T60" y="T61"/>
+              </a:cxn>
+              <a:cxn ang="0">
+                <a:pos x="T62" y="T63"/>
+              </a:cxn>
+              <a:cxn ang="0">
+                <a:pos x="T64" y="T65"/>
+              </a:cxn>
+              <a:cxn ang="0">
+                <a:pos x="T66" y="T67"/>
+              </a:cxn>
+              <a:cxn ang="0">
+                <a:pos x="T68" y="T69"/>
+              </a:cxn>
+              <a:cxn ang="0">
+                <a:pos x="T70" y="T71"/>
+              </a:cxn>
+              <a:cxn ang="0">
+                <a:pos x="T72" y="T73"/>
+              </a:cxn>
+              <a:cxn ang="0">
+                <a:pos x="T74" y="T75"/>
+              </a:cxn>
+              <a:cxn ang="0">
+                <a:pos x="T76" y="T77"/>
+              </a:cxn>
+              <a:cxn ang="0">
+                <a:pos x="T78" y="T79"/>
+              </a:cxn>
+              <a:cxn ang="0">
+                <a:pos x="T80" y="T81"/>
+              </a:cxn>
+              <a:cxn ang="0">
+                <a:pos x="T82" y="T83"/>
+              </a:cxn>
+              <a:cxn ang="0">
+                <a:pos x="T84" y="T85"/>
+              </a:cxn>
+              <a:cxn ang="0">
+                <a:pos x="T86" y="T87"/>
+              </a:cxn>
+              <a:cxn ang="0">
+                <a:pos x="T88" y="T89"/>
+              </a:cxn>
+              <a:cxn ang="0">
+                <a:pos x="T90" y="T91"/>
+              </a:cxn>
+              <a:cxn ang="0">
+                <a:pos x="T92" y="T93"/>
+              </a:cxn>
+              <a:cxn ang="0">
+                <a:pos x="T94" y="T95"/>
+              </a:cxn>
+              <a:cxn ang="0">
+                <a:pos x="T96" y="T97"/>
+              </a:cxn>
+              <a:cxn ang="0">
+                <a:pos x="T98" y="T99"/>
+              </a:cxn>
+              <a:cxn ang="0">
+                <a:pos x="T100" y="T101"/>
+              </a:cxn>
+              <a:cxn ang="0">
+                <a:pos x="T102" y="T103"/>
+              </a:cxn>
+              <a:cxn ang="0">
+                <a:pos x="T104" y="T105"/>
+              </a:cxn>
+              <a:cxn ang="0">
+                <a:pos x="T106" y="T107"/>
+              </a:cxn>
+              <a:cxn ang="0">
+                <a:pos x="T108" y="T109"/>
+              </a:cxn>
+              <a:cxn ang="0">
+                <a:pos x="T110" y="T111"/>
+              </a:cxn>
+              <a:cxn ang="0">
+                <a:pos x="T112" y="T113"/>
+              </a:cxn>
+              <a:cxn ang="0">
+                <a:pos x="T114" y="T115"/>
+              </a:cxn>
+              <a:cxn ang="0">
+                <a:pos x="T116" y="T117"/>
+              </a:cxn>
+              <a:cxn ang="0">
+                <a:pos x="T118" y="T119"/>
+              </a:cxn>
+            </a:cxnLst>
+            <a:rect l="0" t="0" r="r" b="b"/>
+            <a:pathLst>
+              <a:path w="2029" h="2127">
+                <a:moveTo>
+                  <a:pt x="1891" y="1639"/>
+                </a:moveTo>
+                <a:lnTo>
+                  <a:pt x="1885" y="1709"/>
+                </a:lnTo>
+                <a:lnTo>
+                  <a:pt x="1880" y="1778"/>
+                </a:lnTo>
+                <a:lnTo>
+                  <a:pt x="1874" y="1845"/>
+                </a:lnTo>
+                <a:lnTo>
+                  <a:pt x="1869" y="1902"/>
+                </a:lnTo>
+                <a:lnTo>
+                  <a:pt x="1842" y="1910"/>
+                </a:lnTo>
+                <a:lnTo>
+                  <a:pt x="1814" y="1919"/>
+                </a:lnTo>
+                <a:lnTo>
+                  <a:pt x="1785" y="1926"/>
+                </a:lnTo>
+                <a:lnTo>
+                  <a:pt x="1756" y="1935"/>
+                </a:lnTo>
+                <a:lnTo>
+                  <a:pt x="1726" y="1943"/>
+                </a:lnTo>
+                <a:lnTo>
+                  <a:pt x="1696" y="1950"/>
+                </a:lnTo>
+                <a:lnTo>
+                  <a:pt x="1667" y="1959"/>
+                </a:lnTo>
+                <a:lnTo>
+                  <a:pt x="1636" y="1966"/>
+                </a:lnTo>
+                <a:lnTo>
+                  <a:pt x="1606" y="1974"/>
+                </a:lnTo>
+                <a:lnTo>
+                  <a:pt x="1576" y="1981"/>
+                </a:lnTo>
+                <a:lnTo>
+                  <a:pt x="1546" y="1989"/>
+                </a:lnTo>
+                <a:lnTo>
+                  <a:pt x="1516" y="1996"/>
+                </a:lnTo>
+                <a:lnTo>
+                  <a:pt x="1487" y="2003"/>
+                </a:lnTo>
+                <a:lnTo>
+                  <a:pt x="1457" y="2010"/>
+                </a:lnTo>
+                <a:lnTo>
+                  <a:pt x="1429" y="2016"/>
+                </a:lnTo>
+                <a:lnTo>
+                  <a:pt x="1401" y="2022"/>
+                </a:lnTo>
+                <a:lnTo>
+                  <a:pt x="1398" y="2015"/>
+                </a:lnTo>
+                <a:lnTo>
+                  <a:pt x="1383" y="1984"/>
+                </a:lnTo>
+                <a:lnTo>
+                  <a:pt x="1365" y="1946"/>
+                </a:lnTo>
+                <a:lnTo>
+                  <a:pt x="1343" y="1900"/>
+                </a:lnTo>
+                <a:lnTo>
+                  <a:pt x="1320" y="1849"/>
+                </a:lnTo>
+                <a:lnTo>
+                  <a:pt x="1293" y="1793"/>
+                </a:lnTo>
+                <a:lnTo>
+                  <a:pt x="1267" y="1735"/>
+                </a:lnTo>
+                <a:lnTo>
+                  <a:pt x="1239" y="1675"/>
+                </a:lnTo>
+                <a:lnTo>
+                  <a:pt x="1211" y="1616"/>
+                </a:lnTo>
+                <a:lnTo>
+                  <a:pt x="1185" y="1558"/>
+                </a:lnTo>
+                <a:lnTo>
+                  <a:pt x="1159" y="1502"/>
+                </a:lnTo>
+                <a:lnTo>
+                  <a:pt x="1136" y="1451"/>
+                </a:lnTo>
+                <a:lnTo>
+                  <a:pt x="1116" y="1406"/>
+                </a:lnTo>
+                <a:lnTo>
+                  <a:pt x="1099" y="1368"/>
+                </a:lnTo>
+                <a:lnTo>
+                  <a:pt x="1085" y="1339"/>
+                </a:lnTo>
+                <a:lnTo>
+                  <a:pt x="1077" y="1319"/>
+                </a:lnTo>
+                <a:lnTo>
+                  <a:pt x="1074" y="1312"/>
+                </a:lnTo>
+                <a:lnTo>
+                  <a:pt x="1088" y="1295"/>
+                </a:lnTo>
+                <a:lnTo>
+                  <a:pt x="1104" y="1279"/>
+                </a:lnTo>
+                <a:lnTo>
+                  <a:pt x="1123" y="1263"/>
+                </a:lnTo>
+                <a:lnTo>
+                  <a:pt x="1141" y="1249"/>
+                </a:lnTo>
+                <a:lnTo>
+                  <a:pt x="1159" y="1237"/>
+                </a:lnTo>
+                <a:lnTo>
+                  <a:pt x="1178" y="1224"/>
+                </a:lnTo>
+                <a:lnTo>
+                  <a:pt x="1199" y="1212"/>
+                </a:lnTo>
+                <a:lnTo>
+                  <a:pt x="1220" y="1202"/>
+                </a:lnTo>
+                <a:lnTo>
+                  <a:pt x="1241" y="1192"/>
+                </a:lnTo>
+                <a:lnTo>
+                  <a:pt x="1263" y="1182"/>
+                </a:lnTo>
+                <a:lnTo>
+                  <a:pt x="1285" y="1172"/>
+                </a:lnTo>
+                <a:lnTo>
+                  <a:pt x="1307" y="1164"/>
+                </a:lnTo>
+                <a:lnTo>
+                  <a:pt x="1329" y="1155"/>
+                </a:lnTo>
+                <a:lnTo>
+                  <a:pt x="1351" y="1146"/>
+                </a:lnTo>
+                <a:lnTo>
+                  <a:pt x="1373" y="1137"/>
+                </a:lnTo>
+                <a:lnTo>
+                  <a:pt x="1395" y="1129"/>
+                </a:lnTo>
+                <a:lnTo>
+                  <a:pt x="1416" y="1121"/>
+                </a:lnTo>
+                <a:lnTo>
+                  <a:pt x="1438" y="1113"/>
+                </a:lnTo>
+                <a:lnTo>
+                  <a:pt x="1460" y="1107"/>
+                </a:lnTo>
+                <a:lnTo>
+                  <a:pt x="1481" y="1102"/>
+                </a:lnTo>
+                <a:lnTo>
+                  <a:pt x="1504" y="1096"/>
+                </a:lnTo>
+                <a:lnTo>
+                  <a:pt x="1527" y="1092"/>
+                </a:lnTo>
+                <a:lnTo>
+                  <a:pt x="1551" y="1089"/>
+                </a:lnTo>
+                <a:lnTo>
+                  <a:pt x="1573" y="1086"/>
+                </a:lnTo>
+                <a:lnTo>
+                  <a:pt x="1597" y="1084"/>
+                </a:lnTo>
+                <a:lnTo>
+                  <a:pt x="1621" y="1083"/>
+                </a:lnTo>
+                <a:lnTo>
+                  <a:pt x="1644" y="1081"/>
+                </a:lnTo>
+                <a:lnTo>
+                  <a:pt x="1668" y="1081"/>
+                </a:lnTo>
+                <a:lnTo>
+                  <a:pt x="1692" y="1081"/>
+                </a:lnTo>
+                <a:lnTo>
+                  <a:pt x="1716" y="1081"/>
+                </a:lnTo>
+                <a:lnTo>
+                  <a:pt x="1740" y="1083"/>
+                </a:lnTo>
+                <a:lnTo>
+                  <a:pt x="1764" y="1084"/>
+                </a:lnTo>
+                <a:lnTo>
+                  <a:pt x="1764" y="1009"/>
+                </a:lnTo>
+                <a:lnTo>
+                  <a:pt x="1746" y="1008"/>
+                </a:lnTo>
+                <a:lnTo>
+                  <a:pt x="1729" y="1006"/>
+                </a:lnTo>
+                <a:lnTo>
+                  <a:pt x="1712" y="1005"/>
+                </a:lnTo>
+                <a:lnTo>
+                  <a:pt x="1695" y="1005"/>
+                </a:lnTo>
+                <a:lnTo>
+                  <a:pt x="1678" y="1004"/>
+                </a:lnTo>
+                <a:lnTo>
+                  <a:pt x="1661" y="1005"/>
+                </a:lnTo>
+                <a:lnTo>
+                  <a:pt x="1644" y="1005"/>
+                </a:lnTo>
+                <a:lnTo>
+                  <a:pt x="1627" y="1006"/>
+                </a:lnTo>
+                <a:lnTo>
+                  <a:pt x="1610" y="1008"/>
+                </a:lnTo>
+                <a:lnTo>
+                  <a:pt x="1593" y="1009"/>
+                </a:lnTo>
+                <a:lnTo>
+                  <a:pt x="1576" y="1011"/>
+                </a:lnTo>
+                <a:lnTo>
+                  <a:pt x="1560" y="1013"/>
+                </a:lnTo>
+                <a:lnTo>
+                  <a:pt x="1544" y="1015"/>
+                </a:lnTo>
+                <a:lnTo>
+                  <a:pt x="1528" y="1017"/>
+                </a:lnTo>
+                <a:lnTo>
+                  <a:pt x="1512" y="1020"/>
+                </a:lnTo>
+                <a:lnTo>
+                  <a:pt x="1496" y="1023"/>
+                </a:lnTo>
+                <a:lnTo>
+                  <a:pt x="1493" y="1002"/>
+                </a:lnTo>
+                <a:lnTo>
+                  <a:pt x="1490" y="979"/>
+                </a:lnTo>
+                <a:lnTo>
+                  <a:pt x="1487" y="957"/>
+                </a:lnTo>
+                <a:lnTo>
+                  <a:pt x="1483" y="936"/>
+                </a:lnTo>
+                <a:lnTo>
+                  <a:pt x="1414" y="936"/>
+                </a:lnTo>
+                <a:lnTo>
+                  <a:pt x="1417" y="960"/>
+                </a:lnTo>
+                <a:lnTo>
+                  <a:pt x="1423" y="987"/>
+                </a:lnTo>
+                <a:lnTo>
+                  <a:pt x="1428" y="1014"/>
+                </a:lnTo>
+                <a:lnTo>
+                  <a:pt x="1432" y="1039"/>
+                </a:lnTo>
+                <a:lnTo>
+                  <a:pt x="1425" y="1041"/>
+                </a:lnTo>
+                <a:lnTo>
+                  <a:pt x="1417" y="1043"/>
+                </a:lnTo>
+                <a:lnTo>
+                  <a:pt x="1411" y="1046"/>
+                </a:lnTo>
+                <a:lnTo>
+                  <a:pt x="1403" y="1048"/>
+                </a:lnTo>
+                <a:lnTo>
+                  <a:pt x="1395" y="1050"/>
+                </a:lnTo>
+                <a:lnTo>
+                  <a:pt x="1388" y="1053"/>
+                </a:lnTo>
+                <a:lnTo>
+                  <a:pt x="1380" y="1055"/>
+                </a:lnTo>
+                <a:lnTo>
+                  <a:pt x="1373" y="1057"/>
+                </a:lnTo>
+                <a:lnTo>
+                  <a:pt x="1353" y="1065"/>
+                </a:lnTo>
+                <a:lnTo>
+                  <a:pt x="1332" y="1072"/>
+                </a:lnTo>
+                <a:lnTo>
+                  <a:pt x="1312" y="1080"/>
+                </a:lnTo>
+                <a:lnTo>
+                  <a:pt x="1291" y="1089"/>
+                </a:lnTo>
+                <a:lnTo>
+                  <a:pt x="1271" y="1097"/>
+                </a:lnTo>
+                <a:lnTo>
+                  <a:pt x="1249" y="1107"/>
+                </a:lnTo>
+                <a:lnTo>
+                  <a:pt x="1228" y="1117"/>
+                </a:lnTo>
+                <a:lnTo>
+                  <a:pt x="1208" y="1127"/>
+                </a:lnTo>
+                <a:lnTo>
+                  <a:pt x="1189" y="1137"/>
+                </a:lnTo>
+                <a:lnTo>
+                  <a:pt x="1168" y="1148"/>
+                </a:lnTo>
+                <a:lnTo>
+                  <a:pt x="1149" y="1160"/>
+                </a:lnTo>
+                <a:lnTo>
+                  <a:pt x="1129" y="1171"/>
+                </a:lnTo>
+                <a:lnTo>
+                  <a:pt x="1110" y="1183"/>
+                </a:lnTo>
+                <a:lnTo>
+                  <a:pt x="1092" y="1194"/>
+                </a:lnTo>
+                <a:lnTo>
+                  <a:pt x="1074" y="1207"/>
+                </a:lnTo>
+                <a:lnTo>
+                  <a:pt x="1057" y="1220"/>
+                </a:lnTo>
+                <a:lnTo>
+                  <a:pt x="1053" y="1167"/>
+                </a:lnTo>
+                <a:lnTo>
+                  <a:pt x="1049" y="1114"/>
+                </a:lnTo>
+                <a:lnTo>
+                  <a:pt x="1046" y="1059"/>
+                </a:lnTo>
+                <a:lnTo>
+                  <a:pt x="1045" y="1005"/>
+                </a:lnTo>
+                <a:lnTo>
+                  <a:pt x="1047" y="952"/>
+                </a:lnTo>
+                <a:lnTo>
+                  <a:pt x="1052" y="898"/>
+                </a:lnTo>
+                <a:lnTo>
+                  <a:pt x="1061" y="845"/>
+                </a:lnTo>
+                <a:lnTo>
+                  <a:pt x="1076" y="794"/>
+                </a:lnTo>
+                <a:lnTo>
+                  <a:pt x="1084" y="774"/>
+                </a:lnTo>
+                <a:lnTo>
+                  <a:pt x="1094" y="755"/>
+                </a:lnTo>
+                <a:lnTo>
+                  <a:pt x="1107" y="737"/>
+                </a:lnTo>
+                <a:lnTo>
+                  <a:pt x="1120" y="720"/>
+                </a:lnTo>
+                <a:lnTo>
+                  <a:pt x="1136" y="703"/>
+                </a:lnTo>
+                <a:lnTo>
+                  <a:pt x="1153" y="688"/>
+                </a:lnTo>
+                <a:lnTo>
+                  <a:pt x="1172" y="673"/>
+                </a:lnTo>
+                <a:lnTo>
+                  <a:pt x="1191" y="659"/>
+                </a:lnTo>
+                <a:lnTo>
+                  <a:pt x="1211" y="646"/>
+                </a:lnTo>
+                <a:lnTo>
+                  <a:pt x="1233" y="635"/>
+                </a:lnTo>
+                <a:lnTo>
+                  <a:pt x="1255" y="623"/>
+                </a:lnTo>
+                <a:lnTo>
+                  <a:pt x="1276" y="614"/>
+                </a:lnTo>
+                <a:lnTo>
+                  <a:pt x="1299" y="604"/>
+                </a:lnTo>
+                <a:lnTo>
+                  <a:pt x="1321" y="596"/>
+                </a:lnTo>
+                <a:lnTo>
+                  <a:pt x="1342" y="589"/>
+                </a:lnTo>
+                <a:lnTo>
+                  <a:pt x="1364" y="583"/>
+                </a:lnTo>
+                <a:lnTo>
+                  <a:pt x="1372" y="627"/>
+                </a:lnTo>
+                <a:lnTo>
+                  <a:pt x="1379" y="671"/>
+                </a:lnTo>
+                <a:lnTo>
+                  <a:pt x="1384" y="715"/>
+                </a:lnTo>
+                <a:lnTo>
+                  <a:pt x="1391" y="758"/>
+                </a:lnTo>
+                <a:lnTo>
+                  <a:pt x="1396" y="803"/>
+                </a:lnTo>
+                <a:lnTo>
+                  <a:pt x="1401" y="847"/>
+                </a:lnTo>
+                <a:lnTo>
+                  <a:pt x="1407" y="891"/>
+                </a:lnTo>
+                <a:lnTo>
+                  <a:pt x="1414" y="936"/>
+                </a:lnTo>
+                <a:lnTo>
+                  <a:pt x="1483" y="936"/>
+                </a:lnTo>
+                <a:lnTo>
+                  <a:pt x="1475" y="890"/>
+                </a:lnTo>
+                <a:lnTo>
+                  <a:pt x="1468" y="844"/>
+                </a:lnTo>
+                <a:lnTo>
+                  <a:pt x="1457" y="798"/>
+                </a:lnTo>
+                <a:lnTo>
+                  <a:pt x="1447" y="754"/>
+                </a:lnTo>
+                <a:lnTo>
+                  <a:pt x="1435" y="709"/>
+                </a:lnTo>
+                <a:lnTo>
+                  <a:pt x="1422" y="664"/>
+                </a:lnTo>
+                <a:lnTo>
+                  <a:pt x="1407" y="620"/>
+                </a:lnTo>
+                <a:lnTo>
+                  <a:pt x="1390" y="577"/>
+                </a:lnTo>
+                <a:lnTo>
+                  <a:pt x="1420" y="571"/>
+                </a:lnTo>
+                <a:lnTo>
+                  <a:pt x="1449" y="568"/>
+                </a:lnTo>
+                <a:lnTo>
+                  <a:pt x="1480" y="567"/>
+                </a:lnTo>
+                <a:lnTo>
+                  <a:pt x="1511" y="567"/>
+                </a:lnTo>
+                <a:lnTo>
+                  <a:pt x="1540" y="570"/>
+                </a:lnTo>
+                <a:lnTo>
+                  <a:pt x="1571" y="575"/>
+                </a:lnTo>
+                <a:lnTo>
+                  <a:pt x="1601" y="580"/>
+                </a:lnTo>
+                <a:lnTo>
+                  <a:pt x="1629" y="587"/>
+                </a:lnTo>
+                <a:lnTo>
+                  <a:pt x="1658" y="597"/>
+                </a:lnTo>
+                <a:lnTo>
+                  <a:pt x="1686" y="608"/>
+                </a:lnTo>
+                <a:lnTo>
+                  <a:pt x="1712" y="621"/>
+                </a:lnTo>
+                <a:lnTo>
+                  <a:pt x="1738" y="636"/>
+                </a:lnTo>
+                <a:lnTo>
+                  <a:pt x="1762" y="653"/>
+                </a:lnTo>
+                <a:lnTo>
+                  <a:pt x="1786" y="671"/>
+                </a:lnTo>
+                <a:lnTo>
+                  <a:pt x="1808" y="691"/>
+                </a:lnTo>
+                <a:lnTo>
+                  <a:pt x="1827" y="712"/>
+                </a:lnTo>
+                <a:lnTo>
+                  <a:pt x="1848" y="753"/>
+                </a:lnTo>
+                <a:lnTo>
+                  <a:pt x="1868" y="795"/>
+                </a:lnTo>
+                <a:lnTo>
+                  <a:pt x="1886" y="836"/>
+                </a:lnTo>
+                <a:lnTo>
+                  <a:pt x="1904" y="879"/>
+                </a:lnTo>
+                <a:lnTo>
+                  <a:pt x="1918" y="921"/>
+                </a:lnTo>
+                <a:lnTo>
+                  <a:pt x="1930" y="963"/>
+                </a:lnTo>
+                <a:lnTo>
+                  <a:pt x="1939" y="1006"/>
+                </a:lnTo>
+                <a:lnTo>
+                  <a:pt x="1945" y="1049"/>
+                </a:lnTo>
+                <a:lnTo>
+                  <a:pt x="1925" y="1041"/>
+                </a:lnTo>
+                <a:lnTo>
+                  <a:pt x="1904" y="1035"/>
+                </a:lnTo>
+                <a:lnTo>
+                  <a:pt x="1881" y="1030"/>
+                </a:lnTo>
+                <a:lnTo>
+                  <a:pt x="1858" y="1023"/>
+                </a:lnTo>
+                <a:lnTo>
+                  <a:pt x="1833" y="1019"/>
+                </a:lnTo>
+                <a:lnTo>
+                  <a:pt x="1809" y="1015"/>
+                </a:lnTo>
+                <a:lnTo>
+                  <a:pt x="1786" y="1012"/>
+                </a:lnTo>
+                <a:lnTo>
+                  <a:pt x="1764" y="1009"/>
+                </a:lnTo>
+                <a:lnTo>
+                  <a:pt x="1764" y="1084"/>
+                </a:lnTo>
+                <a:lnTo>
+                  <a:pt x="1784" y="1085"/>
+                </a:lnTo>
+                <a:lnTo>
+                  <a:pt x="1806" y="1087"/>
+                </a:lnTo>
+                <a:lnTo>
+                  <a:pt x="1828" y="1089"/>
+                </a:lnTo>
+                <a:lnTo>
+                  <a:pt x="1851" y="1091"/>
+                </a:lnTo>
+                <a:lnTo>
+                  <a:pt x="1874" y="1093"/>
+                </a:lnTo>
+                <a:lnTo>
+                  <a:pt x="1897" y="1095"/>
+                </a:lnTo>
+                <a:lnTo>
+                  <a:pt x="1918" y="1097"/>
+                </a:lnTo>
+                <a:lnTo>
+                  <a:pt x="1938" y="1099"/>
+                </a:lnTo>
+                <a:lnTo>
+                  <a:pt x="1937" y="1112"/>
+                </a:lnTo>
+                <a:lnTo>
+                  <a:pt x="1933" y="1148"/>
+                </a:lnTo>
+                <a:lnTo>
+                  <a:pt x="1929" y="1203"/>
+                </a:lnTo>
+                <a:lnTo>
+                  <a:pt x="1923" y="1273"/>
+                </a:lnTo>
+                <a:lnTo>
+                  <a:pt x="1915" y="1355"/>
+                </a:lnTo>
+                <a:lnTo>
+                  <a:pt x="1907" y="1446"/>
+                </a:lnTo>
+                <a:lnTo>
+                  <a:pt x="1899" y="1542"/>
+                </a:lnTo>
+                <a:lnTo>
+                  <a:pt x="1891" y="1639"/>
+                </a:lnTo>
+                <a:lnTo>
+                  <a:pt x="1989" y="1639"/>
+                </a:lnTo>
+                <a:lnTo>
+                  <a:pt x="2006" y="1516"/>
+                </a:lnTo>
+                <a:lnTo>
+                  <a:pt x="2020" y="1393"/>
+                </a:lnTo>
+                <a:lnTo>
+                  <a:pt x="2029" y="1270"/>
+                </a:lnTo>
+                <a:lnTo>
+                  <a:pt x="2029" y="1148"/>
+                </a:lnTo>
+                <a:lnTo>
+                  <a:pt x="2020" y="1028"/>
+                </a:lnTo>
+                <a:lnTo>
+                  <a:pt x="1997" y="909"/>
+                </a:lnTo>
+                <a:lnTo>
+                  <a:pt x="1958" y="793"/>
+                </a:lnTo>
+                <a:lnTo>
+                  <a:pt x="1902" y="681"/>
+                </a:lnTo>
+                <a:lnTo>
+                  <a:pt x="1890" y="668"/>
+                </a:lnTo>
+                <a:lnTo>
+                  <a:pt x="1877" y="654"/>
+                </a:lnTo>
+                <a:lnTo>
+                  <a:pt x="1865" y="641"/>
+                </a:lnTo>
+                <a:lnTo>
+                  <a:pt x="1851" y="628"/>
+                </a:lnTo>
+                <a:lnTo>
+                  <a:pt x="1838" y="617"/>
+                </a:lnTo>
+                <a:lnTo>
+                  <a:pt x="1823" y="605"/>
+                </a:lnTo>
+                <a:lnTo>
+                  <a:pt x="1808" y="594"/>
+                </a:lnTo>
+                <a:lnTo>
+                  <a:pt x="1793" y="583"/>
+                </a:lnTo>
+                <a:lnTo>
+                  <a:pt x="1777" y="574"/>
+                </a:lnTo>
+                <a:lnTo>
+                  <a:pt x="1761" y="564"/>
+                </a:lnTo>
+                <a:lnTo>
+                  <a:pt x="1745" y="555"/>
+                </a:lnTo>
+                <a:lnTo>
+                  <a:pt x="1729" y="546"/>
+                </a:lnTo>
+                <a:lnTo>
+                  <a:pt x="1712" y="539"/>
+                </a:lnTo>
+                <a:lnTo>
+                  <a:pt x="1695" y="531"/>
+                </a:lnTo>
+                <a:lnTo>
+                  <a:pt x="1678" y="524"/>
+                </a:lnTo>
+                <a:lnTo>
+                  <a:pt x="1661" y="518"/>
+                </a:lnTo>
+                <a:lnTo>
+                  <a:pt x="1650" y="513"/>
+                </a:lnTo>
+                <a:lnTo>
+                  <a:pt x="1638" y="510"/>
+                </a:lnTo>
+                <a:lnTo>
+                  <a:pt x="1626" y="507"/>
+                </a:lnTo>
+                <a:lnTo>
+                  <a:pt x="1614" y="504"/>
+                </a:lnTo>
+                <a:lnTo>
+                  <a:pt x="1603" y="501"/>
+                </a:lnTo>
+                <a:lnTo>
+                  <a:pt x="1590" y="498"/>
+                </a:lnTo>
+                <a:lnTo>
+                  <a:pt x="1579" y="495"/>
+                </a:lnTo>
+                <a:lnTo>
+                  <a:pt x="1567" y="493"/>
+                </a:lnTo>
+                <a:lnTo>
+                  <a:pt x="1554" y="491"/>
+                </a:lnTo>
+                <a:lnTo>
+                  <a:pt x="1543" y="490"/>
+                </a:lnTo>
+                <a:lnTo>
+                  <a:pt x="1530" y="488"/>
+                </a:lnTo>
+                <a:lnTo>
+                  <a:pt x="1518" y="487"/>
+                </a:lnTo>
+                <a:lnTo>
+                  <a:pt x="1506" y="486"/>
+                </a:lnTo>
+                <a:lnTo>
+                  <a:pt x="1494" y="486"/>
+                </a:lnTo>
+                <a:lnTo>
+                  <a:pt x="1481" y="485"/>
+                </a:lnTo>
+                <a:lnTo>
+                  <a:pt x="1469" y="485"/>
+                </a:lnTo>
+                <a:lnTo>
+                  <a:pt x="1466" y="470"/>
+                </a:lnTo>
+                <a:lnTo>
+                  <a:pt x="1461" y="450"/>
+                </a:lnTo>
+                <a:lnTo>
+                  <a:pt x="1453" y="429"/>
+                </a:lnTo>
+                <a:lnTo>
+                  <a:pt x="1446" y="410"/>
+                </a:lnTo>
+                <a:lnTo>
+                  <a:pt x="1379" y="410"/>
+                </a:lnTo>
+                <a:lnTo>
+                  <a:pt x="1383" y="420"/>
+                </a:lnTo>
+                <a:lnTo>
+                  <a:pt x="1388" y="431"/>
+                </a:lnTo>
+                <a:lnTo>
+                  <a:pt x="1394" y="442"/>
+                </a:lnTo>
+                <a:lnTo>
+                  <a:pt x="1399" y="453"/>
+                </a:lnTo>
+                <a:lnTo>
+                  <a:pt x="1405" y="465"/>
+                </a:lnTo>
+                <a:lnTo>
+                  <a:pt x="1411" y="475"/>
+                </a:lnTo>
+                <a:lnTo>
+                  <a:pt x="1415" y="484"/>
+                </a:lnTo>
+                <a:lnTo>
+                  <a:pt x="1421" y="492"/>
+                </a:lnTo>
+                <a:lnTo>
+                  <a:pt x="1408" y="493"/>
+                </a:lnTo>
+                <a:lnTo>
+                  <a:pt x="1396" y="494"/>
+                </a:lnTo>
+                <a:lnTo>
+                  <a:pt x="1383" y="496"/>
+                </a:lnTo>
+                <a:lnTo>
+                  <a:pt x="1370" y="499"/>
+                </a:lnTo>
+                <a:lnTo>
+                  <a:pt x="1356" y="501"/>
+                </a:lnTo>
+                <a:lnTo>
+                  <a:pt x="1343" y="503"/>
+                </a:lnTo>
+                <a:lnTo>
+                  <a:pt x="1331" y="506"/>
+                </a:lnTo>
+                <a:lnTo>
+                  <a:pt x="1318" y="509"/>
+                </a:lnTo>
+                <a:lnTo>
+                  <a:pt x="1315" y="474"/>
+                </a:lnTo>
+                <a:lnTo>
+                  <a:pt x="1313" y="431"/>
+                </a:lnTo>
+                <a:lnTo>
+                  <a:pt x="1312" y="393"/>
+                </a:lnTo>
+                <a:lnTo>
+                  <a:pt x="1312" y="377"/>
+                </a:lnTo>
+                <a:lnTo>
+                  <a:pt x="1359" y="370"/>
+                </a:lnTo>
+                <a:lnTo>
+                  <a:pt x="1364" y="379"/>
+                </a:lnTo>
+                <a:lnTo>
+                  <a:pt x="1370" y="389"/>
+                </a:lnTo>
+                <a:lnTo>
+                  <a:pt x="1374" y="399"/>
+                </a:lnTo>
+                <a:lnTo>
+                  <a:pt x="1379" y="410"/>
+                </a:lnTo>
+                <a:lnTo>
+                  <a:pt x="1446" y="410"/>
+                </a:lnTo>
+                <a:lnTo>
+                  <a:pt x="1439" y="394"/>
+                </a:lnTo>
+                <a:lnTo>
+                  <a:pt x="1433" y="379"/>
+                </a:lnTo>
+                <a:lnTo>
+                  <a:pt x="1427" y="366"/>
+                </a:lnTo>
+                <a:lnTo>
+                  <a:pt x="1421" y="353"/>
+                </a:lnTo>
+                <a:lnTo>
+                  <a:pt x="1416" y="342"/>
+                </a:lnTo>
+                <a:lnTo>
+                  <a:pt x="1413" y="335"/>
+                </a:lnTo>
+                <a:lnTo>
+                  <a:pt x="1411" y="330"/>
+                </a:lnTo>
+                <a:lnTo>
+                  <a:pt x="1409" y="328"/>
+                </a:lnTo>
+                <a:lnTo>
+                  <a:pt x="1409" y="326"/>
+                </a:lnTo>
+                <a:lnTo>
+                  <a:pt x="1409" y="326"/>
+                </a:lnTo>
+                <a:lnTo>
+                  <a:pt x="1409" y="326"/>
+                </a:lnTo>
+                <a:lnTo>
+                  <a:pt x="1408" y="325"/>
+                </a:lnTo>
+                <a:lnTo>
+                  <a:pt x="1405" y="321"/>
+                </a:lnTo>
+                <a:lnTo>
+                  <a:pt x="1400" y="318"/>
+                </a:lnTo>
+                <a:lnTo>
+                  <a:pt x="1394" y="316"/>
+                </a:lnTo>
+                <a:lnTo>
+                  <a:pt x="1387" y="315"/>
+                </a:lnTo>
+                <a:lnTo>
+                  <a:pt x="1379" y="316"/>
+                </a:lnTo>
+                <a:lnTo>
+                  <a:pt x="1371" y="317"/>
+                </a:lnTo>
+                <a:lnTo>
+                  <a:pt x="1363" y="319"/>
+                </a:lnTo>
+                <a:lnTo>
+                  <a:pt x="1356" y="321"/>
+                </a:lnTo>
+                <a:lnTo>
+                  <a:pt x="1354" y="298"/>
+                </a:lnTo>
+                <a:lnTo>
+                  <a:pt x="1350" y="275"/>
+                </a:lnTo>
+                <a:lnTo>
+                  <a:pt x="1345" y="254"/>
+                </a:lnTo>
+                <a:lnTo>
+                  <a:pt x="1338" y="232"/>
+                </a:lnTo>
+                <a:lnTo>
+                  <a:pt x="1329" y="211"/>
+                </a:lnTo>
+                <a:lnTo>
+                  <a:pt x="1320" y="192"/>
+                </a:lnTo>
+                <a:lnTo>
+                  <a:pt x="1309" y="173"/>
+                </a:lnTo>
+                <a:lnTo>
+                  <a:pt x="1297" y="155"/>
+                </a:lnTo>
+                <a:lnTo>
+                  <a:pt x="1283" y="138"/>
+                </a:lnTo>
+                <a:lnTo>
+                  <a:pt x="1269" y="123"/>
+                </a:lnTo>
+                <a:lnTo>
+                  <a:pt x="1255" y="108"/>
+                </a:lnTo>
+                <a:lnTo>
+                  <a:pt x="1239" y="93"/>
+                </a:lnTo>
+                <a:lnTo>
+                  <a:pt x="1222" y="79"/>
+                </a:lnTo>
+                <a:lnTo>
+                  <a:pt x="1203" y="68"/>
+                </a:lnTo>
+                <a:lnTo>
+                  <a:pt x="1185" y="56"/>
+                </a:lnTo>
+                <a:lnTo>
+                  <a:pt x="1166" y="46"/>
+                </a:lnTo>
+                <a:lnTo>
+                  <a:pt x="1154" y="40"/>
+                </a:lnTo>
+                <a:lnTo>
+                  <a:pt x="1142" y="34"/>
+                </a:lnTo>
+                <a:lnTo>
+                  <a:pt x="1129" y="30"/>
+                </a:lnTo>
+                <a:lnTo>
+                  <a:pt x="1117" y="24"/>
+                </a:lnTo>
+                <a:lnTo>
+                  <a:pt x="1104" y="20"/>
+                </a:lnTo>
+                <a:lnTo>
+                  <a:pt x="1092" y="16"/>
+                </a:lnTo>
+                <a:lnTo>
+                  <a:pt x="1079" y="13"/>
+                </a:lnTo>
+                <a:lnTo>
+                  <a:pt x="1067" y="10"/>
+                </a:lnTo>
+                <a:lnTo>
+                  <a:pt x="1053" y="8"/>
+                </a:lnTo>
+                <a:lnTo>
+                  <a:pt x="1041" y="4"/>
+                </a:lnTo>
+                <a:lnTo>
+                  <a:pt x="1027" y="3"/>
+                </a:lnTo>
+                <a:lnTo>
+                  <a:pt x="1014" y="1"/>
+                </a:lnTo>
+                <a:lnTo>
+                  <a:pt x="1001" y="0"/>
+                </a:lnTo>
+                <a:lnTo>
+                  <a:pt x="987" y="0"/>
+                </a:lnTo>
+                <a:lnTo>
+                  <a:pt x="975" y="0"/>
+                </a:lnTo>
+                <a:lnTo>
+                  <a:pt x="961" y="0"/>
+                </a:lnTo>
+                <a:lnTo>
+                  <a:pt x="942" y="1"/>
+                </a:lnTo>
+                <a:lnTo>
+                  <a:pt x="922" y="2"/>
+                </a:lnTo>
+                <a:lnTo>
+                  <a:pt x="903" y="5"/>
+                </a:lnTo>
+                <a:lnTo>
+                  <a:pt x="883" y="8"/>
+                </a:lnTo>
+                <a:lnTo>
+                  <a:pt x="863" y="12"/>
+                </a:lnTo>
+                <a:lnTo>
+                  <a:pt x="844" y="16"/>
+                </a:lnTo>
+                <a:lnTo>
+                  <a:pt x="824" y="20"/>
+                </a:lnTo>
+                <a:lnTo>
+                  <a:pt x="805" y="26"/>
+                </a:lnTo>
+                <a:lnTo>
+                  <a:pt x="786" y="32"/>
+                </a:lnTo>
+                <a:lnTo>
+                  <a:pt x="766" y="38"/>
+                </a:lnTo>
+                <a:lnTo>
+                  <a:pt x="748" y="45"/>
+                </a:lnTo>
+                <a:lnTo>
+                  <a:pt x="729" y="52"/>
+                </a:lnTo>
+                <a:lnTo>
+                  <a:pt x="710" y="60"/>
+                </a:lnTo>
+                <a:lnTo>
+                  <a:pt x="691" y="69"/>
+                </a:lnTo>
+                <a:lnTo>
+                  <a:pt x="673" y="77"/>
+                </a:lnTo>
+                <a:lnTo>
+                  <a:pt x="655" y="87"/>
+                </a:lnTo>
+                <a:lnTo>
+                  <a:pt x="636" y="96"/>
+                </a:lnTo>
+                <a:lnTo>
+                  <a:pt x="619" y="106"/>
+                </a:lnTo>
+                <a:lnTo>
+                  <a:pt x="601" y="116"/>
+                </a:lnTo>
+                <a:lnTo>
+                  <a:pt x="584" y="127"/>
+                </a:lnTo>
+                <a:lnTo>
+                  <a:pt x="567" y="138"/>
+                </a:lnTo>
+                <a:lnTo>
+                  <a:pt x="550" y="150"/>
+                </a:lnTo>
+                <a:lnTo>
+                  <a:pt x="534" y="162"/>
+                </a:lnTo>
+                <a:lnTo>
+                  <a:pt x="518" y="173"/>
+                </a:lnTo>
+                <a:lnTo>
+                  <a:pt x="502" y="186"/>
+                </a:lnTo>
+                <a:lnTo>
+                  <a:pt x="486" y="199"/>
+                </a:lnTo>
+                <a:lnTo>
+                  <a:pt x="471" y="211"/>
+                </a:lnTo>
+                <a:lnTo>
+                  <a:pt x="457" y="224"/>
+                </a:lnTo>
+                <a:lnTo>
+                  <a:pt x="443" y="237"/>
+                </a:lnTo>
+                <a:lnTo>
+                  <a:pt x="429" y="250"/>
+                </a:lnTo>
+                <a:lnTo>
+                  <a:pt x="416" y="263"/>
+                </a:lnTo>
+                <a:lnTo>
+                  <a:pt x="403" y="277"/>
+                </a:lnTo>
+                <a:lnTo>
+                  <a:pt x="361" y="333"/>
+                </a:lnTo>
+                <a:lnTo>
+                  <a:pt x="332" y="392"/>
+                </a:lnTo>
+                <a:lnTo>
+                  <a:pt x="315" y="455"/>
+                </a:lnTo>
+                <a:lnTo>
+                  <a:pt x="310" y="520"/>
+                </a:lnTo>
+                <a:lnTo>
+                  <a:pt x="311" y="586"/>
+                </a:lnTo>
+                <a:lnTo>
+                  <a:pt x="321" y="652"/>
+                </a:lnTo>
+                <a:lnTo>
+                  <a:pt x="336" y="717"/>
+                </a:lnTo>
+                <a:lnTo>
+                  <a:pt x="355" y="781"/>
+                </a:lnTo>
+                <a:lnTo>
+                  <a:pt x="370" y="819"/>
+                </a:lnTo>
+                <a:lnTo>
+                  <a:pt x="387" y="854"/>
+                </a:lnTo>
+                <a:lnTo>
+                  <a:pt x="406" y="887"/>
+                </a:lnTo>
+                <a:lnTo>
+                  <a:pt x="427" y="920"/>
+                </a:lnTo>
+                <a:lnTo>
+                  <a:pt x="450" y="951"/>
+                </a:lnTo>
+                <a:lnTo>
+                  <a:pt x="474" y="980"/>
+                </a:lnTo>
+                <a:lnTo>
+                  <a:pt x="499" y="1010"/>
+                </a:lnTo>
+                <a:lnTo>
+                  <a:pt x="524" y="1038"/>
+                </a:lnTo>
+                <a:lnTo>
+                  <a:pt x="549" y="1067"/>
+                </a:lnTo>
+                <a:lnTo>
+                  <a:pt x="574" y="1096"/>
+                </a:lnTo>
+                <a:lnTo>
+                  <a:pt x="599" y="1125"/>
+                </a:lnTo>
+                <a:lnTo>
+                  <a:pt x="623" y="1155"/>
+                </a:lnTo>
+                <a:lnTo>
+                  <a:pt x="646" y="1187"/>
+                </a:lnTo>
+                <a:lnTo>
+                  <a:pt x="666" y="1220"/>
+                </a:lnTo>
+                <a:lnTo>
+                  <a:pt x="685" y="1254"/>
+                </a:lnTo>
+                <a:lnTo>
+                  <a:pt x="702" y="1291"/>
+                </a:lnTo>
+                <a:lnTo>
+                  <a:pt x="724" y="1383"/>
+                </a:lnTo>
+                <a:lnTo>
+                  <a:pt x="717" y="1452"/>
+                </a:lnTo>
+                <a:lnTo>
+                  <a:pt x="705" y="1471"/>
+                </a:lnTo>
+                <a:lnTo>
+                  <a:pt x="692" y="1493"/>
+                </a:lnTo>
+                <a:lnTo>
+                  <a:pt x="680" y="1519"/>
+                </a:lnTo>
+                <a:lnTo>
+                  <a:pt x="664" y="1544"/>
+                </a:lnTo>
+                <a:lnTo>
+                  <a:pt x="644" y="1569"/>
+                </a:lnTo>
+                <a:lnTo>
+                  <a:pt x="619" y="1591"/>
+                </a:lnTo>
+                <a:lnTo>
+                  <a:pt x="589" y="1609"/>
+                </a:lnTo>
+                <a:lnTo>
+                  <a:pt x="551" y="1622"/>
+                </a:lnTo>
+                <a:lnTo>
+                  <a:pt x="523" y="1626"/>
+                </a:lnTo>
+                <a:lnTo>
+                  <a:pt x="493" y="1631"/>
+                </a:lnTo>
+                <a:lnTo>
+                  <a:pt x="462" y="1635"/>
+                </a:lnTo>
+                <a:lnTo>
+                  <a:pt x="430" y="1638"/>
+                </a:lnTo>
+                <a:lnTo>
+                  <a:pt x="398" y="1641"/>
+                </a:lnTo>
+                <a:lnTo>
+                  <a:pt x="367" y="1643"/>
+                </a:lnTo>
+                <a:lnTo>
+                  <a:pt x="335" y="1643"/>
+                </a:lnTo>
+                <a:lnTo>
+                  <a:pt x="302" y="1643"/>
+                </a:lnTo>
+                <a:lnTo>
+                  <a:pt x="270" y="1641"/>
+                </a:lnTo>
+                <a:lnTo>
+                  <a:pt x="239" y="1637"/>
+                </a:lnTo>
+                <a:lnTo>
+                  <a:pt x="208" y="1631"/>
+                </a:lnTo>
+                <a:lnTo>
+                  <a:pt x="180" y="1623"/>
+                </a:lnTo>
+                <a:lnTo>
+                  <a:pt x="151" y="1613"/>
+                </a:lnTo>
+                <a:lnTo>
+                  <a:pt x="124" y="1600"/>
+                </a:lnTo>
+                <a:lnTo>
+                  <a:pt x="99" y="1584"/>
+                </a:lnTo>
+                <a:lnTo>
+                  <a:pt x="76" y="1566"/>
+                </a:lnTo>
+                <a:lnTo>
+                  <a:pt x="0" y="1613"/>
+                </a:lnTo>
+                <a:lnTo>
+                  <a:pt x="14" y="1626"/>
+                </a:lnTo>
+                <a:lnTo>
+                  <a:pt x="28" y="1640"/>
+                </a:lnTo>
+                <a:lnTo>
+                  <a:pt x="43" y="1652"/>
+                </a:lnTo>
+                <a:lnTo>
+                  <a:pt x="58" y="1662"/>
+                </a:lnTo>
+                <a:lnTo>
+                  <a:pt x="75" y="1673"/>
+                </a:lnTo>
+                <a:lnTo>
+                  <a:pt x="91" y="1681"/>
+                </a:lnTo>
+                <a:lnTo>
+                  <a:pt x="108" y="1690"/>
+                </a:lnTo>
+                <a:lnTo>
+                  <a:pt x="126" y="1697"/>
+                </a:lnTo>
+                <a:lnTo>
+                  <a:pt x="138" y="1701"/>
+                </a:lnTo>
+                <a:lnTo>
+                  <a:pt x="150" y="1706"/>
+                </a:lnTo>
+                <a:lnTo>
+                  <a:pt x="162" y="1709"/>
+                </a:lnTo>
+                <a:lnTo>
+                  <a:pt x="174" y="1713"/>
+                </a:lnTo>
+                <a:lnTo>
+                  <a:pt x="186" y="1716"/>
+                </a:lnTo>
+                <a:lnTo>
+                  <a:pt x="198" y="1718"/>
+                </a:lnTo>
+                <a:lnTo>
+                  <a:pt x="211" y="1721"/>
+                </a:lnTo>
+                <a:lnTo>
+                  <a:pt x="223" y="1723"/>
+                </a:lnTo>
+                <a:lnTo>
+                  <a:pt x="236" y="1725"/>
+                </a:lnTo>
+                <a:lnTo>
+                  <a:pt x="248" y="1727"/>
+                </a:lnTo>
+                <a:lnTo>
+                  <a:pt x="261" y="1728"/>
+                </a:lnTo>
+                <a:lnTo>
+                  <a:pt x="273" y="1729"/>
+                </a:lnTo>
+                <a:lnTo>
+                  <a:pt x="286" y="1730"/>
+                </a:lnTo>
+                <a:lnTo>
+                  <a:pt x="298" y="1731"/>
+                </a:lnTo>
+                <a:lnTo>
+                  <a:pt x="311" y="1731"/>
+                </a:lnTo>
+                <a:lnTo>
+                  <a:pt x="323" y="1731"/>
+                </a:lnTo>
+                <a:lnTo>
+                  <a:pt x="350" y="1731"/>
+                </a:lnTo>
+                <a:lnTo>
+                  <a:pt x="376" y="1731"/>
+                </a:lnTo>
+                <a:lnTo>
+                  <a:pt x="403" y="1730"/>
+                </a:lnTo>
+                <a:lnTo>
+                  <a:pt x="429" y="1729"/>
+                </a:lnTo>
+                <a:lnTo>
+                  <a:pt x="457" y="1727"/>
+                </a:lnTo>
+                <a:lnTo>
+                  <a:pt x="483" y="1725"/>
+                </a:lnTo>
+                <a:lnTo>
+                  <a:pt x="509" y="1720"/>
+                </a:lnTo>
+                <a:lnTo>
+                  <a:pt x="535" y="1715"/>
+                </a:lnTo>
+                <a:lnTo>
+                  <a:pt x="560" y="1709"/>
+                </a:lnTo>
+                <a:lnTo>
+                  <a:pt x="586" y="1700"/>
+                </a:lnTo>
+                <a:lnTo>
+                  <a:pt x="610" y="1691"/>
+                </a:lnTo>
+                <a:lnTo>
+                  <a:pt x="634" y="1679"/>
+                </a:lnTo>
+                <a:lnTo>
+                  <a:pt x="658" y="1665"/>
+                </a:lnTo>
+                <a:lnTo>
+                  <a:pt x="680" y="1650"/>
+                </a:lnTo>
+                <a:lnTo>
+                  <a:pt x="701" y="1632"/>
+                </a:lnTo>
+                <a:lnTo>
+                  <a:pt x="722" y="1610"/>
+                </a:lnTo>
+                <a:lnTo>
+                  <a:pt x="804" y="1483"/>
+                </a:lnTo>
+                <a:lnTo>
+                  <a:pt x="814" y="1445"/>
+                </a:lnTo>
+                <a:lnTo>
+                  <a:pt x="819" y="1410"/>
+                </a:lnTo>
+                <a:lnTo>
+                  <a:pt x="819" y="1378"/>
+                </a:lnTo>
+                <a:lnTo>
+                  <a:pt x="815" y="1351"/>
+                </a:lnTo>
+                <a:lnTo>
+                  <a:pt x="809" y="1329"/>
+                </a:lnTo>
+                <a:lnTo>
+                  <a:pt x="804" y="1312"/>
+                </a:lnTo>
+                <a:lnTo>
+                  <a:pt x="800" y="1301"/>
+                </a:lnTo>
+                <a:lnTo>
+                  <a:pt x="798" y="1297"/>
+                </a:lnTo>
+                <a:lnTo>
+                  <a:pt x="787" y="1273"/>
+                </a:lnTo>
+                <a:lnTo>
+                  <a:pt x="775" y="1249"/>
+                </a:lnTo>
+                <a:lnTo>
+                  <a:pt x="764" y="1225"/>
+                </a:lnTo>
+                <a:lnTo>
+                  <a:pt x="751" y="1202"/>
+                </a:lnTo>
+                <a:lnTo>
+                  <a:pt x="739" y="1178"/>
+                </a:lnTo>
+                <a:lnTo>
+                  <a:pt x="726" y="1154"/>
+                </a:lnTo>
+                <a:lnTo>
+                  <a:pt x="714" y="1131"/>
+                </a:lnTo>
+                <a:lnTo>
+                  <a:pt x="700" y="1108"/>
+                </a:lnTo>
+                <a:lnTo>
+                  <a:pt x="687" y="1086"/>
+                </a:lnTo>
+                <a:lnTo>
+                  <a:pt x="673" y="1062"/>
+                </a:lnTo>
+                <a:lnTo>
+                  <a:pt x="658" y="1040"/>
+                </a:lnTo>
+                <a:lnTo>
+                  <a:pt x="643" y="1018"/>
+                </a:lnTo>
+                <a:lnTo>
+                  <a:pt x="628" y="996"/>
+                </a:lnTo>
+                <a:lnTo>
+                  <a:pt x="613" y="974"/>
+                </a:lnTo>
+                <a:lnTo>
+                  <a:pt x="595" y="952"/>
+                </a:lnTo>
+                <a:lnTo>
+                  <a:pt x="578" y="929"/>
+                </a:lnTo>
+                <a:lnTo>
+                  <a:pt x="548" y="888"/>
+                </a:lnTo>
+                <a:lnTo>
+                  <a:pt x="520" y="847"/>
+                </a:lnTo>
+                <a:lnTo>
+                  <a:pt x="495" y="805"/>
+                </a:lnTo>
+                <a:lnTo>
+                  <a:pt x="474" y="764"/>
+                </a:lnTo>
+                <a:lnTo>
+                  <a:pt x="455" y="721"/>
+                </a:lnTo>
+                <a:lnTo>
+                  <a:pt x="441" y="679"/>
+                </a:lnTo>
+                <a:lnTo>
+                  <a:pt x="428" y="639"/>
+                </a:lnTo>
+                <a:lnTo>
+                  <a:pt x="419" y="599"/>
+                </a:lnTo>
+                <a:lnTo>
+                  <a:pt x="413" y="560"/>
+                </a:lnTo>
+                <a:lnTo>
+                  <a:pt x="410" y="523"/>
+                </a:lnTo>
+                <a:lnTo>
+                  <a:pt x="410" y="488"/>
+                </a:lnTo>
+                <a:lnTo>
+                  <a:pt x="412" y="455"/>
+                </a:lnTo>
+                <a:lnTo>
+                  <a:pt x="419" y="425"/>
+                </a:lnTo>
+                <a:lnTo>
+                  <a:pt x="427" y="397"/>
+                </a:lnTo>
+                <a:lnTo>
+                  <a:pt x="439" y="373"/>
+                </a:lnTo>
+                <a:lnTo>
+                  <a:pt x="454" y="352"/>
+                </a:lnTo>
+                <a:lnTo>
+                  <a:pt x="476" y="328"/>
+                </a:lnTo>
+                <a:lnTo>
+                  <a:pt x="498" y="304"/>
+                </a:lnTo>
+                <a:lnTo>
+                  <a:pt x="521" y="281"/>
+                </a:lnTo>
+                <a:lnTo>
+                  <a:pt x="546" y="258"/>
+                </a:lnTo>
+                <a:lnTo>
+                  <a:pt x="573" y="236"/>
+                </a:lnTo>
+                <a:lnTo>
+                  <a:pt x="600" y="215"/>
+                </a:lnTo>
+                <a:lnTo>
+                  <a:pt x="628" y="193"/>
+                </a:lnTo>
+                <a:lnTo>
+                  <a:pt x="658" y="174"/>
+                </a:lnTo>
+                <a:lnTo>
+                  <a:pt x="688" y="155"/>
+                </a:lnTo>
+                <a:lnTo>
+                  <a:pt x="718" y="138"/>
+                </a:lnTo>
+                <a:lnTo>
+                  <a:pt x="750" y="124"/>
+                </a:lnTo>
+                <a:lnTo>
+                  <a:pt x="783" y="110"/>
+                </a:lnTo>
+                <a:lnTo>
+                  <a:pt x="816" y="98"/>
+                </a:lnTo>
+                <a:lnTo>
+                  <a:pt x="849" y="89"/>
+                </a:lnTo>
+                <a:lnTo>
+                  <a:pt x="883" y="81"/>
+                </a:lnTo>
+                <a:lnTo>
+                  <a:pt x="918" y="76"/>
+                </a:lnTo>
+                <a:lnTo>
+                  <a:pt x="939" y="74"/>
+                </a:lnTo>
+                <a:lnTo>
+                  <a:pt x="961" y="74"/>
+                </a:lnTo>
+                <a:lnTo>
+                  <a:pt x="981" y="74"/>
+                </a:lnTo>
+                <a:lnTo>
+                  <a:pt x="1003" y="76"/>
+                </a:lnTo>
+                <a:lnTo>
+                  <a:pt x="1024" y="80"/>
+                </a:lnTo>
+                <a:lnTo>
+                  <a:pt x="1044" y="85"/>
+                </a:lnTo>
+                <a:lnTo>
+                  <a:pt x="1063" y="91"/>
+                </a:lnTo>
+                <a:lnTo>
+                  <a:pt x="1083" y="98"/>
+                </a:lnTo>
+                <a:lnTo>
+                  <a:pt x="1101" y="107"/>
+                </a:lnTo>
+                <a:lnTo>
+                  <a:pt x="1119" y="115"/>
+                </a:lnTo>
+                <a:lnTo>
+                  <a:pt x="1137" y="126"/>
+                </a:lnTo>
+                <a:lnTo>
+                  <a:pt x="1154" y="136"/>
+                </a:lnTo>
+                <a:lnTo>
+                  <a:pt x="1170" y="148"/>
+                </a:lnTo>
+                <a:lnTo>
+                  <a:pt x="1186" y="161"/>
+                </a:lnTo>
+                <a:lnTo>
+                  <a:pt x="1200" y="174"/>
+                </a:lnTo>
+                <a:lnTo>
+                  <a:pt x="1215" y="188"/>
+                </a:lnTo>
+                <a:lnTo>
+                  <a:pt x="1227" y="204"/>
+                </a:lnTo>
+                <a:lnTo>
+                  <a:pt x="1240" y="220"/>
+                </a:lnTo>
+                <a:lnTo>
+                  <a:pt x="1250" y="236"/>
+                </a:lnTo>
+                <a:lnTo>
+                  <a:pt x="1260" y="253"/>
+                </a:lnTo>
+                <a:lnTo>
+                  <a:pt x="1269" y="270"/>
+                </a:lnTo>
+                <a:lnTo>
+                  <a:pt x="1277" y="288"/>
+                </a:lnTo>
+                <a:lnTo>
+                  <a:pt x="1283" y="307"/>
+                </a:lnTo>
+                <a:lnTo>
+                  <a:pt x="1289" y="326"/>
+                </a:lnTo>
+                <a:lnTo>
+                  <a:pt x="1252" y="351"/>
+                </a:lnTo>
+                <a:lnTo>
+                  <a:pt x="1249" y="392"/>
+                </a:lnTo>
+                <a:lnTo>
+                  <a:pt x="1251" y="438"/>
+                </a:lnTo>
+                <a:lnTo>
+                  <a:pt x="1256" y="484"/>
+                </a:lnTo>
+                <a:lnTo>
+                  <a:pt x="1261" y="525"/>
+                </a:lnTo>
+                <a:lnTo>
+                  <a:pt x="1240" y="534"/>
+                </a:lnTo>
+                <a:lnTo>
+                  <a:pt x="1218" y="545"/>
+                </a:lnTo>
+                <a:lnTo>
+                  <a:pt x="1198" y="558"/>
+                </a:lnTo>
+                <a:lnTo>
+                  <a:pt x="1178" y="570"/>
+                </a:lnTo>
+                <a:lnTo>
+                  <a:pt x="1159" y="584"/>
+                </a:lnTo>
+                <a:lnTo>
+                  <a:pt x="1141" y="599"/>
+                </a:lnTo>
+                <a:lnTo>
+                  <a:pt x="1123" y="615"/>
+                </a:lnTo>
+                <a:lnTo>
+                  <a:pt x="1105" y="632"/>
+                </a:lnTo>
+                <a:lnTo>
+                  <a:pt x="1090" y="649"/>
+                </a:lnTo>
+                <a:lnTo>
+                  <a:pt x="1075" y="668"/>
+                </a:lnTo>
+                <a:lnTo>
+                  <a:pt x="1061" y="685"/>
+                </a:lnTo>
+                <a:lnTo>
+                  <a:pt x="1049" y="704"/>
+                </a:lnTo>
+                <a:lnTo>
+                  <a:pt x="1036" y="725"/>
+                </a:lnTo>
+                <a:lnTo>
+                  <a:pt x="1026" y="746"/>
+                </a:lnTo>
+                <a:lnTo>
+                  <a:pt x="1017" y="767"/>
+                </a:lnTo>
+                <a:lnTo>
+                  <a:pt x="1009" y="788"/>
+                </a:lnTo>
+                <a:lnTo>
+                  <a:pt x="989" y="850"/>
+                </a:lnTo>
+                <a:lnTo>
+                  <a:pt x="973" y="913"/>
+                </a:lnTo>
+                <a:lnTo>
+                  <a:pt x="963" y="973"/>
+                </a:lnTo>
+                <a:lnTo>
+                  <a:pt x="956" y="1033"/>
+                </a:lnTo>
+                <a:lnTo>
+                  <a:pt x="954" y="1094"/>
+                </a:lnTo>
+                <a:lnTo>
+                  <a:pt x="956" y="1155"/>
+                </a:lnTo>
+                <a:lnTo>
+                  <a:pt x="963" y="1218"/>
+                </a:lnTo>
+                <a:lnTo>
+                  <a:pt x="976" y="1282"/>
+                </a:lnTo>
+                <a:lnTo>
+                  <a:pt x="976" y="1288"/>
+                </a:lnTo>
+                <a:lnTo>
+                  <a:pt x="979" y="1304"/>
+                </a:lnTo>
+                <a:lnTo>
+                  <a:pt x="986" y="1327"/>
+                </a:lnTo>
+                <a:lnTo>
+                  <a:pt x="995" y="1357"/>
+                </a:lnTo>
+                <a:lnTo>
+                  <a:pt x="1006" y="1393"/>
+                </a:lnTo>
+                <a:lnTo>
+                  <a:pt x="1020" y="1433"/>
+                </a:lnTo>
+                <a:lnTo>
+                  <a:pt x="1036" y="1477"/>
+                </a:lnTo>
+                <a:lnTo>
+                  <a:pt x="1053" y="1524"/>
+                </a:lnTo>
+                <a:lnTo>
+                  <a:pt x="1071" y="1571"/>
+                </a:lnTo>
+                <a:lnTo>
+                  <a:pt x="1091" y="1620"/>
+                </a:lnTo>
+                <a:lnTo>
+                  <a:pt x="1110" y="1667"/>
+                </a:lnTo>
+                <a:lnTo>
+                  <a:pt x="1132" y="1714"/>
+                </a:lnTo>
+                <a:lnTo>
+                  <a:pt x="1152" y="1757"/>
+                </a:lnTo>
+                <a:lnTo>
+                  <a:pt x="1174" y="1796"/>
+                </a:lnTo>
+                <a:lnTo>
+                  <a:pt x="1194" y="1831"/>
+                </a:lnTo>
+                <a:lnTo>
+                  <a:pt x="1215" y="1861"/>
+                </a:lnTo>
+                <a:lnTo>
+                  <a:pt x="1227" y="1888"/>
+                </a:lnTo>
+                <a:lnTo>
+                  <a:pt x="1247" y="1925"/>
+                </a:lnTo>
+                <a:lnTo>
+                  <a:pt x="1271" y="1969"/>
+                </a:lnTo>
+                <a:lnTo>
+                  <a:pt x="1297" y="2015"/>
+                </a:lnTo>
+                <a:lnTo>
+                  <a:pt x="1322" y="2058"/>
+                </a:lnTo>
+                <a:lnTo>
+                  <a:pt x="1346" y="2094"/>
+                </a:lnTo>
+                <a:lnTo>
+                  <a:pt x="1365" y="2118"/>
+                </a:lnTo>
+                <a:lnTo>
+                  <a:pt x="1378" y="2127"/>
+                </a:lnTo>
+                <a:lnTo>
+                  <a:pt x="1947" y="1961"/>
+                </a:lnTo>
+                <a:lnTo>
+                  <a:pt x="1950" y="1923"/>
+                </a:lnTo>
+                <a:lnTo>
+                  <a:pt x="1955" y="1883"/>
+                </a:lnTo>
+                <a:lnTo>
+                  <a:pt x="1960" y="1843"/>
+                </a:lnTo>
+                <a:lnTo>
+                  <a:pt x="1965" y="1802"/>
+                </a:lnTo>
+                <a:lnTo>
+                  <a:pt x="1971" y="1759"/>
+                </a:lnTo>
+                <a:lnTo>
+                  <a:pt x="1976" y="1718"/>
+                </a:lnTo>
+                <a:lnTo>
+                  <a:pt x="1983" y="1678"/>
+                </a:lnTo>
+                <a:lnTo>
+                  <a:pt x="1989" y="1639"/>
+                </a:lnTo>
+                <a:lnTo>
+                  <a:pt x="1891" y="1639"/>
+                </a:lnTo>
+                <a:close/>
+              </a:path>
+            </a:pathLst>
+          </a:custGeom>
+          <a:solidFill>
+            <a:schemeClr val="bg1">
+              <a:lumMod val="65000"/>
+            </a:schemeClr>
+          </a:solidFill>
+          <a:ln w="9525">
+            <a:solidFill>
+              <a:schemeClr val="bg1">
+                <a:lumMod val="65000"/>
+              </a:schemeClr>
+            </a:solidFill>
+            <a:round/>
+            <a:headEnd/>
+            <a:tailEnd/>
+          </a:ln>
+        </p:spPr>
+        <p:txBody>
+          <a:bodyPr vert="horz" wrap="square" lIns="91440" tIns="45720" rIns="91440" bIns="45720" numCol="1" anchor="t" anchorCtr="0" compatLnSpc="1">
+            <a:prstTxWarp prst="textNoShape">
+              <a:avLst/>
+            </a:prstTxWarp>
+          </a:bodyPr>
+          <a:lstStyle/>
+          <a:p>
+            <a:endParaRPr lang="en-SG"/>
+          </a:p>
+        </p:txBody>
+      </p:sp>
+      <p:sp>
+        <p:nvSpPr>
+          <p:cNvPr id="9" name="Freeform 10"/>
+          <p:cNvSpPr>
+            <a:spLocks/>
+          </p:cNvSpPr>
+          <p:nvPr/>
+        </p:nvSpPr>
+        <p:spPr bwMode="auto">
+          <a:xfrm>
+            <a:off x="6469063" y="1939646"/>
+            <a:ext cx="0" cy="1588"/>
+          </a:xfrm>
+          <a:custGeom>
+            <a:avLst/>
+            <a:gdLst>
+              <a:gd name="T0" fmla="*/ 2 w 2"/>
+              <a:gd name="T1" fmla="*/ 0 h 3"/>
+              <a:gd name="T2" fmla="*/ 0 w 2"/>
+              <a:gd name="T3" fmla="*/ 3 h 3"/>
+              <a:gd name="T4" fmla="*/ 0 w 2"/>
+              <a:gd name="T5" fmla="*/ 3 h 3"/>
+              <a:gd name="T6" fmla="*/ 0 w 2"/>
+              <a:gd name="T7" fmla="*/ 3 h 3"/>
+              <a:gd name="T8" fmla="*/ 0 w 2"/>
+              <a:gd name="T9" fmla="*/ 3 h 3"/>
+              <a:gd name="T10" fmla="*/ 0 w 2"/>
+              <a:gd name="T11" fmla="*/ 3 h 3"/>
+              <a:gd name="T12" fmla="*/ 2 w 2"/>
+              <a:gd name="T13" fmla="*/ 0 h 3"/>
+            </a:gdLst>
+            <a:ahLst/>
+            <a:cxnLst>
+              <a:cxn ang="0">
+                <a:pos x="T0" y="T1"/>
+              </a:cxn>
+              <a:cxn ang="0">
+                <a:pos x="T2" y="T3"/>
+              </a:cxn>
+              <a:cxn ang="0">
+                <a:pos x="T4" y="T5"/>
+              </a:cxn>
+              <a:cxn ang="0">
+                <a:pos x="T6" y="T7"/>
+              </a:cxn>
+              <a:cxn ang="0">
+                <a:pos x="T8" y="T9"/>
+              </a:cxn>
+              <a:cxn ang="0">
+                <a:pos x="T10" y="T11"/>
+              </a:cxn>
+              <a:cxn ang="0">
+                <a:pos x="T12" y="T13"/>
+              </a:cxn>
+            </a:cxnLst>
+            <a:rect l="0" t="0" r="r" b="b"/>
+            <a:pathLst>
+              <a:path w="2" h="3">
+                <a:moveTo>
+                  <a:pt x="2" y="0"/>
+                </a:moveTo>
+                <a:lnTo>
+                  <a:pt x="0" y="3"/>
+                </a:lnTo>
+                <a:lnTo>
+                  <a:pt x="0" y="3"/>
+                </a:lnTo>
+                <a:lnTo>
+                  <a:pt x="0" y="3"/>
+                </a:lnTo>
+                <a:lnTo>
+                  <a:pt x="0" y="3"/>
+                </a:lnTo>
+                <a:lnTo>
+                  <a:pt x="0" y="3"/>
+                </a:lnTo>
+                <a:lnTo>
+                  <a:pt x="2" y="0"/>
+                </a:lnTo>
+                <a:close/>
+              </a:path>
+            </a:pathLst>
+          </a:custGeom>
+          <a:solidFill>
+            <a:srgbClr val="000000"/>
+          </a:solidFill>
+          <a:ln>
+            <a:noFill/>
+          </a:ln>
+          <a:extLst>
+            <a:ext uri="{91240B29-F687-4F45-9708-019B960494DF}">
+              <a14:hiddenLine xmlns:a14="http://schemas.microsoft.com/office/drawing/2010/main" w="9525">
+                <a:solidFill>
+                  <a:srgbClr val="000000"/>
+                </a:solidFill>
+                <a:round/>
+                <a:headEnd/>
+                <a:tailEnd/>
+              </a14:hiddenLine>
+            </a:ext>
+          </a:extLst>
+        </p:spPr>
+        <p:txBody>
+          <a:bodyPr vert="horz" wrap="square" lIns="91440" tIns="45720" rIns="91440" bIns="45720" numCol="1" anchor="t" anchorCtr="0" compatLnSpc="1">
+            <a:prstTxWarp prst="textNoShape">
+              <a:avLst/>
+            </a:prstTxWarp>
+          </a:bodyPr>
+          <a:lstStyle/>
+          <a:p>
+            <a:endParaRPr lang="en-SG"/>
+          </a:p>
+        </p:txBody>
+      </p:sp>
+      <p:grpSp>
+        <p:nvGrpSpPr>
+          <p:cNvPr id="75" name="Group 74"/>
+          <p:cNvGrpSpPr/>
+          <p:nvPr/>
+        </p:nvGrpSpPr>
+        <p:grpSpPr>
+          <a:xfrm>
+            <a:off x="5622925" y="1287462"/>
+            <a:ext cx="298983" cy="520531"/>
+            <a:chOff x="638861" y="309422"/>
+            <a:chExt cx="298983" cy="520531"/>
+          </a:xfrm>
+        </p:grpSpPr>
+        <p:sp>
+          <p:nvSpPr>
+            <p:cNvPr id="81" name="Flowchart: Connector 80"/>
+            <p:cNvSpPr/>
+            <p:nvPr/>
+          </p:nvSpPr>
+          <p:spPr>
+            <a:xfrm>
+              <a:off x="678021" y="309422"/>
+              <a:ext cx="220662" cy="220662"/>
+            </a:xfrm>
+            <a:prstGeom prst="flowChartConnector">
+              <a:avLst/>
+            </a:prstGeom>
+            <a:solidFill>
+              <a:schemeClr val="bg1"/>
+            </a:solidFill>
+          </p:spPr>
+          <p:style>
+            <a:lnRef idx="2">
+              <a:schemeClr val="accent1">
+                <a:shade val="50000"/>
+              </a:schemeClr>
+            </a:lnRef>
+            <a:fillRef idx="1">
+              <a:schemeClr val="accent1"/>
+            </a:fillRef>
+            <a:effectRef idx="0">
+              <a:schemeClr val="accent1"/>
+            </a:effectRef>
+            <a:fontRef idx="minor">
+              <a:schemeClr val="lt1"/>
+            </a:fontRef>
+          </p:style>
+          <p:txBody>
+            <a:bodyPr rtlCol="0" anchor="ctr"/>
+            <a:lstStyle/>
+            <a:p>
+              <a:pPr algn="ctr"/>
+              <a:endParaRPr lang="en-SG"/>
+            </a:p>
+          </p:txBody>
+        </p:sp>
+        <p:grpSp>
+          <p:nvGrpSpPr>
+            <p:cNvPr id="82" name="Group 81"/>
+            <p:cNvGrpSpPr/>
+            <p:nvPr/>
+          </p:nvGrpSpPr>
+          <p:grpSpPr>
+            <a:xfrm>
+              <a:off x="638861" y="549600"/>
+              <a:ext cx="298983" cy="280353"/>
+              <a:chOff x="638861" y="549600"/>
+              <a:chExt cx="298983" cy="280353"/>
+            </a:xfrm>
+          </p:grpSpPr>
+          <p:sp>
+            <p:nvSpPr>
+              <p:cNvPr id="92" name="Flowchart: Delay 91"/>
+              <p:cNvSpPr/>
+              <p:nvPr/>
+            </p:nvSpPr>
+            <p:spPr>
+              <a:xfrm rot="16200000">
+                <a:off x="648176" y="540285"/>
+                <a:ext cx="280353" cy="298983"/>
+              </a:xfrm>
+              <a:prstGeom prst="flowChartDelay">
+                <a:avLst/>
+              </a:prstGeom>
+              <a:solidFill>
+                <a:schemeClr val="bg1"/>
+              </a:solidFill>
+            </p:spPr>
+            <p:style>
+              <a:lnRef idx="2">
+                <a:schemeClr val="accent1">
+                  <a:shade val="50000"/>
+                </a:schemeClr>
+              </a:lnRef>
+              <a:fillRef idx="1">
+                <a:schemeClr val="accent1"/>
+              </a:fillRef>
+              <a:effectRef idx="0">
+                <a:schemeClr val="accent1"/>
+              </a:effectRef>
+              <a:fontRef idx="minor">
+                <a:schemeClr val="lt1"/>
+              </a:fontRef>
+            </p:style>
+            <p:txBody>
+              <a:bodyPr rtlCol="0" anchor="ctr"/>
+              <a:lstStyle/>
+              <a:p>
+                <a:pPr algn="ctr"/>
+                <a:endParaRPr lang="en-SG"/>
+              </a:p>
+            </p:txBody>
+          </p:sp>
+          <p:sp>
+            <p:nvSpPr>
+              <p:cNvPr id="99" name="Freeform 98"/>
+              <p:cNvSpPr/>
+              <p:nvPr/>
+            </p:nvSpPr>
+            <p:spPr>
+              <a:xfrm>
+                <a:off x="737215" y="552954"/>
+                <a:ext cx="102393" cy="235744"/>
+              </a:xfrm>
+              <a:custGeom>
+                <a:avLst/>
+                <a:gdLst>
+                  <a:gd name="connsiteX0" fmla="*/ 47625 w 102393"/>
+                  <a:gd name="connsiteY0" fmla="*/ 0 h 235744"/>
+                  <a:gd name="connsiteX1" fmla="*/ 0 w 102393"/>
+                  <a:gd name="connsiteY1" fmla="*/ 185738 h 235744"/>
+                  <a:gd name="connsiteX2" fmla="*/ 57150 w 102393"/>
+                  <a:gd name="connsiteY2" fmla="*/ 235744 h 235744"/>
+                  <a:gd name="connsiteX3" fmla="*/ 102393 w 102393"/>
+                  <a:gd name="connsiteY3" fmla="*/ 171450 h 235744"/>
+                  <a:gd name="connsiteX4" fmla="*/ 47625 w 102393"/>
+                  <a:gd name="connsiteY4" fmla="*/ 0 h 235744"/>
+                </a:gdLst>
+                <a:ahLst/>
+                <a:cxnLst>
+                  <a:cxn ang="0">
+                    <a:pos x="connsiteX0" y="connsiteY0"/>
+                  </a:cxn>
+                  <a:cxn ang="0">
+                    <a:pos x="connsiteX1" y="connsiteY1"/>
+                  </a:cxn>
+                  <a:cxn ang="0">
+                    <a:pos x="connsiteX2" y="connsiteY2"/>
+                  </a:cxn>
+                  <a:cxn ang="0">
+                    <a:pos x="connsiteX3" y="connsiteY3"/>
+                  </a:cxn>
+                  <a:cxn ang="0">
+                    <a:pos x="connsiteX4" y="connsiteY4"/>
+                  </a:cxn>
+                </a:cxnLst>
+                <a:rect l="l" t="t" r="r" b="b"/>
+                <a:pathLst>
+                  <a:path w="102393" h="235744">
+                    <a:moveTo>
+                      <a:pt x="47625" y="0"/>
+                    </a:moveTo>
+                    <a:lnTo>
+                      <a:pt x="0" y="185738"/>
+                    </a:lnTo>
+                    <a:lnTo>
+                      <a:pt x="57150" y="235744"/>
+                    </a:lnTo>
+                    <a:lnTo>
+                      <a:pt x="102393" y="171450"/>
+                    </a:lnTo>
+                    <a:lnTo>
+                      <a:pt x="47625" y="0"/>
+                    </a:lnTo>
+                    <a:close/>
+                  </a:path>
+                </a:pathLst>
+              </a:custGeom>
+              <a:solidFill>
+                <a:schemeClr val="bg1"/>
+              </a:solidFill>
+            </p:spPr>
+            <p:style>
+              <a:lnRef idx="2">
+                <a:schemeClr val="accent1">
+                  <a:shade val="50000"/>
+                </a:schemeClr>
+              </a:lnRef>
+              <a:fillRef idx="1">
+                <a:schemeClr val="accent1"/>
+              </a:fillRef>
+              <a:effectRef idx="0">
+                <a:schemeClr val="accent1"/>
+              </a:effectRef>
+              <a:fontRef idx="minor">
+                <a:schemeClr val="lt1"/>
+              </a:fontRef>
+            </p:style>
+            <p:txBody>
+              <a:bodyPr rtlCol="0" anchor="ctr"/>
+              <a:lstStyle/>
+              <a:p>
+                <a:pPr algn="ctr"/>
+                <a:endParaRPr lang="en-SG"/>
+              </a:p>
+            </p:txBody>
+          </p:sp>
+        </p:grpSp>
+        <p:sp>
+          <p:nvSpPr>
+            <p:cNvPr id="84" name="Freeform 83"/>
+            <p:cNvSpPr/>
+            <p:nvPr/>
+          </p:nvSpPr>
+          <p:spPr>
+            <a:xfrm>
+              <a:off x="882472" y="469611"/>
+              <a:ext cx="50006" cy="19050"/>
+            </a:xfrm>
+            <a:custGeom>
+              <a:avLst/>
+              <a:gdLst>
+                <a:gd name="connsiteX0" fmla="*/ 0 w 50006"/>
+                <a:gd name="connsiteY0" fmla="*/ 0 h 19050"/>
+                <a:gd name="connsiteX1" fmla="*/ 0 w 50006"/>
+                <a:gd name="connsiteY1" fmla="*/ 0 h 19050"/>
+                <a:gd name="connsiteX2" fmla="*/ 21431 w 50006"/>
+                <a:gd name="connsiteY2" fmla="*/ 4762 h 19050"/>
+                <a:gd name="connsiteX3" fmla="*/ 28575 w 50006"/>
+                <a:gd name="connsiteY3" fmla="*/ 9525 h 19050"/>
+                <a:gd name="connsiteX4" fmla="*/ 38100 w 50006"/>
+                <a:gd name="connsiteY4" fmla="*/ 14287 h 19050"/>
+                <a:gd name="connsiteX5" fmla="*/ 50006 w 50006"/>
+                <a:gd name="connsiteY5" fmla="*/ 19050 h 19050"/>
+              </a:gdLst>
+              <a:ahLst/>
+              <a:cxnLst>
+                <a:cxn ang="0">
+                  <a:pos x="connsiteX0" y="connsiteY0"/>
+                </a:cxn>
+                <a:cxn ang="0">
+                  <a:pos x="connsiteX1" y="connsiteY1"/>
+                </a:cxn>
+                <a:cxn ang="0">
+                  <a:pos x="connsiteX2" y="connsiteY2"/>
+                </a:cxn>
+                <a:cxn ang="0">
+                  <a:pos x="connsiteX3" y="connsiteY3"/>
+                </a:cxn>
+                <a:cxn ang="0">
+                  <a:pos x="connsiteX4" y="connsiteY4"/>
+                </a:cxn>
+                <a:cxn ang="0">
+                  <a:pos x="connsiteX5" y="connsiteY5"/>
+                </a:cxn>
+              </a:cxnLst>
+              <a:rect l="l" t="t" r="r" b="b"/>
+              <a:pathLst>
+                <a:path w="50006" h="19050">
+                  <a:moveTo>
+                    <a:pt x="0" y="0"/>
+                  </a:moveTo>
+                  <a:lnTo>
+                    <a:pt x="0" y="0"/>
+                  </a:lnTo>
+                  <a:cubicBezTo>
+                    <a:pt x="7144" y="1587"/>
+                    <a:pt x="14489" y="2448"/>
+                    <a:pt x="21431" y="4762"/>
+                  </a:cubicBezTo>
+                  <a:cubicBezTo>
+                    <a:pt x="24146" y="5667"/>
+                    <a:pt x="26090" y="8105"/>
+                    <a:pt x="28575" y="9525"/>
+                  </a:cubicBezTo>
+                  <a:cubicBezTo>
+                    <a:pt x="31657" y="11286"/>
+                    <a:pt x="34837" y="12889"/>
+                    <a:pt x="38100" y="14287"/>
+                  </a:cubicBezTo>
+                  <a:cubicBezTo>
+                    <a:pt x="58672" y="23103"/>
+                    <a:pt x="34691" y="11391"/>
+                    <a:pt x="50006" y="19050"/>
+                  </a:cubicBezTo>
+                </a:path>
+              </a:pathLst>
+            </a:custGeom>
+            <a:solidFill>
+              <a:schemeClr val="bg1"/>
+            </a:solidFill>
+          </p:spPr>
+          <p:style>
+            <a:lnRef idx="2">
+              <a:schemeClr val="accent1">
+                <a:shade val="50000"/>
+              </a:schemeClr>
+            </a:lnRef>
+            <a:fillRef idx="1">
+              <a:schemeClr val="accent1"/>
+            </a:fillRef>
+            <a:effectRef idx="0">
+              <a:schemeClr val="accent1"/>
+            </a:effectRef>
+            <a:fontRef idx="minor">
+              <a:schemeClr val="lt1"/>
+            </a:fontRef>
+          </p:style>
+          <p:txBody>
+            <a:bodyPr rtlCol="0" anchor="ctr"/>
+            <a:lstStyle/>
+            <a:p>
+              <a:pPr algn="ctr"/>
+              <a:endParaRPr lang="en-SG"/>
+            </a:p>
+          </p:txBody>
+        </p:sp>
+        <p:sp>
+          <p:nvSpPr>
+            <p:cNvPr id="88" name="Flowchart: Connector 87"/>
+            <p:cNvSpPr/>
+            <p:nvPr/>
+          </p:nvSpPr>
+          <p:spPr>
+            <a:xfrm>
+              <a:off x="800257" y="354516"/>
+              <a:ext cx="45719" cy="45719"/>
+            </a:xfrm>
+            <a:prstGeom prst="flowChartConnector">
+              <a:avLst/>
+            </a:prstGeom>
+            <a:solidFill>
+              <a:schemeClr val="bg1"/>
+            </a:solidFill>
+            <a:ln>
+              <a:solidFill>
+                <a:schemeClr val="accent1">
+                  <a:lumMod val="75000"/>
+                </a:schemeClr>
+              </a:solidFill>
+            </a:ln>
+          </p:spPr>
+          <p:style>
+            <a:lnRef idx="2">
+              <a:schemeClr val="accent1">
+                <a:shade val="50000"/>
+              </a:schemeClr>
+            </a:lnRef>
+            <a:fillRef idx="1">
+              <a:schemeClr val="accent1"/>
+            </a:fillRef>
+            <a:effectRef idx="0">
+              <a:schemeClr val="accent1"/>
+            </a:effectRef>
+            <a:fontRef idx="minor">
+              <a:schemeClr val="lt1"/>
+            </a:fontRef>
+          </p:style>
+          <p:txBody>
+            <a:bodyPr rtlCol="0" anchor="ctr"/>
+            <a:lstStyle/>
+            <a:p>
+              <a:pPr algn="ctr"/>
+              <a:endParaRPr lang="en-SG"/>
+            </a:p>
+          </p:txBody>
+        </p:sp>
+      </p:grpSp>
     </p:spTree>
     <p:extLst>
       <p:ext uri="{BB962C8B-B14F-4D97-AF65-F5344CB8AC3E}">

</xml_diff>

<commit_message>
Syncing Issue656 [instructorCourseDetails, instructorCourseEnroll: add a note about mass editing]
</commit_message>
<xml_diff>
--- a/doc/mockups/homepage image.pptx
+++ b/doc/mockups/homepage image.pptx
@@ -1,6 +1,6 @@
 
 <file path=ppt/presentation.xml><?xml version="1.0" encoding="utf-8"?>
-<p:presentation xmlns:a="http://schemas.openxmlformats.org/drawingml/2006/main" xmlns:r="http://schemas.openxmlformats.org/officeDocument/2006/relationships" xmlns:p="http://schemas.openxmlformats.org/presentationml/2006/main" embedTrueTypeFonts="1">
+<p:presentation xmlns:a="http://schemas.openxmlformats.org/drawingml/2006/main" xmlns:r="http://schemas.openxmlformats.org/officeDocument/2006/relationships" xmlns:p="http://schemas.openxmlformats.org/presentationml/2006/main" saveSubsetFonts="1">
   <p:sldMasterIdLst>
     <p:sldMasterId id="2147483648" r:id="rId1"/>
   </p:sldMasterIdLst>
@@ -10,19 +10,10 @@
   <p:sldIdLst>
     <p:sldId id="258" r:id="rId2"/>
   </p:sldIdLst>
-  <p:sldSz cx="7740650" cy="2879725"/>
+  <p:sldSz cx="7740650" cy="3108325"/>
   <p:notesSz cx="6858000" cy="9144000"/>
-  <p:embeddedFontLst>
-    <p:embeddedFont>
-      <p:font typeface="Calibri" pitchFamily="34" charset="0"/>
-      <p:regular r:id="rId4"/>
-      <p:bold r:id="rId5"/>
-      <p:italic r:id="rId6"/>
-      <p:boldItalic r:id="rId7"/>
-    </p:embeddedFont>
-  </p:embeddedFontLst>
   <p:custDataLst>
-    <p:tags r:id="rId8"/>
+    <p:tags r:id="rId4"/>
   </p:custDataLst>
   <p:defaultTextStyle>
     <a:defPPr>
@@ -204,7 +195,7 @@
           <a:p>
             <a:fld id="{A4537E34-E1A6-4BBF-AF99-84C669929841}" type="datetimeFigureOut">
               <a:rPr lang="en-SG" smtClean="0"/>
-              <a:t>20/3/2013</a:t>
+              <a:t>21/3/2013</a:t>
             </a:fld>
             <a:endParaRPr lang="en-SG"/>
           </a:p>
@@ -222,8 +213,8 @@
         </p:nvSpPr>
         <p:spPr>
           <a:xfrm>
-            <a:off x="-1179513" y="685800"/>
-            <a:ext cx="9217026" cy="3429000"/>
+            <a:off x="-841375" y="685800"/>
+            <a:ext cx="8540750" cy="3429000"/>
           </a:xfrm>
           <a:prstGeom prst="rect">
             <a:avLst/>
@@ -499,7 +490,12 @@
             <p:ph type="sldImg"/>
           </p:nvPr>
         </p:nvSpPr>
-        <p:spPr/>
+        <p:spPr>
+          <a:xfrm>
+            <a:off x="-841375" y="685800"/>
+            <a:ext cx="8540750" cy="3429000"/>
+          </a:xfrm>
+        </p:spPr>
       </p:sp>
       <p:sp>
         <p:nvSpPr>
@@ -585,8 +581,8 @@
         </p:nvSpPr>
         <p:spPr>
           <a:xfrm>
-            <a:off x="580550" y="894582"/>
-            <a:ext cx="6579552" cy="617275"/>
+            <a:off x="580550" y="965597"/>
+            <a:ext cx="6579552" cy="666276"/>
           </a:xfrm>
         </p:spPr>
         <p:txBody>
@@ -613,8 +609,8 @@
         </p:nvSpPr>
         <p:spPr>
           <a:xfrm>
-            <a:off x="1161098" y="1631845"/>
-            <a:ext cx="5418455" cy="735929"/>
+            <a:off x="1161099" y="1761386"/>
+            <a:ext cx="5418455" cy="794349"/>
           </a:xfrm>
         </p:spPr>
         <p:txBody>
@@ -738,7 +734,7 @@
             <a:fld id="{1D8BD707-D9CF-40AE-B4C6-C98DA3205C09}" type="datetimeFigureOut">
               <a:rPr lang="en-US" smtClean="0"/>
               <a:pPr/>
-              <a:t>3/20/2013</a:t>
+              <a:t>3/21/2013</a:t>
             </a:fld>
             <a:endParaRPr lang="en-US"/>
           </a:p>
@@ -905,7 +901,7 @@
             <a:fld id="{1D8BD707-D9CF-40AE-B4C6-C98DA3205C09}" type="datetimeFigureOut">
               <a:rPr lang="en-US" smtClean="0"/>
               <a:pPr/>
-              <a:t>3/20/2013</a:t>
+              <a:t>3/21/2013</a:t>
             </a:fld>
             <a:endParaRPr lang="en-US"/>
           </a:p>
@@ -991,8 +987,8 @@
         </p:nvSpPr>
         <p:spPr>
           <a:xfrm>
-            <a:off x="5611971" y="115324"/>
-            <a:ext cx="1741647" cy="2457099"/>
+            <a:off x="5611972" y="124479"/>
+            <a:ext cx="1741647" cy="2652150"/>
           </a:xfrm>
         </p:spPr>
         <p:txBody>
@@ -1019,8 +1015,8 @@
         </p:nvSpPr>
         <p:spPr>
           <a:xfrm>
-            <a:off x="387033" y="115324"/>
-            <a:ext cx="5095928" cy="2457099"/>
+            <a:off x="387033" y="124479"/>
+            <a:ext cx="5095928" cy="2652150"/>
           </a:xfrm>
         </p:spPr>
         <p:txBody>
@@ -1082,7 +1078,7 @@
             <a:fld id="{1D8BD707-D9CF-40AE-B4C6-C98DA3205C09}" type="datetimeFigureOut">
               <a:rPr lang="en-US" smtClean="0"/>
               <a:pPr/>
-              <a:t>3/20/2013</a:t>
+              <a:t>3/21/2013</a:t>
             </a:fld>
             <a:endParaRPr lang="en-US"/>
           </a:p>
@@ -1249,7 +1245,7 @@
             <a:fld id="{1D8BD707-D9CF-40AE-B4C6-C98DA3205C09}" type="datetimeFigureOut">
               <a:rPr lang="en-US" smtClean="0"/>
               <a:pPr/>
-              <a:t>3/20/2013</a:t>
+              <a:t>3/21/2013</a:t>
             </a:fld>
             <a:endParaRPr lang="en-US"/>
           </a:p>
@@ -1335,8 +1331,8 @@
         </p:nvSpPr>
         <p:spPr>
           <a:xfrm>
-            <a:off x="611459" y="1850492"/>
-            <a:ext cx="6579552" cy="571945"/>
+            <a:off x="611459" y="1997390"/>
+            <a:ext cx="6579552" cy="617347"/>
           </a:xfrm>
         </p:spPr>
         <p:txBody>
@@ -1367,8 +1363,8 @@
         </p:nvSpPr>
         <p:spPr>
           <a:xfrm>
-            <a:off x="611459" y="1220551"/>
-            <a:ext cx="6579552" cy="629940"/>
+            <a:off x="611459" y="1317442"/>
+            <a:ext cx="6579552" cy="679946"/>
           </a:xfrm>
         </p:spPr>
         <p:txBody>
@@ -1492,7 +1488,7 @@
             <a:fld id="{1D8BD707-D9CF-40AE-B4C6-C98DA3205C09}" type="datetimeFigureOut">
               <a:rPr lang="en-US" smtClean="0"/>
               <a:pPr/>
-              <a:t>3/20/2013</a:t>
+              <a:t>3/21/2013</a:t>
             </a:fld>
             <a:endParaRPr lang="en-US"/>
           </a:p>
@@ -1601,8 +1597,8 @@
         </p:nvSpPr>
         <p:spPr>
           <a:xfrm>
-            <a:off x="387032" y="671937"/>
-            <a:ext cx="3418787" cy="1900485"/>
+            <a:off x="387033" y="725278"/>
+            <a:ext cx="3418787" cy="2051350"/>
           </a:xfrm>
         </p:spPr>
         <p:txBody>
@@ -1686,8 +1682,8 @@
         </p:nvSpPr>
         <p:spPr>
           <a:xfrm>
-            <a:off x="3934831" y="671937"/>
-            <a:ext cx="3418787" cy="1900485"/>
+            <a:off x="3934831" y="725278"/>
+            <a:ext cx="3418787" cy="2051350"/>
           </a:xfrm>
         </p:spPr>
         <p:txBody>
@@ -1777,7 +1773,7 @@
             <a:fld id="{1D8BD707-D9CF-40AE-B4C6-C98DA3205C09}" type="datetimeFigureOut">
               <a:rPr lang="en-US" smtClean="0"/>
               <a:pPr/>
-              <a:t>3/20/2013</a:t>
+              <a:t>3/21/2013</a:t>
             </a:fld>
             <a:endParaRPr lang="en-US"/>
           </a:p>
@@ -1890,8 +1886,8 @@
         </p:nvSpPr>
         <p:spPr>
           <a:xfrm>
-            <a:off x="387033" y="644606"/>
-            <a:ext cx="3420131" cy="268641"/>
+            <a:off x="387034" y="695777"/>
+            <a:ext cx="3420131" cy="289966"/>
           </a:xfrm>
         </p:spPr>
         <p:txBody>
@@ -1955,8 +1951,8 @@
         </p:nvSpPr>
         <p:spPr>
           <a:xfrm>
-            <a:off x="387033" y="913248"/>
-            <a:ext cx="3420131" cy="1659175"/>
+            <a:off x="387034" y="985744"/>
+            <a:ext cx="3420131" cy="1790885"/>
           </a:xfrm>
         </p:spPr>
         <p:txBody>
@@ -2040,8 +2036,8 @@
         </p:nvSpPr>
         <p:spPr>
           <a:xfrm>
-            <a:off x="3932143" y="644606"/>
-            <a:ext cx="3421475" cy="268641"/>
+            <a:off x="3932143" y="695777"/>
+            <a:ext cx="3421475" cy="289966"/>
           </a:xfrm>
         </p:spPr>
         <p:txBody>
@@ -2105,8 +2101,8 @@
         </p:nvSpPr>
         <p:spPr>
           <a:xfrm>
-            <a:off x="3932143" y="913248"/>
-            <a:ext cx="3421475" cy="1659175"/>
+            <a:off x="3932143" y="985744"/>
+            <a:ext cx="3421475" cy="1790885"/>
           </a:xfrm>
         </p:spPr>
         <p:txBody>
@@ -2196,7 +2192,7 @@
             <a:fld id="{1D8BD707-D9CF-40AE-B4C6-C98DA3205C09}" type="datetimeFigureOut">
               <a:rPr lang="en-US" smtClean="0"/>
               <a:pPr/>
-              <a:t>3/20/2013</a:t>
+              <a:t>3/21/2013</a:t>
             </a:fld>
             <a:endParaRPr lang="en-US"/>
           </a:p>
@@ -2311,7 +2307,7 @@
             <a:fld id="{1D8BD707-D9CF-40AE-B4C6-C98DA3205C09}" type="datetimeFigureOut">
               <a:rPr lang="en-US" smtClean="0"/>
               <a:pPr/>
-              <a:t>3/20/2013</a:t>
+              <a:t>3/21/2013</a:t>
             </a:fld>
             <a:endParaRPr lang="en-US"/>
           </a:p>
@@ -2403,7 +2399,7 @@
             <a:fld id="{1D8BD707-D9CF-40AE-B4C6-C98DA3205C09}" type="datetimeFigureOut">
               <a:rPr lang="en-US" smtClean="0"/>
               <a:pPr/>
-              <a:t>3/20/2013</a:t>
+              <a:t>3/21/2013</a:t>
             </a:fld>
             <a:endParaRPr lang="en-US"/>
           </a:p>
@@ -2489,8 +2485,8 @@
         </p:nvSpPr>
         <p:spPr>
           <a:xfrm>
-            <a:off x="387033" y="114657"/>
-            <a:ext cx="2546620" cy="487953"/>
+            <a:off x="387033" y="123759"/>
+            <a:ext cx="2546620" cy="526688"/>
           </a:xfrm>
         </p:spPr>
         <p:txBody>
@@ -2521,8 +2517,8 @@
         </p:nvSpPr>
         <p:spPr>
           <a:xfrm>
-            <a:off x="3026380" y="114657"/>
-            <a:ext cx="4327238" cy="2457765"/>
+            <a:off x="3026380" y="123759"/>
+            <a:ext cx="4327238" cy="2652869"/>
           </a:xfrm>
         </p:spPr>
         <p:txBody>
@@ -2606,8 +2602,8 @@
         </p:nvSpPr>
         <p:spPr>
           <a:xfrm>
-            <a:off x="387033" y="602610"/>
-            <a:ext cx="2546620" cy="1969812"/>
+            <a:off x="387033" y="650447"/>
+            <a:ext cx="2546620" cy="2126181"/>
           </a:xfrm>
         </p:spPr>
         <p:txBody>
@@ -2677,7 +2673,7 @@
             <a:fld id="{1D8BD707-D9CF-40AE-B4C6-C98DA3205C09}" type="datetimeFigureOut">
               <a:rPr lang="en-US" smtClean="0"/>
               <a:pPr/>
-              <a:t>3/20/2013</a:t>
+              <a:t>3/21/2013</a:t>
             </a:fld>
             <a:endParaRPr lang="en-US"/>
           </a:p>
@@ -2763,8 +2759,8 @@
         </p:nvSpPr>
         <p:spPr>
           <a:xfrm>
-            <a:off x="1517222" y="2015807"/>
-            <a:ext cx="4644390" cy="237978"/>
+            <a:off x="1517222" y="2175827"/>
+            <a:ext cx="4644390" cy="256869"/>
           </a:xfrm>
         </p:spPr>
         <p:txBody>
@@ -2795,8 +2791,8 @@
         </p:nvSpPr>
         <p:spPr>
           <a:xfrm>
-            <a:off x="1517222" y="257309"/>
-            <a:ext cx="4644390" cy="1727835"/>
+            <a:off x="1517222" y="277735"/>
+            <a:ext cx="4644390" cy="1864995"/>
           </a:xfrm>
         </p:spPr>
         <p:txBody>
@@ -2856,8 +2852,8 @@
         </p:nvSpPr>
         <p:spPr>
           <a:xfrm>
-            <a:off x="1517222" y="2253786"/>
-            <a:ext cx="4644390" cy="337967"/>
+            <a:off x="1517222" y="2432698"/>
+            <a:ext cx="4644390" cy="364796"/>
           </a:xfrm>
         </p:spPr>
         <p:txBody>
@@ -2927,7 +2923,7 @@
             <a:fld id="{1D8BD707-D9CF-40AE-B4C6-C98DA3205C09}" type="datetimeFigureOut">
               <a:rPr lang="en-US" smtClean="0"/>
               <a:pPr/>
-              <a:t>3/20/2013</a:t>
+              <a:t>3/21/2013</a:t>
             </a:fld>
             <a:endParaRPr lang="en-US"/>
           </a:p>
@@ -3018,8 +3014,8 @@
         </p:nvSpPr>
         <p:spPr>
           <a:xfrm>
-            <a:off x="387033" y="115323"/>
-            <a:ext cx="6966585" cy="479954"/>
+            <a:off x="387034" y="124478"/>
+            <a:ext cx="6966585" cy="518054"/>
           </a:xfrm>
           <a:prstGeom prst="rect">
             <a:avLst/>
@@ -3051,8 +3047,8 @@
         </p:nvSpPr>
         <p:spPr>
           <a:xfrm>
-            <a:off x="387033" y="671937"/>
-            <a:ext cx="6966585" cy="1900485"/>
+            <a:off x="387034" y="725278"/>
+            <a:ext cx="6966585" cy="2051350"/>
           </a:xfrm>
           <a:prstGeom prst="rect">
             <a:avLst/>
@@ -3113,8 +3109,8 @@
         </p:nvSpPr>
         <p:spPr>
           <a:xfrm>
-            <a:off x="387032" y="2669080"/>
-            <a:ext cx="1806152" cy="153319"/>
+            <a:off x="387032" y="2880959"/>
+            <a:ext cx="1806152" cy="165490"/>
           </a:xfrm>
           <a:prstGeom prst="rect">
             <a:avLst/>
@@ -3137,7 +3133,7 @@
             <a:fld id="{1D8BD707-D9CF-40AE-B4C6-C98DA3205C09}" type="datetimeFigureOut">
               <a:rPr lang="en-US" smtClean="0"/>
               <a:pPr/>
-              <a:t>3/20/2013</a:t>
+              <a:t>3/21/2013</a:t>
             </a:fld>
             <a:endParaRPr lang="en-US"/>
           </a:p>
@@ -3155,8 +3151,8 @@
         </p:nvSpPr>
         <p:spPr>
           <a:xfrm>
-            <a:off x="2644723" y="2669080"/>
-            <a:ext cx="2451206" cy="153319"/>
+            <a:off x="2644723" y="2880959"/>
+            <a:ext cx="2451206" cy="165490"/>
           </a:xfrm>
           <a:prstGeom prst="rect">
             <a:avLst/>
@@ -3192,8 +3188,8 @@
         </p:nvSpPr>
         <p:spPr>
           <a:xfrm>
-            <a:off x="5547466" y="2669080"/>
-            <a:ext cx="1806152" cy="153319"/>
+            <a:off x="5547466" y="2880959"/>
+            <a:ext cx="1806152" cy="165490"/>
           </a:xfrm>
           <a:prstGeom prst="rect">
             <a:avLst/>
@@ -3510,7 +3506,59 @@
       </p:grpSpPr>
       <p:sp>
         <p:nvSpPr>
-          <p:cNvPr id="31" name="Flowchart: Delay 30"/>
+          <p:cNvPr id="100" name="Rounded Rectangle 99"/>
+          <p:cNvSpPr/>
+          <p:nvPr/>
+        </p:nvSpPr>
+        <p:spPr>
+          <a:xfrm>
+            <a:off x="136525" y="166476"/>
+            <a:ext cx="2117725" cy="2584344"/>
+          </a:xfrm>
+          <a:prstGeom prst="roundRect">
+            <a:avLst>
+              <a:gd name="adj" fmla="val 7667"/>
+            </a:avLst>
+          </a:prstGeom>
+          <a:noFill/>
+          <a:ln w="107950">
+            <a:solidFill>
+              <a:schemeClr val="accent6">
+                <a:lumMod val="60000"/>
+                <a:lumOff val="40000"/>
+              </a:schemeClr>
+            </a:solidFill>
+          </a:ln>
+          <a:effectLst/>
+        </p:spPr>
+        <p:style>
+          <a:lnRef idx="2">
+            <a:schemeClr val="accent1">
+              <a:shade val="50000"/>
+            </a:schemeClr>
+          </a:lnRef>
+          <a:fillRef idx="1">
+            <a:schemeClr val="accent1"/>
+          </a:fillRef>
+          <a:effectRef idx="0">
+            <a:schemeClr val="accent1"/>
+          </a:effectRef>
+          <a:fontRef idx="minor">
+            <a:schemeClr val="lt1"/>
+          </a:fontRef>
+        </p:style>
+        <p:txBody>
+          <a:bodyPr rtlCol="0" anchor="ctr"/>
+          <a:lstStyle/>
+          <a:p>
+            <a:pPr algn="ctr"/>
+            <a:endParaRPr lang="en-US"/>
+          </a:p>
+        </p:txBody>
+      </p:sp>
+      <p:sp>
+        <p:nvSpPr>
+          <p:cNvPr id="101" name="Flowchart: Delay 100"/>
           <p:cNvSpPr/>
           <p:nvPr/>
         </p:nvSpPr>
@@ -3553,7 +3601,7 @@
       </p:sp>
       <p:sp>
         <p:nvSpPr>
-          <p:cNvPr id="32" name="Freeform 31"/>
+          <p:cNvPr id="103" name="Freeform 102"/>
           <p:cNvSpPr/>
           <p:nvPr/>
         </p:nvSpPr>
@@ -3647,7 +3695,7 @@
       </p:sp>
       <p:sp>
         <p:nvSpPr>
-          <p:cNvPr id="30" name="Flowchart: Connector 29"/>
+          <p:cNvPr id="104" name="Flowchart: Connector 103"/>
           <p:cNvSpPr/>
           <p:nvPr/>
         </p:nvSpPr>
@@ -3690,7 +3738,7 @@
       </p:sp>
       <p:sp>
         <p:nvSpPr>
-          <p:cNvPr id="33" name="Freeform 32"/>
+          <p:cNvPr id="105" name="Freeform 104"/>
           <p:cNvSpPr/>
           <p:nvPr/>
         </p:nvSpPr>
@@ -3799,7 +3847,7 @@
       </p:sp>
       <p:sp>
         <p:nvSpPr>
-          <p:cNvPr id="34" name="Flowchart: Connector 33"/>
+          <p:cNvPr id="106" name="Flowchart: Connector 105"/>
           <p:cNvSpPr/>
           <p:nvPr/>
         </p:nvSpPr>
@@ -3849,7 +3897,7 @@
       </p:sp>
       <p:grpSp>
         <p:nvGrpSpPr>
-          <p:cNvPr id="22" name="Group 21"/>
+          <p:cNvPr id="107" name="Group 106"/>
           <p:cNvGrpSpPr/>
           <p:nvPr/>
         </p:nvGrpSpPr>
@@ -3863,7 +3911,7 @@
         </p:grpSpPr>
         <p:sp>
           <p:nvSpPr>
-            <p:cNvPr id="111" name="Flowchart: Connector 110"/>
+            <p:cNvPr id="109" name="Flowchart: Connector 108"/>
             <p:cNvSpPr/>
             <p:nvPr/>
           </p:nvSpPr>
@@ -3906,7 +3954,7 @@
         </p:sp>
         <p:grpSp>
           <p:nvGrpSpPr>
-            <p:cNvPr id="21" name="Group 20"/>
+            <p:cNvPr id="113" name="Group 112"/>
             <p:cNvGrpSpPr/>
             <p:nvPr/>
           </p:nvGrpSpPr>
@@ -3920,7 +3968,7 @@
           </p:grpSpPr>
           <p:sp>
             <p:nvSpPr>
-              <p:cNvPr id="112" name="Flowchart: Delay 111"/>
+              <p:cNvPr id="119" name="Flowchart: Delay 118"/>
               <p:cNvSpPr/>
               <p:nvPr/>
             </p:nvSpPr>
@@ -3963,7 +4011,7 @@
           </p:sp>
           <p:sp>
             <p:nvSpPr>
-              <p:cNvPr id="114" name="Freeform 113"/>
+              <p:cNvPr id="120" name="Freeform 119"/>
               <p:cNvSpPr/>
               <p:nvPr/>
             </p:nvSpPr>
@@ -4058,7 +4106,7 @@
         </p:grpSp>
         <p:sp>
           <p:nvSpPr>
-            <p:cNvPr id="115" name="Freeform 114"/>
+            <p:cNvPr id="117" name="Freeform 116"/>
             <p:cNvSpPr/>
             <p:nvPr/>
           </p:nvSpPr>
@@ -4167,7 +4215,7 @@
         </p:sp>
         <p:sp>
           <p:nvSpPr>
-            <p:cNvPr id="116" name="Flowchart: Connector 115"/>
+            <p:cNvPr id="118" name="Flowchart: Connector 117"/>
             <p:cNvSpPr/>
             <p:nvPr/>
           </p:nvSpPr>
@@ -4218,7 +4266,7 @@
       </p:grpSp>
       <p:sp>
         <p:nvSpPr>
-          <p:cNvPr id="24" name="Rounded Rectangle 23"/>
+          <p:cNvPr id="121" name="Rounded Rectangle 120"/>
           <p:cNvSpPr/>
           <p:nvPr/>
         </p:nvSpPr>
@@ -4235,15 +4283,13 @@
           <a:noFill/>
           <a:ln w="107950">
             <a:solidFill>
-              <a:schemeClr val="accent1">
-                <a:lumMod val="20000"/>
-                <a:lumOff val="80000"/>
+              <a:schemeClr val="tx2">
+                <a:lumMod val="40000"/>
+                <a:lumOff val="60000"/>
               </a:schemeClr>
             </a:solidFill>
           </a:ln>
-          <a:effectLst>
-            <a:softEdge rad="31750"/>
-          </a:effectLst>
+          <a:effectLst/>
         </p:spPr>
         <p:style>
           <a:lnRef idx="2">
@@ -4272,61 +4318,7 @@
       </p:sp>
       <p:sp>
         <p:nvSpPr>
-          <p:cNvPr id="23" name="Rounded Rectangle 22"/>
-          <p:cNvSpPr/>
-          <p:nvPr/>
-        </p:nvSpPr>
-        <p:spPr>
-          <a:xfrm>
-            <a:off x="136525" y="166476"/>
-            <a:ext cx="2117725" cy="2584344"/>
-          </a:xfrm>
-          <a:prstGeom prst="roundRect">
-            <a:avLst>
-              <a:gd name="adj" fmla="val 7667"/>
-            </a:avLst>
-          </a:prstGeom>
-          <a:noFill/>
-          <a:ln w="107950">
-            <a:solidFill>
-              <a:schemeClr val="accent6">
-                <a:lumMod val="20000"/>
-                <a:lumOff val="80000"/>
-              </a:schemeClr>
-            </a:solidFill>
-          </a:ln>
-          <a:effectLst>
-            <a:softEdge rad="31750"/>
-          </a:effectLst>
-        </p:spPr>
-        <p:style>
-          <a:lnRef idx="2">
-            <a:schemeClr val="accent1">
-              <a:shade val="50000"/>
-            </a:schemeClr>
-          </a:lnRef>
-          <a:fillRef idx="1">
-            <a:schemeClr val="accent1"/>
-          </a:fillRef>
-          <a:effectRef idx="0">
-            <a:schemeClr val="accent1"/>
-          </a:effectRef>
-          <a:fontRef idx="minor">
-            <a:schemeClr val="lt1"/>
-          </a:fontRef>
-        </p:style>
-        <p:txBody>
-          <a:bodyPr rtlCol="0" anchor="ctr"/>
-          <a:lstStyle/>
-          <a:p>
-            <a:pPr algn="ctr"/>
-            <a:endParaRPr lang="en-US"/>
-          </a:p>
-        </p:txBody>
-      </p:sp>
-      <p:sp>
-        <p:nvSpPr>
-          <p:cNvPr id="93" name="Isosceles Triangle 92"/>
+          <p:cNvPr id="122" name="Isosceles Triangle 121"/>
           <p:cNvSpPr/>
           <p:nvPr/>
         </p:nvSpPr>
@@ -4378,14 +4370,14 @@
       </p:sp>
       <p:sp>
         <p:nvSpPr>
-          <p:cNvPr id="94" name="Isosceles Triangle 93"/>
+          <p:cNvPr id="123" name="Isosceles Triangle 122"/>
           <p:cNvSpPr/>
           <p:nvPr/>
         </p:nvSpPr>
         <p:spPr>
           <a:xfrm rot="3148928">
-            <a:off x="3750367" y="1837621"/>
-            <a:ext cx="650104" cy="899883"/>
+            <a:off x="3703148" y="1794751"/>
+            <a:ext cx="650104" cy="1018950"/>
           </a:xfrm>
           <a:prstGeom prst="triangle">
             <a:avLst>
@@ -4396,6 +4388,7 @@
             <a:schemeClr val="accent6">
               <a:lumMod val="40000"/>
               <a:lumOff val="60000"/>
+              <a:alpha val="65000"/>
             </a:schemeClr>
           </a:solidFill>
           <a:ln>
@@ -4429,13 +4422,13 @@
       </p:sp>
       <p:sp>
         <p:nvSpPr>
-          <p:cNvPr id="95" name="Isosceles Triangle 94"/>
+          <p:cNvPr id="124" name="Isosceles Triangle 123"/>
           <p:cNvSpPr/>
           <p:nvPr/>
         </p:nvSpPr>
         <p:spPr>
           <a:xfrm rot="4843798">
-            <a:off x="3307100" y="1214943"/>
+            <a:off x="3307100" y="1195350"/>
             <a:ext cx="672349" cy="1283148"/>
           </a:xfrm>
           <a:prstGeom prst="triangle">
@@ -4445,6 +4438,7 @@
             <a:schemeClr val="accent6">
               <a:lumMod val="40000"/>
               <a:lumOff val="60000"/>
+              <a:alpha val="65000"/>
             </a:schemeClr>
           </a:solidFill>
           <a:ln>
@@ -4478,7 +4472,7 @@
       </p:sp>
       <p:sp>
         <p:nvSpPr>
-          <p:cNvPr id="98" name="TextBox 97"/>
+          <p:cNvPr id="125" name="TextBox 124"/>
           <p:cNvSpPr txBox="1"/>
           <p:nvPr/>
         </p:nvSpPr>
@@ -4562,7 +4556,7 @@
       </p:sp>
       <p:sp>
         <p:nvSpPr>
-          <p:cNvPr id="102" name="TextBox 101"/>
+          <p:cNvPr id="126" name="TextBox 125"/>
           <p:cNvSpPr txBox="1"/>
           <p:nvPr/>
         </p:nvSpPr>
@@ -4582,7 +4576,7 @@
           </a:bodyPr>
           <a:lstStyle/>
           <a:p>
-            <a:pPr algn="ctr"/>
+            <a:pPr algn="r"/>
             <a:r>
               <a:rPr lang="en-US" sz="1100" dirty="0" smtClean="0">
                 <a:solidFill>
@@ -4633,7 +4627,7 @@
       </p:sp>
       <p:sp>
         <p:nvSpPr>
-          <p:cNvPr id="108" name="TextBox 107"/>
+          <p:cNvPr id="127" name="TextBox 126"/>
           <p:cNvSpPr txBox="1"/>
           <p:nvPr/>
         </p:nvSpPr>
@@ -4710,13 +4704,13 @@
       </p:sp>
       <p:sp>
         <p:nvSpPr>
-          <p:cNvPr id="110" name="Rounded Rectangle 109"/>
+          <p:cNvPr id="128" name="Rounded Rectangle 127"/>
           <p:cNvSpPr/>
           <p:nvPr/>
         </p:nvSpPr>
         <p:spPr>
           <a:xfrm>
-            <a:off x="5767678" y="1822729"/>
+            <a:off x="5767678" y="2049462"/>
             <a:ext cx="1371600" cy="457200"/>
           </a:xfrm>
           <a:prstGeom prst="roundRect">
@@ -4762,7 +4756,7 @@
       </p:sp>
       <p:sp>
         <p:nvSpPr>
-          <p:cNvPr id="25" name="Rounded Rectangle 24"/>
+          <p:cNvPr id="129" name="Rounded Rectangle 128"/>
           <p:cNvSpPr/>
           <p:nvPr/>
         </p:nvSpPr>
@@ -4780,14 +4774,12 @@
           <a:ln w="107950">
             <a:solidFill>
               <a:schemeClr val="accent6">
-                <a:lumMod val="20000"/>
-                <a:lumOff val="80000"/>
+                <a:lumMod val="60000"/>
+                <a:lumOff val="40000"/>
               </a:schemeClr>
             </a:solidFill>
           </a:ln>
-          <a:effectLst>
-            <a:softEdge rad="31750"/>
-          </a:effectLst>
+          <a:effectLst/>
         </p:spPr>
         <p:style>
           <a:lnRef idx="2">
@@ -4816,7 +4808,7 @@
       </p:sp>
       <p:grpSp>
         <p:nvGrpSpPr>
-          <p:cNvPr id="41" name="Group 40"/>
+          <p:cNvPr id="130" name="Group 129"/>
           <p:cNvGrpSpPr/>
           <p:nvPr/>
         </p:nvGrpSpPr>
@@ -4833,7 +4825,7 @@
         </p:grpSpPr>
         <p:sp>
           <p:nvSpPr>
-            <p:cNvPr id="42" name="Flowchart: Connector 41"/>
+            <p:cNvPr id="131" name="Flowchart: Connector 130"/>
             <p:cNvSpPr/>
             <p:nvPr/>
           </p:nvSpPr>
@@ -4881,7 +4873,7 @@
         </p:sp>
         <p:sp>
           <p:nvSpPr>
-            <p:cNvPr id="43" name="Flowchart: Delay 42"/>
+            <p:cNvPr id="132" name="Flowchart: Delay 131"/>
             <p:cNvSpPr/>
             <p:nvPr/>
           </p:nvSpPr>
@@ -4929,7 +4921,7 @@
         </p:sp>
         <p:sp>
           <p:nvSpPr>
-            <p:cNvPr id="45" name="Freeform 44"/>
+            <p:cNvPr id="133" name="Freeform 132"/>
             <p:cNvSpPr/>
             <p:nvPr/>
           </p:nvSpPr>
@@ -5043,7 +5035,7 @@
         </p:sp>
         <p:sp>
           <p:nvSpPr>
-            <p:cNvPr id="46" name="Flowchart: Connector 45"/>
+            <p:cNvPr id="134" name="Flowchart: Connector 133"/>
             <p:cNvSpPr/>
             <p:nvPr/>
           </p:nvSpPr>
@@ -5094,7 +5086,7 @@
       </p:grpSp>
       <p:grpSp>
         <p:nvGrpSpPr>
-          <p:cNvPr id="2" name="Group 1"/>
+          <p:cNvPr id="135" name="Group 134"/>
           <p:cNvGrpSpPr/>
           <p:nvPr/>
         </p:nvGrpSpPr>
@@ -5108,7 +5100,7 @@
         </p:grpSpPr>
         <p:sp>
           <p:nvSpPr>
-            <p:cNvPr id="59" name="Flowchart: Delay 58"/>
+            <p:cNvPr id="136" name="Flowchart: Delay 135"/>
             <p:cNvSpPr/>
             <p:nvPr/>
           </p:nvSpPr>
@@ -5158,7 +5150,7 @@
         </p:sp>
         <p:grpSp>
           <p:nvGrpSpPr>
-            <p:cNvPr id="10" name="Group 9"/>
+            <p:cNvPr id="137" name="Group 136"/>
             <p:cNvGrpSpPr/>
             <p:nvPr/>
           </p:nvGrpSpPr>
@@ -5172,7 +5164,7 @@
           </p:grpSpPr>
           <p:sp>
             <p:nvSpPr>
-              <p:cNvPr id="58" name="Flowchart: Connector 57"/>
+              <p:cNvPr id="138" name="Flowchart: Connector 137"/>
               <p:cNvSpPr/>
               <p:nvPr/>
             </p:nvSpPr>
@@ -5222,7 +5214,7 @@
           </p:sp>
           <p:sp>
             <p:nvSpPr>
-              <p:cNvPr id="60" name="Freeform 59"/>
+              <p:cNvPr id="139" name="Freeform 138"/>
               <p:cNvSpPr/>
               <p:nvPr/>
             </p:nvSpPr>
@@ -5338,7 +5330,7 @@
           </p:sp>
           <p:sp>
             <p:nvSpPr>
-              <p:cNvPr id="61" name="Flowchart: Connector 60"/>
+              <p:cNvPr id="140" name="Flowchart: Connector 139"/>
               <p:cNvSpPr/>
               <p:nvPr/>
             </p:nvSpPr>
@@ -5390,13 +5382,13 @@
       </p:grpSp>
       <p:sp>
         <p:nvSpPr>
-          <p:cNvPr id="67" name="Flowchart: Delay 66"/>
+          <p:cNvPr id="141" name="Flowchart: Delay 140"/>
           <p:cNvSpPr/>
           <p:nvPr/>
         </p:nvSpPr>
         <p:spPr>
           <a:xfrm rot="5400000" flipH="1">
-            <a:off x="4290496" y="1819658"/>
+            <a:off x="4290496" y="1800065"/>
             <a:ext cx="280353" cy="298983"/>
           </a:xfrm>
           <a:prstGeom prst="flowChartDelay">
@@ -5440,13 +5432,13 @@
       </p:sp>
       <p:grpSp>
         <p:nvGrpSpPr>
-          <p:cNvPr id="12" name="Group 11"/>
+          <p:cNvPr id="142" name="Group 141"/>
           <p:cNvGrpSpPr/>
           <p:nvPr/>
         </p:nvGrpSpPr>
         <p:grpSpPr>
           <a:xfrm rot="3372795">
-            <a:off x="4286547" y="1588795"/>
+            <a:off x="4286547" y="1569202"/>
             <a:ext cx="254457" cy="220662"/>
             <a:chOff x="4335990" y="1588795"/>
             <a:chExt cx="254457" cy="220662"/>
@@ -5454,7 +5446,7 @@
         </p:grpSpPr>
         <p:sp>
           <p:nvSpPr>
-            <p:cNvPr id="66" name="Flowchart: Connector 65"/>
+            <p:cNvPr id="143" name="Flowchart: Connector 142"/>
             <p:cNvSpPr/>
             <p:nvPr/>
           </p:nvSpPr>
@@ -5504,7 +5496,7 @@
         </p:sp>
         <p:sp>
           <p:nvSpPr>
-            <p:cNvPr id="68" name="Freeform 67"/>
+            <p:cNvPr id="144" name="Freeform 143"/>
             <p:cNvSpPr/>
             <p:nvPr/>
           </p:nvSpPr>
@@ -5620,7 +5612,7 @@
         </p:sp>
         <p:sp>
           <p:nvSpPr>
-            <p:cNvPr id="69" name="Flowchart: Connector 68"/>
+            <p:cNvPr id="145" name="Flowchart: Connector 144"/>
             <p:cNvSpPr/>
             <p:nvPr/>
           </p:nvSpPr>
@@ -5671,13 +5663,13 @@
       </p:grpSp>
       <p:sp>
         <p:nvSpPr>
-          <p:cNvPr id="72" name="Flowchart: Delay 71"/>
+          <p:cNvPr id="146" name="Flowchart: Delay 145"/>
           <p:cNvSpPr/>
           <p:nvPr/>
         </p:nvSpPr>
         <p:spPr>
           <a:xfrm rot="5400000" flipH="1">
-            <a:off x="3732363" y="2369394"/>
+            <a:off x="3732363" y="2349801"/>
             <a:ext cx="280353" cy="298983"/>
           </a:xfrm>
           <a:prstGeom prst="flowChartDelay">
@@ -5721,13 +5713,13 @@
       </p:sp>
       <p:grpSp>
         <p:nvGrpSpPr>
-          <p:cNvPr id="13" name="Group 12"/>
+          <p:cNvPr id="147" name="Group 146"/>
           <p:cNvGrpSpPr/>
           <p:nvPr/>
         </p:nvGrpSpPr>
         <p:grpSpPr>
           <a:xfrm rot="2886978">
-            <a:off x="3728414" y="2144246"/>
+            <a:off x="3728414" y="2124653"/>
             <a:ext cx="254457" cy="220662"/>
             <a:chOff x="3791084" y="2070419"/>
             <a:chExt cx="254457" cy="220662"/>
@@ -5735,7 +5727,7 @@
         </p:grpSpPr>
         <p:sp>
           <p:nvSpPr>
-            <p:cNvPr id="71" name="Flowchart: Connector 70"/>
+            <p:cNvPr id="148" name="Flowchart: Connector 147"/>
             <p:cNvSpPr/>
             <p:nvPr/>
           </p:nvSpPr>
@@ -5785,7 +5777,7 @@
         </p:sp>
         <p:sp>
           <p:nvSpPr>
-            <p:cNvPr id="73" name="Freeform 72"/>
+            <p:cNvPr id="149" name="Freeform 148"/>
             <p:cNvSpPr/>
             <p:nvPr/>
           </p:nvSpPr>
@@ -5901,7 +5893,7 @@
         </p:sp>
         <p:sp>
           <p:nvSpPr>
-            <p:cNvPr id="74" name="Flowchart: Connector 73"/>
+            <p:cNvPr id="150" name="Flowchart: Connector 149"/>
             <p:cNvSpPr/>
             <p:nvPr/>
           </p:nvSpPr>
@@ -5952,13 +5944,13 @@
       </p:grpSp>
       <p:sp>
         <p:nvSpPr>
-          <p:cNvPr id="76" name="Flowchart: Delay 75"/>
+          <p:cNvPr id="151" name="Flowchart: Delay 150"/>
           <p:cNvSpPr/>
           <p:nvPr/>
         </p:nvSpPr>
         <p:spPr>
           <a:xfrm rot="16200000">
-            <a:off x="3193840" y="2006887"/>
+            <a:off x="3193840" y="1987294"/>
             <a:ext cx="280353" cy="298983"/>
           </a:xfrm>
           <a:prstGeom prst="flowChartDelay">
@@ -6002,13 +5994,13 @@
       </p:sp>
       <p:grpSp>
         <p:nvGrpSpPr>
-          <p:cNvPr id="77" name="Group 76"/>
+          <p:cNvPr id="152" name="Group 151"/>
           <p:cNvGrpSpPr/>
           <p:nvPr/>
         </p:nvGrpSpPr>
         <p:grpSpPr>
           <a:xfrm rot="1483511">
-            <a:off x="3226182" y="1790579"/>
+            <a:off x="3226182" y="1770986"/>
             <a:ext cx="267922" cy="220662"/>
             <a:chOff x="786805" y="1760534"/>
             <a:chExt cx="267922" cy="220662"/>
@@ -6016,7 +6008,7 @@
         </p:grpSpPr>
         <p:sp>
           <p:nvSpPr>
-            <p:cNvPr id="78" name="Flowchart: Connector 77"/>
+            <p:cNvPr id="153" name="Flowchart: Connector 152"/>
             <p:cNvSpPr/>
             <p:nvPr/>
           </p:nvSpPr>
@@ -6066,7 +6058,7 @@
         </p:sp>
         <p:sp>
           <p:nvSpPr>
-            <p:cNvPr id="79" name="Freeform 78"/>
+            <p:cNvPr id="154" name="Freeform 153"/>
             <p:cNvSpPr/>
             <p:nvPr/>
           </p:nvSpPr>
@@ -6182,7 +6174,7 @@
         </p:sp>
         <p:sp>
           <p:nvSpPr>
-            <p:cNvPr id="80" name="Flowchart: Connector 79"/>
+            <p:cNvPr id="155" name="Flowchart: Connector 154"/>
             <p:cNvSpPr/>
             <p:nvPr/>
           </p:nvSpPr>
@@ -6233,7 +6225,7 @@
       </p:grpSp>
       <p:grpSp>
         <p:nvGrpSpPr>
-          <p:cNvPr id="26" name="Group 25"/>
+          <p:cNvPr id="156" name="Group 155"/>
           <p:cNvGrpSpPr/>
           <p:nvPr/>
         </p:nvGrpSpPr>
@@ -6247,7 +6239,7 @@
         </p:grpSpPr>
         <p:sp>
           <p:nvSpPr>
-            <p:cNvPr id="83" name="Flowchart: Delay 82"/>
+            <p:cNvPr id="157" name="Flowchart: Delay 156"/>
             <p:cNvSpPr/>
             <p:nvPr/>
           </p:nvSpPr>
@@ -6297,7 +6289,7 @@
         </p:sp>
         <p:sp>
           <p:nvSpPr>
-            <p:cNvPr id="85" name="Flowchart: Connector 84"/>
+            <p:cNvPr id="158" name="Flowchart: Connector 157"/>
             <p:cNvSpPr/>
             <p:nvPr/>
           </p:nvSpPr>
@@ -6347,7 +6339,7 @@
         </p:sp>
         <p:sp>
           <p:nvSpPr>
-            <p:cNvPr id="86" name="Freeform 85"/>
+            <p:cNvPr id="159" name="Freeform 158"/>
             <p:cNvSpPr/>
             <p:nvPr/>
           </p:nvSpPr>
@@ -6463,7 +6455,7 @@
         </p:sp>
         <p:sp>
           <p:nvSpPr>
-            <p:cNvPr id="87" name="Flowchart: Connector 86"/>
+            <p:cNvPr id="160" name="Flowchart: Connector 159"/>
             <p:cNvSpPr/>
             <p:nvPr/>
           </p:nvSpPr>
@@ -6514,13 +6506,13 @@
       </p:grpSp>
       <p:sp>
         <p:nvSpPr>
-          <p:cNvPr id="90" name="Flowchart: Delay 89"/>
+          <p:cNvPr id="161" name="Flowchart: Delay 160"/>
           <p:cNvSpPr/>
           <p:nvPr/>
         </p:nvSpPr>
         <p:spPr>
           <a:xfrm rot="16200000">
-            <a:off x="6851720" y="954795"/>
+            <a:off x="6845012" y="862936"/>
             <a:ext cx="280353" cy="298983"/>
           </a:xfrm>
           <a:prstGeom prst="flowChartDelay">
@@ -6557,13 +6549,13 @@
       </p:sp>
       <p:sp>
         <p:nvSpPr>
-          <p:cNvPr id="91" name="Freeform 90"/>
+          <p:cNvPr id="162" name="Freeform 161"/>
           <p:cNvSpPr/>
           <p:nvPr/>
         </p:nvSpPr>
         <p:spPr>
           <a:xfrm rot="326821">
-            <a:off x="6940759" y="967464"/>
+            <a:off x="6934051" y="875605"/>
             <a:ext cx="102393" cy="235744"/>
           </a:xfrm>
           <a:custGeom>
@@ -6651,13 +6643,13 @@
       </p:sp>
       <p:sp>
         <p:nvSpPr>
-          <p:cNvPr id="89" name="Flowchart: Connector 88"/>
+          <p:cNvPr id="163" name="Flowchart: Connector 162"/>
           <p:cNvSpPr/>
           <p:nvPr/>
         </p:nvSpPr>
         <p:spPr>
           <a:xfrm rot="11865946">
-            <a:off x="6914554" y="729088"/>
+            <a:off x="6907846" y="637229"/>
             <a:ext cx="220662" cy="220662"/>
           </a:xfrm>
           <a:prstGeom prst="flowChartConnector">
@@ -6694,13 +6686,13 @@
       </p:sp>
       <p:sp>
         <p:nvSpPr>
-          <p:cNvPr id="96" name="Freeform 95"/>
+          <p:cNvPr id="164" name="Freeform 163"/>
           <p:cNvSpPr/>
           <p:nvPr/>
         </p:nvSpPr>
         <p:spPr>
           <a:xfrm rot="11865946">
-            <a:off x="6904559" y="736995"/>
+            <a:off x="6897851" y="645136"/>
             <a:ext cx="50006" cy="19050"/>
           </a:xfrm>
           <a:custGeom>
@@ -6803,13 +6795,13 @@
       </p:sp>
       <p:sp>
         <p:nvSpPr>
-          <p:cNvPr id="97" name="Flowchart: Connector 96"/>
+          <p:cNvPr id="165" name="Flowchart: Connector 164"/>
           <p:cNvSpPr/>
           <p:nvPr/>
         </p:nvSpPr>
         <p:spPr>
           <a:xfrm rot="11865946">
-            <a:off x="7031245" y="783890"/>
+            <a:off x="7024537" y="692031"/>
             <a:ext cx="45719" cy="45719"/>
           </a:xfrm>
           <a:prstGeom prst="flowChartConnector">
@@ -6853,7 +6845,7 @@
       </p:sp>
       <p:sp>
         <p:nvSpPr>
-          <p:cNvPr id="16" name="Freeform 15"/>
+          <p:cNvPr id="166" name="Freeform 165"/>
           <p:cNvSpPr/>
           <p:nvPr/>
         </p:nvSpPr>
@@ -6956,7 +6948,7 @@
       </p:sp>
       <p:sp>
         <p:nvSpPr>
-          <p:cNvPr id="17" name="Freeform 16"/>
+          <p:cNvPr id="167" name="Freeform 166"/>
           <p:cNvSpPr/>
           <p:nvPr/>
         </p:nvSpPr>
@@ -7196,14 +7188,14 @@
       </p:sp>
       <p:sp>
         <p:nvSpPr>
-          <p:cNvPr id="18" name="Freeform 17"/>
+          <p:cNvPr id="168" name="Freeform 167"/>
           <p:cNvSpPr/>
           <p:nvPr/>
         </p:nvSpPr>
         <p:spPr>
           <a:xfrm>
-            <a:off x="797728" y="989315"/>
-            <a:ext cx="982980" cy="726012"/>
+            <a:off x="797728" y="989167"/>
+            <a:ext cx="975836" cy="726159"/>
           </a:xfrm>
           <a:custGeom>
             <a:avLst/>
@@ -7240,6 +7232,30 @@
               <a:gd name="connsiteY2" fmla="*/ 194517 h 726012"/>
               <a:gd name="connsiteX3" fmla="*/ 0 w 982980"/>
               <a:gd name="connsiteY3" fmla="*/ 726012 h 726012"/>
+              <a:gd name="connsiteX0" fmla="*/ 982980 w 982980"/>
+              <a:gd name="connsiteY0" fmla="*/ 206475 h 709395"/>
+              <a:gd name="connsiteX1" fmla="*/ 546259 w 982980"/>
+              <a:gd name="connsiteY1" fmla="*/ 258 h 709395"/>
+              <a:gd name="connsiteX2" fmla="*/ 217170 w 982980"/>
+              <a:gd name="connsiteY2" fmla="*/ 177900 h 709395"/>
+              <a:gd name="connsiteX3" fmla="*/ 0 w 982980"/>
+              <a:gd name="connsiteY3" fmla="*/ 709395 h 709395"/>
+              <a:gd name="connsiteX0" fmla="*/ 975836 w 975836"/>
+              <a:gd name="connsiteY0" fmla="*/ 216179 h 709574"/>
+              <a:gd name="connsiteX1" fmla="*/ 546259 w 975836"/>
+              <a:gd name="connsiteY1" fmla="*/ 437 h 709574"/>
+              <a:gd name="connsiteX2" fmla="*/ 217170 w 975836"/>
+              <a:gd name="connsiteY2" fmla="*/ 178079 h 709574"/>
+              <a:gd name="connsiteX3" fmla="*/ 0 w 975836"/>
+              <a:gd name="connsiteY3" fmla="*/ 709574 h 709574"/>
+              <a:gd name="connsiteX0" fmla="*/ 975836 w 975836"/>
+              <a:gd name="connsiteY0" fmla="*/ 232764 h 726159"/>
+              <a:gd name="connsiteX1" fmla="*/ 577216 w 975836"/>
+              <a:gd name="connsiteY1" fmla="*/ 353 h 726159"/>
+              <a:gd name="connsiteX2" fmla="*/ 217170 w 975836"/>
+              <a:gd name="connsiteY2" fmla="*/ 194664 h 726159"/>
+              <a:gd name="connsiteX3" fmla="*/ 0 w 975836"/>
+              <a:gd name="connsiteY3" fmla="*/ 726159 h 726159"/>
             </a:gdLst>
             <a:ahLst/>
             <a:cxnLst>
@@ -7258,24 +7274,24 @@
             </a:cxnLst>
             <a:rect l="l" t="t" r="r" b="b"/>
             <a:pathLst>
-              <a:path w="982980" h="726012">
+              <a:path w="975836" h="726159">
                 <a:moveTo>
-                  <a:pt x="982980" y="223092"/>
+                  <a:pt x="975836" y="232764"/>
                 </a:moveTo>
                 <a:cubicBezTo>
-                  <a:pt x="929640" y="132128"/>
-                  <a:pt x="676275" y="4969"/>
-                  <a:pt x="548640" y="207"/>
+                  <a:pt x="922496" y="141800"/>
+                  <a:pt x="703660" y="6703"/>
+                  <a:pt x="577216" y="353"/>
                 </a:cubicBezTo>
                 <a:cubicBezTo>
-                  <a:pt x="421005" y="-4555"/>
-                  <a:pt x="308610" y="73550"/>
-                  <a:pt x="217170" y="194517"/>
+                  <a:pt x="450772" y="-5997"/>
+                  <a:pt x="308610" y="73697"/>
+                  <a:pt x="217170" y="194664"/>
                 </a:cubicBezTo>
                 <a:cubicBezTo>
-                  <a:pt x="125730" y="315484"/>
-                  <a:pt x="62865" y="495507"/>
-                  <a:pt x="0" y="726012"/>
+                  <a:pt x="125730" y="315631"/>
+                  <a:pt x="62865" y="495654"/>
+                  <a:pt x="0" y="726159"/>
                 </a:cubicBezTo>
               </a:path>
             </a:pathLst>
@@ -7316,6 +7332,3480 @@
           </a:p>
         </p:txBody>
       </p:sp>
+      <p:sp>
+        <p:nvSpPr>
+          <p:cNvPr id="169" name="Freeform 7"/>
+          <p:cNvSpPr>
+            <a:spLocks/>
+          </p:cNvSpPr>
+          <p:nvPr/>
+        </p:nvSpPr>
+        <p:spPr bwMode="auto">
+          <a:xfrm>
+            <a:off x="6311900" y="1476375"/>
+            <a:ext cx="177800" cy="258763"/>
+          </a:xfrm>
+          <a:custGeom>
+            <a:avLst/>
+            <a:gdLst>
+              <a:gd name="T0" fmla="*/ 475 w 900"/>
+              <a:gd name="T1" fmla="*/ 204 h 1469"/>
+              <a:gd name="T2" fmla="*/ 527 w 900"/>
+              <a:gd name="T3" fmla="*/ 239 h 1469"/>
+              <a:gd name="T4" fmla="*/ 573 w 900"/>
+              <a:gd name="T5" fmla="*/ 280 h 1469"/>
+              <a:gd name="T6" fmla="*/ 601 w 900"/>
+              <a:gd name="T7" fmla="*/ 330 h 1469"/>
+              <a:gd name="T8" fmla="*/ 604 w 900"/>
+              <a:gd name="T9" fmla="*/ 437 h 1469"/>
+              <a:gd name="T10" fmla="*/ 579 w 900"/>
+              <a:gd name="T11" fmla="*/ 589 h 1469"/>
+              <a:gd name="T12" fmla="*/ 540 w 900"/>
+              <a:gd name="T13" fmla="*/ 739 h 1469"/>
+              <a:gd name="T14" fmla="*/ 500 w 900"/>
+              <a:gd name="T15" fmla="*/ 891 h 1469"/>
+              <a:gd name="T16" fmla="*/ 474 w 900"/>
+              <a:gd name="T17" fmla="*/ 1077 h 1469"/>
+              <a:gd name="T18" fmla="*/ 469 w 900"/>
+              <a:gd name="T19" fmla="*/ 1362 h 1469"/>
+              <a:gd name="T20" fmla="*/ 476 w 900"/>
+              <a:gd name="T21" fmla="*/ 1469 h 1469"/>
+              <a:gd name="T22" fmla="*/ 505 w 900"/>
+              <a:gd name="T23" fmla="*/ 1467 h 1469"/>
+              <a:gd name="T24" fmla="*/ 555 w 900"/>
+              <a:gd name="T25" fmla="*/ 1462 h 1469"/>
+              <a:gd name="T26" fmla="*/ 617 w 900"/>
+              <a:gd name="T27" fmla="*/ 1454 h 1469"/>
+              <a:gd name="T28" fmla="*/ 685 w 900"/>
+              <a:gd name="T29" fmla="*/ 1444 h 1469"/>
+              <a:gd name="T30" fmla="*/ 748 w 900"/>
+              <a:gd name="T31" fmla="*/ 1429 h 1469"/>
+              <a:gd name="T32" fmla="*/ 801 w 900"/>
+              <a:gd name="T33" fmla="*/ 1410 h 1469"/>
+              <a:gd name="T34" fmla="*/ 833 w 900"/>
+              <a:gd name="T35" fmla="*/ 1388 h 1469"/>
+              <a:gd name="T36" fmla="*/ 863 w 900"/>
+              <a:gd name="T37" fmla="*/ 1204 h 1469"/>
+              <a:gd name="T38" fmla="*/ 894 w 900"/>
+              <a:gd name="T39" fmla="*/ 903 h 1469"/>
+              <a:gd name="T40" fmla="*/ 899 w 900"/>
+              <a:gd name="T41" fmla="*/ 640 h 1469"/>
+              <a:gd name="T42" fmla="*/ 871 w 900"/>
+              <a:gd name="T43" fmla="*/ 395 h 1469"/>
+              <a:gd name="T44" fmla="*/ 834 w 900"/>
+              <a:gd name="T45" fmla="*/ 248 h 1469"/>
+              <a:gd name="T46" fmla="*/ 803 w 900"/>
+              <a:gd name="T47" fmla="*/ 201 h 1469"/>
+              <a:gd name="T48" fmla="*/ 763 w 900"/>
+              <a:gd name="T49" fmla="*/ 159 h 1469"/>
+              <a:gd name="T50" fmla="*/ 718 w 900"/>
+              <a:gd name="T51" fmla="*/ 121 h 1469"/>
+              <a:gd name="T52" fmla="*/ 665 w 900"/>
+              <a:gd name="T53" fmla="*/ 86 h 1469"/>
+              <a:gd name="T54" fmla="*/ 611 w 900"/>
+              <a:gd name="T55" fmla="*/ 56 h 1469"/>
+              <a:gd name="T56" fmla="*/ 554 w 900"/>
+              <a:gd name="T57" fmla="*/ 31 h 1469"/>
+              <a:gd name="T58" fmla="*/ 497 w 900"/>
+              <a:gd name="T59" fmla="*/ 10 h 1469"/>
+              <a:gd name="T60" fmla="*/ 439 w 900"/>
+              <a:gd name="T61" fmla="*/ 0 h 1469"/>
+              <a:gd name="T62" fmla="*/ 371 w 900"/>
+              <a:gd name="T63" fmla="*/ 3 h 1469"/>
+              <a:gd name="T64" fmla="*/ 300 w 900"/>
+              <a:gd name="T65" fmla="*/ 11 h 1469"/>
+              <a:gd name="T66" fmla="*/ 228 w 900"/>
+              <a:gd name="T67" fmla="*/ 26 h 1469"/>
+              <a:gd name="T68" fmla="*/ 159 w 900"/>
+              <a:gd name="T69" fmla="*/ 50 h 1469"/>
+              <a:gd name="T70" fmla="*/ 97 w 900"/>
+              <a:gd name="T71" fmla="*/ 82 h 1469"/>
+              <a:gd name="T72" fmla="*/ 47 w 900"/>
+              <a:gd name="T73" fmla="*/ 124 h 1469"/>
+              <a:gd name="T74" fmla="*/ 12 w 900"/>
+              <a:gd name="T75" fmla="*/ 176 h 1469"/>
+              <a:gd name="T76" fmla="*/ 4 w 900"/>
+              <a:gd name="T77" fmla="*/ 206 h 1469"/>
+              <a:gd name="T78" fmla="*/ 29 w 900"/>
+              <a:gd name="T79" fmla="*/ 204 h 1469"/>
+              <a:gd name="T80" fmla="*/ 77 w 900"/>
+              <a:gd name="T81" fmla="*/ 199 h 1469"/>
+              <a:gd name="T82" fmla="*/ 140 w 900"/>
+              <a:gd name="T83" fmla="*/ 192 h 1469"/>
+              <a:gd name="T84" fmla="*/ 213 w 900"/>
+              <a:gd name="T85" fmla="*/ 185 h 1469"/>
+              <a:gd name="T86" fmla="*/ 288 w 900"/>
+              <a:gd name="T87" fmla="*/ 181 h 1469"/>
+              <a:gd name="T88" fmla="*/ 361 w 900"/>
+              <a:gd name="T89" fmla="*/ 180 h 1469"/>
+              <a:gd name="T90" fmla="*/ 424 w 900"/>
+              <a:gd name="T91" fmla="*/ 184 h 1469"/>
+            </a:gdLst>
+            <a:ahLst/>
+            <a:cxnLst>
+              <a:cxn ang="0">
+                <a:pos x="T0" y="T1"/>
+              </a:cxn>
+              <a:cxn ang="0">
+                <a:pos x="T2" y="T3"/>
+              </a:cxn>
+              <a:cxn ang="0">
+                <a:pos x="T4" y="T5"/>
+              </a:cxn>
+              <a:cxn ang="0">
+                <a:pos x="T6" y="T7"/>
+              </a:cxn>
+              <a:cxn ang="0">
+                <a:pos x="T8" y="T9"/>
+              </a:cxn>
+              <a:cxn ang="0">
+                <a:pos x="T10" y="T11"/>
+              </a:cxn>
+              <a:cxn ang="0">
+                <a:pos x="T12" y="T13"/>
+              </a:cxn>
+              <a:cxn ang="0">
+                <a:pos x="T14" y="T15"/>
+              </a:cxn>
+              <a:cxn ang="0">
+                <a:pos x="T16" y="T17"/>
+              </a:cxn>
+              <a:cxn ang="0">
+                <a:pos x="T18" y="T19"/>
+              </a:cxn>
+              <a:cxn ang="0">
+                <a:pos x="T20" y="T21"/>
+              </a:cxn>
+              <a:cxn ang="0">
+                <a:pos x="T22" y="T23"/>
+              </a:cxn>
+              <a:cxn ang="0">
+                <a:pos x="T24" y="T25"/>
+              </a:cxn>
+              <a:cxn ang="0">
+                <a:pos x="T26" y="T27"/>
+              </a:cxn>
+              <a:cxn ang="0">
+                <a:pos x="T28" y="T29"/>
+              </a:cxn>
+              <a:cxn ang="0">
+                <a:pos x="T30" y="T31"/>
+              </a:cxn>
+              <a:cxn ang="0">
+                <a:pos x="T32" y="T33"/>
+              </a:cxn>
+              <a:cxn ang="0">
+                <a:pos x="T34" y="T35"/>
+              </a:cxn>
+              <a:cxn ang="0">
+                <a:pos x="T36" y="T37"/>
+              </a:cxn>
+              <a:cxn ang="0">
+                <a:pos x="T38" y="T39"/>
+              </a:cxn>
+              <a:cxn ang="0">
+                <a:pos x="T40" y="T41"/>
+              </a:cxn>
+              <a:cxn ang="0">
+                <a:pos x="T42" y="T43"/>
+              </a:cxn>
+              <a:cxn ang="0">
+                <a:pos x="T44" y="T45"/>
+              </a:cxn>
+              <a:cxn ang="0">
+                <a:pos x="T46" y="T47"/>
+              </a:cxn>
+              <a:cxn ang="0">
+                <a:pos x="T48" y="T49"/>
+              </a:cxn>
+              <a:cxn ang="0">
+                <a:pos x="T50" y="T51"/>
+              </a:cxn>
+              <a:cxn ang="0">
+                <a:pos x="T52" y="T53"/>
+              </a:cxn>
+              <a:cxn ang="0">
+                <a:pos x="T54" y="T55"/>
+              </a:cxn>
+              <a:cxn ang="0">
+                <a:pos x="T56" y="T57"/>
+              </a:cxn>
+              <a:cxn ang="0">
+                <a:pos x="T58" y="T59"/>
+              </a:cxn>
+              <a:cxn ang="0">
+                <a:pos x="T60" y="T61"/>
+              </a:cxn>
+              <a:cxn ang="0">
+                <a:pos x="T62" y="T63"/>
+              </a:cxn>
+              <a:cxn ang="0">
+                <a:pos x="T64" y="T65"/>
+              </a:cxn>
+              <a:cxn ang="0">
+                <a:pos x="T66" y="T67"/>
+              </a:cxn>
+              <a:cxn ang="0">
+                <a:pos x="T68" y="T69"/>
+              </a:cxn>
+              <a:cxn ang="0">
+                <a:pos x="T70" y="T71"/>
+              </a:cxn>
+              <a:cxn ang="0">
+                <a:pos x="T72" y="T73"/>
+              </a:cxn>
+              <a:cxn ang="0">
+                <a:pos x="T74" y="T75"/>
+              </a:cxn>
+              <a:cxn ang="0">
+                <a:pos x="T76" y="T77"/>
+              </a:cxn>
+              <a:cxn ang="0">
+                <a:pos x="T78" y="T79"/>
+              </a:cxn>
+              <a:cxn ang="0">
+                <a:pos x="T80" y="T81"/>
+              </a:cxn>
+              <a:cxn ang="0">
+                <a:pos x="T82" y="T83"/>
+              </a:cxn>
+              <a:cxn ang="0">
+                <a:pos x="T84" y="T85"/>
+              </a:cxn>
+              <a:cxn ang="0">
+                <a:pos x="T86" y="T87"/>
+              </a:cxn>
+              <a:cxn ang="0">
+                <a:pos x="T88" y="T89"/>
+              </a:cxn>
+              <a:cxn ang="0">
+                <a:pos x="T90" y="T91"/>
+              </a:cxn>
+            </a:cxnLst>
+            <a:rect l="0" t="0" r="r" b="b"/>
+            <a:pathLst>
+              <a:path w="900" h="1469">
+                <a:moveTo>
+                  <a:pt x="450" y="188"/>
+                </a:moveTo>
+                <a:lnTo>
+                  <a:pt x="475" y="204"/>
+                </a:lnTo>
+                <a:lnTo>
+                  <a:pt x="502" y="221"/>
+                </a:lnTo>
+                <a:lnTo>
+                  <a:pt x="527" y="239"/>
+                </a:lnTo>
+                <a:lnTo>
+                  <a:pt x="552" y="258"/>
+                </a:lnTo>
+                <a:lnTo>
+                  <a:pt x="573" y="280"/>
+                </a:lnTo>
+                <a:lnTo>
+                  <a:pt x="590" y="303"/>
+                </a:lnTo>
+                <a:lnTo>
+                  <a:pt x="601" y="330"/>
+                </a:lnTo>
+                <a:lnTo>
+                  <a:pt x="606" y="359"/>
+                </a:lnTo>
+                <a:lnTo>
+                  <a:pt x="604" y="437"/>
+                </a:lnTo>
+                <a:lnTo>
+                  <a:pt x="593" y="514"/>
+                </a:lnTo>
+                <a:lnTo>
+                  <a:pt x="579" y="589"/>
+                </a:lnTo>
+                <a:lnTo>
+                  <a:pt x="560" y="664"/>
+                </a:lnTo>
+                <a:lnTo>
+                  <a:pt x="540" y="739"/>
+                </a:lnTo>
+                <a:lnTo>
+                  <a:pt x="519" y="815"/>
+                </a:lnTo>
+                <a:lnTo>
+                  <a:pt x="500" y="891"/>
+                </a:lnTo>
+                <a:lnTo>
+                  <a:pt x="484" y="969"/>
+                </a:lnTo>
+                <a:lnTo>
+                  <a:pt x="474" y="1077"/>
+                </a:lnTo>
+                <a:lnTo>
+                  <a:pt x="469" y="1220"/>
+                </a:lnTo>
+                <a:lnTo>
+                  <a:pt x="469" y="1362"/>
+                </a:lnTo>
+                <a:lnTo>
+                  <a:pt x="472" y="1469"/>
+                </a:lnTo>
+                <a:lnTo>
+                  <a:pt x="476" y="1469"/>
+                </a:lnTo>
+                <a:lnTo>
+                  <a:pt x="486" y="1468"/>
+                </a:lnTo>
+                <a:lnTo>
+                  <a:pt x="505" y="1467"/>
+                </a:lnTo>
+                <a:lnTo>
+                  <a:pt x="527" y="1465"/>
+                </a:lnTo>
+                <a:lnTo>
+                  <a:pt x="555" y="1462"/>
+                </a:lnTo>
+                <a:lnTo>
+                  <a:pt x="584" y="1459"/>
+                </a:lnTo>
+                <a:lnTo>
+                  <a:pt x="617" y="1454"/>
+                </a:lnTo>
+                <a:lnTo>
+                  <a:pt x="650" y="1449"/>
+                </a:lnTo>
+                <a:lnTo>
+                  <a:pt x="685" y="1444"/>
+                </a:lnTo>
+                <a:lnTo>
+                  <a:pt x="718" y="1436"/>
+                </a:lnTo>
+                <a:lnTo>
+                  <a:pt x="748" y="1429"/>
+                </a:lnTo>
+                <a:lnTo>
+                  <a:pt x="776" y="1421"/>
+                </a:lnTo>
+                <a:lnTo>
+                  <a:pt x="801" y="1410"/>
+                </a:lnTo>
+                <a:lnTo>
+                  <a:pt x="819" y="1400"/>
+                </a:lnTo>
+                <a:lnTo>
+                  <a:pt x="833" y="1388"/>
+                </a:lnTo>
+                <a:lnTo>
+                  <a:pt x="838" y="1374"/>
+                </a:lnTo>
+                <a:lnTo>
+                  <a:pt x="863" y="1204"/>
+                </a:lnTo>
+                <a:lnTo>
+                  <a:pt x="881" y="1048"/>
+                </a:lnTo>
+                <a:lnTo>
+                  <a:pt x="894" y="903"/>
+                </a:lnTo>
+                <a:lnTo>
+                  <a:pt x="900" y="769"/>
+                </a:lnTo>
+                <a:lnTo>
+                  <a:pt x="899" y="640"/>
+                </a:lnTo>
+                <a:lnTo>
+                  <a:pt x="888" y="517"/>
+                </a:lnTo>
+                <a:lnTo>
+                  <a:pt x="871" y="395"/>
+                </a:lnTo>
+                <a:lnTo>
+                  <a:pt x="845" y="273"/>
+                </a:lnTo>
+                <a:lnTo>
+                  <a:pt x="834" y="248"/>
+                </a:lnTo>
+                <a:lnTo>
+                  <a:pt x="819" y="224"/>
+                </a:lnTo>
+                <a:lnTo>
+                  <a:pt x="803" y="201"/>
+                </a:lnTo>
+                <a:lnTo>
+                  <a:pt x="784" y="180"/>
+                </a:lnTo>
+                <a:lnTo>
+                  <a:pt x="763" y="159"/>
+                </a:lnTo>
+                <a:lnTo>
+                  <a:pt x="741" y="139"/>
+                </a:lnTo>
+                <a:lnTo>
+                  <a:pt x="718" y="121"/>
+                </a:lnTo>
+                <a:lnTo>
+                  <a:pt x="691" y="103"/>
+                </a:lnTo>
+                <a:lnTo>
+                  <a:pt x="665" y="86"/>
+                </a:lnTo>
+                <a:lnTo>
+                  <a:pt x="638" y="71"/>
+                </a:lnTo>
+                <a:lnTo>
+                  <a:pt x="611" y="56"/>
+                </a:lnTo>
+                <a:lnTo>
+                  <a:pt x="582" y="43"/>
+                </a:lnTo>
+                <a:lnTo>
+                  <a:pt x="554" y="31"/>
+                </a:lnTo>
+                <a:lnTo>
+                  <a:pt x="525" y="20"/>
+                </a:lnTo>
+                <a:lnTo>
+                  <a:pt x="497" y="10"/>
+                </a:lnTo>
+                <a:lnTo>
+                  <a:pt x="469" y="1"/>
+                </a:lnTo>
+                <a:lnTo>
+                  <a:pt x="439" y="0"/>
+                </a:lnTo>
+                <a:lnTo>
+                  <a:pt x="406" y="0"/>
+                </a:lnTo>
+                <a:lnTo>
+                  <a:pt x="371" y="3"/>
+                </a:lnTo>
+                <a:lnTo>
+                  <a:pt x="336" y="6"/>
+                </a:lnTo>
+                <a:lnTo>
+                  <a:pt x="300" y="11"/>
+                </a:lnTo>
+                <a:lnTo>
+                  <a:pt x="263" y="17"/>
+                </a:lnTo>
+                <a:lnTo>
+                  <a:pt x="228" y="26"/>
+                </a:lnTo>
+                <a:lnTo>
+                  <a:pt x="193" y="37"/>
+                </a:lnTo>
+                <a:lnTo>
+                  <a:pt x="159" y="50"/>
+                </a:lnTo>
+                <a:lnTo>
+                  <a:pt x="127" y="65"/>
+                </a:lnTo>
+                <a:lnTo>
+                  <a:pt x="97" y="82"/>
+                </a:lnTo>
+                <a:lnTo>
+                  <a:pt x="71" y="102"/>
+                </a:lnTo>
+                <a:lnTo>
+                  <a:pt x="47" y="124"/>
+                </a:lnTo>
+                <a:lnTo>
+                  <a:pt x="26" y="148"/>
+                </a:lnTo>
+                <a:lnTo>
+                  <a:pt x="12" y="176"/>
+                </a:lnTo>
+                <a:lnTo>
+                  <a:pt x="0" y="206"/>
+                </a:lnTo>
+                <a:lnTo>
+                  <a:pt x="4" y="206"/>
+                </a:lnTo>
+                <a:lnTo>
+                  <a:pt x="13" y="206"/>
+                </a:lnTo>
+                <a:lnTo>
+                  <a:pt x="29" y="204"/>
+                </a:lnTo>
+                <a:lnTo>
+                  <a:pt x="50" y="202"/>
+                </a:lnTo>
+                <a:lnTo>
+                  <a:pt x="77" y="199"/>
+                </a:lnTo>
+                <a:lnTo>
+                  <a:pt x="107" y="196"/>
+                </a:lnTo>
+                <a:lnTo>
+                  <a:pt x="140" y="192"/>
+                </a:lnTo>
+                <a:lnTo>
+                  <a:pt x="176" y="188"/>
+                </a:lnTo>
+                <a:lnTo>
+                  <a:pt x="213" y="185"/>
+                </a:lnTo>
+                <a:lnTo>
+                  <a:pt x="251" y="183"/>
+                </a:lnTo>
+                <a:lnTo>
+                  <a:pt x="288" y="181"/>
+                </a:lnTo>
+                <a:lnTo>
+                  <a:pt x="325" y="180"/>
+                </a:lnTo>
+                <a:lnTo>
+                  <a:pt x="361" y="180"/>
+                </a:lnTo>
+                <a:lnTo>
+                  <a:pt x="394" y="181"/>
+                </a:lnTo>
+                <a:lnTo>
+                  <a:pt x="424" y="184"/>
+                </a:lnTo>
+                <a:lnTo>
+                  <a:pt x="450" y="188"/>
+                </a:lnTo>
+                <a:close/>
+              </a:path>
+            </a:pathLst>
+          </a:custGeom>
+          <a:solidFill>
+            <a:srgbClr val="FFFFEA"/>
+          </a:solidFill>
+          <a:ln>
+            <a:noFill/>
+          </a:ln>
+          <a:extLst>
+            <a:ext uri="{91240B29-F687-4F45-9708-019B960494DF}">
+              <a14:hiddenLine xmlns:a14="http://schemas.microsoft.com/office/drawing/2010/main" w="9525">
+                <a:solidFill>
+                  <a:srgbClr val="000000"/>
+                </a:solidFill>
+                <a:round/>
+                <a:headEnd/>
+                <a:tailEnd/>
+              </a14:hiddenLine>
+            </a:ext>
+          </a:extLst>
+        </p:spPr>
+        <p:txBody>
+          <a:bodyPr vert="horz" wrap="square" lIns="91440" tIns="45720" rIns="91440" bIns="45720" numCol="1" anchor="t" anchorCtr="0" compatLnSpc="1">
+            <a:prstTxWarp prst="textNoShape">
+              <a:avLst/>
+            </a:prstTxWarp>
+          </a:bodyPr>
+          <a:lstStyle/>
+          <a:p>
+            <a:endParaRPr lang="en-SG"/>
+          </a:p>
+        </p:txBody>
+      </p:sp>
+      <p:sp>
+        <p:nvSpPr>
+          <p:cNvPr id="170" name="Freeform 8"/>
+          <p:cNvSpPr>
+            <a:spLocks/>
+          </p:cNvSpPr>
+          <p:nvPr/>
+        </p:nvSpPr>
+        <p:spPr bwMode="auto">
+          <a:xfrm>
+            <a:off x="6364288" y="1446213"/>
+            <a:ext cx="15875" cy="25400"/>
+          </a:xfrm>
+          <a:custGeom>
+            <a:avLst/>
+            <a:gdLst>
+              <a:gd name="T0" fmla="*/ 2 w 81"/>
+              <a:gd name="T1" fmla="*/ 11 h 146"/>
+              <a:gd name="T2" fmla="*/ 0 w 81"/>
+              <a:gd name="T3" fmla="*/ 44 h 146"/>
+              <a:gd name="T4" fmla="*/ 1 w 81"/>
+              <a:gd name="T5" fmla="*/ 76 h 146"/>
+              <a:gd name="T6" fmla="*/ 7 w 81"/>
+              <a:gd name="T7" fmla="*/ 109 h 146"/>
+              <a:gd name="T8" fmla="*/ 21 w 81"/>
+              <a:gd name="T9" fmla="*/ 140 h 146"/>
+              <a:gd name="T10" fmla="*/ 25 w 81"/>
+              <a:gd name="T11" fmla="*/ 144 h 146"/>
+              <a:gd name="T12" fmla="*/ 33 w 81"/>
+              <a:gd name="T13" fmla="*/ 146 h 146"/>
+              <a:gd name="T14" fmla="*/ 43 w 81"/>
+              <a:gd name="T15" fmla="*/ 145 h 146"/>
+              <a:gd name="T16" fmla="*/ 55 w 81"/>
+              <a:gd name="T17" fmla="*/ 143 h 146"/>
+              <a:gd name="T18" fmla="*/ 65 w 81"/>
+              <a:gd name="T19" fmla="*/ 139 h 146"/>
+              <a:gd name="T20" fmla="*/ 74 w 81"/>
+              <a:gd name="T21" fmla="*/ 133 h 146"/>
+              <a:gd name="T22" fmla="*/ 80 w 81"/>
+              <a:gd name="T23" fmla="*/ 128 h 146"/>
+              <a:gd name="T24" fmla="*/ 81 w 81"/>
+              <a:gd name="T25" fmla="*/ 122 h 146"/>
+              <a:gd name="T26" fmla="*/ 77 w 81"/>
+              <a:gd name="T27" fmla="*/ 106 h 146"/>
+              <a:gd name="T28" fmla="*/ 73 w 81"/>
+              <a:gd name="T29" fmla="*/ 90 h 146"/>
+              <a:gd name="T30" fmla="*/ 68 w 81"/>
+              <a:gd name="T31" fmla="*/ 75 h 146"/>
+              <a:gd name="T32" fmla="*/ 63 w 81"/>
+              <a:gd name="T33" fmla="*/ 60 h 146"/>
+              <a:gd name="T34" fmla="*/ 56 w 81"/>
+              <a:gd name="T35" fmla="*/ 45 h 146"/>
+              <a:gd name="T36" fmla="*/ 48 w 81"/>
+              <a:gd name="T37" fmla="*/ 30 h 146"/>
+              <a:gd name="T38" fmla="*/ 40 w 81"/>
+              <a:gd name="T39" fmla="*/ 16 h 146"/>
+              <a:gd name="T40" fmla="*/ 31 w 81"/>
+              <a:gd name="T41" fmla="*/ 3 h 146"/>
+              <a:gd name="T42" fmla="*/ 25 w 81"/>
+              <a:gd name="T43" fmla="*/ 0 h 146"/>
+              <a:gd name="T44" fmla="*/ 15 w 81"/>
+              <a:gd name="T45" fmla="*/ 1 h 146"/>
+              <a:gd name="T46" fmla="*/ 6 w 81"/>
+              <a:gd name="T47" fmla="*/ 6 h 146"/>
+              <a:gd name="T48" fmla="*/ 2 w 81"/>
+              <a:gd name="T49" fmla="*/ 11 h 146"/>
+              <a:gd name="T50" fmla="*/ 2 w 81"/>
+              <a:gd name="T51" fmla="*/ 11 h 146"/>
+            </a:gdLst>
+            <a:ahLst/>
+            <a:cxnLst>
+              <a:cxn ang="0">
+                <a:pos x="T0" y="T1"/>
+              </a:cxn>
+              <a:cxn ang="0">
+                <a:pos x="T2" y="T3"/>
+              </a:cxn>
+              <a:cxn ang="0">
+                <a:pos x="T4" y="T5"/>
+              </a:cxn>
+              <a:cxn ang="0">
+                <a:pos x="T6" y="T7"/>
+              </a:cxn>
+              <a:cxn ang="0">
+                <a:pos x="T8" y="T9"/>
+              </a:cxn>
+              <a:cxn ang="0">
+                <a:pos x="T10" y="T11"/>
+              </a:cxn>
+              <a:cxn ang="0">
+                <a:pos x="T12" y="T13"/>
+              </a:cxn>
+              <a:cxn ang="0">
+                <a:pos x="T14" y="T15"/>
+              </a:cxn>
+              <a:cxn ang="0">
+                <a:pos x="T16" y="T17"/>
+              </a:cxn>
+              <a:cxn ang="0">
+                <a:pos x="T18" y="T19"/>
+              </a:cxn>
+              <a:cxn ang="0">
+                <a:pos x="T20" y="T21"/>
+              </a:cxn>
+              <a:cxn ang="0">
+                <a:pos x="T22" y="T23"/>
+              </a:cxn>
+              <a:cxn ang="0">
+                <a:pos x="T24" y="T25"/>
+              </a:cxn>
+              <a:cxn ang="0">
+                <a:pos x="T26" y="T27"/>
+              </a:cxn>
+              <a:cxn ang="0">
+                <a:pos x="T28" y="T29"/>
+              </a:cxn>
+              <a:cxn ang="0">
+                <a:pos x="T30" y="T31"/>
+              </a:cxn>
+              <a:cxn ang="0">
+                <a:pos x="T32" y="T33"/>
+              </a:cxn>
+              <a:cxn ang="0">
+                <a:pos x="T34" y="T35"/>
+              </a:cxn>
+              <a:cxn ang="0">
+                <a:pos x="T36" y="T37"/>
+              </a:cxn>
+              <a:cxn ang="0">
+                <a:pos x="T38" y="T39"/>
+              </a:cxn>
+              <a:cxn ang="0">
+                <a:pos x="T40" y="T41"/>
+              </a:cxn>
+              <a:cxn ang="0">
+                <a:pos x="T42" y="T43"/>
+              </a:cxn>
+              <a:cxn ang="0">
+                <a:pos x="T44" y="T45"/>
+              </a:cxn>
+              <a:cxn ang="0">
+                <a:pos x="T46" y="T47"/>
+              </a:cxn>
+              <a:cxn ang="0">
+                <a:pos x="T48" y="T49"/>
+              </a:cxn>
+              <a:cxn ang="0">
+                <a:pos x="T50" y="T51"/>
+              </a:cxn>
+            </a:cxnLst>
+            <a:rect l="0" t="0" r="r" b="b"/>
+            <a:pathLst>
+              <a:path w="81" h="146">
+                <a:moveTo>
+                  <a:pt x="2" y="11"/>
+                </a:moveTo>
+                <a:lnTo>
+                  <a:pt x="0" y="44"/>
+                </a:lnTo>
+                <a:lnTo>
+                  <a:pt x="1" y="76"/>
+                </a:lnTo>
+                <a:lnTo>
+                  <a:pt x="7" y="109"/>
+                </a:lnTo>
+                <a:lnTo>
+                  <a:pt x="21" y="140"/>
+                </a:lnTo>
+                <a:lnTo>
+                  <a:pt x="25" y="144"/>
+                </a:lnTo>
+                <a:lnTo>
+                  <a:pt x="33" y="146"/>
+                </a:lnTo>
+                <a:lnTo>
+                  <a:pt x="43" y="145"/>
+                </a:lnTo>
+                <a:lnTo>
+                  <a:pt x="55" y="143"/>
+                </a:lnTo>
+                <a:lnTo>
+                  <a:pt x="65" y="139"/>
+                </a:lnTo>
+                <a:lnTo>
+                  <a:pt x="74" y="133"/>
+                </a:lnTo>
+                <a:lnTo>
+                  <a:pt x="80" y="128"/>
+                </a:lnTo>
+                <a:lnTo>
+                  <a:pt x="81" y="122"/>
+                </a:lnTo>
+                <a:lnTo>
+                  <a:pt x="77" y="106"/>
+                </a:lnTo>
+                <a:lnTo>
+                  <a:pt x="73" y="90"/>
+                </a:lnTo>
+                <a:lnTo>
+                  <a:pt x="68" y="75"/>
+                </a:lnTo>
+                <a:lnTo>
+                  <a:pt x="63" y="60"/>
+                </a:lnTo>
+                <a:lnTo>
+                  <a:pt x="56" y="45"/>
+                </a:lnTo>
+                <a:lnTo>
+                  <a:pt x="48" y="30"/>
+                </a:lnTo>
+                <a:lnTo>
+                  <a:pt x="40" y="16"/>
+                </a:lnTo>
+                <a:lnTo>
+                  <a:pt x="31" y="3"/>
+                </a:lnTo>
+                <a:lnTo>
+                  <a:pt x="25" y="0"/>
+                </a:lnTo>
+                <a:lnTo>
+                  <a:pt x="15" y="1"/>
+                </a:lnTo>
+                <a:lnTo>
+                  <a:pt x="6" y="6"/>
+                </a:lnTo>
+                <a:lnTo>
+                  <a:pt x="2" y="11"/>
+                </a:lnTo>
+                <a:lnTo>
+                  <a:pt x="2" y="11"/>
+                </a:lnTo>
+                <a:close/>
+              </a:path>
+            </a:pathLst>
+          </a:custGeom>
+          <a:solidFill>
+            <a:srgbClr val="FFFFEA"/>
+          </a:solidFill>
+          <a:ln>
+            <a:noFill/>
+          </a:ln>
+          <a:extLst>
+            <a:ext uri="{91240B29-F687-4F45-9708-019B960494DF}">
+              <a14:hiddenLine xmlns:a14="http://schemas.microsoft.com/office/drawing/2010/main" w="9525">
+                <a:solidFill>
+                  <a:srgbClr val="000000"/>
+                </a:solidFill>
+                <a:round/>
+                <a:headEnd/>
+                <a:tailEnd/>
+              </a14:hiddenLine>
+            </a:ext>
+          </a:extLst>
+        </p:spPr>
+        <p:txBody>
+          <a:bodyPr vert="horz" wrap="square" lIns="91440" tIns="45720" rIns="91440" bIns="45720" numCol="1" anchor="t" anchorCtr="0" compatLnSpc="1">
+            <a:prstTxWarp prst="textNoShape">
+              <a:avLst/>
+            </a:prstTxWarp>
+          </a:bodyPr>
+          <a:lstStyle/>
+          <a:p>
+            <a:endParaRPr lang="en-SG"/>
+          </a:p>
+        </p:txBody>
+      </p:sp>
+      <p:sp>
+        <p:nvSpPr>
+          <p:cNvPr id="171" name="Freeform 9"/>
+          <p:cNvSpPr>
+            <a:spLocks/>
+          </p:cNvSpPr>
+          <p:nvPr/>
+        </p:nvSpPr>
+        <p:spPr bwMode="auto">
+          <a:xfrm rot="2760171" flipH="1">
+            <a:off x="6071869" y="1628232"/>
+            <a:ext cx="403225" cy="376238"/>
+          </a:xfrm>
+          <a:custGeom>
+            <a:avLst/>
+            <a:gdLst>
+              <a:gd name="T0" fmla="*/ 1726 w 2029"/>
+              <a:gd name="T1" fmla="*/ 1943 h 2127"/>
+              <a:gd name="T2" fmla="*/ 1429 w 2029"/>
+              <a:gd name="T3" fmla="*/ 2016 h 2127"/>
+              <a:gd name="T4" fmla="*/ 1211 w 2029"/>
+              <a:gd name="T5" fmla="*/ 1616 h 2127"/>
+              <a:gd name="T6" fmla="*/ 1104 w 2029"/>
+              <a:gd name="T7" fmla="*/ 1279 h 2127"/>
+              <a:gd name="T8" fmla="*/ 1307 w 2029"/>
+              <a:gd name="T9" fmla="*/ 1164 h 2127"/>
+              <a:gd name="T10" fmla="*/ 1527 w 2029"/>
+              <a:gd name="T11" fmla="*/ 1092 h 2127"/>
+              <a:gd name="T12" fmla="*/ 1764 w 2029"/>
+              <a:gd name="T13" fmla="*/ 1084 h 2127"/>
+              <a:gd name="T14" fmla="*/ 1610 w 2029"/>
+              <a:gd name="T15" fmla="*/ 1008 h 2127"/>
+              <a:gd name="T16" fmla="*/ 1487 w 2029"/>
+              <a:gd name="T17" fmla="*/ 957 h 2127"/>
+              <a:gd name="T18" fmla="*/ 1403 w 2029"/>
+              <a:gd name="T19" fmla="*/ 1048 h 2127"/>
+              <a:gd name="T20" fmla="*/ 1249 w 2029"/>
+              <a:gd name="T21" fmla="*/ 1107 h 2127"/>
+              <a:gd name="T22" fmla="*/ 1057 w 2029"/>
+              <a:gd name="T23" fmla="*/ 1220 h 2127"/>
+              <a:gd name="T24" fmla="*/ 1094 w 2029"/>
+              <a:gd name="T25" fmla="*/ 755 h 2127"/>
+              <a:gd name="T26" fmla="*/ 1276 w 2029"/>
+              <a:gd name="T27" fmla="*/ 614 h 2127"/>
+              <a:gd name="T28" fmla="*/ 1401 w 2029"/>
+              <a:gd name="T29" fmla="*/ 847 h 2127"/>
+              <a:gd name="T30" fmla="*/ 1407 w 2029"/>
+              <a:gd name="T31" fmla="*/ 620 h 2127"/>
+              <a:gd name="T32" fmla="*/ 1658 w 2029"/>
+              <a:gd name="T33" fmla="*/ 597 h 2127"/>
+              <a:gd name="T34" fmla="*/ 1886 w 2029"/>
+              <a:gd name="T35" fmla="*/ 836 h 2127"/>
+              <a:gd name="T36" fmla="*/ 1833 w 2029"/>
+              <a:gd name="T37" fmla="*/ 1019 h 2127"/>
+              <a:gd name="T38" fmla="*/ 1897 w 2029"/>
+              <a:gd name="T39" fmla="*/ 1095 h 2127"/>
+              <a:gd name="T40" fmla="*/ 1891 w 2029"/>
+              <a:gd name="T41" fmla="*/ 1639 h 2127"/>
+              <a:gd name="T42" fmla="*/ 1890 w 2029"/>
+              <a:gd name="T43" fmla="*/ 668 h 2127"/>
+              <a:gd name="T44" fmla="*/ 1745 w 2029"/>
+              <a:gd name="T45" fmla="*/ 555 h 2127"/>
+              <a:gd name="T46" fmla="*/ 1603 w 2029"/>
+              <a:gd name="T47" fmla="*/ 501 h 2127"/>
+              <a:gd name="T48" fmla="*/ 1481 w 2029"/>
+              <a:gd name="T49" fmla="*/ 485 h 2127"/>
+              <a:gd name="T50" fmla="*/ 1399 w 2029"/>
+              <a:gd name="T51" fmla="*/ 453 h 2127"/>
+              <a:gd name="T52" fmla="*/ 1343 w 2029"/>
+              <a:gd name="T53" fmla="*/ 503 h 2127"/>
+              <a:gd name="T54" fmla="*/ 1374 w 2029"/>
+              <a:gd name="T55" fmla="*/ 399 h 2127"/>
+              <a:gd name="T56" fmla="*/ 1409 w 2029"/>
+              <a:gd name="T57" fmla="*/ 328 h 2127"/>
+              <a:gd name="T58" fmla="*/ 1371 w 2029"/>
+              <a:gd name="T59" fmla="*/ 317 h 2127"/>
+              <a:gd name="T60" fmla="*/ 1297 w 2029"/>
+              <a:gd name="T61" fmla="*/ 155 h 2127"/>
+              <a:gd name="T62" fmla="*/ 1142 w 2029"/>
+              <a:gd name="T63" fmla="*/ 34 h 2127"/>
+              <a:gd name="T64" fmla="*/ 1014 w 2029"/>
+              <a:gd name="T65" fmla="*/ 1 h 2127"/>
+              <a:gd name="T66" fmla="*/ 844 w 2029"/>
+              <a:gd name="T67" fmla="*/ 16 h 2127"/>
+              <a:gd name="T68" fmla="*/ 655 w 2029"/>
+              <a:gd name="T69" fmla="*/ 87 h 2127"/>
+              <a:gd name="T70" fmla="*/ 486 w 2029"/>
+              <a:gd name="T71" fmla="*/ 199 h 2127"/>
+              <a:gd name="T72" fmla="*/ 310 w 2029"/>
+              <a:gd name="T73" fmla="*/ 520 h 2127"/>
+              <a:gd name="T74" fmla="*/ 474 w 2029"/>
+              <a:gd name="T75" fmla="*/ 980 h 2127"/>
+              <a:gd name="T76" fmla="*/ 702 w 2029"/>
+              <a:gd name="T77" fmla="*/ 1291 h 2127"/>
+              <a:gd name="T78" fmla="*/ 551 w 2029"/>
+              <a:gd name="T79" fmla="*/ 1622 h 2127"/>
+              <a:gd name="T80" fmla="*/ 239 w 2029"/>
+              <a:gd name="T81" fmla="*/ 1637 h 2127"/>
+              <a:gd name="T82" fmla="*/ 43 w 2029"/>
+              <a:gd name="T83" fmla="*/ 1652 h 2127"/>
+              <a:gd name="T84" fmla="*/ 186 w 2029"/>
+              <a:gd name="T85" fmla="*/ 1716 h 2127"/>
+              <a:gd name="T86" fmla="*/ 311 w 2029"/>
+              <a:gd name="T87" fmla="*/ 1731 h 2127"/>
+              <a:gd name="T88" fmla="*/ 560 w 2029"/>
+              <a:gd name="T89" fmla="*/ 1709 h 2127"/>
+              <a:gd name="T90" fmla="*/ 819 w 2029"/>
+              <a:gd name="T91" fmla="*/ 1410 h 2127"/>
+              <a:gd name="T92" fmla="*/ 751 w 2029"/>
+              <a:gd name="T93" fmla="*/ 1202 h 2127"/>
+              <a:gd name="T94" fmla="*/ 613 w 2029"/>
+              <a:gd name="T95" fmla="*/ 974 h 2127"/>
+              <a:gd name="T96" fmla="*/ 419 w 2029"/>
+              <a:gd name="T97" fmla="*/ 599 h 2127"/>
+              <a:gd name="T98" fmla="*/ 498 w 2029"/>
+              <a:gd name="T99" fmla="*/ 304 h 2127"/>
+              <a:gd name="T100" fmla="*/ 783 w 2029"/>
+              <a:gd name="T101" fmla="*/ 110 h 2127"/>
+              <a:gd name="T102" fmla="*/ 1044 w 2029"/>
+              <a:gd name="T103" fmla="*/ 85 h 2127"/>
+              <a:gd name="T104" fmla="*/ 1215 w 2029"/>
+              <a:gd name="T105" fmla="*/ 188 h 2127"/>
+              <a:gd name="T106" fmla="*/ 1249 w 2029"/>
+              <a:gd name="T107" fmla="*/ 392 h 2127"/>
+              <a:gd name="T108" fmla="*/ 1123 w 2029"/>
+              <a:gd name="T109" fmla="*/ 615 h 2127"/>
+              <a:gd name="T110" fmla="*/ 989 w 2029"/>
+              <a:gd name="T111" fmla="*/ 850 h 2127"/>
+              <a:gd name="T112" fmla="*/ 986 w 2029"/>
+              <a:gd name="T113" fmla="*/ 1327 h 2127"/>
+              <a:gd name="T114" fmla="*/ 1152 w 2029"/>
+              <a:gd name="T115" fmla="*/ 1757 h 2127"/>
+              <a:gd name="T116" fmla="*/ 1365 w 2029"/>
+              <a:gd name="T117" fmla="*/ 2118 h 2127"/>
+              <a:gd name="T118" fmla="*/ 1989 w 2029"/>
+              <a:gd name="T119" fmla="*/ 1639 h 2127"/>
+            </a:gdLst>
+            <a:ahLst/>
+            <a:cxnLst>
+              <a:cxn ang="0">
+                <a:pos x="T0" y="T1"/>
+              </a:cxn>
+              <a:cxn ang="0">
+                <a:pos x="T2" y="T3"/>
+              </a:cxn>
+              <a:cxn ang="0">
+                <a:pos x="T4" y="T5"/>
+              </a:cxn>
+              <a:cxn ang="0">
+                <a:pos x="T6" y="T7"/>
+              </a:cxn>
+              <a:cxn ang="0">
+                <a:pos x="T8" y="T9"/>
+              </a:cxn>
+              <a:cxn ang="0">
+                <a:pos x="T10" y="T11"/>
+              </a:cxn>
+              <a:cxn ang="0">
+                <a:pos x="T12" y="T13"/>
+              </a:cxn>
+              <a:cxn ang="0">
+                <a:pos x="T14" y="T15"/>
+              </a:cxn>
+              <a:cxn ang="0">
+                <a:pos x="T16" y="T17"/>
+              </a:cxn>
+              <a:cxn ang="0">
+                <a:pos x="T18" y="T19"/>
+              </a:cxn>
+              <a:cxn ang="0">
+                <a:pos x="T20" y="T21"/>
+              </a:cxn>
+              <a:cxn ang="0">
+                <a:pos x="T22" y="T23"/>
+              </a:cxn>
+              <a:cxn ang="0">
+                <a:pos x="T24" y="T25"/>
+              </a:cxn>
+              <a:cxn ang="0">
+                <a:pos x="T26" y="T27"/>
+              </a:cxn>
+              <a:cxn ang="0">
+                <a:pos x="T28" y="T29"/>
+              </a:cxn>
+              <a:cxn ang="0">
+                <a:pos x="T30" y="T31"/>
+              </a:cxn>
+              <a:cxn ang="0">
+                <a:pos x="T32" y="T33"/>
+              </a:cxn>
+              <a:cxn ang="0">
+                <a:pos x="T34" y="T35"/>
+              </a:cxn>
+              <a:cxn ang="0">
+                <a:pos x="T36" y="T37"/>
+              </a:cxn>
+              <a:cxn ang="0">
+                <a:pos x="T38" y="T39"/>
+              </a:cxn>
+              <a:cxn ang="0">
+                <a:pos x="T40" y="T41"/>
+              </a:cxn>
+              <a:cxn ang="0">
+                <a:pos x="T42" y="T43"/>
+              </a:cxn>
+              <a:cxn ang="0">
+                <a:pos x="T44" y="T45"/>
+              </a:cxn>
+              <a:cxn ang="0">
+                <a:pos x="T46" y="T47"/>
+              </a:cxn>
+              <a:cxn ang="0">
+                <a:pos x="T48" y="T49"/>
+              </a:cxn>
+              <a:cxn ang="0">
+                <a:pos x="T50" y="T51"/>
+              </a:cxn>
+              <a:cxn ang="0">
+                <a:pos x="T52" y="T53"/>
+              </a:cxn>
+              <a:cxn ang="0">
+                <a:pos x="T54" y="T55"/>
+              </a:cxn>
+              <a:cxn ang="0">
+                <a:pos x="T56" y="T57"/>
+              </a:cxn>
+              <a:cxn ang="0">
+                <a:pos x="T58" y="T59"/>
+              </a:cxn>
+              <a:cxn ang="0">
+                <a:pos x="T60" y="T61"/>
+              </a:cxn>
+              <a:cxn ang="0">
+                <a:pos x="T62" y="T63"/>
+              </a:cxn>
+              <a:cxn ang="0">
+                <a:pos x="T64" y="T65"/>
+              </a:cxn>
+              <a:cxn ang="0">
+                <a:pos x="T66" y="T67"/>
+              </a:cxn>
+              <a:cxn ang="0">
+                <a:pos x="T68" y="T69"/>
+              </a:cxn>
+              <a:cxn ang="0">
+                <a:pos x="T70" y="T71"/>
+              </a:cxn>
+              <a:cxn ang="0">
+                <a:pos x="T72" y="T73"/>
+              </a:cxn>
+              <a:cxn ang="0">
+                <a:pos x="T74" y="T75"/>
+              </a:cxn>
+              <a:cxn ang="0">
+                <a:pos x="T76" y="T77"/>
+              </a:cxn>
+              <a:cxn ang="0">
+                <a:pos x="T78" y="T79"/>
+              </a:cxn>
+              <a:cxn ang="0">
+                <a:pos x="T80" y="T81"/>
+              </a:cxn>
+              <a:cxn ang="0">
+                <a:pos x="T82" y="T83"/>
+              </a:cxn>
+              <a:cxn ang="0">
+                <a:pos x="T84" y="T85"/>
+              </a:cxn>
+              <a:cxn ang="0">
+                <a:pos x="T86" y="T87"/>
+              </a:cxn>
+              <a:cxn ang="0">
+                <a:pos x="T88" y="T89"/>
+              </a:cxn>
+              <a:cxn ang="0">
+                <a:pos x="T90" y="T91"/>
+              </a:cxn>
+              <a:cxn ang="0">
+                <a:pos x="T92" y="T93"/>
+              </a:cxn>
+              <a:cxn ang="0">
+                <a:pos x="T94" y="T95"/>
+              </a:cxn>
+              <a:cxn ang="0">
+                <a:pos x="T96" y="T97"/>
+              </a:cxn>
+              <a:cxn ang="0">
+                <a:pos x="T98" y="T99"/>
+              </a:cxn>
+              <a:cxn ang="0">
+                <a:pos x="T100" y="T101"/>
+              </a:cxn>
+              <a:cxn ang="0">
+                <a:pos x="T102" y="T103"/>
+              </a:cxn>
+              <a:cxn ang="0">
+                <a:pos x="T104" y="T105"/>
+              </a:cxn>
+              <a:cxn ang="0">
+                <a:pos x="T106" y="T107"/>
+              </a:cxn>
+              <a:cxn ang="0">
+                <a:pos x="T108" y="T109"/>
+              </a:cxn>
+              <a:cxn ang="0">
+                <a:pos x="T110" y="T111"/>
+              </a:cxn>
+              <a:cxn ang="0">
+                <a:pos x="T112" y="T113"/>
+              </a:cxn>
+              <a:cxn ang="0">
+                <a:pos x="T114" y="T115"/>
+              </a:cxn>
+              <a:cxn ang="0">
+                <a:pos x="T116" y="T117"/>
+              </a:cxn>
+              <a:cxn ang="0">
+                <a:pos x="T118" y="T119"/>
+              </a:cxn>
+            </a:cxnLst>
+            <a:rect l="0" t="0" r="r" b="b"/>
+            <a:pathLst>
+              <a:path w="2029" h="2127">
+                <a:moveTo>
+                  <a:pt x="1891" y="1639"/>
+                </a:moveTo>
+                <a:lnTo>
+                  <a:pt x="1885" y="1709"/>
+                </a:lnTo>
+                <a:lnTo>
+                  <a:pt x="1880" y="1778"/>
+                </a:lnTo>
+                <a:lnTo>
+                  <a:pt x="1874" y="1845"/>
+                </a:lnTo>
+                <a:lnTo>
+                  <a:pt x="1869" y="1902"/>
+                </a:lnTo>
+                <a:lnTo>
+                  <a:pt x="1842" y="1910"/>
+                </a:lnTo>
+                <a:lnTo>
+                  <a:pt x="1814" y="1919"/>
+                </a:lnTo>
+                <a:lnTo>
+                  <a:pt x="1785" y="1926"/>
+                </a:lnTo>
+                <a:lnTo>
+                  <a:pt x="1756" y="1935"/>
+                </a:lnTo>
+                <a:lnTo>
+                  <a:pt x="1726" y="1943"/>
+                </a:lnTo>
+                <a:lnTo>
+                  <a:pt x="1696" y="1950"/>
+                </a:lnTo>
+                <a:lnTo>
+                  <a:pt x="1667" y="1959"/>
+                </a:lnTo>
+                <a:lnTo>
+                  <a:pt x="1636" y="1966"/>
+                </a:lnTo>
+                <a:lnTo>
+                  <a:pt x="1606" y="1974"/>
+                </a:lnTo>
+                <a:lnTo>
+                  <a:pt x="1576" y="1981"/>
+                </a:lnTo>
+                <a:lnTo>
+                  <a:pt x="1546" y="1989"/>
+                </a:lnTo>
+                <a:lnTo>
+                  <a:pt x="1516" y="1996"/>
+                </a:lnTo>
+                <a:lnTo>
+                  <a:pt x="1487" y="2003"/>
+                </a:lnTo>
+                <a:lnTo>
+                  <a:pt x="1457" y="2010"/>
+                </a:lnTo>
+                <a:lnTo>
+                  <a:pt x="1429" y="2016"/>
+                </a:lnTo>
+                <a:lnTo>
+                  <a:pt x="1401" y="2022"/>
+                </a:lnTo>
+                <a:lnTo>
+                  <a:pt x="1398" y="2015"/>
+                </a:lnTo>
+                <a:lnTo>
+                  <a:pt x="1383" y="1984"/>
+                </a:lnTo>
+                <a:lnTo>
+                  <a:pt x="1365" y="1946"/>
+                </a:lnTo>
+                <a:lnTo>
+                  <a:pt x="1343" y="1900"/>
+                </a:lnTo>
+                <a:lnTo>
+                  <a:pt x="1320" y="1849"/>
+                </a:lnTo>
+                <a:lnTo>
+                  <a:pt x="1293" y="1793"/>
+                </a:lnTo>
+                <a:lnTo>
+                  <a:pt x="1267" y="1735"/>
+                </a:lnTo>
+                <a:lnTo>
+                  <a:pt x="1239" y="1675"/>
+                </a:lnTo>
+                <a:lnTo>
+                  <a:pt x="1211" y="1616"/>
+                </a:lnTo>
+                <a:lnTo>
+                  <a:pt x="1185" y="1558"/>
+                </a:lnTo>
+                <a:lnTo>
+                  <a:pt x="1159" y="1502"/>
+                </a:lnTo>
+                <a:lnTo>
+                  <a:pt x="1136" y="1451"/>
+                </a:lnTo>
+                <a:lnTo>
+                  <a:pt x="1116" y="1406"/>
+                </a:lnTo>
+                <a:lnTo>
+                  <a:pt x="1099" y="1368"/>
+                </a:lnTo>
+                <a:lnTo>
+                  <a:pt x="1085" y="1339"/>
+                </a:lnTo>
+                <a:lnTo>
+                  <a:pt x="1077" y="1319"/>
+                </a:lnTo>
+                <a:lnTo>
+                  <a:pt x="1074" y="1312"/>
+                </a:lnTo>
+                <a:lnTo>
+                  <a:pt x="1088" y="1295"/>
+                </a:lnTo>
+                <a:lnTo>
+                  <a:pt x="1104" y="1279"/>
+                </a:lnTo>
+                <a:lnTo>
+                  <a:pt x="1123" y="1263"/>
+                </a:lnTo>
+                <a:lnTo>
+                  <a:pt x="1141" y="1249"/>
+                </a:lnTo>
+                <a:lnTo>
+                  <a:pt x="1159" y="1237"/>
+                </a:lnTo>
+                <a:lnTo>
+                  <a:pt x="1178" y="1224"/>
+                </a:lnTo>
+                <a:lnTo>
+                  <a:pt x="1199" y="1212"/>
+                </a:lnTo>
+                <a:lnTo>
+                  <a:pt x="1220" y="1202"/>
+                </a:lnTo>
+                <a:lnTo>
+                  <a:pt x="1241" y="1192"/>
+                </a:lnTo>
+                <a:lnTo>
+                  <a:pt x="1263" y="1182"/>
+                </a:lnTo>
+                <a:lnTo>
+                  <a:pt x="1285" y="1172"/>
+                </a:lnTo>
+                <a:lnTo>
+                  <a:pt x="1307" y="1164"/>
+                </a:lnTo>
+                <a:lnTo>
+                  <a:pt x="1329" y="1155"/>
+                </a:lnTo>
+                <a:lnTo>
+                  <a:pt x="1351" y="1146"/>
+                </a:lnTo>
+                <a:lnTo>
+                  <a:pt x="1373" y="1137"/>
+                </a:lnTo>
+                <a:lnTo>
+                  <a:pt x="1395" y="1129"/>
+                </a:lnTo>
+                <a:lnTo>
+                  <a:pt x="1416" y="1121"/>
+                </a:lnTo>
+                <a:lnTo>
+                  <a:pt x="1438" y="1113"/>
+                </a:lnTo>
+                <a:lnTo>
+                  <a:pt x="1460" y="1107"/>
+                </a:lnTo>
+                <a:lnTo>
+                  <a:pt x="1481" y="1102"/>
+                </a:lnTo>
+                <a:lnTo>
+                  <a:pt x="1504" y="1096"/>
+                </a:lnTo>
+                <a:lnTo>
+                  <a:pt x="1527" y="1092"/>
+                </a:lnTo>
+                <a:lnTo>
+                  <a:pt x="1551" y="1089"/>
+                </a:lnTo>
+                <a:lnTo>
+                  <a:pt x="1573" y="1086"/>
+                </a:lnTo>
+                <a:lnTo>
+                  <a:pt x="1597" y="1084"/>
+                </a:lnTo>
+                <a:lnTo>
+                  <a:pt x="1621" y="1083"/>
+                </a:lnTo>
+                <a:lnTo>
+                  <a:pt x="1644" y="1081"/>
+                </a:lnTo>
+                <a:lnTo>
+                  <a:pt x="1668" y="1081"/>
+                </a:lnTo>
+                <a:lnTo>
+                  <a:pt x="1692" y="1081"/>
+                </a:lnTo>
+                <a:lnTo>
+                  <a:pt x="1716" y="1081"/>
+                </a:lnTo>
+                <a:lnTo>
+                  <a:pt x="1740" y="1083"/>
+                </a:lnTo>
+                <a:lnTo>
+                  <a:pt x="1764" y="1084"/>
+                </a:lnTo>
+                <a:lnTo>
+                  <a:pt x="1764" y="1009"/>
+                </a:lnTo>
+                <a:lnTo>
+                  <a:pt x="1746" y="1008"/>
+                </a:lnTo>
+                <a:lnTo>
+                  <a:pt x="1729" y="1006"/>
+                </a:lnTo>
+                <a:lnTo>
+                  <a:pt x="1712" y="1005"/>
+                </a:lnTo>
+                <a:lnTo>
+                  <a:pt x="1695" y="1005"/>
+                </a:lnTo>
+                <a:lnTo>
+                  <a:pt x="1678" y="1004"/>
+                </a:lnTo>
+                <a:lnTo>
+                  <a:pt x="1661" y="1005"/>
+                </a:lnTo>
+                <a:lnTo>
+                  <a:pt x="1644" y="1005"/>
+                </a:lnTo>
+                <a:lnTo>
+                  <a:pt x="1627" y="1006"/>
+                </a:lnTo>
+                <a:lnTo>
+                  <a:pt x="1610" y="1008"/>
+                </a:lnTo>
+                <a:lnTo>
+                  <a:pt x="1593" y="1009"/>
+                </a:lnTo>
+                <a:lnTo>
+                  <a:pt x="1576" y="1011"/>
+                </a:lnTo>
+                <a:lnTo>
+                  <a:pt x="1560" y="1013"/>
+                </a:lnTo>
+                <a:lnTo>
+                  <a:pt x="1544" y="1015"/>
+                </a:lnTo>
+                <a:lnTo>
+                  <a:pt x="1528" y="1017"/>
+                </a:lnTo>
+                <a:lnTo>
+                  <a:pt x="1512" y="1020"/>
+                </a:lnTo>
+                <a:lnTo>
+                  <a:pt x="1496" y="1023"/>
+                </a:lnTo>
+                <a:lnTo>
+                  <a:pt x="1493" y="1002"/>
+                </a:lnTo>
+                <a:lnTo>
+                  <a:pt x="1490" y="979"/>
+                </a:lnTo>
+                <a:lnTo>
+                  <a:pt x="1487" y="957"/>
+                </a:lnTo>
+                <a:lnTo>
+                  <a:pt x="1483" y="936"/>
+                </a:lnTo>
+                <a:lnTo>
+                  <a:pt x="1414" y="936"/>
+                </a:lnTo>
+                <a:lnTo>
+                  <a:pt x="1417" y="960"/>
+                </a:lnTo>
+                <a:lnTo>
+                  <a:pt x="1423" y="987"/>
+                </a:lnTo>
+                <a:lnTo>
+                  <a:pt x="1428" y="1014"/>
+                </a:lnTo>
+                <a:lnTo>
+                  <a:pt x="1432" y="1039"/>
+                </a:lnTo>
+                <a:lnTo>
+                  <a:pt x="1425" y="1041"/>
+                </a:lnTo>
+                <a:lnTo>
+                  <a:pt x="1417" y="1043"/>
+                </a:lnTo>
+                <a:lnTo>
+                  <a:pt x="1411" y="1046"/>
+                </a:lnTo>
+                <a:lnTo>
+                  <a:pt x="1403" y="1048"/>
+                </a:lnTo>
+                <a:lnTo>
+                  <a:pt x="1395" y="1050"/>
+                </a:lnTo>
+                <a:lnTo>
+                  <a:pt x="1388" y="1053"/>
+                </a:lnTo>
+                <a:lnTo>
+                  <a:pt x="1380" y="1055"/>
+                </a:lnTo>
+                <a:lnTo>
+                  <a:pt x="1373" y="1057"/>
+                </a:lnTo>
+                <a:lnTo>
+                  <a:pt x="1353" y="1065"/>
+                </a:lnTo>
+                <a:lnTo>
+                  <a:pt x="1332" y="1072"/>
+                </a:lnTo>
+                <a:lnTo>
+                  <a:pt x="1312" y="1080"/>
+                </a:lnTo>
+                <a:lnTo>
+                  <a:pt x="1291" y="1089"/>
+                </a:lnTo>
+                <a:lnTo>
+                  <a:pt x="1271" y="1097"/>
+                </a:lnTo>
+                <a:lnTo>
+                  <a:pt x="1249" y="1107"/>
+                </a:lnTo>
+                <a:lnTo>
+                  <a:pt x="1228" y="1117"/>
+                </a:lnTo>
+                <a:lnTo>
+                  <a:pt x="1208" y="1127"/>
+                </a:lnTo>
+                <a:lnTo>
+                  <a:pt x="1189" y="1137"/>
+                </a:lnTo>
+                <a:lnTo>
+                  <a:pt x="1168" y="1148"/>
+                </a:lnTo>
+                <a:lnTo>
+                  <a:pt x="1149" y="1160"/>
+                </a:lnTo>
+                <a:lnTo>
+                  <a:pt x="1129" y="1171"/>
+                </a:lnTo>
+                <a:lnTo>
+                  <a:pt x="1110" y="1183"/>
+                </a:lnTo>
+                <a:lnTo>
+                  <a:pt x="1092" y="1194"/>
+                </a:lnTo>
+                <a:lnTo>
+                  <a:pt x="1074" y="1207"/>
+                </a:lnTo>
+                <a:lnTo>
+                  <a:pt x="1057" y="1220"/>
+                </a:lnTo>
+                <a:lnTo>
+                  <a:pt x="1053" y="1167"/>
+                </a:lnTo>
+                <a:lnTo>
+                  <a:pt x="1049" y="1114"/>
+                </a:lnTo>
+                <a:lnTo>
+                  <a:pt x="1046" y="1059"/>
+                </a:lnTo>
+                <a:lnTo>
+                  <a:pt x="1045" y="1005"/>
+                </a:lnTo>
+                <a:lnTo>
+                  <a:pt x="1047" y="952"/>
+                </a:lnTo>
+                <a:lnTo>
+                  <a:pt x="1052" y="898"/>
+                </a:lnTo>
+                <a:lnTo>
+                  <a:pt x="1061" y="845"/>
+                </a:lnTo>
+                <a:lnTo>
+                  <a:pt x="1076" y="794"/>
+                </a:lnTo>
+                <a:lnTo>
+                  <a:pt x="1084" y="774"/>
+                </a:lnTo>
+                <a:lnTo>
+                  <a:pt x="1094" y="755"/>
+                </a:lnTo>
+                <a:lnTo>
+                  <a:pt x="1107" y="737"/>
+                </a:lnTo>
+                <a:lnTo>
+                  <a:pt x="1120" y="720"/>
+                </a:lnTo>
+                <a:lnTo>
+                  <a:pt x="1136" y="703"/>
+                </a:lnTo>
+                <a:lnTo>
+                  <a:pt x="1153" y="688"/>
+                </a:lnTo>
+                <a:lnTo>
+                  <a:pt x="1172" y="673"/>
+                </a:lnTo>
+                <a:lnTo>
+                  <a:pt x="1191" y="659"/>
+                </a:lnTo>
+                <a:lnTo>
+                  <a:pt x="1211" y="646"/>
+                </a:lnTo>
+                <a:lnTo>
+                  <a:pt x="1233" y="635"/>
+                </a:lnTo>
+                <a:lnTo>
+                  <a:pt x="1255" y="623"/>
+                </a:lnTo>
+                <a:lnTo>
+                  <a:pt x="1276" y="614"/>
+                </a:lnTo>
+                <a:lnTo>
+                  <a:pt x="1299" y="604"/>
+                </a:lnTo>
+                <a:lnTo>
+                  <a:pt x="1321" y="596"/>
+                </a:lnTo>
+                <a:lnTo>
+                  <a:pt x="1342" y="589"/>
+                </a:lnTo>
+                <a:lnTo>
+                  <a:pt x="1364" y="583"/>
+                </a:lnTo>
+                <a:lnTo>
+                  <a:pt x="1372" y="627"/>
+                </a:lnTo>
+                <a:lnTo>
+                  <a:pt x="1379" y="671"/>
+                </a:lnTo>
+                <a:lnTo>
+                  <a:pt x="1384" y="715"/>
+                </a:lnTo>
+                <a:lnTo>
+                  <a:pt x="1391" y="758"/>
+                </a:lnTo>
+                <a:lnTo>
+                  <a:pt x="1396" y="803"/>
+                </a:lnTo>
+                <a:lnTo>
+                  <a:pt x="1401" y="847"/>
+                </a:lnTo>
+                <a:lnTo>
+                  <a:pt x="1407" y="891"/>
+                </a:lnTo>
+                <a:lnTo>
+                  <a:pt x="1414" y="936"/>
+                </a:lnTo>
+                <a:lnTo>
+                  <a:pt x="1483" y="936"/>
+                </a:lnTo>
+                <a:lnTo>
+                  <a:pt x="1475" y="890"/>
+                </a:lnTo>
+                <a:lnTo>
+                  <a:pt x="1468" y="844"/>
+                </a:lnTo>
+                <a:lnTo>
+                  <a:pt x="1457" y="798"/>
+                </a:lnTo>
+                <a:lnTo>
+                  <a:pt x="1447" y="754"/>
+                </a:lnTo>
+                <a:lnTo>
+                  <a:pt x="1435" y="709"/>
+                </a:lnTo>
+                <a:lnTo>
+                  <a:pt x="1422" y="664"/>
+                </a:lnTo>
+                <a:lnTo>
+                  <a:pt x="1407" y="620"/>
+                </a:lnTo>
+                <a:lnTo>
+                  <a:pt x="1390" y="577"/>
+                </a:lnTo>
+                <a:lnTo>
+                  <a:pt x="1420" y="571"/>
+                </a:lnTo>
+                <a:lnTo>
+                  <a:pt x="1449" y="568"/>
+                </a:lnTo>
+                <a:lnTo>
+                  <a:pt x="1480" y="567"/>
+                </a:lnTo>
+                <a:lnTo>
+                  <a:pt x="1511" y="567"/>
+                </a:lnTo>
+                <a:lnTo>
+                  <a:pt x="1540" y="570"/>
+                </a:lnTo>
+                <a:lnTo>
+                  <a:pt x="1571" y="575"/>
+                </a:lnTo>
+                <a:lnTo>
+                  <a:pt x="1601" y="580"/>
+                </a:lnTo>
+                <a:lnTo>
+                  <a:pt x="1629" y="587"/>
+                </a:lnTo>
+                <a:lnTo>
+                  <a:pt x="1658" y="597"/>
+                </a:lnTo>
+                <a:lnTo>
+                  <a:pt x="1686" y="608"/>
+                </a:lnTo>
+                <a:lnTo>
+                  <a:pt x="1712" y="621"/>
+                </a:lnTo>
+                <a:lnTo>
+                  <a:pt x="1738" y="636"/>
+                </a:lnTo>
+                <a:lnTo>
+                  <a:pt x="1762" y="653"/>
+                </a:lnTo>
+                <a:lnTo>
+                  <a:pt x="1786" y="671"/>
+                </a:lnTo>
+                <a:lnTo>
+                  <a:pt x="1808" y="691"/>
+                </a:lnTo>
+                <a:lnTo>
+                  <a:pt x="1827" y="712"/>
+                </a:lnTo>
+                <a:lnTo>
+                  <a:pt x="1848" y="753"/>
+                </a:lnTo>
+                <a:lnTo>
+                  <a:pt x="1868" y="795"/>
+                </a:lnTo>
+                <a:lnTo>
+                  <a:pt x="1886" y="836"/>
+                </a:lnTo>
+                <a:lnTo>
+                  <a:pt x="1904" y="879"/>
+                </a:lnTo>
+                <a:lnTo>
+                  <a:pt x="1918" y="921"/>
+                </a:lnTo>
+                <a:lnTo>
+                  <a:pt x="1930" y="963"/>
+                </a:lnTo>
+                <a:lnTo>
+                  <a:pt x="1939" y="1006"/>
+                </a:lnTo>
+                <a:lnTo>
+                  <a:pt x="1945" y="1049"/>
+                </a:lnTo>
+                <a:lnTo>
+                  <a:pt x="1925" y="1041"/>
+                </a:lnTo>
+                <a:lnTo>
+                  <a:pt x="1904" y="1035"/>
+                </a:lnTo>
+                <a:lnTo>
+                  <a:pt x="1881" y="1030"/>
+                </a:lnTo>
+                <a:lnTo>
+                  <a:pt x="1858" y="1023"/>
+                </a:lnTo>
+                <a:lnTo>
+                  <a:pt x="1833" y="1019"/>
+                </a:lnTo>
+                <a:lnTo>
+                  <a:pt x="1809" y="1015"/>
+                </a:lnTo>
+                <a:lnTo>
+                  <a:pt x="1786" y="1012"/>
+                </a:lnTo>
+                <a:lnTo>
+                  <a:pt x="1764" y="1009"/>
+                </a:lnTo>
+                <a:lnTo>
+                  <a:pt x="1764" y="1084"/>
+                </a:lnTo>
+                <a:lnTo>
+                  <a:pt x="1784" y="1085"/>
+                </a:lnTo>
+                <a:lnTo>
+                  <a:pt x="1806" y="1087"/>
+                </a:lnTo>
+                <a:lnTo>
+                  <a:pt x="1828" y="1089"/>
+                </a:lnTo>
+                <a:lnTo>
+                  <a:pt x="1851" y="1091"/>
+                </a:lnTo>
+                <a:lnTo>
+                  <a:pt x="1874" y="1093"/>
+                </a:lnTo>
+                <a:lnTo>
+                  <a:pt x="1897" y="1095"/>
+                </a:lnTo>
+                <a:lnTo>
+                  <a:pt x="1918" y="1097"/>
+                </a:lnTo>
+                <a:lnTo>
+                  <a:pt x="1938" y="1099"/>
+                </a:lnTo>
+                <a:lnTo>
+                  <a:pt x="1937" y="1112"/>
+                </a:lnTo>
+                <a:lnTo>
+                  <a:pt x="1933" y="1148"/>
+                </a:lnTo>
+                <a:lnTo>
+                  <a:pt x="1929" y="1203"/>
+                </a:lnTo>
+                <a:lnTo>
+                  <a:pt x="1923" y="1273"/>
+                </a:lnTo>
+                <a:lnTo>
+                  <a:pt x="1915" y="1355"/>
+                </a:lnTo>
+                <a:lnTo>
+                  <a:pt x="1907" y="1446"/>
+                </a:lnTo>
+                <a:lnTo>
+                  <a:pt x="1899" y="1542"/>
+                </a:lnTo>
+                <a:lnTo>
+                  <a:pt x="1891" y="1639"/>
+                </a:lnTo>
+                <a:lnTo>
+                  <a:pt x="1989" y="1639"/>
+                </a:lnTo>
+                <a:lnTo>
+                  <a:pt x="2006" y="1516"/>
+                </a:lnTo>
+                <a:lnTo>
+                  <a:pt x="2020" y="1393"/>
+                </a:lnTo>
+                <a:lnTo>
+                  <a:pt x="2029" y="1270"/>
+                </a:lnTo>
+                <a:lnTo>
+                  <a:pt x="2029" y="1148"/>
+                </a:lnTo>
+                <a:lnTo>
+                  <a:pt x="2020" y="1028"/>
+                </a:lnTo>
+                <a:lnTo>
+                  <a:pt x="1997" y="909"/>
+                </a:lnTo>
+                <a:lnTo>
+                  <a:pt x="1958" y="793"/>
+                </a:lnTo>
+                <a:lnTo>
+                  <a:pt x="1902" y="681"/>
+                </a:lnTo>
+                <a:lnTo>
+                  <a:pt x="1890" y="668"/>
+                </a:lnTo>
+                <a:lnTo>
+                  <a:pt x="1877" y="654"/>
+                </a:lnTo>
+                <a:lnTo>
+                  <a:pt x="1865" y="641"/>
+                </a:lnTo>
+                <a:lnTo>
+                  <a:pt x="1851" y="628"/>
+                </a:lnTo>
+                <a:lnTo>
+                  <a:pt x="1838" y="617"/>
+                </a:lnTo>
+                <a:lnTo>
+                  <a:pt x="1823" y="605"/>
+                </a:lnTo>
+                <a:lnTo>
+                  <a:pt x="1808" y="594"/>
+                </a:lnTo>
+                <a:lnTo>
+                  <a:pt x="1793" y="583"/>
+                </a:lnTo>
+                <a:lnTo>
+                  <a:pt x="1777" y="574"/>
+                </a:lnTo>
+                <a:lnTo>
+                  <a:pt x="1761" y="564"/>
+                </a:lnTo>
+                <a:lnTo>
+                  <a:pt x="1745" y="555"/>
+                </a:lnTo>
+                <a:lnTo>
+                  <a:pt x="1729" y="546"/>
+                </a:lnTo>
+                <a:lnTo>
+                  <a:pt x="1712" y="539"/>
+                </a:lnTo>
+                <a:lnTo>
+                  <a:pt x="1695" y="531"/>
+                </a:lnTo>
+                <a:lnTo>
+                  <a:pt x="1678" y="524"/>
+                </a:lnTo>
+                <a:lnTo>
+                  <a:pt x="1661" y="518"/>
+                </a:lnTo>
+                <a:lnTo>
+                  <a:pt x="1650" y="513"/>
+                </a:lnTo>
+                <a:lnTo>
+                  <a:pt x="1638" y="510"/>
+                </a:lnTo>
+                <a:lnTo>
+                  <a:pt x="1626" y="507"/>
+                </a:lnTo>
+                <a:lnTo>
+                  <a:pt x="1614" y="504"/>
+                </a:lnTo>
+                <a:lnTo>
+                  <a:pt x="1603" y="501"/>
+                </a:lnTo>
+                <a:lnTo>
+                  <a:pt x="1590" y="498"/>
+                </a:lnTo>
+                <a:lnTo>
+                  <a:pt x="1579" y="495"/>
+                </a:lnTo>
+                <a:lnTo>
+                  <a:pt x="1567" y="493"/>
+                </a:lnTo>
+                <a:lnTo>
+                  <a:pt x="1554" y="491"/>
+                </a:lnTo>
+                <a:lnTo>
+                  <a:pt x="1543" y="490"/>
+                </a:lnTo>
+                <a:lnTo>
+                  <a:pt x="1530" y="488"/>
+                </a:lnTo>
+                <a:lnTo>
+                  <a:pt x="1518" y="487"/>
+                </a:lnTo>
+                <a:lnTo>
+                  <a:pt x="1506" y="486"/>
+                </a:lnTo>
+                <a:lnTo>
+                  <a:pt x="1494" y="486"/>
+                </a:lnTo>
+                <a:lnTo>
+                  <a:pt x="1481" y="485"/>
+                </a:lnTo>
+                <a:lnTo>
+                  <a:pt x="1469" y="485"/>
+                </a:lnTo>
+                <a:lnTo>
+                  <a:pt x="1466" y="470"/>
+                </a:lnTo>
+                <a:lnTo>
+                  <a:pt x="1461" y="450"/>
+                </a:lnTo>
+                <a:lnTo>
+                  <a:pt x="1453" y="429"/>
+                </a:lnTo>
+                <a:lnTo>
+                  <a:pt x="1446" y="410"/>
+                </a:lnTo>
+                <a:lnTo>
+                  <a:pt x="1379" y="410"/>
+                </a:lnTo>
+                <a:lnTo>
+                  <a:pt x="1383" y="420"/>
+                </a:lnTo>
+                <a:lnTo>
+                  <a:pt x="1388" y="431"/>
+                </a:lnTo>
+                <a:lnTo>
+                  <a:pt x="1394" y="442"/>
+                </a:lnTo>
+                <a:lnTo>
+                  <a:pt x="1399" y="453"/>
+                </a:lnTo>
+                <a:lnTo>
+                  <a:pt x="1405" y="465"/>
+                </a:lnTo>
+                <a:lnTo>
+                  <a:pt x="1411" y="475"/>
+                </a:lnTo>
+                <a:lnTo>
+                  <a:pt x="1415" y="484"/>
+                </a:lnTo>
+                <a:lnTo>
+                  <a:pt x="1421" y="492"/>
+                </a:lnTo>
+                <a:lnTo>
+                  <a:pt x="1408" y="493"/>
+                </a:lnTo>
+                <a:lnTo>
+                  <a:pt x="1396" y="494"/>
+                </a:lnTo>
+                <a:lnTo>
+                  <a:pt x="1383" y="496"/>
+                </a:lnTo>
+                <a:lnTo>
+                  <a:pt x="1370" y="499"/>
+                </a:lnTo>
+                <a:lnTo>
+                  <a:pt x="1356" y="501"/>
+                </a:lnTo>
+                <a:lnTo>
+                  <a:pt x="1343" y="503"/>
+                </a:lnTo>
+                <a:lnTo>
+                  <a:pt x="1331" y="506"/>
+                </a:lnTo>
+                <a:lnTo>
+                  <a:pt x="1318" y="509"/>
+                </a:lnTo>
+                <a:lnTo>
+                  <a:pt x="1315" y="474"/>
+                </a:lnTo>
+                <a:lnTo>
+                  <a:pt x="1313" y="431"/>
+                </a:lnTo>
+                <a:lnTo>
+                  <a:pt x="1312" y="393"/>
+                </a:lnTo>
+                <a:lnTo>
+                  <a:pt x="1312" y="377"/>
+                </a:lnTo>
+                <a:lnTo>
+                  <a:pt x="1359" y="370"/>
+                </a:lnTo>
+                <a:lnTo>
+                  <a:pt x="1364" y="379"/>
+                </a:lnTo>
+                <a:lnTo>
+                  <a:pt x="1370" y="389"/>
+                </a:lnTo>
+                <a:lnTo>
+                  <a:pt x="1374" y="399"/>
+                </a:lnTo>
+                <a:lnTo>
+                  <a:pt x="1379" y="410"/>
+                </a:lnTo>
+                <a:lnTo>
+                  <a:pt x="1446" y="410"/>
+                </a:lnTo>
+                <a:lnTo>
+                  <a:pt x="1439" y="394"/>
+                </a:lnTo>
+                <a:lnTo>
+                  <a:pt x="1433" y="379"/>
+                </a:lnTo>
+                <a:lnTo>
+                  <a:pt x="1427" y="366"/>
+                </a:lnTo>
+                <a:lnTo>
+                  <a:pt x="1421" y="353"/>
+                </a:lnTo>
+                <a:lnTo>
+                  <a:pt x="1416" y="342"/>
+                </a:lnTo>
+                <a:lnTo>
+                  <a:pt x="1413" y="335"/>
+                </a:lnTo>
+                <a:lnTo>
+                  <a:pt x="1411" y="330"/>
+                </a:lnTo>
+                <a:lnTo>
+                  <a:pt x="1409" y="328"/>
+                </a:lnTo>
+                <a:lnTo>
+                  <a:pt x="1409" y="326"/>
+                </a:lnTo>
+                <a:lnTo>
+                  <a:pt x="1409" y="326"/>
+                </a:lnTo>
+                <a:lnTo>
+                  <a:pt x="1409" y="326"/>
+                </a:lnTo>
+                <a:lnTo>
+                  <a:pt x="1408" y="325"/>
+                </a:lnTo>
+                <a:lnTo>
+                  <a:pt x="1405" y="321"/>
+                </a:lnTo>
+                <a:lnTo>
+                  <a:pt x="1400" y="318"/>
+                </a:lnTo>
+                <a:lnTo>
+                  <a:pt x="1394" y="316"/>
+                </a:lnTo>
+                <a:lnTo>
+                  <a:pt x="1387" y="315"/>
+                </a:lnTo>
+                <a:lnTo>
+                  <a:pt x="1379" y="316"/>
+                </a:lnTo>
+                <a:lnTo>
+                  <a:pt x="1371" y="317"/>
+                </a:lnTo>
+                <a:lnTo>
+                  <a:pt x="1363" y="319"/>
+                </a:lnTo>
+                <a:lnTo>
+                  <a:pt x="1356" y="321"/>
+                </a:lnTo>
+                <a:lnTo>
+                  <a:pt x="1354" y="298"/>
+                </a:lnTo>
+                <a:lnTo>
+                  <a:pt x="1350" y="275"/>
+                </a:lnTo>
+                <a:lnTo>
+                  <a:pt x="1345" y="254"/>
+                </a:lnTo>
+                <a:lnTo>
+                  <a:pt x="1338" y="232"/>
+                </a:lnTo>
+                <a:lnTo>
+                  <a:pt x="1329" y="211"/>
+                </a:lnTo>
+                <a:lnTo>
+                  <a:pt x="1320" y="192"/>
+                </a:lnTo>
+                <a:lnTo>
+                  <a:pt x="1309" y="173"/>
+                </a:lnTo>
+                <a:lnTo>
+                  <a:pt x="1297" y="155"/>
+                </a:lnTo>
+                <a:lnTo>
+                  <a:pt x="1283" y="138"/>
+                </a:lnTo>
+                <a:lnTo>
+                  <a:pt x="1269" y="123"/>
+                </a:lnTo>
+                <a:lnTo>
+                  <a:pt x="1255" y="108"/>
+                </a:lnTo>
+                <a:lnTo>
+                  <a:pt x="1239" y="93"/>
+                </a:lnTo>
+                <a:lnTo>
+                  <a:pt x="1222" y="79"/>
+                </a:lnTo>
+                <a:lnTo>
+                  <a:pt x="1203" y="68"/>
+                </a:lnTo>
+                <a:lnTo>
+                  <a:pt x="1185" y="56"/>
+                </a:lnTo>
+                <a:lnTo>
+                  <a:pt x="1166" y="46"/>
+                </a:lnTo>
+                <a:lnTo>
+                  <a:pt x="1154" y="40"/>
+                </a:lnTo>
+                <a:lnTo>
+                  <a:pt x="1142" y="34"/>
+                </a:lnTo>
+                <a:lnTo>
+                  <a:pt x="1129" y="30"/>
+                </a:lnTo>
+                <a:lnTo>
+                  <a:pt x="1117" y="24"/>
+                </a:lnTo>
+                <a:lnTo>
+                  <a:pt x="1104" y="20"/>
+                </a:lnTo>
+                <a:lnTo>
+                  <a:pt x="1092" y="16"/>
+                </a:lnTo>
+                <a:lnTo>
+                  <a:pt x="1079" y="13"/>
+                </a:lnTo>
+                <a:lnTo>
+                  <a:pt x="1067" y="10"/>
+                </a:lnTo>
+                <a:lnTo>
+                  <a:pt x="1053" y="8"/>
+                </a:lnTo>
+                <a:lnTo>
+                  <a:pt x="1041" y="4"/>
+                </a:lnTo>
+                <a:lnTo>
+                  <a:pt x="1027" y="3"/>
+                </a:lnTo>
+                <a:lnTo>
+                  <a:pt x="1014" y="1"/>
+                </a:lnTo>
+                <a:lnTo>
+                  <a:pt x="1001" y="0"/>
+                </a:lnTo>
+                <a:lnTo>
+                  <a:pt x="987" y="0"/>
+                </a:lnTo>
+                <a:lnTo>
+                  <a:pt x="975" y="0"/>
+                </a:lnTo>
+                <a:lnTo>
+                  <a:pt x="961" y="0"/>
+                </a:lnTo>
+                <a:lnTo>
+                  <a:pt x="942" y="1"/>
+                </a:lnTo>
+                <a:lnTo>
+                  <a:pt x="922" y="2"/>
+                </a:lnTo>
+                <a:lnTo>
+                  <a:pt x="903" y="5"/>
+                </a:lnTo>
+                <a:lnTo>
+                  <a:pt x="883" y="8"/>
+                </a:lnTo>
+                <a:lnTo>
+                  <a:pt x="863" y="12"/>
+                </a:lnTo>
+                <a:lnTo>
+                  <a:pt x="844" y="16"/>
+                </a:lnTo>
+                <a:lnTo>
+                  <a:pt x="824" y="20"/>
+                </a:lnTo>
+                <a:lnTo>
+                  <a:pt x="805" y="26"/>
+                </a:lnTo>
+                <a:lnTo>
+                  <a:pt x="786" y="32"/>
+                </a:lnTo>
+                <a:lnTo>
+                  <a:pt x="766" y="38"/>
+                </a:lnTo>
+                <a:lnTo>
+                  <a:pt x="748" y="45"/>
+                </a:lnTo>
+                <a:lnTo>
+                  <a:pt x="729" y="52"/>
+                </a:lnTo>
+                <a:lnTo>
+                  <a:pt x="710" y="60"/>
+                </a:lnTo>
+                <a:lnTo>
+                  <a:pt x="691" y="69"/>
+                </a:lnTo>
+                <a:lnTo>
+                  <a:pt x="673" y="77"/>
+                </a:lnTo>
+                <a:lnTo>
+                  <a:pt x="655" y="87"/>
+                </a:lnTo>
+                <a:lnTo>
+                  <a:pt x="636" y="96"/>
+                </a:lnTo>
+                <a:lnTo>
+                  <a:pt x="619" y="106"/>
+                </a:lnTo>
+                <a:lnTo>
+                  <a:pt x="601" y="116"/>
+                </a:lnTo>
+                <a:lnTo>
+                  <a:pt x="584" y="127"/>
+                </a:lnTo>
+                <a:lnTo>
+                  <a:pt x="567" y="138"/>
+                </a:lnTo>
+                <a:lnTo>
+                  <a:pt x="550" y="150"/>
+                </a:lnTo>
+                <a:lnTo>
+                  <a:pt x="534" y="162"/>
+                </a:lnTo>
+                <a:lnTo>
+                  <a:pt x="518" y="173"/>
+                </a:lnTo>
+                <a:lnTo>
+                  <a:pt x="502" y="186"/>
+                </a:lnTo>
+                <a:lnTo>
+                  <a:pt x="486" y="199"/>
+                </a:lnTo>
+                <a:lnTo>
+                  <a:pt x="471" y="211"/>
+                </a:lnTo>
+                <a:lnTo>
+                  <a:pt x="457" y="224"/>
+                </a:lnTo>
+                <a:lnTo>
+                  <a:pt x="443" y="237"/>
+                </a:lnTo>
+                <a:lnTo>
+                  <a:pt x="429" y="250"/>
+                </a:lnTo>
+                <a:lnTo>
+                  <a:pt x="416" y="263"/>
+                </a:lnTo>
+                <a:lnTo>
+                  <a:pt x="403" y="277"/>
+                </a:lnTo>
+                <a:lnTo>
+                  <a:pt x="361" y="333"/>
+                </a:lnTo>
+                <a:lnTo>
+                  <a:pt x="332" y="392"/>
+                </a:lnTo>
+                <a:lnTo>
+                  <a:pt x="315" y="455"/>
+                </a:lnTo>
+                <a:lnTo>
+                  <a:pt x="310" y="520"/>
+                </a:lnTo>
+                <a:lnTo>
+                  <a:pt x="311" y="586"/>
+                </a:lnTo>
+                <a:lnTo>
+                  <a:pt x="321" y="652"/>
+                </a:lnTo>
+                <a:lnTo>
+                  <a:pt x="336" y="717"/>
+                </a:lnTo>
+                <a:lnTo>
+                  <a:pt x="355" y="781"/>
+                </a:lnTo>
+                <a:lnTo>
+                  <a:pt x="370" y="819"/>
+                </a:lnTo>
+                <a:lnTo>
+                  <a:pt x="387" y="854"/>
+                </a:lnTo>
+                <a:lnTo>
+                  <a:pt x="406" y="887"/>
+                </a:lnTo>
+                <a:lnTo>
+                  <a:pt x="427" y="920"/>
+                </a:lnTo>
+                <a:lnTo>
+                  <a:pt x="450" y="951"/>
+                </a:lnTo>
+                <a:lnTo>
+                  <a:pt x="474" y="980"/>
+                </a:lnTo>
+                <a:lnTo>
+                  <a:pt x="499" y="1010"/>
+                </a:lnTo>
+                <a:lnTo>
+                  <a:pt x="524" y="1038"/>
+                </a:lnTo>
+                <a:lnTo>
+                  <a:pt x="549" y="1067"/>
+                </a:lnTo>
+                <a:lnTo>
+                  <a:pt x="574" y="1096"/>
+                </a:lnTo>
+                <a:lnTo>
+                  <a:pt x="599" y="1125"/>
+                </a:lnTo>
+                <a:lnTo>
+                  <a:pt x="623" y="1155"/>
+                </a:lnTo>
+                <a:lnTo>
+                  <a:pt x="646" y="1187"/>
+                </a:lnTo>
+                <a:lnTo>
+                  <a:pt x="666" y="1220"/>
+                </a:lnTo>
+                <a:lnTo>
+                  <a:pt x="685" y="1254"/>
+                </a:lnTo>
+                <a:lnTo>
+                  <a:pt x="702" y="1291"/>
+                </a:lnTo>
+                <a:lnTo>
+                  <a:pt x="724" y="1383"/>
+                </a:lnTo>
+                <a:lnTo>
+                  <a:pt x="717" y="1452"/>
+                </a:lnTo>
+                <a:lnTo>
+                  <a:pt x="705" y="1471"/>
+                </a:lnTo>
+                <a:lnTo>
+                  <a:pt x="692" y="1493"/>
+                </a:lnTo>
+                <a:lnTo>
+                  <a:pt x="680" y="1519"/>
+                </a:lnTo>
+                <a:lnTo>
+                  <a:pt x="664" y="1544"/>
+                </a:lnTo>
+                <a:lnTo>
+                  <a:pt x="644" y="1569"/>
+                </a:lnTo>
+                <a:lnTo>
+                  <a:pt x="619" y="1591"/>
+                </a:lnTo>
+                <a:lnTo>
+                  <a:pt x="589" y="1609"/>
+                </a:lnTo>
+                <a:lnTo>
+                  <a:pt x="551" y="1622"/>
+                </a:lnTo>
+                <a:lnTo>
+                  <a:pt x="523" y="1626"/>
+                </a:lnTo>
+                <a:lnTo>
+                  <a:pt x="493" y="1631"/>
+                </a:lnTo>
+                <a:lnTo>
+                  <a:pt x="462" y="1635"/>
+                </a:lnTo>
+                <a:lnTo>
+                  <a:pt x="430" y="1638"/>
+                </a:lnTo>
+                <a:lnTo>
+                  <a:pt x="398" y="1641"/>
+                </a:lnTo>
+                <a:lnTo>
+                  <a:pt x="367" y="1643"/>
+                </a:lnTo>
+                <a:lnTo>
+                  <a:pt x="335" y="1643"/>
+                </a:lnTo>
+                <a:lnTo>
+                  <a:pt x="302" y="1643"/>
+                </a:lnTo>
+                <a:lnTo>
+                  <a:pt x="270" y="1641"/>
+                </a:lnTo>
+                <a:lnTo>
+                  <a:pt x="239" y="1637"/>
+                </a:lnTo>
+                <a:lnTo>
+                  <a:pt x="208" y="1631"/>
+                </a:lnTo>
+                <a:lnTo>
+                  <a:pt x="180" y="1623"/>
+                </a:lnTo>
+                <a:lnTo>
+                  <a:pt x="151" y="1613"/>
+                </a:lnTo>
+                <a:lnTo>
+                  <a:pt x="124" y="1600"/>
+                </a:lnTo>
+                <a:lnTo>
+                  <a:pt x="99" y="1584"/>
+                </a:lnTo>
+                <a:lnTo>
+                  <a:pt x="76" y="1566"/>
+                </a:lnTo>
+                <a:lnTo>
+                  <a:pt x="0" y="1613"/>
+                </a:lnTo>
+                <a:lnTo>
+                  <a:pt x="14" y="1626"/>
+                </a:lnTo>
+                <a:lnTo>
+                  <a:pt x="28" y="1640"/>
+                </a:lnTo>
+                <a:lnTo>
+                  <a:pt x="43" y="1652"/>
+                </a:lnTo>
+                <a:lnTo>
+                  <a:pt x="58" y="1662"/>
+                </a:lnTo>
+                <a:lnTo>
+                  <a:pt x="75" y="1673"/>
+                </a:lnTo>
+                <a:lnTo>
+                  <a:pt x="91" y="1681"/>
+                </a:lnTo>
+                <a:lnTo>
+                  <a:pt x="108" y="1690"/>
+                </a:lnTo>
+                <a:lnTo>
+                  <a:pt x="126" y="1697"/>
+                </a:lnTo>
+                <a:lnTo>
+                  <a:pt x="138" y="1701"/>
+                </a:lnTo>
+                <a:lnTo>
+                  <a:pt x="150" y="1706"/>
+                </a:lnTo>
+                <a:lnTo>
+                  <a:pt x="162" y="1709"/>
+                </a:lnTo>
+                <a:lnTo>
+                  <a:pt x="174" y="1713"/>
+                </a:lnTo>
+                <a:lnTo>
+                  <a:pt x="186" y="1716"/>
+                </a:lnTo>
+                <a:lnTo>
+                  <a:pt x="198" y="1718"/>
+                </a:lnTo>
+                <a:lnTo>
+                  <a:pt x="211" y="1721"/>
+                </a:lnTo>
+                <a:lnTo>
+                  <a:pt x="223" y="1723"/>
+                </a:lnTo>
+                <a:lnTo>
+                  <a:pt x="236" y="1725"/>
+                </a:lnTo>
+                <a:lnTo>
+                  <a:pt x="248" y="1727"/>
+                </a:lnTo>
+                <a:lnTo>
+                  <a:pt x="261" y="1728"/>
+                </a:lnTo>
+                <a:lnTo>
+                  <a:pt x="273" y="1729"/>
+                </a:lnTo>
+                <a:lnTo>
+                  <a:pt x="286" y="1730"/>
+                </a:lnTo>
+                <a:lnTo>
+                  <a:pt x="298" y="1731"/>
+                </a:lnTo>
+                <a:lnTo>
+                  <a:pt x="311" y="1731"/>
+                </a:lnTo>
+                <a:lnTo>
+                  <a:pt x="323" y="1731"/>
+                </a:lnTo>
+                <a:lnTo>
+                  <a:pt x="350" y="1731"/>
+                </a:lnTo>
+                <a:lnTo>
+                  <a:pt x="376" y="1731"/>
+                </a:lnTo>
+                <a:lnTo>
+                  <a:pt x="403" y="1730"/>
+                </a:lnTo>
+                <a:lnTo>
+                  <a:pt x="429" y="1729"/>
+                </a:lnTo>
+                <a:lnTo>
+                  <a:pt x="457" y="1727"/>
+                </a:lnTo>
+                <a:lnTo>
+                  <a:pt x="483" y="1725"/>
+                </a:lnTo>
+                <a:lnTo>
+                  <a:pt x="509" y="1720"/>
+                </a:lnTo>
+                <a:lnTo>
+                  <a:pt x="535" y="1715"/>
+                </a:lnTo>
+                <a:lnTo>
+                  <a:pt x="560" y="1709"/>
+                </a:lnTo>
+                <a:lnTo>
+                  <a:pt x="586" y="1700"/>
+                </a:lnTo>
+                <a:lnTo>
+                  <a:pt x="610" y="1691"/>
+                </a:lnTo>
+                <a:lnTo>
+                  <a:pt x="634" y="1679"/>
+                </a:lnTo>
+                <a:lnTo>
+                  <a:pt x="658" y="1665"/>
+                </a:lnTo>
+                <a:lnTo>
+                  <a:pt x="680" y="1650"/>
+                </a:lnTo>
+                <a:lnTo>
+                  <a:pt x="701" y="1632"/>
+                </a:lnTo>
+                <a:lnTo>
+                  <a:pt x="722" y="1610"/>
+                </a:lnTo>
+                <a:lnTo>
+                  <a:pt x="804" y="1483"/>
+                </a:lnTo>
+                <a:lnTo>
+                  <a:pt x="814" y="1445"/>
+                </a:lnTo>
+                <a:lnTo>
+                  <a:pt x="819" y="1410"/>
+                </a:lnTo>
+                <a:lnTo>
+                  <a:pt x="819" y="1378"/>
+                </a:lnTo>
+                <a:lnTo>
+                  <a:pt x="815" y="1351"/>
+                </a:lnTo>
+                <a:lnTo>
+                  <a:pt x="809" y="1329"/>
+                </a:lnTo>
+                <a:lnTo>
+                  <a:pt x="804" y="1312"/>
+                </a:lnTo>
+                <a:lnTo>
+                  <a:pt x="800" y="1301"/>
+                </a:lnTo>
+                <a:lnTo>
+                  <a:pt x="798" y="1297"/>
+                </a:lnTo>
+                <a:lnTo>
+                  <a:pt x="787" y="1273"/>
+                </a:lnTo>
+                <a:lnTo>
+                  <a:pt x="775" y="1249"/>
+                </a:lnTo>
+                <a:lnTo>
+                  <a:pt x="764" y="1225"/>
+                </a:lnTo>
+                <a:lnTo>
+                  <a:pt x="751" y="1202"/>
+                </a:lnTo>
+                <a:lnTo>
+                  <a:pt x="739" y="1178"/>
+                </a:lnTo>
+                <a:lnTo>
+                  <a:pt x="726" y="1154"/>
+                </a:lnTo>
+                <a:lnTo>
+                  <a:pt x="714" y="1131"/>
+                </a:lnTo>
+                <a:lnTo>
+                  <a:pt x="700" y="1108"/>
+                </a:lnTo>
+                <a:lnTo>
+                  <a:pt x="687" y="1086"/>
+                </a:lnTo>
+                <a:lnTo>
+                  <a:pt x="673" y="1062"/>
+                </a:lnTo>
+                <a:lnTo>
+                  <a:pt x="658" y="1040"/>
+                </a:lnTo>
+                <a:lnTo>
+                  <a:pt x="643" y="1018"/>
+                </a:lnTo>
+                <a:lnTo>
+                  <a:pt x="628" y="996"/>
+                </a:lnTo>
+                <a:lnTo>
+                  <a:pt x="613" y="974"/>
+                </a:lnTo>
+                <a:lnTo>
+                  <a:pt x="595" y="952"/>
+                </a:lnTo>
+                <a:lnTo>
+                  <a:pt x="578" y="929"/>
+                </a:lnTo>
+                <a:lnTo>
+                  <a:pt x="548" y="888"/>
+                </a:lnTo>
+                <a:lnTo>
+                  <a:pt x="520" y="847"/>
+                </a:lnTo>
+                <a:lnTo>
+                  <a:pt x="495" y="805"/>
+                </a:lnTo>
+                <a:lnTo>
+                  <a:pt x="474" y="764"/>
+                </a:lnTo>
+                <a:lnTo>
+                  <a:pt x="455" y="721"/>
+                </a:lnTo>
+                <a:lnTo>
+                  <a:pt x="441" y="679"/>
+                </a:lnTo>
+                <a:lnTo>
+                  <a:pt x="428" y="639"/>
+                </a:lnTo>
+                <a:lnTo>
+                  <a:pt x="419" y="599"/>
+                </a:lnTo>
+                <a:lnTo>
+                  <a:pt x="413" y="560"/>
+                </a:lnTo>
+                <a:lnTo>
+                  <a:pt x="410" y="523"/>
+                </a:lnTo>
+                <a:lnTo>
+                  <a:pt x="410" y="488"/>
+                </a:lnTo>
+                <a:lnTo>
+                  <a:pt x="412" y="455"/>
+                </a:lnTo>
+                <a:lnTo>
+                  <a:pt x="419" y="425"/>
+                </a:lnTo>
+                <a:lnTo>
+                  <a:pt x="427" y="397"/>
+                </a:lnTo>
+                <a:lnTo>
+                  <a:pt x="439" y="373"/>
+                </a:lnTo>
+                <a:lnTo>
+                  <a:pt x="454" y="352"/>
+                </a:lnTo>
+                <a:lnTo>
+                  <a:pt x="476" y="328"/>
+                </a:lnTo>
+                <a:lnTo>
+                  <a:pt x="498" y="304"/>
+                </a:lnTo>
+                <a:lnTo>
+                  <a:pt x="521" y="281"/>
+                </a:lnTo>
+                <a:lnTo>
+                  <a:pt x="546" y="258"/>
+                </a:lnTo>
+                <a:lnTo>
+                  <a:pt x="573" y="236"/>
+                </a:lnTo>
+                <a:lnTo>
+                  <a:pt x="600" y="215"/>
+                </a:lnTo>
+                <a:lnTo>
+                  <a:pt x="628" y="193"/>
+                </a:lnTo>
+                <a:lnTo>
+                  <a:pt x="658" y="174"/>
+                </a:lnTo>
+                <a:lnTo>
+                  <a:pt x="688" y="155"/>
+                </a:lnTo>
+                <a:lnTo>
+                  <a:pt x="718" y="138"/>
+                </a:lnTo>
+                <a:lnTo>
+                  <a:pt x="750" y="124"/>
+                </a:lnTo>
+                <a:lnTo>
+                  <a:pt x="783" y="110"/>
+                </a:lnTo>
+                <a:lnTo>
+                  <a:pt x="816" y="98"/>
+                </a:lnTo>
+                <a:lnTo>
+                  <a:pt x="849" y="89"/>
+                </a:lnTo>
+                <a:lnTo>
+                  <a:pt x="883" y="81"/>
+                </a:lnTo>
+                <a:lnTo>
+                  <a:pt x="918" y="76"/>
+                </a:lnTo>
+                <a:lnTo>
+                  <a:pt x="939" y="74"/>
+                </a:lnTo>
+                <a:lnTo>
+                  <a:pt x="961" y="74"/>
+                </a:lnTo>
+                <a:lnTo>
+                  <a:pt x="981" y="74"/>
+                </a:lnTo>
+                <a:lnTo>
+                  <a:pt x="1003" y="76"/>
+                </a:lnTo>
+                <a:lnTo>
+                  <a:pt x="1024" y="80"/>
+                </a:lnTo>
+                <a:lnTo>
+                  <a:pt x="1044" y="85"/>
+                </a:lnTo>
+                <a:lnTo>
+                  <a:pt x="1063" y="91"/>
+                </a:lnTo>
+                <a:lnTo>
+                  <a:pt x="1083" y="98"/>
+                </a:lnTo>
+                <a:lnTo>
+                  <a:pt x="1101" y="107"/>
+                </a:lnTo>
+                <a:lnTo>
+                  <a:pt x="1119" y="115"/>
+                </a:lnTo>
+                <a:lnTo>
+                  <a:pt x="1137" y="126"/>
+                </a:lnTo>
+                <a:lnTo>
+                  <a:pt x="1154" y="136"/>
+                </a:lnTo>
+                <a:lnTo>
+                  <a:pt x="1170" y="148"/>
+                </a:lnTo>
+                <a:lnTo>
+                  <a:pt x="1186" y="161"/>
+                </a:lnTo>
+                <a:lnTo>
+                  <a:pt x="1200" y="174"/>
+                </a:lnTo>
+                <a:lnTo>
+                  <a:pt x="1215" y="188"/>
+                </a:lnTo>
+                <a:lnTo>
+                  <a:pt x="1227" y="204"/>
+                </a:lnTo>
+                <a:lnTo>
+                  <a:pt x="1240" y="220"/>
+                </a:lnTo>
+                <a:lnTo>
+                  <a:pt x="1250" y="236"/>
+                </a:lnTo>
+                <a:lnTo>
+                  <a:pt x="1260" y="253"/>
+                </a:lnTo>
+                <a:lnTo>
+                  <a:pt x="1269" y="270"/>
+                </a:lnTo>
+                <a:lnTo>
+                  <a:pt x="1277" y="288"/>
+                </a:lnTo>
+                <a:lnTo>
+                  <a:pt x="1283" y="307"/>
+                </a:lnTo>
+                <a:lnTo>
+                  <a:pt x="1289" y="326"/>
+                </a:lnTo>
+                <a:lnTo>
+                  <a:pt x="1252" y="351"/>
+                </a:lnTo>
+                <a:lnTo>
+                  <a:pt x="1249" y="392"/>
+                </a:lnTo>
+                <a:lnTo>
+                  <a:pt x="1251" y="438"/>
+                </a:lnTo>
+                <a:lnTo>
+                  <a:pt x="1256" y="484"/>
+                </a:lnTo>
+                <a:lnTo>
+                  <a:pt x="1261" y="525"/>
+                </a:lnTo>
+                <a:lnTo>
+                  <a:pt x="1240" y="534"/>
+                </a:lnTo>
+                <a:lnTo>
+                  <a:pt x="1218" y="545"/>
+                </a:lnTo>
+                <a:lnTo>
+                  <a:pt x="1198" y="558"/>
+                </a:lnTo>
+                <a:lnTo>
+                  <a:pt x="1178" y="570"/>
+                </a:lnTo>
+                <a:lnTo>
+                  <a:pt x="1159" y="584"/>
+                </a:lnTo>
+                <a:lnTo>
+                  <a:pt x="1141" y="599"/>
+                </a:lnTo>
+                <a:lnTo>
+                  <a:pt x="1123" y="615"/>
+                </a:lnTo>
+                <a:lnTo>
+                  <a:pt x="1105" y="632"/>
+                </a:lnTo>
+                <a:lnTo>
+                  <a:pt x="1090" y="649"/>
+                </a:lnTo>
+                <a:lnTo>
+                  <a:pt x="1075" y="668"/>
+                </a:lnTo>
+                <a:lnTo>
+                  <a:pt x="1061" y="685"/>
+                </a:lnTo>
+                <a:lnTo>
+                  <a:pt x="1049" y="704"/>
+                </a:lnTo>
+                <a:lnTo>
+                  <a:pt x="1036" y="725"/>
+                </a:lnTo>
+                <a:lnTo>
+                  <a:pt x="1026" y="746"/>
+                </a:lnTo>
+                <a:lnTo>
+                  <a:pt x="1017" y="767"/>
+                </a:lnTo>
+                <a:lnTo>
+                  <a:pt x="1009" y="788"/>
+                </a:lnTo>
+                <a:lnTo>
+                  <a:pt x="989" y="850"/>
+                </a:lnTo>
+                <a:lnTo>
+                  <a:pt x="973" y="913"/>
+                </a:lnTo>
+                <a:lnTo>
+                  <a:pt x="963" y="973"/>
+                </a:lnTo>
+                <a:lnTo>
+                  <a:pt x="956" y="1033"/>
+                </a:lnTo>
+                <a:lnTo>
+                  <a:pt x="954" y="1094"/>
+                </a:lnTo>
+                <a:lnTo>
+                  <a:pt x="956" y="1155"/>
+                </a:lnTo>
+                <a:lnTo>
+                  <a:pt x="963" y="1218"/>
+                </a:lnTo>
+                <a:lnTo>
+                  <a:pt x="976" y="1282"/>
+                </a:lnTo>
+                <a:lnTo>
+                  <a:pt x="976" y="1288"/>
+                </a:lnTo>
+                <a:lnTo>
+                  <a:pt x="979" y="1304"/>
+                </a:lnTo>
+                <a:lnTo>
+                  <a:pt x="986" y="1327"/>
+                </a:lnTo>
+                <a:lnTo>
+                  <a:pt x="995" y="1357"/>
+                </a:lnTo>
+                <a:lnTo>
+                  <a:pt x="1006" y="1393"/>
+                </a:lnTo>
+                <a:lnTo>
+                  <a:pt x="1020" y="1433"/>
+                </a:lnTo>
+                <a:lnTo>
+                  <a:pt x="1036" y="1477"/>
+                </a:lnTo>
+                <a:lnTo>
+                  <a:pt x="1053" y="1524"/>
+                </a:lnTo>
+                <a:lnTo>
+                  <a:pt x="1071" y="1571"/>
+                </a:lnTo>
+                <a:lnTo>
+                  <a:pt x="1091" y="1620"/>
+                </a:lnTo>
+                <a:lnTo>
+                  <a:pt x="1110" y="1667"/>
+                </a:lnTo>
+                <a:lnTo>
+                  <a:pt x="1132" y="1714"/>
+                </a:lnTo>
+                <a:lnTo>
+                  <a:pt x="1152" y="1757"/>
+                </a:lnTo>
+                <a:lnTo>
+                  <a:pt x="1174" y="1796"/>
+                </a:lnTo>
+                <a:lnTo>
+                  <a:pt x="1194" y="1831"/>
+                </a:lnTo>
+                <a:lnTo>
+                  <a:pt x="1215" y="1861"/>
+                </a:lnTo>
+                <a:lnTo>
+                  <a:pt x="1227" y="1888"/>
+                </a:lnTo>
+                <a:lnTo>
+                  <a:pt x="1247" y="1925"/>
+                </a:lnTo>
+                <a:lnTo>
+                  <a:pt x="1271" y="1969"/>
+                </a:lnTo>
+                <a:lnTo>
+                  <a:pt x="1297" y="2015"/>
+                </a:lnTo>
+                <a:lnTo>
+                  <a:pt x="1322" y="2058"/>
+                </a:lnTo>
+                <a:lnTo>
+                  <a:pt x="1346" y="2094"/>
+                </a:lnTo>
+                <a:lnTo>
+                  <a:pt x="1365" y="2118"/>
+                </a:lnTo>
+                <a:lnTo>
+                  <a:pt x="1378" y="2127"/>
+                </a:lnTo>
+                <a:lnTo>
+                  <a:pt x="1947" y="1961"/>
+                </a:lnTo>
+                <a:lnTo>
+                  <a:pt x="1950" y="1923"/>
+                </a:lnTo>
+                <a:lnTo>
+                  <a:pt x="1955" y="1883"/>
+                </a:lnTo>
+                <a:lnTo>
+                  <a:pt x="1960" y="1843"/>
+                </a:lnTo>
+                <a:lnTo>
+                  <a:pt x="1965" y="1802"/>
+                </a:lnTo>
+                <a:lnTo>
+                  <a:pt x="1971" y="1759"/>
+                </a:lnTo>
+                <a:lnTo>
+                  <a:pt x="1976" y="1718"/>
+                </a:lnTo>
+                <a:lnTo>
+                  <a:pt x="1983" y="1678"/>
+                </a:lnTo>
+                <a:lnTo>
+                  <a:pt x="1989" y="1639"/>
+                </a:lnTo>
+                <a:lnTo>
+                  <a:pt x="1891" y="1639"/>
+                </a:lnTo>
+                <a:close/>
+              </a:path>
+            </a:pathLst>
+          </a:custGeom>
+          <a:solidFill>
+            <a:schemeClr val="bg1">
+              <a:lumMod val="65000"/>
+            </a:schemeClr>
+          </a:solidFill>
+          <a:ln w="9525">
+            <a:solidFill>
+              <a:schemeClr val="bg1">
+                <a:lumMod val="65000"/>
+              </a:schemeClr>
+            </a:solidFill>
+            <a:round/>
+            <a:headEnd/>
+            <a:tailEnd/>
+          </a:ln>
+        </p:spPr>
+        <p:txBody>
+          <a:bodyPr vert="horz" wrap="square" lIns="91440" tIns="45720" rIns="91440" bIns="45720" numCol="1" anchor="t" anchorCtr="0" compatLnSpc="1">
+            <a:prstTxWarp prst="textNoShape">
+              <a:avLst/>
+            </a:prstTxWarp>
+          </a:bodyPr>
+          <a:lstStyle/>
+          <a:p>
+            <a:endParaRPr lang="en-SG"/>
+          </a:p>
+        </p:txBody>
+      </p:sp>
+      <p:sp>
+        <p:nvSpPr>
+          <p:cNvPr id="172" name="Freeform 10"/>
+          <p:cNvSpPr>
+            <a:spLocks/>
+          </p:cNvSpPr>
+          <p:nvPr/>
+        </p:nvSpPr>
+        <p:spPr bwMode="auto">
+          <a:xfrm>
+            <a:off x="6469063" y="1939646"/>
+            <a:ext cx="0" cy="1588"/>
+          </a:xfrm>
+          <a:custGeom>
+            <a:avLst/>
+            <a:gdLst>
+              <a:gd name="T0" fmla="*/ 2 w 2"/>
+              <a:gd name="T1" fmla="*/ 0 h 3"/>
+              <a:gd name="T2" fmla="*/ 0 w 2"/>
+              <a:gd name="T3" fmla="*/ 3 h 3"/>
+              <a:gd name="T4" fmla="*/ 0 w 2"/>
+              <a:gd name="T5" fmla="*/ 3 h 3"/>
+              <a:gd name="T6" fmla="*/ 0 w 2"/>
+              <a:gd name="T7" fmla="*/ 3 h 3"/>
+              <a:gd name="T8" fmla="*/ 0 w 2"/>
+              <a:gd name="T9" fmla="*/ 3 h 3"/>
+              <a:gd name="T10" fmla="*/ 0 w 2"/>
+              <a:gd name="T11" fmla="*/ 3 h 3"/>
+              <a:gd name="T12" fmla="*/ 2 w 2"/>
+              <a:gd name="T13" fmla="*/ 0 h 3"/>
+            </a:gdLst>
+            <a:ahLst/>
+            <a:cxnLst>
+              <a:cxn ang="0">
+                <a:pos x="T0" y="T1"/>
+              </a:cxn>
+              <a:cxn ang="0">
+                <a:pos x="T2" y="T3"/>
+              </a:cxn>
+              <a:cxn ang="0">
+                <a:pos x="T4" y="T5"/>
+              </a:cxn>
+              <a:cxn ang="0">
+                <a:pos x="T6" y="T7"/>
+              </a:cxn>
+              <a:cxn ang="0">
+                <a:pos x="T8" y="T9"/>
+              </a:cxn>
+              <a:cxn ang="0">
+                <a:pos x="T10" y="T11"/>
+              </a:cxn>
+              <a:cxn ang="0">
+                <a:pos x="T12" y="T13"/>
+              </a:cxn>
+            </a:cxnLst>
+            <a:rect l="0" t="0" r="r" b="b"/>
+            <a:pathLst>
+              <a:path w="2" h="3">
+                <a:moveTo>
+                  <a:pt x="2" y="0"/>
+                </a:moveTo>
+                <a:lnTo>
+                  <a:pt x="0" y="3"/>
+                </a:lnTo>
+                <a:lnTo>
+                  <a:pt x="0" y="3"/>
+                </a:lnTo>
+                <a:lnTo>
+                  <a:pt x="0" y="3"/>
+                </a:lnTo>
+                <a:lnTo>
+                  <a:pt x="0" y="3"/>
+                </a:lnTo>
+                <a:lnTo>
+                  <a:pt x="0" y="3"/>
+                </a:lnTo>
+                <a:lnTo>
+                  <a:pt x="2" y="0"/>
+                </a:lnTo>
+                <a:close/>
+              </a:path>
+            </a:pathLst>
+          </a:custGeom>
+          <a:solidFill>
+            <a:srgbClr val="000000"/>
+          </a:solidFill>
+          <a:ln>
+            <a:noFill/>
+          </a:ln>
+          <a:extLst>
+            <a:ext uri="{91240B29-F687-4F45-9708-019B960494DF}">
+              <a14:hiddenLine xmlns:a14="http://schemas.microsoft.com/office/drawing/2010/main" w="9525">
+                <a:solidFill>
+                  <a:srgbClr val="000000"/>
+                </a:solidFill>
+                <a:round/>
+                <a:headEnd/>
+                <a:tailEnd/>
+              </a14:hiddenLine>
+            </a:ext>
+          </a:extLst>
+        </p:spPr>
+        <p:txBody>
+          <a:bodyPr vert="horz" wrap="square" lIns="91440" tIns="45720" rIns="91440" bIns="45720" numCol="1" anchor="t" anchorCtr="0" compatLnSpc="1">
+            <a:prstTxWarp prst="textNoShape">
+              <a:avLst/>
+            </a:prstTxWarp>
+          </a:bodyPr>
+          <a:lstStyle/>
+          <a:p>
+            <a:endParaRPr lang="en-SG"/>
+          </a:p>
+        </p:txBody>
+      </p:sp>
+      <p:grpSp>
+        <p:nvGrpSpPr>
+          <p:cNvPr id="173" name="Group 172"/>
+          <p:cNvGrpSpPr/>
+          <p:nvPr/>
+        </p:nvGrpSpPr>
+        <p:grpSpPr>
+          <a:xfrm>
+            <a:off x="5622925" y="1287462"/>
+            <a:ext cx="298983" cy="520531"/>
+            <a:chOff x="638861" y="309422"/>
+            <a:chExt cx="298983" cy="520531"/>
+          </a:xfrm>
+        </p:grpSpPr>
+        <p:sp>
+          <p:nvSpPr>
+            <p:cNvPr id="174" name="Flowchart: Connector 173"/>
+            <p:cNvSpPr/>
+            <p:nvPr/>
+          </p:nvSpPr>
+          <p:spPr>
+            <a:xfrm>
+              <a:off x="678021" y="309422"/>
+              <a:ext cx="220662" cy="220662"/>
+            </a:xfrm>
+            <a:prstGeom prst="flowChartConnector">
+              <a:avLst/>
+            </a:prstGeom>
+            <a:solidFill>
+              <a:schemeClr val="bg1"/>
+            </a:solidFill>
+          </p:spPr>
+          <p:style>
+            <a:lnRef idx="2">
+              <a:schemeClr val="accent1">
+                <a:shade val="50000"/>
+              </a:schemeClr>
+            </a:lnRef>
+            <a:fillRef idx="1">
+              <a:schemeClr val="accent1"/>
+            </a:fillRef>
+            <a:effectRef idx="0">
+              <a:schemeClr val="accent1"/>
+            </a:effectRef>
+            <a:fontRef idx="minor">
+              <a:schemeClr val="lt1"/>
+            </a:fontRef>
+          </p:style>
+          <p:txBody>
+            <a:bodyPr rtlCol="0" anchor="ctr"/>
+            <a:lstStyle/>
+            <a:p>
+              <a:pPr algn="ctr"/>
+              <a:endParaRPr lang="en-SG"/>
+            </a:p>
+          </p:txBody>
+        </p:sp>
+        <p:grpSp>
+          <p:nvGrpSpPr>
+            <p:cNvPr id="175" name="Group 174"/>
+            <p:cNvGrpSpPr/>
+            <p:nvPr/>
+          </p:nvGrpSpPr>
+          <p:grpSpPr>
+            <a:xfrm>
+              <a:off x="638861" y="549600"/>
+              <a:ext cx="298983" cy="280353"/>
+              <a:chOff x="638861" y="549600"/>
+              <a:chExt cx="298983" cy="280353"/>
+            </a:xfrm>
+          </p:grpSpPr>
+          <p:sp>
+            <p:nvSpPr>
+              <p:cNvPr id="178" name="Flowchart: Delay 177"/>
+              <p:cNvSpPr/>
+              <p:nvPr/>
+            </p:nvSpPr>
+            <p:spPr>
+              <a:xfrm rot="16200000">
+                <a:off x="648176" y="540285"/>
+                <a:ext cx="280353" cy="298983"/>
+              </a:xfrm>
+              <a:prstGeom prst="flowChartDelay">
+                <a:avLst/>
+              </a:prstGeom>
+              <a:solidFill>
+                <a:schemeClr val="bg1"/>
+              </a:solidFill>
+            </p:spPr>
+            <p:style>
+              <a:lnRef idx="2">
+                <a:schemeClr val="accent1">
+                  <a:shade val="50000"/>
+                </a:schemeClr>
+              </a:lnRef>
+              <a:fillRef idx="1">
+                <a:schemeClr val="accent1"/>
+              </a:fillRef>
+              <a:effectRef idx="0">
+                <a:schemeClr val="accent1"/>
+              </a:effectRef>
+              <a:fontRef idx="minor">
+                <a:schemeClr val="lt1"/>
+              </a:fontRef>
+            </p:style>
+            <p:txBody>
+              <a:bodyPr rtlCol="0" anchor="ctr"/>
+              <a:lstStyle/>
+              <a:p>
+                <a:pPr algn="ctr"/>
+                <a:endParaRPr lang="en-SG"/>
+              </a:p>
+            </p:txBody>
+          </p:sp>
+          <p:sp>
+            <p:nvSpPr>
+              <p:cNvPr id="179" name="Freeform 178"/>
+              <p:cNvSpPr/>
+              <p:nvPr/>
+            </p:nvSpPr>
+            <p:spPr>
+              <a:xfrm>
+                <a:off x="737215" y="552954"/>
+                <a:ext cx="102393" cy="235744"/>
+              </a:xfrm>
+              <a:custGeom>
+                <a:avLst/>
+                <a:gdLst>
+                  <a:gd name="connsiteX0" fmla="*/ 47625 w 102393"/>
+                  <a:gd name="connsiteY0" fmla="*/ 0 h 235744"/>
+                  <a:gd name="connsiteX1" fmla="*/ 0 w 102393"/>
+                  <a:gd name="connsiteY1" fmla="*/ 185738 h 235744"/>
+                  <a:gd name="connsiteX2" fmla="*/ 57150 w 102393"/>
+                  <a:gd name="connsiteY2" fmla="*/ 235744 h 235744"/>
+                  <a:gd name="connsiteX3" fmla="*/ 102393 w 102393"/>
+                  <a:gd name="connsiteY3" fmla="*/ 171450 h 235744"/>
+                  <a:gd name="connsiteX4" fmla="*/ 47625 w 102393"/>
+                  <a:gd name="connsiteY4" fmla="*/ 0 h 235744"/>
+                </a:gdLst>
+                <a:ahLst/>
+                <a:cxnLst>
+                  <a:cxn ang="0">
+                    <a:pos x="connsiteX0" y="connsiteY0"/>
+                  </a:cxn>
+                  <a:cxn ang="0">
+                    <a:pos x="connsiteX1" y="connsiteY1"/>
+                  </a:cxn>
+                  <a:cxn ang="0">
+                    <a:pos x="connsiteX2" y="connsiteY2"/>
+                  </a:cxn>
+                  <a:cxn ang="0">
+                    <a:pos x="connsiteX3" y="connsiteY3"/>
+                  </a:cxn>
+                  <a:cxn ang="0">
+                    <a:pos x="connsiteX4" y="connsiteY4"/>
+                  </a:cxn>
+                </a:cxnLst>
+                <a:rect l="l" t="t" r="r" b="b"/>
+                <a:pathLst>
+                  <a:path w="102393" h="235744">
+                    <a:moveTo>
+                      <a:pt x="47625" y="0"/>
+                    </a:moveTo>
+                    <a:lnTo>
+                      <a:pt x="0" y="185738"/>
+                    </a:lnTo>
+                    <a:lnTo>
+                      <a:pt x="57150" y="235744"/>
+                    </a:lnTo>
+                    <a:lnTo>
+                      <a:pt x="102393" y="171450"/>
+                    </a:lnTo>
+                    <a:lnTo>
+                      <a:pt x="47625" y="0"/>
+                    </a:lnTo>
+                    <a:close/>
+                  </a:path>
+                </a:pathLst>
+              </a:custGeom>
+              <a:solidFill>
+                <a:schemeClr val="bg1"/>
+              </a:solidFill>
+            </p:spPr>
+            <p:style>
+              <a:lnRef idx="2">
+                <a:schemeClr val="accent1">
+                  <a:shade val="50000"/>
+                </a:schemeClr>
+              </a:lnRef>
+              <a:fillRef idx="1">
+                <a:schemeClr val="accent1"/>
+              </a:fillRef>
+              <a:effectRef idx="0">
+                <a:schemeClr val="accent1"/>
+              </a:effectRef>
+              <a:fontRef idx="minor">
+                <a:schemeClr val="lt1"/>
+              </a:fontRef>
+            </p:style>
+            <p:txBody>
+              <a:bodyPr rtlCol="0" anchor="ctr"/>
+              <a:lstStyle/>
+              <a:p>
+                <a:pPr algn="ctr"/>
+                <a:endParaRPr lang="en-SG"/>
+              </a:p>
+            </p:txBody>
+          </p:sp>
+        </p:grpSp>
+        <p:sp>
+          <p:nvSpPr>
+            <p:cNvPr id="176" name="Freeform 175"/>
+            <p:cNvSpPr/>
+            <p:nvPr/>
+          </p:nvSpPr>
+          <p:spPr>
+            <a:xfrm>
+              <a:off x="882472" y="469611"/>
+              <a:ext cx="50006" cy="19050"/>
+            </a:xfrm>
+            <a:custGeom>
+              <a:avLst/>
+              <a:gdLst>
+                <a:gd name="connsiteX0" fmla="*/ 0 w 50006"/>
+                <a:gd name="connsiteY0" fmla="*/ 0 h 19050"/>
+                <a:gd name="connsiteX1" fmla="*/ 0 w 50006"/>
+                <a:gd name="connsiteY1" fmla="*/ 0 h 19050"/>
+                <a:gd name="connsiteX2" fmla="*/ 21431 w 50006"/>
+                <a:gd name="connsiteY2" fmla="*/ 4762 h 19050"/>
+                <a:gd name="connsiteX3" fmla="*/ 28575 w 50006"/>
+                <a:gd name="connsiteY3" fmla="*/ 9525 h 19050"/>
+                <a:gd name="connsiteX4" fmla="*/ 38100 w 50006"/>
+                <a:gd name="connsiteY4" fmla="*/ 14287 h 19050"/>
+                <a:gd name="connsiteX5" fmla="*/ 50006 w 50006"/>
+                <a:gd name="connsiteY5" fmla="*/ 19050 h 19050"/>
+              </a:gdLst>
+              <a:ahLst/>
+              <a:cxnLst>
+                <a:cxn ang="0">
+                  <a:pos x="connsiteX0" y="connsiteY0"/>
+                </a:cxn>
+                <a:cxn ang="0">
+                  <a:pos x="connsiteX1" y="connsiteY1"/>
+                </a:cxn>
+                <a:cxn ang="0">
+                  <a:pos x="connsiteX2" y="connsiteY2"/>
+                </a:cxn>
+                <a:cxn ang="0">
+                  <a:pos x="connsiteX3" y="connsiteY3"/>
+                </a:cxn>
+                <a:cxn ang="0">
+                  <a:pos x="connsiteX4" y="connsiteY4"/>
+                </a:cxn>
+                <a:cxn ang="0">
+                  <a:pos x="connsiteX5" y="connsiteY5"/>
+                </a:cxn>
+              </a:cxnLst>
+              <a:rect l="l" t="t" r="r" b="b"/>
+              <a:pathLst>
+                <a:path w="50006" h="19050">
+                  <a:moveTo>
+                    <a:pt x="0" y="0"/>
+                  </a:moveTo>
+                  <a:lnTo>
+                    <a:pt x="0" y="0"/>
+                  </a:lnTo>
+                  <a:cubicBezTo>
+                    <a:pt x="7144" y="1587"/>
+                    <a:pt x="14489" y="2448"/>
+                    <a:pt x="21431" y="4762"/>
+                  </a:cubicBezTo>
+                  <a:cubicBezTo>
+                    <a:pt x="24146" y="5667"/>
+                    <a:pt x="26090" y="8105"/>
+                    <a:pt x="28575" y="9525"/>
+                  </a:cubicBezTo>
+                  <a:cubicBezTo>
+                    <a:pt x="31657" y="11286"/>
+                    <a:pt x="34837" y="12889"/>
+                    <a:pt x="38100" y="14287"/>
+                  </a:cubicBezTo>
+                  <a:cubicBezTo>
+                    <a:pt x="58672" y="23103"/>
+                    <a:pt x="34691" y="11391"/>
+                    <a:pt x="50006" y="19050"/>
+                  </a:cubicBezTo>
+                </a:path>
+              </a:pathLst>
+            </a:custGeom>
+            <a:solidFill>
+              <a:schemeClr val="bg1"/>
+            </a:solidFill>
+          </p:spPr>
+          <p:style>
+            <a:lnRef idx="2">
+              <a:schemeClr val="accent1">
+                <a:shade val="50000"/>
+              </a:schemeClr>
+            </a:lnRef>
+            <a:fillRef idx="1">
+              <a:schemeClr val="accent1"/>
+            </a:fillRef>
+            <a:effectRef idx="0">
+              <a:schemeClr val="accent1"/>
+            </a:effectRef>
+            <a:fontRef idx="minor">
+              <a:schemeClr val="lt1"/>
+            </a:fontRef>
+          </p:style>
+          <p:txBody>
+            <a:bodyPr rtlCol="0" anchor="ctr"/>
+            <a:lstStyle/>
+            <a:p>
+              <a:pPr algn="ctr"/>
+              <a:endParaRPr lang="en-SG"/>
+            </a:p>
+          </p:txBody>
+        </p:sp>
+        <p:sp>
+          <p:nvSpPr>
+            <p:cNvPr id="177" name="Flowchart: Connector 176"/>
+            <p:cNvSpPr/>
+            <p:nvPr/>
+          </p:nvSpPr>
+          <p:spPr>
+            <a:xfrm>
+              <a:off x="800257" y="354516"/>
+              <a:ext cx="45719" cy="45719"/>
+            </a:xfrm>
+            <a:prstGeom prst="flowChartConnector">
+              <a:avLst/>
+            </a:prstGeom>
+            <a:solidFill>
+              <a:schemeClr val="bg1"/>
+            </a:solidFill>
+            <a:ln>
+              <a:solidFill>
+                <a:schemeClr val="accent1">
+                  <a:lumMod val="75000"/>
+                </a:schemeClr>
+              </a:solidFill>
+            </a:ln>
+          </p:spPr>
+          <p:style>
+            <a:lnRef idx="2">
+              <a:schemeClr val="accent1">
+                <a:shade val="50000"/>
+              </a:schemeClr>
+            </a:lnRef>
+            <a:fillRef idx="1">
+              <a:schemeClr val="accent1"/>
+            </a:fillRef>
+            <a:effectRef idx="0">
+              <a:schemeClr val="accent1"/>
+            </a:effectRef>
+            <a:fontRef idx="minor">
+              <a:schemeClr val="lt1"/>
+            </a:fontRef>
+          </p:style>
+          <p:txBody>
+            <a:bodyPr rtlCol="0" anchor="ctr"/>
+            <a:lstStyle/>
+            <a:p>
+              <a:pPr algn="ctr"/>
+              <a:endParaRPr lang="en-SG"/>
+            </a:p>
+          </p:txBody>
+        </p:sp>
+      </p:grpSp>
     </p:spTree>
     <p:extLst>
       <p:ext uri="{BB962C8B-B14F-4D97-AF65-F5344CB8AC3E}">

</xml_diff>

<commit_message>
Syncing Issue 697 [Set default grace period to 15 minutes]
</commit_message>
<xml_diff>
--- a/doc/mockups/homepage image.pptx
+++ b/doc/mockups/homepage image.pptx
@@ -1,6 +1,6 @@
 
 <file path=ppt/presentation.xml><?xml version="1.0" encoding="utf-8"?>
-<p:presentation xmlns:a="http://schemas.openxmlformats.org/drawingml/2006/main" xmlns:r="http://schemas.openxmlformats.org/officeDocument/2006/relationships" xmlns:p="http://schemas.openxmlformats.org/presentationml/2006/main" embedTrueTypeFonts="1">
+<p:presentation xmlns:a="http://schemas.openxmlformats.org/drawingml/2006/main" xmlns:r="http://schemas.openxmlformats.org/officeDocument/2006/relationships" xmlns:p="http://schemas.openxmlformats.org/presentationml/2006/main" saveSubsetFonts="1">
   <p:sldMasterIdLst>
     <p:sldMasterId id="2147483648" r:id="rId1"/>
   </p:sldMasterIdLst>
@@ -10,19 +10,10 @@
   <p:sldIdLst>
     <p:sldId id="258" r:id="rId2"/>
   </p:sldIdLst>
-  <p:sldSz cx="7740650" cy="2879725"/>
+  <p:sldSz cx="7740650" cy="3108325"/>
   <p:notesSz cx="6858000" cy="9144000"/>
-  <p:embeddedFontLst>
-    <p:embeddedFont>
-      <p:font typeface="Calibri" pitchFamily="34" charset="0"/>
-      <p:regular r:id="rId4"/>
-      <p:bold r:id="rId5"/>
-      <p:italic r:id="rId6"/>
-      <p:boldItalic r:id="rId7"/>
-    </p:embeddedFont>
-  </p:embeddedFontLst>
   <p:custDataLst>
-    <p:tags r:id="rId8"/>
+    <p:tags r:id="rId4"/>
   </p:custDataLst>
   <p:defaultTextStyle>
     <a:defPPr>
@@ -204,7 +195,7 @@
           <a:p>
             <a:fld id="{A4537E34-E1A6-4BBF-AF99-84C669929841}" type="datetimeFigureOut">
               <a:rPr lang="en-SG" smtClean="0"/>
-              <a:t>20/3/2013</a:t>
+              <a:t>21/3/2013</a:t>
             </a:fld>
             <a:endParaRPr lang="en-SG"/>
           </a:p>
@@ -222,8 +213,8 @@
         </p:nvSpPr>
         <p:spPr>
           <a:xfrm>
-            <a:off x="-1179513" y="685800"/>
-            <a:ext cx="9217026" cy="3429000"/>
+            <a:off x="-841375" y="685800"/>
+            <a:ext cx="8540750" cy="3429000"/>
           </a:xfrm>
           <a:prstGeom prst="rect">
             <a:avLst/>
@@ -499,7 +490,12 @@
             <p:ph type="sldImg"/>
           </p:nvPr>
         </p:nvSpPr>
-        <p:spPr/>
+        <p:spPr>
+          <a:xfrm>
+            <a:off x="-841375" y="685800"/>
+            <a:ext cx="8540750" cy="3429000"/>
+          </a:xfrm>
+        </p:spPr>
       </p:sp>
       <p:sp>
         <p:nvSpPr>
@@ -585,8 +581,8 @@
         </p:nvSpPr>
         <p:spPr>
           <a:xfrm>
-            <a:off x="580550" y="894582"/>
-            <a:ext cx="6579552" cy="617275"/>
+            <a:off x="580550" y="965597"/>
+            <a:ext cx="6579552" cy="666276"/>
           </a:xfrm>
         </p:spPr>
         <p:txBody>
@@ -613,8 +609,8 @@
         </p:nvSpPr>
         <p:spPr>
           <a:xfrm>
-            <a:off x="1161098" y="1631845"/>
-            <a:ext cx="5418455" cy="735929"/>
+            <a:off x="1161099" y="1761386"/>
+            <a:ext cx="5418455" cy="794349"/>
           </a:xfrm>
         </p:spPr>
         <p:txBody>
@@ -738,7 +734,7 @@
             <a:fld id="{1D8BD707-D9CF-40AE-B4C6-C98DA3205C09}" type="datetimeFigureOut">
               <a:rPr lang="en-US" smtClean="0"/>
               <a:pPr/>
-              <a:t>3/20/2013</a:t>
+              <a:t>3/21/2013</a:t>
             </a:fld>
             <a:endParaRPr lang="en-US"/>
           </a:p>
@@ -905,7 +901,7 @@
             <a:fld id="{1D8BD707-D9CF-40AE-B4C6-C98DA3205C09}" type="datetimeFigureOut">
               <a:rPr lang="en-US" smtClean="0"/>
               <a:pPr/>
-              <a:t>3/20/2013</a:t>
+              <a:t>3/21/2013</a:t>
             </a:fld>
             <a:endParaRPr lang="en-US"/>
           </a:p>
@@ -991,8 +987,8 @@
         </p:nvSpPr>
         <p:spPr>
           <a:xfrm>
-            <a:off x="5611971" y="115324"/>
-            <a:ext cx="1741647" cy="2457099"/>
+            <a:off x="5611972" y="124479"/>
+            <a:ext cx="1741647" cy="2652150"/>
           </a:xfrm>
         </p:spPr>
         <p:txBody>
@@ -1019,8 +1015,8 @@
         </p:nvSpPr>
         <p:spPr>
           <a:xfrm>
-            <a:off x="387033" y="115324"/>
-            <a:ext cx="5095928" cy="2457099"/>
+            <a:off x="387033" y="124479"/>
+            <a:ext cx="5095928" cy="2652150"/>
           </a:xfrm>
         </p:spPr>
         <p:txBody>
@@ -1082,7 +1078,7 @@
             <a:fld id="{1D8BD707-D9CF-40AE-B4C6-C98DA3205C09}" type="datetimeFigureOut">
               <a:rPr lang="en-US" smtClean="0"/>
               <a:pPr/>
-              <a:t>3/20/2013</a:t>
+              <a:t>3/21/2013</a:t>
             </a:fld>
             <a:endParaRPr lang="en-US"/>
           </a:p>
@@ -1249,7 +1245,7 @@
             <a:fld id="{1D8BD707-D9CF-40AE-B4C6-C98DA3205C09}" type="datetimeFigureOut">
               <a:rPr lang="en-US" smtClean="0"/>
               <a:pPr/>
-              <a:t>3/20/2013</a:t>
+              <a:t>3/21/2013</a:t>
             </a:fld>
             <a:endParaRPr lang="en-US"/>
           </a:p>
@@ -1335,8 +1331,8 @@
         </p:nvSpPr>
         <p:spPr>
           <a:xfrm>
-            <a:off x="611459" y="1850492"/>
-            <a:ext cx="6579552" cy="571945"/>
+            <a:off x="611459" y="1997390"/>
+            <a:ext cx="6579552" cy="617347"/>
           </a:xfrm>
         </p:spPr>
         <p:txBody>
@@ -1367,8 +1363,8 @@
         </p:nvSpPr>
         <p:spPr>
           <a:xfrm>
-            <a:off x="611459" y="1220551"/>
-            <a:ext cx="6579552" cy="629940"/>
+            <a:off x="611459" y="1317442"/>
+            <a:ext cx="6579552" cy="679946"/>
           </a:xfrm>
         </p:spPr>
         <p:txBody>
@@ -1492,7 +1488,7 @@
             <a:fld id="{1D8BD707-D9CF-40AE-B4C6-C98DA3205C09}" type="datetimeFigureOut">
               <a:rPr lang="en-US" smtClean="0"/>
               <a:pPr/>
-              <a:t>3/20/2013</a:t>
+              <a:t>3/21/2013</a:t>
             </a:fld>
             <a:endParaRPr lang="en-US"/>
           </a:p>
@@ -1601,8 +1597,8 @@
         </p:nvSpPr>
         <p:spPr>
           <a:xfrm>
-            <a:off x="387032" y="671937"/>
-            <a:ext cx="3418787" cy="1900485"/>
+            <a:off x="387033" y="725278"/>
+            <a:ext cx="3418787" cy="2051350"/>
           </a:xfrm>
         </p:spPr>
         <p:txBody>
@@ -1686,8 +1682,8 @@
         </p:nvSpPr>
         <p:spPr>
           <a:xfrm>
-            <a:off x="3934831" y="671937"/>
-            <a:ext cx="3418787" cy="1900485"/>
+            <a:off x="3934831" y="725278"/>
+            <a:ext cx="3418787" cy="2051350"/>
           </a:xfrm>
         </p:spPr>
         <p:txBody>
@@ -1777,7 +1773,7 @@
             <a:fld id="{1D8BD707-D9CF-40AE-B4C6-C98DA3205C09}" type="datetimeFigureOut">
               <a:rPr lang="en-US" smtClean="0"/>
               <a:pPr/>
-              <a:t>3/20/2013</a:t>
+              <a:t>3/21/2013</a:t>
             </a:fld>
             <a:endParaRPr lang="en-US"/>
           </a:p>
@@ -1890,8 +1886,8 @@
         </p:nvSpPr>
         <p:spPr>
           <a:xfrm>
-            <a:off x="387033" y="644606"/>
-            <a:ext cx="3420131" cy="268641"/>
+            <a:off x="387034" y="695777"/>
+            <a:ext cx="3420131" cy="289966"/>
           </a:xfrm>
         </p:spPr>
         <p:txBody>
@@ -1955,8 +1951,8 @@
         </p:nvSpPr>
         <p:spPr>
           <a:xfrm>
-            <a:off x="387033" y="913248"/>
-            <a:ext cx="3420131" cy="1659175"/>
+            <a:off x="387034" y="985744"/>
+            <a:ext cx="3420131" cy="1790885"/>
           </a:xfrm>
         </p:spPr>
         <p:txBody>
@@ -2040,8 +2036,8 @@
         </p:nvSpPr>
         <p:spPr>
           <a:xfrm>
-            <a:off x="3932143" y="644606"/>
-            <a:ext cx="3421475" cy="268641"/>
+            <a:off x="3932143" y="695777"/>
+            <a:ext cx="3421475" cy="289966"/>
           </a:xfrm>
         </p:spPr>
         <p:txBody>
@@ -2105,8 +2101,8 @@
         </p:nvSpPr>
         <p:spPr>
           <a:xfrm>
-            <a:off x="3932143" y="913248"/>
-            <a:ext cx="3421475" cy="1659175"/>
+            <a:off x="3932143" y="985744"/>
+            <a:ext cx="3421475" cy="1790885"/>
           </a:xfrm>
         </p:spPr>
         <p:txBody>
@@ -2196,7 +2192,7 @@
             <a:fld id="{1D8BD707-D9CF-40AE-B4C6-C98DA3205C09}" type="datetimeFigureOut">
               <a:rPr lang="en-US" smtClean="0"/>
               <a:pPr/>
-              <a:t>3/20/2013</a:t>
+              <a:t>3/21/2013</a:t>
             </a:fld>
             <a:endParaRPr lang="en-US"/>
           </a:p>
@@ -2311,7 +2307,7 @@
             <a:fld id="{1D8BD707-D9CF-40AE-B4C6-C98DA3205C09}" type="datetimeFigureOut">
               <a:rPr lang="en-US" smtClean="0"/>
               <a:pPr/>
-              <a:t>3/20/2013</a:t>
+              <a:t>3/21/2013</a:t>
             </a:fld>
             <a:endParaRPr lang="en-US"/>
           </a:p>
@@ -2403,7 +2399,7 @@
             <a:fld id="{1D8BD707-D9CF-40AE-B4C6-C98DA3205C09}" type="datetimeFigureOut">
               <a:rPr lang="en-US" smtClean="0"/>
               <a:pPr/>
-              <a:t>3/20/2013</a:t>
+              <a:t>3/21/2013</a:t>
             </a:fld>
             <a:endParaRPr lang="en-US"/>
           </a:p>
@@ -2489,8 +2485,8 @@
         </p:nvSpPr>
         <p:spPr>
           <a:xfrm>
-            <a:off x="387033" y="114657"/>
-            <a:ext cx="2546620" cy="487953"/>
+            <a:off x="387033" y="123759"/>
+            <a:ext cx="2546620" cy="526688"/>
           </a:xfrm>
         </p:spPr>
         <p:txBody>
@@ -2521,8 +2517,8 @@
         </p:nvSpPr>
         <p:spPr>
           <a:xfrm>
-            <a:off x="3026380" y="114657"/>
-            <a:ext cx="4327238" cy="2457765"/>
+            <a:off x="3026380" y="123759"/>
+            <a:ext cx="4327238" cy="2652869"/>
           </a:xfrm>
         </p:spPr>
         <p:txBody>
@@ -2606,8 +2602,8 @@
         </p:nvSpPr>
         <p:spPr>
           <a:xfrm>
-            <a:off x="387033" y="602610"/>
-            <a:ext cx="2546620" cy="1969812"/>
+            <a:off x="387033" y="650447"/>
+            <a:ext cx="2546620" cy="2126181"/>
           </a:xfrm>
         </p:spPr>
         <p:txBody>
@@ -2677,7 +2673,7 @@
             <a:fld id="{1D8BD707-D9CF-40AE-B4C6-C98DA3205C09}" type="datetimeFigureOut">
               <a:rPr lang="en-US" smtClean="0"/>
               <a:pPr/>
-              <a:t>3/20/2013</a:t>
+              <a:t>3/21/2013</a:t>
             </a:fld>
             <a:endParaRPr lang="en-US"/>
           </a:p>
@@ -2763,8 +2759,8 @@
         </p:nvSpPr>
         <p:spPr>
           <a:xfrm>
-            <a:off x="1517222" y="2015807"/>
-            <a:ext cx="4644390" cy="237978"/>
+            <a:off x="1517222" y="2175827"/>
+            <a:ext cx="4644390" cy="256869"/>
           </a:xfrm>
         </p:spPr>
         <p:txBody>
@@ -2795,8 +2791,8 @@
         </p:nvSpPr>
         <p:spPr>
           <a:xfrm>
-            <a:off x="1517222" y="257309"/>
-            <a:ext cx="4644390" cy="1727835"/>
+            <a:off x="1517222" y="277735"/>
+            <a:ext cx="4644390" cy="1864995"/>
           </a:xfrm>
         </p:spPr>
         <p:txBody>
@@ -2856,8 +2852,8 @@
         </p:nvSpPr>
         <p:spPr>
           <a:xfrm>
-            <a:off x="1517222" y="2253786"/>
-            <a:ext cx="4644390" cy="337967"/>
+            <a:off x="1517222" y="2432698"/>
+            <a:ext cx="4644390" cy="364796"/>
           </a:xfrm>
         </p:spPr>
         <p:txBody>
@@ -2927,7 +2923,7 @@
             <a:fld id="{1D8BD707-D9CF-40AE-B4C6-C98DA3205C09}" type="datetimeFigureOut">
               <a:rPr lang="en-US" smtClean="0"/>
               <a:pPr/>
-              <a:t>3/20/2013</a:t>
+              <a:t>3/21/2013</a:t>
             </a:fld>
             <a:endParaRPr lang="en-US"/>
           </a:p>
@@ -3018,8 +3014,8 @@
         </p:nvSpPr>
         <p:spPr>
           <a:xfrm>
-            <a:off x="387033" y="115323"/>
-            <a:ext cx="6966585" cy="479954"/>
+            <a:off x="387034" y="124478"/>
+            <a:ext cx="6966585" cy="518054"/>
           </a:xfrm>
           <a:prstGeom prst="rect">
             <a:avLst/>
@@ -3051,8 +3047,8 @@
         </p:nvSpPr>
         <p:spPr>
           <a:xfrm>
-            <a:off x="387033" y="671937"/>
-            <a:ext cx="6966585" cy="1900485"/>
+            <a:off x="387034" y="725278"/>
+            <a:ext cx="6966585" cy="2051350"/>
           </a:xfrm>
           <a:prstGeom prst="rect">
             <a:avLst/>
@@ -3113,8 +3109,8 @@
         </p:nvSpPr>
         <p:spPr>
           <a:xfrm>
-            <a:off x="387032" y="2669080"/>
-            <a:ext cx="1806152" cy="153319"/>
+            <a:off x="387032" y="2880959"/>
+            <a:ext cx="1806152" cy="165490"/>
           </a:xfrm>
           <a:prstGeom prst="rect">
             <a:avLst/>
@@ -3137,7 +3133,7 @@
             <a:fld id="{1D8BD707-D9CF-40AE-B4C6-C98DA3205C09}" type="datetimeFigureOut">
               <a:rPr lang="en-US" smtClean="0"/>
               <a:pPr/>
-              <a:t>3/20/2013</a:t>
+              <a:t>3/21/2013</a:t>
             </a:fld>
             <a:endParaRPr lang="en-US"/>
           </a:p>
@@ -3155,8 +3151,8 @@
         </p:nvSpPr>
         <p:spPr>
           <a:xfrm>
-            <a:off x="2644723" y="2669080"/>
-            <a:ext cx="2451206" cy="153319"/>
+            <a:off x="2644723" y="2880959"/>
+            <a:ext cx="2451206" cy="165490"/>
           </a:xfrm>
           <a:prstGeom prst="rect">
             <a:avLst/>
@@ -3192,8 +3188,8 @@
         </p:nvSpPr>
         <p:spPr>
           <a:xfrm>
-            <a:off x="5547466" y="2669080"/>
-            <a:ext cx="1806152" cy="153319"/>
+            <a:off x="5547466" y="2880959"/>
+            <a:ext cx="1806152" cy="165490"/>
           </a:xfrm>
           <a:prstGeom prst="rect">
             <a:avLst/>
@@ -3510,7 +3506,59 @@
       </p:grpSpPr>
       <p:sp>
         <p:nvSpPr>
-          <p:cNvPr id="31" name="Flowchart: Delay 30"/>
+          <p:cNvPr id="100" name="Rounded Rectangle 99"/>
+          <p:cNvSpPr/>
+          <p:nvPr/>
+        </p:nvSpPr>
+        <p:spPr>
+          <a:xfrm>
+            <a:off x="136525" y="166476"/>
+            <a:ext cx="2117725" cy="2584344"/>
+          </a:xfrm>
+          <a:prstGeom prst="roundRect">
+            <a:avLst>
+              <a:gd name="adj" fmla="val 7667"/>
+            </a:avLst>
+          </a:prstGeom>
+          <a:noFill/>
+          <a:ln w="107950">
+            <a:solidFill>
+              <a:schemeClr val="accent6">
+                <a:lumMod val="60000"/>
+                <a:lumOff val="40000"/>
+              </a:schemeClr>
+            </a:solidFill>
+          </a:ln>
+          <a:effectLst/>
+        </p:spPr>
+        <p:style>
+          <a:lnRef idx="2">
+            <a:schemeClr val="accent1">
+              <a:shade val="50000"/>
+            </a:schemeClr>
+          </a:lnRef>
+          <a:fillRef idx="1">
+            <a:schemeClr val="accent1"/>
+          </a:fillRef>
+          <a:effectRef idx="0">
+            <a:schemeClr val="accent1"/>
+          </a:effectRef>
+          <a:fontRef idx="minor">
+            <a:schemeClr val="lt1"/>
+          </a:fontRef>
+        </p:style>
+        <p:txBody>
+          <a:bodyPr rtlCol="0" anchor="ctr"/>
+          <a:lstStyle/>
+          <a:p>
+            <a:pPr algn="ctr"/>
+            <a:endParaRPr lang="en-US"/>
+          </a:p>
+        </p:txBody>
+      </p:sp>
+      <p:sp>
+        <p:nvSpPr>
+          <p:cNvPr id="101" name="Flowchart: Delay 100"/>
           <p:cNvSpPr/>
           <p:nvPr/>
         </p:nvSpPr>
@@ -3553,7 +3601,7 @@
       </p:sp>
       <p:sp>
         <p:nvSpPr>
-          <p:cNvPr id="32" name="Freeform 31"/>
+          <p:cNvPr id="103" name="Freeform 102"/>
           <p:cNvSpPr/>
           <p:nvPr/>
         </p:nvSpPr>
@@ -3647,7 +3695,7 @@
       </p:sp>
       <p:sp>
         <p:nvSpPr>
-          <p:cNvPr id="30" name="Flowchart: Connector 29"/>
+          <p:cNvPr id="104" name="Flowchart: Connector 103"/>
           <p:cNvSpPr/>
           <p:nvPr/>
         </p:nvSpPr>
@@ -3690,7 +3738,7 @@
       </p:sp>
       <p:sp>
         <p:nvSpPr>
-          <p:cNvPr id="33" name="Freeform 32"/>
+          <p:cNvPr id="105" name="Freeform 104"/>
           <p:cNvSpPr/>
           <p:nvPr/>
         </p:nvSpPr>
@@ -3799,7 +3847,7 @@
       </p:sp>
       <p:sp>
         <p:nvSpPr>
-          <p:cNvPr id="34" name="Flowchart: Connector 33"/>
+          <p:cNvPr id="106" name="Flowchart: Connector 105"/>
           <p:cNvSpPr/>
           <p:nvPr/>
         </p:nvSpPr>
@@ -3849,7 +3897,7 @@
       </p:sp>
       <p:grpSp>
         <p:nvGrpSpPr>
-          <p:cNvPr id="22" name="Group 21"/>
+          <p:cNvPr id="107" name="Group 106"/>
           <p:cNvGrpSpPr/>
           <p:nvPr/>
         </p:nvGrpSpPr>
@@ -3863,7 +3911,7 @@
         </p:grpSpPr>
         <p:sp>
           <p:nvSpPr>
-            <p:cNvPr id="111" name="Flowchart: Connector 110"/>
+            <p:cNvPr id="109" name="Flowchart: Connector 108"/>
             <p:cNvSpPr/>
             <p:nvPr/>
           </p:nvSpPr>
@@ -3906,7 +3954,7 @@
         </p:sp>
         <p:grpSp>
           <p:nvGrpSpPr>
-            <p:cNvPr id="21" name="Group 20"/>
+            <p:cNvPr id="113" name="Group 112"/>
             <p:cNvGrpSpPr/>
             <p:nvPr/>
           </p:nvGrpSpPr>
@@ -3920,7 +3968,7 @@
           </p:grpSpPr>
           <p:sp>
             <p:nvSpPr>
-              <p:cNvPr id="112" name="Flowchart: Delay 111"/>
+              <p:cNvPr id="119" name="Flowchart: Delay 118"/>
               <p:cNvSpPr/>
               <p:nvPr/>
             </p:nvSpPr>
@@ -3963,7 +4011,7 @@
           </p:sp>
           <p:sp>
             <p:nvSpPr>
-              <p:cNvPr id="114" name="Freeform 113"/>
+              <p:cNvPr id="120" name="Freeform 119"/>
               <p:cNvSpPr/>
               <p:nvPr/>
             </p:nvSpPr>
@@ -4058,7 +4106,7 @@
         </p:grpSp>
         <p:sp>
           <p:nvSpPr>
-            <p:cNvPr id="115" name="Freeform 114"/>
+            <p:cNvPr id="117" name="Freeform 116"/>
             <p:cNvSpPr/>
             <p:nvPr/>
           </p:nvSpPr>
@@ -4167,7 +4215,7 @@
         </p:sp>
         <p:sp>
           <p:nvSpPr>
-            <p:cNvPr id="116" name="Flowchart: Connector 115"/>
+            <p:cNvPr id="118" name="Flowchart: Connector 117"/>
             <p:cNvSpPr/>
             <p:nvPr/>
           </p:nvSpPr>
@@ -4218,7 +4266,7 @@
       </p:grpSp>
       <p:sp>
         <p:nvSpPr>
-          <p:cNvPr id="24" name="Rounded Rectangle 23"/>
+          <p:cNvPr id="121" name="Rounded Rectangle 120"/>
           <p:cNvSpPr/>
           <p:nvPr/>
         </p:nvSpPr>
@@ -4235,15 +4283,13 @@
           <a:noFill/>
           <a:ln w="107950">
             <a:solidFill>
-              <a:schemeClr val="accent1">
-                <a:lumMod val="20000"/>
-                <a:lumOff val="80000"/>
+              <a:schemeClr val="tx2">
+                <a:lumMod val="40000"/>
+                <a:lumOff val="60000"/>
               </a:schemeClr>
             </a:solidFill>
           </a:ln>
-          <a:effectLst>
-            <a:softEdge rad="31750"/>
-          </a:effectLst>
+          <a:effectLst/>
         </p:spPr>
         <p:style>
           <a:lnRef idx="2">
@@ -4272,61 +4318,7 @@
       </p:sp>
       <p:sp>
         <p:nvSpPr>
-          <p:cNvPr id="23" name="Rounded Rectangle 22"/>
-          <p:cNvSpPr/>
-          <p:nvPr/>
-        </p:nvSpPr>
-        <p:spPr>
-          <a:xfrm>
-            <a:off x="136525" y="166476"/>
-            <a:ext cx="2117725" cy="2584344"/>
-          </a:xfrm>
-          <a:prstGeom prst="roundRect">
-            <a:avLst>
-              <a:gd name="adj" fmla="val 7667"/>
-            </a:avLst>
-          </a:prstGeom>
-          <a:noFill/>
-          <a:ln w="107950">
-            <a:solidFill>
-              <a:schemeClr val="accent6">
-                <a:lumMod val="20000"/>
-                <a:lumOff val="80000"/>
-              </a:schemeClr>
-            </a:solidFill>
-          </a:ln>
-          <a:effectLst>
-            <a:softEdge rad="31750"/>
-          </a:effectLst>
-        </p:spPr>
-        <p:style>
-          <a:lnRef idx="2">
-            <a:schemeClr val="accent1">
-              <a:shade val="50000"/>
-            </a:schemeClr>
-          </a:lnRef>
-          <a:fillRef idx="1">
-            <a:schemeClr val="accent1"/>
-          </a:fillRef>
-          <a:effectRef idx="0">
-            <a:schemeClr val="accent1"/>
-          </a:effectRef>
-          <a:fontRef idx="minor">
-            <a:schemeClr val="lt1"/>
-          </a:fontRef>
-        </p:style>
-        <p:txBody>
-          <a:bodyPr rtlCol="0" anchor="ctr"/>
-          <a:lstStyle/>
-          <a:p>
-            <a:pPr algn="ctr"/>
-            <a:endParaRPr lang="en-US"/>
-          </a:p>
-        </p:txBody>
-      </p:sp>
-      <p:sp>
-        <p:nvSpPr>
-          <p:cNvPr id="93" name="Isosceles Triangle 92"/>
+          <p:cNvPr id="122" name="Isosceles Triangle 121"/>
           <p:cNvSpPr/>
           <p:nvPr/>
         </p:nvSpPr>
@@ -4378,14 +4370,14 @@
       </p:sp>
       <p:sp>
         <p:nvSpPr>
-          <p:cNvPr id="94" name="Isosceles Triangle 93"/>
+          <p:cNvPr id="123" name="Isosceles Triangle 122"/>
           <p:cNvSpPr/>
           <p:nvPr/>
         </p:nvSpPr>
         <p:spPr>
           <a:xfrm rot="3148928">
-            <a:off x="3750367" y="1837621"/>
-            <a:ext cx="650104" cy="899883"/>
+            <a:off x="3703148" y="1794751"/>
+            <a:ext cx="650104" cy="1018950"/>
           </a:xfrm>
           <a:prstGeom prst="triangle">
             <a:avLst>
@@ -4396,6 +4388,7 @@
             <a:schemeClr val="accent6">
               <a:lumMod val="40000"/>
               <a:lumOff val="60000"/>
+              <a:alpha val="65000"/>
             </a:schemeClr>
           </a:solidFill>
           <a:ln>
@@ -4429,13 +4422,13 @@
       </p:sp>
       <p:sp>
         <p:nvSpPr>
-          <p:cNvPr id="95" name="Isosceles Triangle 94"/>
+          <p:cNvPr id="124" name="Isosceles Triangle 123"/>
           <p:cNvSpPr/>
           <p:nvPr/>
         </p:nvSpPr>
         <p:spPr>
           <a:xfrm rot="4843798">
-            <a:off x="3307100" y="1214943"/>
+            <a:off x="3307100" y="1195350"/>
             <a:ext cx="672349" cy="1283148"/>
           </a:xfrm>
           <a:prstGeom prst="triangle">
@@ -4445,6 +4438,7 @@
             <a:schemeClr val="accent6">
               <a:lumMod val="40000"/>
               <a:lumOff val="60000"/>
+              <a:alpha val="65000"/>
             </a:schemeClr>
           </a:solidFill>
           <a:ln>
@@ -4478,7 +4472,7 @@
       </p:sp>
       <p:sp>
         <p:nvSpPr>
-          <p:cNvPr id="98" name="TextBox 97"/>
+          <p:cNvPr id="125" name="TextBox 124"/>
           <p:cNvSpPr txBox="1"/>
           <p:nvPr/>
         </p:nvSpPr>
@@ -4562,7 +4556,7 @@
       </p:sp>
       <p:sp>
         <p:nvSpPr>
-          <p:cNvPr id="102" name="TextBox 101"/>
+          <p:cNvPr id="126" name="TextBox 125"/>
           <p:cNvSpPr txBox="1"/>
           <p:nvPr/>
         </p:nvSpPr>
@@ -4582,7 +4576,7 @@
           </a:bodyPr>
           <a:lstStyle/>
           <a:p>
-            <a:pPr algn="ctr"/>
+            <a:pPr algn="r"/>
             <a:r>
               <a:rPr lang="en-US" sz="1100" dirty="0" smtClean="0">
                 <a:solidFill>
@@ -4633,7 +4627,7 @@
       </p:sp>
       <p:sp>
         <p:nvSpPr>
-          <p:cNvPr id="108" name="TextBox 107"/>
+          <p:cNvPr id="127" name="TextBox 126"/>
           <p:cNvSpPr txBox="1"/>
           <p:nvPr/>
         </p:nvSpPr>
@@ -4710,13 +4704,13 @@
       </p:sp>
       <p:sp>
         <p:nvSpPr>
-          <p:cNvPr id="110" name="Rounded Rectangle 109"/>
+          <p:cNvPr id="128" name="Rounded Rectangle 127"/>
           <p:cNvSpPr/>
           <p:nvPr/>
         </p:nvSpPr>
         <p:spPr>
           <a:xfrm>
-            <a:off x="5767678" y="1822729"/>
+            <a:off x="5767678" y="2049462"/>
             <a:ext cx="1371600" cy="457200"/>
           </a:xfrm>
           <a:prstGeom prst="roundRect">
@@ -4762,7 +4756,7 @@
       </p:sp>
       <p:sp>
         <p:nvSpPr>
-          <p:cNvPr id="25" name="Rounded Rectangle 24"/>
+          <p:cNvPr id="129" name="Rounded Rectangle 128"/>
           <p:cNvSpPr/>
           <p:nvPr/>
         </p:nvSpPr>
@@ -4780,14 +4774,12 @@
           <a:ln w="107950">
             <a:solidFill>
               <a:schemeClr val="accent6">
-                <a:lumMod val="20000"/>
-                <a:lumOff val="80000"/>
+                <a:lumMod val="60000"/>
+                <a:lumOff val="40000"/>
               </a:schemeClr>
             </a:solidFill>
           </a:ln>
-          <a:effectLst>
-            <a:softEdge rad="31750"/>
-          </a:effectLst>
+          <a:effectLst/>
         </p:spPr>
         <p:style>
           <a:lnRef idx="2">
@@ -4816,7 +4808,7 @@
       </p:sp>
       <p:grpSp>
         <p:nvGrpSpPr>
-          <p:cNvPr id="41" name="Group 40"/>
+          <p:cNvPr id="130" name="Group 129"/>
           <p:cNvGrpSpPr/>
           <p:nvPr/>
         </p:nvGrpSpPr>
@@ -4833,7 +4825,7 @@
         </p:grpSpPr>
         <p:sp>
           <p:nvSpPr>
-            <p:cNvPr id="42" name="Flowchart: Connector 41"/>
+            <p:cNvPr id="131" name="Flowchart: Connector 130"/>
             <p:cNvSpPr/>
             <p:nvPr/>
           </p:nvSpPr>
@@ -4881,7 +4873,7 @@
         </p:sp>
         <p:sp>
           <p:nvSpPr>
-            <p:cNvPr id="43" name="Flowchart: Delay 42"/>
+            <p:cNvPr id="132" name="Flowchart: Delay 131"/>
             <p:cNvSpPr/>
             <p:nvPr/>
           </p:nvSpPr>
@@ -4929,7 +4921,7 @@
         </p:sp>
         <p:sp>
           <p:nvSpPr>
-            <p:cNvPr id="45" name="Freeform 44"/>
+            <p:cNvPr id="133" name="Freeform 132"/>
             <p:cNvSpPr/>
             <p:nvPr/>
           </p:nvSpPr>
@@ -5043,7 +5035,7 @@
         </p:sp>
         <p:sp>
           <p:nvSpPr>
-            <p:cNvPr id="46" name="Flowchart: Connector 45"/>
+            <p:cNvPr id="134" name="Flowchart: Connector 133"/>
             <p:cNvSpPr/>
             <p:nvPr/>
           </p:nvSpPr>
@@ -5094,7 +5086,7 @@
       </p:grpSp>
       <p:grpSp>
         <p:nvGrpSpPr>
-          <p:cNvPr id="2" name="Group 1"/>
+          <p:cNvPr id="135" name="Group 134"/>
           <p:cNvGrpSpPr/>
           <p:nvPr/>
         </p:nvGrpSpPr>
@@ -5108,7 +5100,7 @@
         </p:grpSpPr>
         <p:sp>
           <p:nvSpPr>
-            <p:cNvPr id="59" name="Flowchart: Delay 58"/>
+            <p:cNvPr id="136" name="Flowchart: Delay 135"/>
             <p:cNvSpPr/>
             <p:nvPr/>
           </p:nvSpPr>
@@ -5158,7 +5150,7 @@
         </p:sp>
         <p:grpSp>
           <p:nvGrpSpPr>
-            <p:cNvPr id="10" name="Group 9"/>
+            <p:cNvPr id="137" name="Group 136"/>
             <p:cNvGrpSpPr/>
             <p:nvPr/>
           </p:nvGrpSpPr>
@@ -5172,7 +5164,7 @@
           </p:grpSpPr>
           <p:sp>
             <p:nvSpPr>
-              <p:cNvPr id="58" name="Flowchart: Connector 57"/>
+              <p:cNvPr id="138" name="Flowchart: Connector 137"/>
               <p:cNvSpPr/>
               <p:nvPr/>
             </p:nvSpPr>
@@ -5222,7 +5214,7 @@
           </p:sp>
           <p:sp>
             <p:nvSpPr>
-              <p:cNvPr id="60" name="Freeform 59"/>
+              <p:cNvPr id="139" name="Freeform 138"/>
               <p:cNvSpPr/>
               <p:nvPr/>
             </p:nvSpPr>
@@ -5338,7 +5330,7 @@
           </p:sp>
           <p:sp>
             <p:nvSpPr>
-              <p:cNvPr id="61" name="Flowchart: Connector 60"/>
+              <p:cNvPr id="140" name="Flowchart: Connector 139"/>
               <p:cNvSpPr/>
               <p:nvPr/>
             </p:nvSpPr>
@@ -5390,13 +5382,13 @@
       </p:grpSp>
       <p:sp>
         <p:nvSpPr>
-          <p:cNvPr id="67" name="Flowchart: Delay 66"/>
+          <p:cNvPr id="141" name="Flowchart: Delay 140"/>
           <p:cNvSpPr/>
           <p:nvPr/>
         </p:nvSpPr>
         <p:spPr>
           <a:xfrm rot="5400000" flipH="1">
-            <a:off x="4290496" y="1819658"/>
+            <a:off x="4290496" y="1800065"/>
             <a:ext cx="280353" cy="298983"/>
           </a:xfrm>
           <a:prstGeom prst="flowChartDelay">
@@ -5440,13 +5432,13 @@
       </p:sp>
       <p:grpSp>
         <p:nvGrpSpPr>
-          <p:cNvPr id="12" name="Group 11"/>
+          <p:cNvPr id="142" name="Group 141"/>
           <p:cNvGrpSpPr/>
           <p:nvPr/>
         </p:nvGrpSpPr>
         <p:grpSpPr>
           <a:xfrm rot="3372795">
-            <a:off x="4286547" y="1588795"/>
+            <a:off x="4286547" y="1569202"/>
             <a:ext cx="254457" cy="220662"/>
             <a:chOff x="4335990" y="1588795"/>
             <a:chExt cx="254457" cy="220662"/>
@@ -5454,7 +5446,7 @@
         </p:grpSpPr>
         <p:sp>
           <p:nvSpPr>
-            <p:cNvPr id="66" name="Flowchart: Connector 65"/>
+            <p:cNvPr id="143" name="Flowchart: Connector 142"/>
             <p:cNvSpPr/>
             <p:nvPr/>
           </p:nvSpPr>
@@ -5504,7 +5496,7 @@
         </p:sp>
         <p:sp>
           <p:nvSpPr>
-            <p:cNvPr id="68" name="Freeform 67"/>
+            <p:cNvPr id="144" name="Freeform 143"/>
             <p:cNvSpPr/>
             <p:nvPr/>
           </p:nvSpPr>
@@ -5620,7 +5612,7 @@
         </p:sp>
         <p:sp>
           <p:nvSpPr>
-            <p:cNvPr id="69" name="Flowchart: Connector 68"/>
+            <p:cNvPr id="145" name="Flowchart: Connector 144"/>
             <p:cNvSpPr/>
             <p:nvPr/>
           </p:nvSpPr>
@@ -5671,13 +5663,13 @@
       </p:grpSp>
       <p:sp>
         <p:nvSpPr>
-          <p:cNvPr id="72" name="Flowchart: Delay 71"/>
+          <p:cNvPr id="146" name="Flowchart: Delay 145"/>
           <p:cNvSpPr/>
           <p:nvPr/>
         </p:nvSpPr>
         <p:spPr>
           <a:xfrm rot="5400000" flipH="1">
-            <a:off x="3732363" y="2369394"/>
+            <a:off x="3732363" y="2349801"/>
             <a:ext cx="280353" cy="298983"/>
           </a:xfrm>
           <a:prstGeom prst="flowChartDelay">
@@ -5721,13 +5713,13 @@
       </p:sp>
       <p:grpSp>
         <p:nvGrpSpPr>
-          <p:cNvPr id="13" name="Group 12"/>
+          <p:cNvPr id="147" name="Group 146"/>
           <p:cNvGrpSpPr/>
           <p:nvPr/>
         </p:nvGrpSpPr>
         <p:grpSpPr>
           <a:xfrm rot="2886978">
-            <a:off x="3728414" y="2144246"/>
+            <a:off x="3728414" y="2124653"/>
             <a:ext cx="254457" cy="220662"/>
             <a:chOff x="3791084" y="2070419"/>
             <a:chExt cx="254457" cy="220662"/>
@@ -5735,7 +5727,7 @@
         </p:grpSpPr>
         <p:sp>
           <p:nvSpPr>
-            <p:cNvPr id="71" name="Flowchart: Connector 70"/>
+            <p:cNvPr id="148" name="Flowchart: Connector 147"/>
             <p:cNvSpPr/>
             <p:nvPr/>
           </p:nvSpPr>
@@ -5785,7 +5777,7 @@
         </p:sp>
         <p:sp>
           <p:nvSpPr>
-            <p:cNvPr id="73" name="Freeform 72"/>
+            <p:cNvPr id="149" name="Freeform 148"/>
             <p:cNvSpPr/>
             <p:nvPr/>
           </p:nvSpPr>
@@ -5901,7 +5893,7 @@
         </p:sp>
         <p:sp>
           <p:nvSpPr>
-            <p:cNvPr id="74" name="Flowchart: Connector 73"/>
+            <p:cNvPr id="150" name="Flowchart: Connector 149"/>
             <p:cNvSpPr/>
             <p:nvPr/>
           </p:nvSpPr>
@@ -5952,13 +5944,13 @@
       </p:grpSp>
       <p:sp>
         <p:nvSpPr>
-          <p:cNvPr id="76" name="Flowchart: Delay 75"/>
+          <p:cNvPr id="151" name="Flowchart: Delay 150"/>
           <p:cNvSpPr/>
           <p:nvPr/>
         </p:nvSpPr>
         <p:spPr>
           <a:xfrm rot="16200000">
-            <a:off x="3193840" y="2006887"/>
+            <a:off x="3193840" y="1987294"/>
             <a:ext cx="280353" cy="298983"/>
           </a:xfrm>
           <a:prstGeom prst="flowChartDelay">
@@ -6002,13 +5994,13 @@
       </p:sp>
       <p:grpSp>
         <p:nvGrpSpPr>
-          <p:cNvPr id="77" name="Group 76"/>
+          <p:cNvPr id="152" name="Group 151"/>
           <p:cNvGrpSpPr/>
           <p:nvPr/>
         </p:nvGrpSpPr>
         <p:grpSpPr>
           <a:xfrm rot="1483511">
-            <a:off x="3226182" y="1790579"/>
+            <a:off x="3226182" y="1770986"/>
             <a:ext cx="267922" cy="220662"/>
             <a:chOff x="786805" y="1760534"/>
             <a:chExt cx="267922" cy="220662"/>
@@ -6016,7 +6008,7 @@
         </p:grpSpPr>
         <p:sp>
           <p:nvSpPr>
-            <p:cNvPr id="78" name="Flowchart: Connector 77"/>
+            <p:cNvPr id="153" name="Flowchart: Connector 152"/>
             <p:cNvSpPr/>
             <p:nvPr/>
           </p:nvSpPr>
@@ -6066,7 +6058,7 @@
         </p:sp>
         <p:sp>
           <p:nvSpPr>
-            <p:cNvPr id="79" name="Freeform 78"/>
+            <p:cNvPr id="154" name="Freeform 153"/>
             <p:cNvSpPr/>
             <p:nvPr/>
           </p:nvSpPr>
@@ -6182,7 +6174,7 @@
         </p:sp>
         <p:sp>
           <p:nvSpPr>
-            <p:cNvPr id="80" name="Flowchart: Connector 79"/>
+            <p:cNvPr id="155" name="Flowchart: Connector 154"/>
             <p:cNvSpPr/>
             <p:nvPr/>
           </p:nvSpPr>
@@ -6233,7 +6225,7 @@
       </p:grpSp>
       <p:grpSp>
         <p:nvGrpSpPr>
-          <p:cNvPr id="26" name="Group 25"/>
+          <p:cNvPr id="156" name="Group 155"/>
           <p:cNvGrpSpPr/>
           <p:nvPr/>
         </p:nvGrpSpPr>
@@ -6247,7 +6239,7 @@
         </p:grpSpPr>
         <p:sp>
           <p:nvSpPr>
-            <p:cNvPr id="83" name="Flowchart: Delay 82"/>
+            <p:cNvPr id="157" name="Flowchart: Delay 156"/>
             <p:cNvSpPr/>
             <p:nvPr/>
           </p:nvSpPr>
@@ -6297,7 +6289,7 @@
         </p:sp>
         <p:sp>
           <p:nvSpPr>
-            <p:cNvPr id="85" name="Flowchart: Connector 84"/>
+            <p:cNvPr id="158" name="Flowchart: Connector 157"/>
             <p:cNvSpPr/>
             <p:nvPr/>
           </p:nvSpPr>
@@ -6347,7 +6339,7 @@
         </p:sp>
         <p:sp>
           <p:nvSpPr>
-            <p:cNvPr id="86" name="Freeform 85"/>
+            <p:cNvPr id="159" name="Freeform 158"/>
             <p:cNvSpPr/>
             <p:nvPr/>
           </p:nvSpPr>
@@ -6463,7 +6455,7 @@
         </p:sp>
         <p:sp>
           <p:nvSpPr>
-            <p:cNvPr id="87" name="Flowchart: Connector 86"/>
+            <p:cNvPr id="160" name="Flowchart: Connector 159"/>
             <p:cNvSpPr/>
             <p:nvPr/>
           </p:nvSpPr>
@@ -6514,13 +6506,13 @@
       </p:grpSp>
       <p:sp>
         <p:nvSpPr>
-          <p:cNvPr id="90" name="Flowchart: Delay 89"/>
+          <p:cNvPr id="161" name="Flowchart: Delay 160"/>
           <p:cNvSpPr/>
           <p:nvPr/>
         </p:nvSpPr>
         <p:spPr>
           <a:xfrm rot="16200000">
-            <a:off x="6851720" y="954795"/>
+            <a:off x="6845012" y="862936"/>
             <a:ext cx="280353" cy="298983"/>
           </a:xfrm>
           <a:prstGeom prst="flowChartDelay">
@@ -6557,13 +6549,13 @@
       </p:sp>
       <p:sp>
         <p:nvSpPr>
-          <p:cNvPr id="91" name="Freeform 90"/>
+          <p:cNvPr id="162" name="Freeform 161"/>
           <p:cNvSpPr/>
           <p:nvPr/>
         </p:nvSpPr>
         <p:spPr>
           <a:xfrm rot="326821">
-            <a:off x="6940759" y="967464"/>
+            <a:off x="6934051" y="875605"/>
             <a:ext cx="102393" cy="235744"/>
           </a:xfrm>
           <a:custGeom>
@@ -6651,13 +6643,13 @@
       </p:sp>
       <p:sp>
         <p:nvSpPr>
-          <p:cNvPr id="89" name="Flowchart: Connector 88"/>
+          <p:cNvPr id="163" name="Flowchart: Connector 162"/>
           <p:cNvSpPr/>
           <p:nvPr/>
         </p:nvSpPr>
         <p:spPr>
           <a:xfrm rot="11865946">
-            <a:off x="6914554" y="729088"/>
+            <a:off x="6907846" y="637229"/>
             <a:ext cx="220662" cy="220662"/>
           </a:xfrm>
           <a:prstGeom prst="flowChartConnector">
@@ -6694,13 +6686,13 @@
       </p:sp>
       <p:sp>
         <p:nvSpPr>
-          <p:cNvPr id="96" name="Freeform 95"/>
+          <p:cNvPr id="164" name="Freeform 163"/>
           <p:cNvSpPr/>
           <p:nvPr/>
         </p:nvSpPr>
         <p:spPr>
           <a:xfrm rot="11865946">
-            <a:off x="6904559" y="736995"/>
+            <a:off x="6897851" y="645136"/>
             <a:ext cx="50006" cy="19050"/>
           </a:xfrm>
           <a:custGeom>
@@ -6803,13 +6795,13 @@
       </p:sp>
       <p:sp>
         <p:nvSpPr>
-          <p:cNvPr id="97" name="Flowchart: Connector 96"/>
+          <p:cNvPr id="165" name="Flowchart: Connector 164"/>
           <p:cNvSpPr/>
           <p:nvPr/>
         </p:nvSpPr>
         <p:spPr>
           <a:xfrm rot="11865946">
-            <a:off x="7031245" y="783890"/>
+            <a:off x="7024537" y="692031"/>
             <a:ext cx="45719" cy="45719"/>
           </a:xfrm>
           <a:prstGeom prst="flowChartConnector">
@@ -6853,7 +6845,7 @@
       </p:sp>
       <p:sp>
         <p:nvSpPr>
-          <p:cNvPr id="16" name="Freeform 15"/>
+          <p:cNvPr id="166" name="Freeform 165"/>
           <p:cNvSpPr/>
           <p:nvPr/>
         </p:nvSpPr>
@@ -6956,7 +6948,7 @@
       </p:sp>
       <p:sp>
         <p:nvSpPr>
-          <p:cNvPr id="17" name="Freeform 16"/>
+          <p:cNvPr id="167" name="Freeform 166"/>
           <p:cNvSpPr/>
           <p:nvPr/>
         </p:nvSpPr>
@@ -7196,14 +7188,14 @@
       </p:sp>
       <p:sp>
         <p:nvSpPr>
-          <p:cNvPr id="18" name="Freeform 17"/>
+          <p:cNvPr id="168" name="Freeform 167"/>
           <p:cNvSpPr/>
           <p:nvPr/>
         </p:nvSpPr>
         <p:spPr>
           <a:xfrm>
-            <a:off x="797728" y="989315"/>
-            <a:ext cx="982980" cy="726012"/>
+            <a:off x="797728" y="989167"/>
+            <a:ext cx="975836" cy="726159"/>
           </a:xfrm>
           <a:custGeom>
             <a:avLst/>
@@ -7240,6 +7232,30 @@
               <a:gd name="connsiteY2" fmla="*/ 194517 h 726012"/>
               <a:gd name="connsiteX3" fmla="*/ 0 w 982980"/>
               <a:gd name="connsiteY3" fmla="*/ 726012 h 726012"/>
+              <a:gd name="connsiteX0" fmla="*/ 982980 w 982980"/>
+              <a:gd name="connsiteY0" fmla="*/ 206475 h 709395"/>
+              <a:gd name="connsiteX1" fmla="*/ 546259 w 982980"/>
+              <a:gd name="connsiteY1" fmla="*/ 258 h 709395"/>
+              <a:gd name="connsiteX2" fmla="*/ 217170 w 982980"/>
+              <a:gd name="connsiteY2" fmla="*/ 177900 h 709395"/>
+              <a:gd name="connsiteX3" fmla="*/ 0 w 982980"/>
+              <a:gd name="connsiteY3" fmla="*/ 709395 h 709395"/>
+              <a:gd name="connsiteX0" fmla="*/ 975836 w 975836"/>
+              <a:gd name="connsiteY0" fmla="*/ 216179 h 709574"/>
+              <a:gd name="connsiteX1" fmla="*/ 546259 w 975836"/>
+              <a:gd name="connsiteY1" fmla="*/ 437 h 709574"/>
+              <a:gd name="connsiteX2" fmla="*/ 217170 w 975836"/>
+              <a:gd name="connsiteY2" fmla="*/ 178079 h 709574"/>
+              <a:gd name="connsiteX3" fmla="*/ 0 w 975836"/>
+              <a:gd name="connsiteY3" fmla="*/ 709574 h 709574"/>
+              <a:gd name="connsiteX0" fmla="*/ 975836 w 975836"/>
+              <a:gd name="connsiteY0" fmla="*/ 232764 h 726159"/>
+              <a:gd name="connsiteX1" fmla="*/ 577216 w 975836"/>
+              <a:gd name="connsiteY1" fmla="*/ 353 h 726159"/>
+              <a:gd name="connsiteX2" fmla="*/ 217170 w 975836"/>
+              <a:gd name="connsiteY2" fmla="*/ 194664 h 726159"/>
+              <a:gd name="connsiteX3" fmla="*/ 0 w 975836"/>
+              <a:gd name="connsiteY3" fmla="*/ 726159 h 726159"/>
             </a:gdLst>
             <a:ahLst/>
             <a:cxnLst>
@@ -7258,24 +7274,24 @@
             </a:cxnLst>
             <a:rect l="l" t="t" r="r" b="b"/>
             <a:pathLst>
-              <a:path w="982980" h="726012">
+              <a:path w="975836" h="726159">
                 <a:moveTo>
-                  <a:pt x="982980" y="223092"/>
+                  <a:pt x="975836" y="232764"/>
                 </a:moveTo>
                 <a:cubicBezTo>
-                  <a:pt x="929640" y="132128"/>
-                  <a:pt x="676275" y="4969"/>
-                  <a:pt x="548640" y="207"/>
+                  <a:pt x="922496" y="141800"/>
+                  <a:pt x="703660" y="6703"/>
+                  <a:pt x="577216" y="353"/>
                 </a:cubicBezTo>
                 <a:cubicBezTo>
-                  <a:pt x="421005" y="-4555"/>
-                  <a:pt x="308610" y="73550"/>
-                  <a:pt x="217170" y="194517"/>
+                  <a:pt x="450772" y="-5997"/>
+                  <a:pt x="308610" y="73697"/>
+                  <a:pt x="217170" y="194664"/>
                 </a:cubicBezTo>
                 <a:cubicBezTo>
-                  <a:pt x="125730" y="315484"/>
-                  <a:pt x="62865" y="495507"/>
-                  <a:pt x="0" y="726012"/>
+                  <a:pt x="125730" y="315631"/>
+                  <a:pt x="62865" y="495654"/>
+                  <a:pt x="0" y="726159"/>
                 </a:cubicBezTo>
               </a:path>
             </a:pathLst>
@@ -7316,6 +7332,3480 @@
           </a:p>
         </p:txBody>
       </p:sp>
+      <p:sp>
+        <p:nvSpPr>
+          <p:cNvPr id="169" name="Freeform 7"/>
+          <p:cNvSpPr>
+            <a:spLocks/>
+          </p:cNvSpPr>
+          <p:nvPr/>
+        </p:nvSpPr>
+        <p:spPr bwMode="auto">
+          <a:xfrm>
+            <a:off x="6311900" y="1476375"/>
+            <a:ext cx="177800" cy="258763"/>
+          </a:xfrm>
+          <a:custGeom>
+            <a:avLst/>
+            <a:gdLst>
+              <a:gd name="T0" fmla="*/ 475 w 900"/>
+              <a:gd name="T1" fmla="*/ 204 h 1469"/>
+              <a:gd name="T2" fmla="*/ 527 w 900"/>
+              <a:gd name="T3" fmla="*/ 239 h 1469"/>
+              <a:gd name="T4" fmla="*/ 573 w 900"/>
+              <a:gd name="T5" fmla="*/ 280 h 1469"/>
+              <a:gd name="T6" fmla="*/ 601 w 900"/>
+              <a:gd name="T7" fmla="*/ 330 h 1469"/>
+              <a:gd name="T8" fmla="*/ 604 w 900"/>
+              <a:gd name="T9" fmla="*/ 437 h 1469"/>
+              <a:gd name="T10" fmla="*/ 579 w 900"/>
+              <a:gd name="T11" fmla="*/ 589 h 1469"/>
+              <a:gd name="T12" fmla="*/ 540 w 900"/>
+              <a:gd name="T13" fmla="*/ 739 h 1469"/>
+              <a:gd name="T14" fmla="*/ 500 w 900"/>
+              <a:gd name="T15" fmla="*/ 891 h 1469"/>
+              <a:gd name="T16" fmla="*/ 474 w 900"/>
+              <a:gd name="T17" fmla="*/ 1077 h 1469"/>
+              <a:gd name="T18" fmla="*/ 469 w 900"/>
+              <a:gd name="T19" fmla="*/ 1362 h 1469"/>
+              <a:gd name="T20" fmla="*/ 476 w 900"/>
+              <a:gd name="T21" fmla="*/ 1469 h 1469"/>
+              <a:gd name="T22" fmla="*/ 505 w 900"/>
+              <a:gd name="T23" fmla="*/ 1467 h 1469"/>
+              <a:gd name="T24" fmla="*/ 555 w 900"/>
+              <a:gd name="T25" fmla="*/ 1462 h 1469"/>
+              <a:gd name="T26" fmla="*/ 617 w 900"/>
+              <a:gd name="T27" fmla="*/ 1454 h 1469"/>
+              <a:gd name="T28" fmla="*/ 685 w 900"/>
+              <a:gd name="T29" fmla="*/ 1444 h 1469"/>
+              <a:gd name="T30" fmla="*/ 748 w 900"/>
+              <a:gd name="T31" fmla="*/ 1429 h 1469"/>
+              <a:gd name="T32" fmla="*/ 801 w 900"/>
+              <a:gd name="T33" fmla="*/ 1410 h 1469"/>
+              <a:gd name="T34" fmla="*/ 833 w 900"/>
+              <a:gd name="T35" fmla="*/ 1388 h 1469"/>
+              <a:gd name="T36" fmla="*/ 863 w 900"/>
+              <a:gd name="T37" fmla="*/ 1204 h 1469"/>
+              <a:gd name="T38" fmla="*/ 894 w 900"/>
+              <a:gd name="T39" fmla="*/ 903 h 1469"/>
+              <a:gd name="T40" fmla="*/ 899 w 900"/>
+              <a:gd name="T41" fmla="*/ 640 h 1469"/>
+              <a:gd name="T42" fmla="*/ 871 w 900"/>
+              <a:gd name="T43" fmla="*/ 395 h 1469"/>
+              <a:gd name="T44" fmla="*/ 834 w 900"/>
+              <a:gd name="T45" fmla="*/ 248 h 1469"/>
+              <a:gd name="T46" fmla="*/ 803 w 900"/>
+              <a:gd name="T47" fmla="*/ 201 h 1469"/>
+              <a:gd name="T48" fmla="*/ 763 w 900"/>
+              <a:gd name="T49" fmla="*/ 159 h 1469"/>
+              <a:gd name="T50" fmla="*/ 718 w 900"/>
+              <a:gd name="T51" fmla="*/ 121 h 1469"/>
+              <a:gd name="T52" fmla="*/ 665 w 900"/>
+              <a:gd name="T53" fmla="*/ 86 h 1469"/>
+              <a:gd name="T54" fmla="*/ 611 w 900"/>
+              <a:gd name="T55" fmla="*/ 56 h 1469"/>
+              <a:gd name="T56" fmla="*/ 554 w 900"/>
+              <a:gd name="T57" fmla="*/ 31 h 1469"/>
+              <a:gd name="T58" fmla="*/ 497 w 900"/>
+              <a:gd name="T59" fmla="*/ 10 h 1469"/>
+              <a:gd name="T60" fmla="*/ 439 w 900"/>
+              <a:gd name="T61" fmla="*/ 0 h 1469"/>
+              <a:gd name="T62" fmla="*/ 371 w 900"/>
+              <a:gd name="T63" fmla="*/ 3 h 1469"/>
+              <a:gd name="T64" fmla="*/ 300 w 900"/>
+              <a:gd name="T65" fmla="*/ 11 h 1469"/>
+              <a:gd name="T66" fmla="*/ 228 w 900"/>
+              <a:gd name="T67" fmla="*/ 26 h 1469"/>
+              <a:gd name="T68" fmla="*/ 159 w 900"/>
+              <a:gd name="T69" fmla="*/ 50 h 1469"/>
+              <a:gd name="T70" fmla="*/ 97 w 900"/>
+              <a:gd name="T71" fmla="*/ 82 h 1469"/>
+              <a:gd name="T72" fmla="*/ 47 w 900"/>
+              <a:gd name="T73" fmla="*/ 124 h 1469"/>
+              <a:gd name="T74" fmla="*/ 12 w 900"/>
+              <a:gd name="T75" fmla="*/ 176 h 1469"/>
+              <a:gd name="T76" fmla="*/ 4 w 900"/>
+              <a:gd name="T77" fmla="*/ 206 h 1469"/>
+              <a:gd name="T78" fmla="*/ 29 w 900"/>
+              <a:gd name="T79" fmla="*/ 204 h 1469"/>
+              <a:gd name="T80" fmla="*/ 77 w 900"/>
+              <a:gd name="T81" fmla="*/ 199 h 1469"/>
+              <a:gd name="T82" fmla="*/ 140 w 900"/>
+              <a:gd name="T83" fmla="*/ 192 h 1469"/>
+              <a:gd name="T84" fmla="*/ 213 w 900"/>
+              <a:gd name="T85" fmla="*/ 185 h 1469"/>
+              <a:gd name="T86" fmla="*/ 288 w 900"/>
+              <a:gd name="T87" fmla="*/ 181 h 1469"/>
+              <a:gd name="T88" fmla="*/ 361 w 900"/>
+              <a:gd name="T89" fmla="*/ 180 h 1469"/>
+              <a:gd name="T90" fmla="*/ 424 w 900"/>
+              <a:gd name="T91" fmla="*/ 184 h 1469"/>
+            </a:gdLst>
+            <a:ahLst/>
+            <a:cxnLst>
+              <a:cxn ang="0">
+                <a:pos x="T0" y="T1"/>
+              </a:cxn>
+              <a:cxn ang="0">
+                <a:pos x="T2" y="T3"/>
+              </a:cxn>
+              <a:cxn ang="0">
+                <a:pos x="T4" y="T5"/>
+              </a:cxn>
+              <a:cxn ang="0">
+                <a:pos x="T6" y="T7"/>
+              </a:cxn>
+              <a:cxn ang="0">
+                <a:pos x="T8" y="T9"/>
+              </a:cxn>
+              <a:cxn ang="0">
+                <a:pos x="T10" y="T11"/>
+              </a:cxn>
+              <a:cxn ang="0">
+                <a:pos x="T12" y="T13"/>
+              </a:cxn>
+              <a:cxn ang="0">
+                <a:pos x="T14" y="T15"/>
+              </a:cxn>
+              <a:cxn ang="0">
+                <a:pos x="T16" y="T17"/>
+              </a:cxn>
+              <a:cxn ang="0">
+                <a:pos x="T18" y="T19"/>
+              </a:cxn>
+              <a:cxn ang="0">
+                <a:pos x="T20" y="T21"/>
+              </a:cxn>
+              <a:cxn ang="0">
+                <a:pos x="T22" y="T23"/>
+              </a:cxn>
+              <a:cxn ang="0">
+                <a:pos x="T24" y="T25"/>
+              </a:cxn>
+              <a:cxn ang="0">
+                <a:pos x="T26" y="T27"/>
+              </a:cxn>
+              <a:cxn ang="0">
+                <a:pos x="T28" y="T29"/>
+              </a:cxn>
+              <a:cxn ang="0">
+                <a:pos x="T30" y="T31"/>
+              </a:cxn>
+              <a:cxn ang="0">
+                <a:pos x="T32" y="T33"/>
+              </a:cxn>
+              <a:cxn ang="0">
+                <a:pos x="T34" y="T35"/>
+              </a:cxn>
+              <a:cxn ang="0">
+                <a:pos x="T36" y="T37"/>
+              </a:cxn>
+              <a:cxn ang="0">
+                <a:pos x="T38" y="T39"/>
+              </a:cxn>
+              <a:cxn ang="0">
+                <a:pos x="T40" y="T41"/>
+              </a:cxn>
+              <a:cxn ang="0">
+                <a:pos x="T42" y="T43"/>
+              </a:cxn>
+              <a:cxn ang="0">
+                <a:pos x="T44" y="T45"/>
+              </a:cxn>
+              <a:cxn ang="0">
+                <a:pos x="T46" y="T47"/>
+              </a:cxn>
+              <a:cxn ang="0">
+                <a:pos x="T48" y="T49"/>
+              </a:cxn>
+              <a:cxn ang="0">
+                <a:pos x="T50" y="T51"/>
+              </a:cxn>
+              <a:cxn ang="0">
+                <a:pos x="T52" y="T53"/>
+              </a:cxn>
+              <a:cxn ang="0">
+                <a:pos x="T54" y="T55"/>
+              </a:cxn>
+              <a:cxn ang="0">
+                <a:pos x="T56" y="T57"/>
+              </a:cxn>
+              <a:cxn ang="0">
+                <a:pos x="T58" y="T59"/>
+              </a:cxn>
+              <a:cxn ang="0">
+                <a:pos x="T60" y="T61"/>
+              </a:cxn>
+              <a:cxn ang="0">
+                <a:pos x="T62" y="T63"/>
+              </a:cxn>
+              <a:cxn ang="0">
+                <a:pos x="T64" y="T65"/>
+              </a:cxn>
+              <a:cxn ang="0">
+                <a:pos x="T66" y="T67"/>
+              </a:cxn>
+              <a:cxn ang="0">
+                <a:pos x="T68" y="T69"/>
+              </a:cxn>
+              <a:cxn ang="0">
+                <a:pos x="T70" y="T71"/>
+              </a:cxn>
+              <a:cxn ang="0">
+                <a:pos x="T72" y="T73"/>
+              </a:cxn>
+              <a:cxn ang="0">
+                <a:pos x="T74" y="T75"/>
+              </a:cxn>
+              <a:cxn ang="0">
+                <a:pos x="T76" y="T77"/>
+              </a:cxn>
+              <a:cxn ang="0">
+                <a:pos x="T78" y="T79"/>
+              </a:cxn>
+              <a:cxn ang="0">
+                <a:pos x="T80" y="T81"/>
+              </a:cxn>
+              <a:cxn ang="0">
+                <a:pos x="T82" y="T83"/>
+              </a:cxn>
+              <a:cxn ang="0">
+                <a:pos x="T84" y="T85"/>
+              </a:cxn>
+              <a:cxn ang="0">
+                <a:pos x="T86" y="T87"/>
+              </a:cxn>
+              <a:cxn ang="0">
+                <a:pos x="T88" y="T89"/>
+              </a:cxn>
+              <a:cxn ang="0">
+                <a:pos x="T90" y="T91"/>
+              </a:cxn>
+            </a:cxnLst>
+            <a:rect l="0" t="0" r="r" b="b"/>
+            <a:pathLst>
+              <a:path w="900" h="1469">
+                <a:moveTo>
+                  <a:pt x="450" y="188"/>
+                </a:moveTo>
+                <a:lnTo>
+                  <a:pt x="475" y="204"/>
+                </a:lnTo>
+                <a:lnTo>
+                  <a:pt x="502" y="221"/>
+                </a:lnTo>
+                <a:lnTo>
+                  <a:pt x="527" y="239"/>
+                </a:lnTo>
+                <a:lnTo>
+                  <a:pt x="552" y="258"/>
+                </a:lnTo>
+                <a:lnTo>
+                  <a:pt x="573" y="280"/>
+                </a:lnTo>
+                <a:lnTo>
+                  <a:pt x="590" y="303"/>
+                </a:lnTo>
+                <a:lnTo>
+                  <a:pt x="601" y="330"/>
+                </a:lnTo>
+                <a:lnTo>
+                  <a:pt x="606" y="359"/>
+                </a:lnTo>
+                <a:lnTo>
+                  <a:pt x="604" y="437"/>
+                </a:lnTo>
+                <a:lnTo>
+                  <a:pt x="593" y="514"/>
+                </a:lnTo>
+                <a:lnTo>
+                  <a:pt x="579" y="589"/>
+                </a:lnTo>
+                <a:lnTo>
+                  <a:pt x="560" y="664"/>
+                </a:lnTo>
+                <a:lnTo>
+                  <a:pt x="540" y="739"/>
+                </a:lnTo>
+                <a:lnTo>
+                  <a:pt x="519" y="815"/>
+                </a:lnTo>
+                <a:lnTo>
+                  <a:pt x="500" y="891"/>
+                </a:lnTo>
+                <a:lnTo>
+                  <a:pt x="484" y="969"/>
+                </a:lnTo>
+                <a:lnTo>
+                  <a:pt x="474" y="1077"/>
+                </a:lnTo>
+                <a:lnTo>
+                  <a:pt x="469" y="1220"/>
+                </a:lnTo>
+                <a:lnTo>
+                  <a:pt x="469" y="1362"/>
+                </a:lnTo>
+                <a:lnTo>
+                  <a:pt x="472" y="1469"/>
+                </a:lnTo>
+                <a:lnTo>
+                  <a:pt x="476" y="1469"/>
+                </a:lnTo>
+                <a:lnTo>
+                  <a:pt x="486" y="1468"/>
+                </a:lnTo>
+                <a:lnTo>
+                  <a:pt x="505" y="1467"/>
+                </a:lnTo>
+                <a:lnTo>
+                  <a:pt x="527" y="1465"/>
+                </a:lnTo>
+                <a:lnTo>
+                  <a:pt x="555" y="1462"/>
+                </a:lnTo>
+                <a:lnTo>
+                  <a:pt x="584" y="1459"/>
+                </a:lnTo>
+                <a:lnTo>
+                  <a:pt x="617" y="1454"/>
+                </a:lnTo>
+                <a:lnTo>
+                  <a:pt x="650" y="1449"/>
+                </a:lnTo>
+                <a:lnTo>
+                  <a:pt x="685" y="1444"/>
+                </a:lnTo>
+                <a:lnTo>
+                  <a:pt x="718" y="1436"/>
+                </a:lnTo>
+                <a:lnTo>
+                  <a:pt x="748" y="1429"/>
+                </a:lnTo>
+                <a:lnTo>
+                  <a:pt x="776" y="1421"/>
+                </a:lnTo>
+                <a:lnTo>
+                  <a:pt x="801" y="1410"/>
+                </a:lnTo>
+                <a:lnTo>
+                  <a:pt x="819" y="1400"/>
+                </a:lnTo>
+                <a:lnTo>
+                  <a:pt x="833" y="1388"/>
+                </a:lnTo>
+                <a:lnTo>
+                  <a:pt x="838" y="1374"/>
+                </a:lnTo>
+                <a:lnTo>
+                  <a:pt x="863" y="1204"/>
+                </a:lnTo>
+                <a:lnTo>
+                  <a:pt x="881" y="1048"/>
+                </a:lnTo>
+                <a:lnTo>
+                  <a:pt x="894" y="903"/>
+                </a:lnTo>
+                <a:lnTo>
+                  <a:pt x="900" y="769"/>
+                </a:lnTo>
+                <a:lnTo>
+                  <a:pt x="899" y="640"/>
+                </a:lnTo>
+                <a:lnTo>
+                  <a:pt x="888" y="517"/>
+                </a:lnTo>
+                <a:lnTo>
+                  <a:pt x="871" y="395"/>
+                </a:lnTo>
+                <a:lnTo>
+                  <a:pt x="845" y="273"/>
+                </a:lnTo>
+                <a:lnTo>
+                  <a:pt x="834" y="248"/>
+                </a:lnTo>
+                <a:lnTo>
+                  <a:pt x="819" y="224"/>
+                </a:lnTo>
+                <a:lnTo>
+                  <a:pt x="803" y="201"/>
+                </a:lnTo>
+                <a:lnTo>
+                  <a:pt x="784" y="180"/>
+                </a:lnTo>
+                <a:lnTo>
+                  <a:pt x="763" y="159"/>
+                </a:lnTo>
+                <a:lnTo>
+                  <a:pt x="741" y="139"/>
+                </a:lnTo>
+                <a:lnTo>
+                  <a:pt x="718" y="121"/>
+                </a:lnTo>
+                <a:lnTo>
+                  <a:pt x="691" y="103"/>
+                </a:lnTo>
+                <a:lnTo>
+                  <a:pt x="665" y="86"/>
+                </a:lnTo>
+                <a:lnTo>
+                  <a:pt x="638" y="71"/>
+                </a:lnTo>
+                <a:lnTo>
+                  <a:pt x="611" y="56"/>
+                </a:lnTo>
+                <a:lnTo>
+                  <a:pt x="582" y="43"/>
+                </a:lnTo>
+                <a:lnTo>
+                  <a:pt x="554" y="31"/>
+                </a:lnTo>
+                <a:lnTo>
+                  <a:pt x="525" y="20"/>
+                </a:lnTo>
+                <a:lnTo>
+                  <a:pt x="497" y="10"/>
+                </a:lnTo>
+                <a:lnTo>
+                  <a:pt x="469" y="1"/>
+                </a:lnTo>
+                <a:lnTo>
+                  <a:pt x="439" y="0"/>
+                </a:lnTo>
+                <a:lnTo>
+                  <a:pt x="406" y="0"/>
+                </a:lnTo>
+                <a:lnTo>
+                  <a:pt x="371" y="3"/>
+                </a:lnTo>
+                <a:lnTo>
+                  <a:pt x="336" y="6"/>
+                </a:lnTo>
+                <a:lnTo>
+                  <a:pt x="300" y="11"/>
+                </a:lnTo>
+                <a:lnTo>
+                  <a:pt x="263" y="17"/>
+                </a:lnTo>
+                <a:lnTo>
+                  <a:pt x="228" y="26"/>
+                </a:lnTo>
+                <a:lnTo>
+                  <a:pt x="193" y="37"/>
+                </a:lnTo>
+                <a:lnTo>
+                  <a:pt x="159" y="50"/>
+                </a:lnTo>
+                <a:lnTo>
+                  <a:pt x="127" y="65"/>
+                </a:lnTo>
+                <a:lnTo>
+                  <a:pt x="97" y="82"/>
+                </a:lnTo>
+                <a:lnTo>
+                  <a:pt x="71" y="102"/>
+                </a:lnTo>
+                <a:lnTo>
+                  <a:pt x="47" y="124"/>
+                </a:lnTo>
+                <a:lnTo>
+                  <a:pt x="26" y="148"/>
+                </a:lnTo>
+                <a:lnTo>
+                  <a:pt x="12" y="176"/>
+                </a:lnTo>
+                <a:lnTo>
+                  <a:pt x="0" y="206"/>
+                </a:lnTo>
+                <a:lnTo>
+                  <a:pt x="4" y="206"/>
+                </a:lnTo>
+                <a:lnTo>
+                  <a:pt x="13" y="206"/>
+                </a:lnTo>
+                <a:lnTo>
+                  <a:pt x="29" y="204"/>
+                </a:lnTo>
+                <a:lnTo>
+                  <a:pt x="50" y="202"/>
+                </a:lnTo>
+                <a:lnTo>
+                  <a:pt x="77" y="199"/>
+                </a:lnTo>
+                <a:lnTo>
+                  <a:pt x="107" y="196"/>
+                </a:lnTo>
+                <a:lnTo>
+                  <a:pt x="140" y="192"/>
+                </a:lnTo>
+                <a:lnTo>
+                  <a:pt x="176" y="188"/>
+                </a:lnTo>
+                <a:lnTo>
+                  <a:pt x="213" y="185"/>
+                </a:lnTo>
+                <a:lnTo>
+                  <a:pt x="251" y="183"/>
+                </a:lnTo>
+                <a:lnTo>
+                  <a:pt x="288" y="181"/>
+                </a:lnTo>
+                <a:lnTo>
+                  <a:pt x="325" y="180"/>
+                </a:lnTo>
+                <a:lnTo>
+                  <a:pt x="361" y="180"/>
+                </a:lnTo>
+                <a:lnTo>
+                  <a:pt x="394" y="181"/>
+                </a:lnTo>
+                <a:lnTo>
+                  <a:pt x="424" y="184"/>
+                </a:lnTo>
+                <a:lnTo>
+                  <a:pt x="450" y="188"/>
+                </a:lnTo>
+                <a:close/>
+              </a:path>
+            </a:pathLst>
+          </a:custGeom>
+          <a:solidFill>
+            <a:srgbClr val="FFFFEA"/>
+          </a:solidFill>
+          <a:ln>
+            <a:noFill/>
+          </a:ln>
+          <a:extLst>
+            <a:ext uri="{91240B29-F687-4F45-9708-019B960494DF}">
+              <a14:hiddenLine xmlns:a14="http://schemas.microsoft.com/office/drawing/2010/main" w="9525">
+                <a:solidFill>
+                  <a:srgbClr val="000000"/>
+                </a:solidFill>
+                <a:round/>
+                <a:headEnd/>
+                <a:tailEnd/>
+              </a14:hiddenLine>
+            </a:ext>
+          </a:extLst>
+        </p:spPr>
+        <p:txBody>
+          <a:bodyPr vert="horz" wrap="square" lIns="91440" tIns="45720" rIns="91440" bIns="45720" numCol="1" anchor="t" anchorCtr="0" compatLnSpc="1">
+            <a:prstTxWarp prst="textNoShape">
+              <a:avLst/>
+            </a:prstTxWarp>
+          </a:bodyPr>
+          <a:lstStyle/>
+          <a:p>
+            <a:endParaRPr lang="en-SG"/>
+          </a:p>
+        </p:txBody>
+      </p:sp>
+      <p:sp>
+        <p:nvSpPr>
+          <p:cNvPr id="170" name="Freeform 8"/>
+          <p:cNvSpPr>
+            <a:spLocks/>
+          </p:cNvSpPr>
+          <p:nvPr/>
+        </p:nvSpPr>
+        <p:spPr bwMode="auto">
+          <a:xfrm>
+            <a:off x="6364288" y="1446213"/>
+            <a:ext cx="15875" cy="25400"/>
+          </a:xfrm>
+          <a:custGeom>
+            <a:avLst/>
+            <a:gdLst>
+              <a:gd name="T0" fmla="*/ 2 w 81"/>
+              <a:gd name="T1" fmla="*/ 11 h 146"/>
+              <a:gd name="T2" fmla="*/ 0 w 81"/>
+              <a:gd name="T3" fmla="*/ 44 h 146"/>
+              <a:gd name="T4" fmla="*/ 1 w 81"/>
+              <a:gd name="T5" fmla="*/ 76 h 146"/>
+              <a:gd name="T6" fmla="*/ 7 w 81"/>
+              <a:gd name="T7" fmla="*/ 109 h 146"/>
+              <a:gd name="T8" fmla="*/ 21 w 81"/>
+              <a:gd name="T9" fmla="*/ 140 h 146"/>
+              <a:gd name="T10" fmla="*/ 25 w 81"/>
+              <a:gd name="T11" fmla="*/ 144 h 146"/>
+              <a:gd name="T12" fmla="*/ 33 w 81"/>
+              <a:gd name="T13" fmla="*/ 146 h 146"/>
+              <a:gd name="T14" fmla="*/ 43 w 81"/>
+              <a:gd name="T15" fmla="*/ 145 h 146"/>
+              <a:gd name="T16" fmla="*/ 55 w 81"/>
+              <a:gd name="T17" fmla="*/ 143 h 146"/>
+              <a:gd name="T18" fmla="*/ 65 w 81"/>
+              <a:gd name="T19" fmla="*/ 139 h 146"/>
+              <a:gd name="T20" fmla="*/ 74 w 81"/>
+              <a:gd name="T21" fmla="*/ 133 h 146"/>
+              <a:gd name="T22" fmla="*/ 80 w 81"/>
+              <a:gd name="T23" fmla="*/ 128 h 146"/>
+              <a:gd name="T24" fmla="*/ 81 w 81"/>
+              <a:gd name="T25" fmla="*/ 122 h 146"/>
+              <a:gd name="T26" fmla="*/ 77 w 81"/>
+              <a:gd name="T27" fmla="*/ 106 h 146"/>
+              <a:gd name="T28" fmla="*/ 73 w 81"/>
+              <a:gd name="T29" fmla="*/ 90 h 146"/>
+              <a:gd name="T30" fmla="*/ 68 w 81"/>
+              <a:gd name="T31" fmla="*/ 75 h 146"/>
+              <a:gd name="T32" fmla="*/ 63 w 81"/>
+              <a:gd name="T33" fmla="*/ 60 h 146"/>
+              <a:gd name="T34" fmla="*/ 56 w 81"/>
+              <a:gd name="T35" fmla="*/ 45 h 146"/>
+              <a:gd name="T36" fmla="*/ 48 w 81"/>
+              <a:gd name="T37" fmla="*/ 30 h 146"/>
+              <a:gd name="T38" fmla="*/ 40 w 81"/>
+              <a:gd name="T39" fmla="*/ 16 h 146"/>
+              <a:gd name="T40" fmla="*/ 31 w 81"/>
+              <a:gd name="T41" fmla="*/ 3 h 146"/>
+              <a:gd name="T42" fmla="*/ 25 w 81"/>
+              <a:gd name="T43" fmla="*/ 0 h 146"/>
+              <a:gd name="T44" fmla="*/ 15 w 81"/>
+              <a:gd name="T45" fmla="*/ 1 h 146"/>
+              <a:gd name="T46" fmla="*/ 6 w 81"/>
+              <a:gd name="T47" fmla="*/ 6 h 146"/>
+              <a:gd name="T48" fmla="*/ 2 w 81"/>
+              <a:gd name="T49" fmla="*/ 11 h 146"/>
+              <a:gd name="T50" fmla="*/ 2 w 81"/>
+              <a:gd name="T51" fmla="*/ 11 h 146"/>
+            </a:gdLst>
+            <a:ahLst/>
+            <a:cxnLst>
+              <a:cxn ang="0">
+                <a:pos x="T0" y="T1"/>
+              </a:cxn>
+              <a:cxn ang="0">
+                <a:pos x="T2" y="T3"/>
+              </a:cxn>
+              <a:cxn ang="0">
+                <a:pos x="T4" y="T5"/>
+              </a:cxn>
+              <a:cxn ang="0">
+                <a:pos x="T6" y="T7"/>
+              </a:cxn>
+              <a:cxn ang="0">
+                <a:pos x="T8" y="T9"/>
+              </a:cxn>
+              <a:cxn ang="0">
+                <a:pos x="T10" y="T11"/>
+              </a:cxn>
+              <a:cxn ang="0">
+                <a:pos x="T12" y="T13"/>
+              </a:cxn>
+              <a:cxn ang="0">
+                <a:pos x="T14" y="T15"/>
+              </a:cxn>
+              <a:cxn ang="0">
+                <a:pos x="T16" y="T17"/>
+              </a:cxn>
+              <a:cxn ang="0">
+                <a:pos x="T18" y="T19"/>
+              </a:cxn>
+              <a:cxn ang="0">
+                <a:pos x="T20" y="T21"/>
+              </a:cxn>
+              <a:cxn ang="0">
+                <a:pos x="T22" y="T23"/>
+              </a:cxn>
+              <a:cxn ang="0">
+                <a:pos x="T24" y="T25"/>
+              </a:cxn>
+              <a:cxn ang="0">
+                <a:pos x="T26" y="T27"/>
+              </a:cxn>
+              <a:cxn ang="0">
+                <a:pos x="T28" y="T29"/>
+              </a:cxn>
+              <a:cxn ang="0">
+                <a:pos x="T30" y="T31"/>
+              </a:cxn>
+              <a:cxn ang="0">
+                <a:pos x="T32" y="T33"/>
+              </a:cxn>
+              <a:cxn ang="0">
+                <a:pos x="T34" y="T35"/>
+              </a:cxn>
+              <a:cxn ang="0">
+                <a:pos x="T36" y="T37"/>
+              </a:cxn>
+              <a:cxn ang="0">
+                <a:pos x="T38" y="T39"/>
+              </a:cxn>
+              <a:cxn ang="0">
+                <a:pos x="T40" y="T41"/>
+              </a:cxn>
+              <a:cxn ang="0">
+                <a:pos x="T42" y="T43"/>
+              </a:cxn>
+              <a:cxn ang="0">
+                <a:pos x="T44" y="T45"/>
+              </a:cxn>
+              <a:cxn ang="0">
+                <a:pos x="T46" y="T47"/>
+              </a:cxn>
+              <a:cxn ang="0">
+                <a:pos x="T48" y="T49"/>
+              </a:cxn>
+              <a:cxn ang="0">
+                <a:pos x="T50" y="T51"/>
+              </a:cxn>
+            </a:cxnLst>
+            <a:rect l="0" t="0" r="r" b="b"/>
+            <a:pathLst>
+              <a:path w="81" h="146">
+                <a:moveTo>
+                  <a:pt x="2" y="11"/>
+                </a:moveTo>
+                <a:lnTo>
+                  <a:pt x="0" y="44"/>
+                </a:lnTo>
+                <a:lnTo>
+                  <a:pt x="1" y="76"/>
+                </a:lnTo>
+                <a:lnTo>
+                  <a:pt x="7" y="109"/>
+                </a:lnTo>
+                <a:lnTo>
+                  <a:pt x="21" y="140"/>
+                </a:lnTo>
+                <a:lnTo>
+                  <a:pt x="25" y="144"/>
+                </a:lnTo>
+                <a:lnTo>
+                  <a:pt x="33" y="146"/>
+                </a:lnTo>
+                <a:lnTo>
+                  <a:pt x="43" y="145"/>
+                </a:lnTo>
+                <a:lnTo>
+                  <a:pt x="55" y="143"/>
+                </a:lnTo>
+                <a:lnTo>
+                  <a:pt x="65" y="139"/>
+                </a:lnTo>
+                <a:lnTo>
+                  <a:pt x="74" y="133"/>
+                </a:lnTo>
+                <a:lnTo>
+                  <a:pt x="80" y="128"/>
+                </a:lnTo>
+                <a:lnTo>
+                  <a:pt x="81" y="122"/>
+                </a:lnTo>
+                <a:lnTo>
+                  <a:pt x="77" y="106"/>
+                </a:lnTo>
+                <a:lnTo>
+                  <a:pt x="73" y="90"/>
+                </a:lnTo>
+                <a:lnTo>
+                  <a:pt x="68" y="75"/>
+                </a:lnTo>
+                <a:lnTo>
+                  <a:pt x="63" y="60"/>
+                </a:lnTo>
+                <a:lnTo>
+                  <a:pt x="56" y="45"/>
+                </a:lnTo>
+                <a:lnTo>
+                  <a:pt x="48" y="30"/>
+                </a:lnTo>
+                <a:lnTo>
+                  <a:pt x="40" y="16"/>
+                </a:lnTo>
+                <a:lnTo>
+                  <a:pt x="31" y="3"/>
+                </a:lnTo>
+                <a:lnTo>
+                  <a:pt x="25" y="0"/>
+                </a:lnTo>
+                <a:lnTo>
+                  <a:pt x="15" y="1"/>
+                </a:lnTo>
+                <a:lnTo>
+                  <a:pt x="6" y="6"/>
+                </a:lnTo>
+                <a:lnTo>
+                  <a:pt x="2" y="11"/>
+                </a:lnTo>
+                <a:lnTo>
+                  <a:pt x="2" y="11"/>
+                </a:lnTo>
+                <a:close/>
+              </a:path>
+            </a:pathLst>
+          </a:custGeom>
+          <a:solidFill>
+            <a:srgbClr val="FFFFEA"/>
+          </a:solidFill>
+          <a:ln>
+            <a:noFill/>
+          </a:ln>
+          <a:extLst>
+            <a:ext uri="{91240B29-F687-4F45-9708-019B960494DF}">
+              <a14:hiddenLine xmlns:a14="http://schemas.microsoft.com/office/drawing/2010/main" w="9525">
+                <a:solidFill>
+                  <a:srgbClr val="000000"/>
+                </a:solidFill>
+                <a:round/>
+                <a:headEnd/>
+                <a:tailEnd/>
+              </a14:hiddenLine>
+            </a:ext>
+          </a:extLst>
+        </p:spPr>
+        <p:txBody>
+          <a:bodyPr vert="horz" wrap="square" lIns="91440" tIns="45720" rIns="91440" bIns="45720" numCol="1" anchor="t" anchorCtr="0" compatLnSpc="1">
+            <a:prstTxWarp prst="textNoShape">
+              <a:avLst/>
+            </a:prstTxWarp>
+          </a:bodyPr>
+          <a:lstStyle/>
+          <a:p>
+            <a:endParaRPr lang="en-SG"/>
+          </a:p>
+        </p:txBody>
+      </p:sp>
+      <p:sp>
+        <p:nvSpPr>
+          <p:cNvPr id="171" name="Freeform 9"/>
+          <p:cNvSpPr>
+            <a:spLocks/>
+          </p:cNvSpPr>
+          <p:nvPr/>
+        </p:nvSpPr>
+        <p:spPr bwMode="auto">
+          <a:xfrm rot="2760171" flipH="1">
+            <a:off x="6071869" y="1628232"/>
+            <a:ext cx="403225" cy="376238"/>
+          </a:xfrm>
+          <a:custGeom>
+            <a:avLst/>
+            <a:gdLst>
+              <a:gd name="T0" fmla="*/ 1726 w 2029"/>
+              <a:gd name="T1" fmla="*/ 1943 h 2127"/>
+              <a:gd name="T2" fmla="*/ 1429 w 2029"/>
+              <a:gd name="T3" fmla="*/ 2016 h 2127"/>
+              <a:gd name="T4" fmla="*/ 1211 w 2029"/>
+              <a:gd name="T5" fmla="*/ 1616 h 2127"/>
+              <a:gd name="T6" fmla="*/ 1104 w 2029"/>
+              <a:gd name="T7" fmla="*/ 1279 h 2127"/>
+              <a:gd name="T8" fmla="*/ 1307 w 2029"/>
+              <a:gd name="T9" fmla="*/ 1164 h 2127"/>
+              <a:gd name="T10" fmla="*/ 1527 w 2029"/>
+              <a:gd name="T11" fmla="*/ 1092 h 2127"/>
+              <a:gd name="T12" fmla="*/ 1764 w 2029"/>
+              <a:gd name="T13" fmla="*/ 1084 h 2127"/>
+              <a:gd name="T14" fmla="*/ 1610 w 2029"/>
+              <a:gd name="T15" fmla="*/ 1008 h 2127"/>
+              <a:gd name="T16" fmla="*/ 1487 w 2029"/>
+              <a:gd name="T17" fmla="*/ 957 h 2127"/>
+              <a:gd name="T18" fmla="*/ 1403 w 2029"/>
+              <a:gd name="T19" fmla="*/ 1048 h 2127"/>
+              <a:gd name="T20" fmla="*/ 1249 w 2029"/>
+              <a:gd name="T21" fmla="*/ 1107 h 2127"/>
+              <a:gd name="T22" fmla="*/ 1057 w 2029"/>
+              <a:gd name="T23" fmla="*/ 1220 h 2127"/>
+              <a:gd name="T24" fmla="*/ 1094 w 2029"/>
+              <a:gd name="T25" fmla="*/ 755 h 2127"/>
+              <a:gd name="T26" fmla="*/ 1276 w 2029"/>
+              <a:gd name="T27" fmla="*/ 614 h 2127"/>
+              <a:gd name="T28" fmla="*/ 1401 w 2029"/>
+              <a:gd name="T29" fmla="*/ 847 h 2127"/>
+              <a:gd name="T30" fmla="*/ 1407 w 2029"/>
+              <a:gd name="T31" fmla="*/ 620 h 2127"/>
+              <a:gd name="T32" fmla="*/ 1658 w 2029"/>
+              <a:gd name="T33" fmla="*/ 597 h 2127"/>
+              <a:gd name="T34" fmla="*/ 1886 w 2029"/>
+              <a:gd name="T35" fmla="*/ 836 h 2127"/>
+              <a:gd name="T36" fmla="*/ 1833 w 2029"/>
+              <a:gd name="T37" fmla="*/ 1019 h 2127"/>
+              <a:gd name="T38" fmla="*/ 1897 w 2029"/>
+              <a:gd name="T39" fmla="*/ 1095 h 2127"/>
+              <a:gd name="T40" fmla="*/ 1891 w 2029"/>
+              <a:gd name="T41" fmla="*/ 1639 h 2127"/>
+              <a:gd name="T42" fmla="*/ 1890 w 2029"/>
+              <a:gd name="T43" fmla="*/ 668 h 2127"/>
+              <a:gd name="T44" fmla="*/ 1745 w 2029"/>
+              <a:gd name="T45" fmla="*/ 555 h 2127"/>
+              <a:gd name="T46" fmla="*/ 1603 w 2029"/>
+              <a:gd name="T47" fmla="*/ 501 h 2127"/>
+              <a:gd name="T48" fmla="*/ 1481 w 2029"/>
+              <a:gd name="T49" fmla="*/ 485 h 2127"/>
+              <a:gd name="T50" fmla="*/ 1399 w 2029"/>
+              <a:gd name="T51" fmla="*/ 453 h 2127"/>
+              <a:gd name="T52" fmla="*/ 1343 w 2029"/>
+              <a:gd name="T53" fmla="*/ 503 h 2127"/>
+              <a:gd name="T54" fmla="*/ 1374 w 2029"/>
+              <a:gd name="T55" fmla="*/ 399 h 2127"/>
+              <a:gd name="T56" fmla="*/ 1409 w 2029"/>
+              <a:gd name="T57" fmla="*/ 328 h 2127"/>
+              <a:gd name="T58" fmla="*/ 1371 w 2029"/>
+              <a:gd name="T59" fmla="*/ 317 h 2127"/>
+              <a:gd name="T60" fmla="*/ 1297 w 2029"/>
+              <a:gd name="T61" fmla="*/ 155 h 2127"/>
+              <a:gd name="T62" fmla="*/ 1142 w 2029"/>
+              <a:gd name="T63" fmla="*/ 34 h 2127"/>
+              <a:gd name="T64" fmla="*/ 1014 w 2029"/>
+              <a:gd name="T65" fmla="*/ 1 h 2127"/>
+              <a:gd name="T66" fmla="*/ 844 w 2029"/>
+              <a:gd name="T67" fmla="*/ 16 h 2127"/>
+              <a:gd name="T68" fmla="*/ 655 w 2029"/>
+              <a:gd name="T69" fmla="*/ 87 h 2127"/>
+              <a:gd name="T70" fmla="*/ 486 w 2029"/>
+              <a:gd name="T71" fmla="*/ 199 h 2127"/>
+              <a:gd name="T72" fmla="*/ 310 w 2029"/>
+              <a:gd name="T73" fmla="*/ 520 h 2127"/>
+              <a:gd name="T74" fmla="*/ 474 w 2029"/>
+              <a:gd name="T75" fmla="*/ 980 h 2127"/>
+              <a:gd name="T76" fmla="*/ 702 w 2029"/>
+              <a:gd name="T77" fmla="*/ 1291 h 2127"/>
+              <a:gd name="T78" fmla="*/ 551 w 2029"/>
+              <a:gd name="T79" fmla="*/ 1622 h 2127"/>
+              <a:gd name="T80" fmla="*/ 239 w 2029"/>
+              <a:gd name="T81" fmla="*/ 1637 h 2127"/>
+              <a:gd name="T82" fmla="*/ 43 w 2029"/>
+              <a:gd name="T83" fmla="*/ 1652 h 2127"/>
+              <a:gd name="T84" fmla="*/ 186 w 2029"/>
+              <a:gd name="T85" fmla="*/ 1716 h 2127"/>
+              <a:gd name="T86" fmla="*/ 311 w 2029"/>
+              <a:gd name="T87" fmla="*/ 1731 h 2127"/>
+              <a:gd name="T88" fmla="*/ 560 w 2029"/>
+              <a:gd name="T89" fmla="*/ 1709 h 2127"/>
+              <a:gd name="T90" fmla="*/ 819 w 2029"/>
+              <a:gd name="T91" fmla="*/ 1410 h 2127"/>
+              <a:gd name="T92" fmla="*/ 751 w 2029"/>
+              <a:gd name="T93" fmla="*/ 1202 h 2127"/>
+              <a:gd name="T94" fmla="*/ 613 w 2029"/>
+              <a:gd name="T95" fmla="*/ 974 h 2127"/>
+              <a:gd name="T96" fmla="*/ 419 w 2029"/>
+              <a:gd name="T97" fmla="*/ 599 h 2127"/>
+              <a:gd name="T98" fmla="*/ 498 w 2029"/>
+              <a:gd name="T99" fmla="*/ 304 h 2127"/>
+              <a:gd name="T100" fmla="*/ 783 w 2029"/>
+              <a:gd name="T101" fmla="*/ 110 h 2127"/>
+              <a:gd name="T102" fmla="*/ 1044 w 2029"/>
+              <a:gd name="T103" fmla="*/ 85 h 2127"/>
+              <a:gd name="T104" fmla="*/ 1215 w 2029"/>
+              <a:gd name="T105" fmla="*/ 188 h 2127"/>
+              <a:gd name="T106" fmla="*/ 1249 w 2029"/>
+              <a:gd name="T107" fmla="*/ 392 h 2127"/>
+              <a:gd name="T108" fmla="*/ 1123 w 2029"/>
+              <a:gd name="T109" fmla="*/ 615 h 2127"/>
+              <a:gd name="T110" fmla="*/ 989 w 2029"/>
+              <a:gd name="T111" fmla="*/ 850 h 2127"/>
+              <a:gd name="T112" fmla="*/ 986 w 2029"/>
+              <a:gd name="T113" fmla="*/ 1327 h 2127"/>
+              <a:gd name="T114" fmla="*/ 1152 w 2029"/>
+              <a:gd name="T115" fmla="*/ 1757 h 2127"/>
+              <a:gd name="T116" fmla="*/ 1365 w 2029"/>
+              <a:gd name="T117" fmla="*/ 2118 h 2127"/>
+              <a:gd name="T118" fmla="*/ 1989 w 2029"/>
+              <a:gd name="T119" fmla="*/ 1639 h 2127"/>
+            </a:gdLst>
+            <a:ahLst/>
+            <a:cxnLst>
+              <a:cxn ang="0">
+                <a:pos x="T0" y="T1"/>
+              </a:cxn>
+              <a:cxn ang="0">
+                <a:pos x="T2" y="T3"/>
+              </a:cxn>
+              <a:cxn ang="0">
+                <a:pos x="T4" y="T5"/>
+              </a:cxn>
+              <a:cxn ang="0">
+                <a:pos x="T6" y="T7"/>
+              </a:cxn>
+              <a:cxn ang="0">
+                <a:pos x="T8" y="T9"/>
+              </a:cxn>
+              <a:cxn ang="0">
+                <a:pos x="T10" y="T11"/>
+              </a:cxn>
+              <a:cxn ang="0">
+                <a:pos x="T12" y="T13"/>
+              </a:cxn>
+              <a:cxn ang="0">
+                <a:pos x="T14" y="T15"/>
+              </a:cxn>
+              <a:cxn ang="0">
+                <a:pos x="T16" y="T17"/>
+              </a:cxn>
+              <a:cxn ang="0">
+                <a:pos x="T18" y="T19"/>
+              </a:cxn>
+              <a:cxn ang="0">
+                <a:pos x="T20" y="T21"/>
+              </a:cxn>
+              <a:cxn ang="0">
+                <a:pos x="T22" y="T23"/>
+              </a:cxn>
+              <a:cxn ang="0">
+                <a:pos x="T24" y="T25"/>
+              </a:cxn>
+              <a:cxn ang="0">
+                <a:pos x="T26" y="T27"/>
+              </a:cxn>
+              <a:cxn ang="0">
+                <a:pos x="T28" y="T29"/>
+              </a:cxn>
+              <a:cxn ang="0">
+                <a:pos x="T30" y="T31"/>
+              </a:cxn>
+              <a:cxn ang="0">
+                <a:pos x="T32" y="T33"/>
+              </a:cxn>
+              <a:cxn ang="0">
+                <a:pos x="T34" y="T35"/>
+              </a:cxn>
+              <a:cxn ang="0">
+                <a:pos x="T36" y="T37"/>
+              </a:cxn>
+              <a:cxn ang="0">
+                <a:pos x="T38" y="T39"/>
+              </a:cxn>
+              <a:cxn ang="0">
+                <a:pos x="T40" y="T41"/>
+              </a:cxn>
+              <a:cxn ang="0">
+                <a:pos x="T42" y="T43"/>
+              </a:cxn>
+              <a:cxn ang="0">
+                <a:pos x="T44" y="T45"/>
+              </a:cxn>
+              <a:cxn ang="0">
+                <a:pos x="T46" y="T47"/>
+              </a:cxn>
+              <a:cxn ang="0">
+                <a:pos x="T48" y="T49"/>
+              </a:cxn>
+              <a:cxn ang="0">
+                <a:pos x="T50" y="T51"/>
+              </a:cxn>
+              <a:cxn ang="0">
+                <a:pos x="T52" y="T53"/>
+              </a:cxn>
+              <a:cxn ang="0">
+                <a:pos x="T54" y="T55"/>
+              </a:cxn>
+              <a:cxn ang="0">
+                <a:pos x="T56" y="T57"/>
+              </a:cxn>
+              <a:cxn ang="0">
+                <a:pos x="T58" y="T59"/>
+              </a:cxn>
+              <a:cxn ang="0">
+                <a:pos x="T60" y="T61"/>
+              </a:cxn>
+              <a:cxn ang="0">
+                <a:pos x="T62" y="T63"/>
+              </a:cxn>
+              <a:cxn ang="0">
+                <a:pos x="T64" y="T65"/>
+              </a:cxn>
+              <a:cxn ang="0">
+                <a:pos x="T66" y="T67"/>
+              </a:cxn>
+              <a:cxn ang="0">
+                <a:pos x="T68" y="T69"/>
+              </a:cxn>
+              <a:cxn ang="0">
+                <a:pos x="T70" y="T71"/>
+              </a:cxn>
+              <a:cxn ang="0">
+                <a:pos x="T72" y="T73"/>
+              </a:cxn>
+              <a:cxn ang="0">
+                <a:pos x="T74" y="T75"/>
+              </a:cxn>
+              <a:cxn ang="0">
+                <a:pos x="T76" y="T77"/>
+              </a:cxn>
+              <a:cxn ang="0">
+                <a:pos x="T78" y="T79"/>
+              </a:cxn>
+              <a:cxn ang="0">
+                <a:pos x="T80" y="T81"/>
+              </a:cxn>
+              <a:cxn ang="0">
+                <a:pos x="T82" y="T83"/>
+              </a:cxn>
+              <a:cxn ang="0">
+                <a:pos x="T84" y="T85"/>
+              </a:cxn>
+              <a:cxn ang="0">
+                <a:pos x="T86" y="T87"/>
+              </a:cxn>
+              <a:cxn ang="0">
+                <a:pos x="T88" y="T89"/>
+              </a:cxn>
+              <a:cxn ang="0">
+                <a:pos x="T90" y="T91"/>
+              </a:cxn>
+              <a:cxn ang="0">
+                <a:pos x="T92" y="T93"/>
+              </a:cxn>
+              <a:cxn ang="0">
+                <a:pos x="T94" y="T95"/>
+              </a:cxn>
+              <a:cxn ang="0">
+                <a:pos x="T96" y="T97"/>
+              </a:cxn>
+              <a:cxn ang="0">
+                <a:pos x="T98" y="T99"/>
+              </a:cxn>
+              <a:cxn ang="0">
+                <a:pos x="T100" y="T101"/>
+              </a:cxn>
+              <a:cxn ang="0">
+                <a:pos x="T102" y="T103"/>
+              </a:cxn>
+              <a:cxn ang="0">
+                <a:pos x="T104" y="T105"/>
+              </a:cxn>
+              <a:cxn ang="0">
+                <a:pos x="T106" y="T107"/>
+              </a:cxn>
+              <a:cxn ang="0">
+                <a:pos x="T108" y="T109"/>
+              </a:cxn>
+              <a:cxn ang="0">
+                <a:pos x="T110" y="T111"/>
+              </a:cxn>
+              <a:cxn ang="0">
+                <a:pos x="T112" y="T113"/>
+              </a:cxn>
+              <a:cxn ang="0">
+                <a:pos x="T114" y="T115"/>
+              </a:cxn>
+              <a:cxn ang="0">
+                <a:pos x="T116" y="T117"/>
+              </a:cxn>
+              <a:cxn ang="0">
+                <a:pos x="T118" y="T119"/>
+              </a:cxn>
+            </a:cxnLst>
+            <a:rect l="0" t="0" r="r" b="b"/>
+            <a:pathLst>
+              <a:path w="2029" h="2127">
+                <a:moveTo>
+                  <a:pt x="1891" y="1639"/>
+                </a:moveTo>
+                <a:lnTo>
+                  <a:pt x="1885" y="1709"/>
+                </a:lnTo>
+                <a:lnTo>
+                  <a:pt x="1880" y="1778"/>
+                </a:lnTo>
+                <a:lnTo>
+                  <a:pt x="1874" y="1845"/>
+                </a:lnTo>
+                <a:lnTo>
+                  <a:pt x="1869" y="1902"/>
+                </a:lnTo>
+                <a:lnTo>
+                  <a:pt x="1842" y="1910"/>
+                </a:lnTo>
+                <a:lnTo>
+                  <a:pt x="1814" y="1919"/>
+                </a:lnTo>
+                <a:lnTo>
+                  <a:pt x="1785" y="1926"/>
+                </a:lnTo>
+                <a:lnTo>
+                  <a:pt x="1756" y="1935"/>
+                </a:lnTo>
+                <a:lnTo>
+                  <a:pt x="1726" y="1943"/>
+                </a:lnTo>
+                <a:lnTo>
+                  <a:pt x="1696" y="1950"/>
+                </a:lnTo>
+                <a:lnTo>
+                  <a:pt x="1667" y="1959"/>
+                </a:lnTo>
+                <a:lnTo>
+                  <a:pt x="1636" y="1966"/>
+                </a:lnTo>
+                <a:lnTo>
+                  <a:pt x="1606" y="1974"/>
+                </a:lnTo>
+                <a:lnTo>
+                  <a:pt x="1576" y="1981"/>
+                </a:lnTo>
+                <a:lnTo>
+                  <a:pt x="1546" y="1989"/>
+                </a:lnTo>
+                <a:lnTo>
+                  <a:pt x="1516" y="1996"/>
+                </a:lnTo>
+                <a:lnTo>
+                  <a:pt x="1487" y="2003"/>
+                </a:lnTo>
+                <a:lnTo>
+                  <a:pt x="1457" y="2010"/>
+                </a:lnTo>
+                <a:lnTo>
+                  <a:pt x="1429" y="2016"/>
+                </a:lnTo>
+                <a:lnTo>
+                  <a:pt x="1401" y="2022"/>
+                </a:lnTo>
+                <a:lnTo>
+                  <a:pt x="1398" y="2015"/>
+                </a:lnTo>
+                <a:lnTo>
+                  <a:pt x="1383" y="1984"/>
+                </a:lnTo>
+                <a:lnTo>
+                  <a:pt x="1365" y="1946"/>
+                </a:lnTo>
+                <a:lnTo>
+                  <a:pt x="1343" y="1900"/>
+                </a:lnTo>
+                <a:lnTo>
+                  <a:pt x="1320" y="1849"/>
+                </a:lnTo>
+                <a:lnTo>
+                  <a:pt x="1293" y="1793"/>
+                </a:lnTo>
+                <a:lnTo>
+                  <a:pt x="1267" y="1735"/>
+                </a:lnTo>
+                <a:lnTo>
+                  <a:pt x="1239" y="1675"/>
+                </a:lnTo>
+                <a:lnTo>
+                  <a:pt x="1211" y="1616"/>
+                </a:lnTo>
+                <a:lnTo>
+                  <a:pt x="1185" y="1558"/>
+                </a:lnTo>
+                <a:lnTo>
+                  <a:pt x="1159" y="1502"/>
+                </a:lnTo>
+                <a:lnTo>
+                  <a:pt x="1136" y="1451"/>
+                </a:lnTo>
+                <a:lnTo>
+                  <a:pt x="1116" y="1406"/>
+                </a:lnTo>
+                <a:lnTo>
+                  <a:pt x="1099" y="1368"/>
+                </a:lnTo>
+                <a:lnTo>
+                  <a:pt x="1085" y="1339"/>
+                </a:lnTo>
+                <a:lnTo>
+                  <a:pt x="1077" y="1319"/>
+                </a:lnTo>
+                <a:lnTo>
+                  <a:pt x="1074" y="1312"/>
+                </a:lnTo>
+                <a:lnTo>
+                  <a:pt x="1088" y="1295"/>
+                </a:lnTo>
+                <a:lnTo>
+                  <a:pt x="1104" y="1279"/>
+                </a:lnTo>
+                <a:lnTo>
+                  <a:pt x="1123" y="1263"/>
+                </a:lnTo>
+                <a:lnTo>
+                  <a:pt x="1141" y="1249"/>
+                </a:lnTo>
+                <a:lnTo>
+                  <a:pt x="1159" y="1237"/>
+                </a:lnTo>
+                <a:lnTo>
+                  <a:pt x="1178" y="1224"/>
+                </a:lnTo>
+                <a:lnTo>
+                  <a:pt x="1199" y="1212"/>
+                </a:lnTo>
+                <a:lnTo>
+                  <a:pt x="1220" y="1202"/>
+                </a:lnTo>
+                <a:lnTo>
+                  <a:pt x="1241" y="1192"/>
+                </a:lnTo>
+                <a:lnTo>
+                  <a:pt x="1263" y="1182"/>
+                </a:lnTo>
+                <a:lnTo>
+                  <a:pt x="1285" y="1172"/>
+                </a:lnTo>
+                <a:lnTo>
+                  <a:pt x="1307" y="1164"/>
+                </a:lnTo>
+                <a:lnTo>
+                  <a:pt x="1329" y="1155"/>
+                </a:lnTo>
+                <a:lnTo>
+                  <a:pt x="1351" y="1146"/>
+                </a:lnTo>
+                <a:lnTo>
+                  <a:pt x="1373" y="1137"/>
+                </a:lnTo>
+                <a:lnTo>
+                  <a:pt x="1395" y="1129"/>
+                </a:lnTo>
+                <a:lnTo>
+                  <a:pt x="1416" y="1121"/>
+                </a:lnTo>
+                <a:lnTo>
+                  <a:pt x="1438" y="1113"/>
+                </a:lnTo>
+                <a:lnTo>
+                  <a:pt x="1460" y="1107"/>
+                </a:lnTo>
+                <a:lnTo>
+                  <a:pt x="1481" y="1102"/>
+                </a:lnTo>
+                <a:lnTo>
+                  <a:pt x="1504" y="1096"/>
+                </a:lnTo>
+                <a:lnTo>
+                  <a:pt x="1527" y="1092"/>
+                </a:lnTo>
+                <a:lnTo>
+                  <a:pt x="1551" y="1089"/>
+                </a:lnTo>
+                <a:lnTo>
+                  <a:pt x="1573" y="1086"/>
+                </a:lnTo>
+                <a:lnTo>
+                  <a:pt x="1597" y="1084"/>
+                </a:lnTo>
+                <a:lnTo>
+                  <a:pt x="1621" y="1083"/>
+                </a:lnTo>
+                <a:lnTo>
+                  <a:pt x="1644" y="1081"/>
+                </a:lnTo>
+                <a:lnTo>
+                  <a:pt x="1668" y="1081"/>
+                </a:lnTo>
+                <a:lnTo>
+                  <a:pt x="1692" y="1081"/>
+                </a:lnTo>
+                <a:lnTo>
+                  <a:pt x="1716" y="1081"/>
+                </a:lnTo>
+                <a:lnTo>
+                  <a:pt x="1740" y="1083"/>
+                </a:lnTo>
+                <a:lnTo>
+                  <a:pt x="1764" y="1084"/>
+                </a:lnTo>
+                <a:lnTo>
+                  <a:pt x="1764" y="1009"/>
+                </a:lnTo>
+                <a:lnTo>
+                  <a:pt x="1746" y="1008"/>
+                </a:lnTo>
+                <a:lnTo>
+                  <a:pt x="1729" y="1006"/>
+                </a:lnTo>
+                <a:lnTo>
+                  <a:pt x="1712" y="1005"/>
+                </a:lnTo>
+                <a:lnTo>
+                  <a:pt x="1695" y="1005"/>
+                </a:lnTo>
+                <a:lnTo>
+                  <a:pt x="1678" y="1004"/>
+                </a:lnTo>
+                <a:lnTo>
+                  <a:pt x="1661" y="1005"/>
+                </a:lnTo>
+                <a:lnTo>
+                  <a:pt x="1644" y="1005"/>
+                </a:lnTo>
+                <a:lnTo>
+                  <a:pt x="1627" y="1006"/>
+                </a:lnTo>
+                <a:lnTo>
+                  <a:pt x="1610" y="1008"/>
+                </a:lnTo>
+                <a:lnTo>
+                  <a:pt x="1593" y="1009"/>
+                </a:lnTo>
+                <a:lnTo>
+                  <a:pt x="1576" y="1011"/>
+                </a:lnTo>
+                <a:lnTo>
+                  <a:pt x="1560" y="1013"/>
+                </a:lnTo>
+                <a:lnTo>
+                  <a:pt x="1544" y="1015"/>
+                </a:lnTo>
+                <a:lnTo>
+                  <a:pt x="1528" y="1017"/>
+                </a:lnTo>
+                <a:lnTo>
+                  <a:pt x="1512" y="1020"/>
+                </a:lnTo>
+                <a:lnTo>
+                  <a:pt x="1496" y="1023"/>
+                </a:lnTo>
+                <a:lnTo>
+                  <a:pt x="1493" y="1002"/>
+                </a:lnTo>
+                <a:lnTo>
+                  <a:pt x="1490" y="979"/>
+                </a:lnTo>
+                <a:lnTo>
+                  <a:pt x="1487" y="957"/>
+                </a:lnTo>
+                <a:lnTo>
+                  <a:pt x="1483" y="936"/>
+                </a:lnTo>
+                <a:lnTo>
+                  <a:pt x="1414" y="936"/>
+                </a:lnTo>
+                <a:lnTo>
+                  <a:pt x="1417" y="960"/>
+                </a:lnTo>
+                <a:lnTo>
+                  <a:pt x="1423" y="987"/>
+                </a:lnTo>
+                <a:lnTo>
+                  <a:pt x="1428" y="1014"/>
+                </a:lnTo>
+                <a:lnTo>
+                  <a:pt x="1432" y="1039"/>
+                </a:lnTo>
+                <a:lnTo>
+                  <a:pt x="1425" y="1041"/>
+                </a:lnTo>
+                <a:lnTo>
+                  <a:pt x="1417" y="1043"/>
+                </a:lnTo>
+                <a:lnTo>
+                  <a:pt x="1411" y="1046"/>
+                </a:lnTo>
+                <a:lnTo>
+                  <a:pt x="1403" y="1048"/>
+                </a:lnTo>
+                <a:lnTo>
+                  <a:pt x="1395" y="1050"/>
+                </a:lnTo>
+                <a:lnTo>
+                  <a:pt x="1388" y="1053"/>
+                </a:lnTo>
+                <a:lnTo>
+                  <a:pt x="1380" y="1055"/>
+                </a:lnTo>
+                <a:lnTo>
+                  <a:pt x="1373" y="1057"/>
+                </a:lnTo>
+                <a:lnTo>
+                  <a:pt x="1353" y="1065"/>
+                </a:lnTo>
+                <a:lnTo>
+                  <a:pt x="1332" y="1072"/>
+                </a:lnTo>
+                <a:lnTo>
+                  <a:pt x="1312" y="1080"/>
+                </a:lnTo>
+                <a:lnTo>
+                  <a:pt x="1291" y="1089"/>
+                </a:lnTo>
+                <a:lnTo>
+                  <a:pt x="1271" y="1097"/>
+                </a:lnTo>
+                <a:lnTo>
+                  <a:pt x="1249" y="1107"/>
+                </a:lnTo>
+                <a:lnTo>
+                  <a:pt x="1228" y="1117"/>
+                </a:lnTo>
+                <a:lnTo>
+                  <a:pt x="1208" y="1127"/>
+                </a:lnTo>
+                <a:lnTo>
+                  <a:pt x="1189" y="1137"/>
+                </a:lnTo>
+                <a:lnTo>
+                  <a:pt x="1168" y="1148"/>
+                </a:lnTo>
+                <a:lnTo>
+                  <a:pt x="1149" y="1160"/>
+                </a:lnTo>
+                <a:lnTo>
+                  <a:pt x="1129" y="1171"/>
+                </a:lnTo>
+                <a:lnTo>
+                  <a:pt x="1110" y="1183"/>
+                </a:lnTo>
+                <a:lnTo>
+                  <a:pt x="1092" y="1194"/>
+                </a:lnTo>
+                <a:lnTo>
+                  <a:pt x="1074" y="1207"/>
+                </a:lnTo>
+                <a:lnTo>
+                  <a:pt x="1057" y="1220"/>
+                </a:lnTo>
+                <a:lnTo>
+                  <a:pt x="1053" y="1167"/>
+                </a:lnTo>
+                <a:lnTo>
+                  <a:pt x="1049" y="1114"/>
+                </a:lnTo>
+                <a:lnTo>
+                  <a:pt x="1046" y="1059"/>
+                </a:lnTo>
+                <a:lnTo>
+                  <a:pt x="1045" y="1005"/>
+                </a:lnTo>
+                <a:lnTo>
+                  <a:pt x="1047" y="952"/>
+                </a:lnTo>
+                <a:lnTo>
+                  <a:pt x="1052" y="898"/>
+                </a:lnTo>
+                <a:lnTo>
+                  <a:pt x="1061" y="845"/>
+                </a:lnTo>
+                <a:lnTo>
+                  <a:pt x="1076" y="794"/>
+                </a:lnTo>
+                <a:lnTo>
+                  <a:pt x="1084" y="774"/>
+                </a:lnTo>
+                <a:lnTo>
+                  <a:pt x="1094" y="755"/>
+                </a:lnTo>
+                <a:lnTo>
+                  <a:pt x="1107" y="737"/>
+                </a:lnTo>
+                <a:lnTo>
+                  <a:pt x="1120" y="720"/>
+                </a:lnTo>
+                <a:lnTo>
+                  <a:pt x="1136" y="703"/>
+                </a:lnTo>
+                <a:lnTo>
+                  <a:pt x="1153" y="688"/>
+                </a:lnTo>
+                <a:lnTo>
+                  <a:pt x="1172" y="673"/>
+                </a:lnTo>
+                <a:lnTo>
+                  <a:pt x="1191" y="659"/>
+                </a:lnTo>
+                <a:lnTo>
+                  <a:pt x="1211" y="646"/>
+                </a:lnTo>
+                <a:lnTo>
+                  <a:pt x="1233" y="635"/>
+                </a:lnTo>
+                <a:lnTo>
+                  <a:pt x="1255" y="623"/>
+                </a:lnTo>
+                <a:lnTo>
+                  <a:pt x="1276" y="614"/>
+                </a:lnTo>
+                <a:lnTo>
+                  <a:pt x="1299" y="604"/>
+                </a:lnTo>
+                <a:lnTo>
+                  <a:pt x="1321" y="596"/>
+                </a:lnTo>
+                <a:lnTo>
+                  <a:pt x="1342" y="589"/>
+                </a:lnTo>
+                <a:lnTo>
+                  <a:pt x="1364" y="583"/>
+                </a:lnTo>
+                <a:lnTo>
+                  <a:pt x="1372" y="627"/>
+                </a:lnTo>
+                <a:lnTo>
+                  <a:pt x="1379" y="671"/>
+                </a:lnTo>
+                <a:lnTo>
+                  <a:pt x="1384" y="715"/>
+                </a:lnTo>
+                <a:lnTo>
+                  <a:pt x="1391" y="758"/>
+                </a:lnTo>
+                <a:lnTo>
+                  <a:pt x="1396" y="803"/>
+                </a:lnTo>
+                <a:lnTo>
+                  <a:pt x="1401" y="847"/>
+                </a:lnTo>
+                <a:lnTo>
+                  <a:pt x="1407" y="891"/>
+                </a:lnTo>
+                <a:lnTo>
+                  <a:pt x="1414" y="936"/>
+                </a:lnTo>
+                <a:lnTo>
+                  <a:pt x="1483" y="936"/>
+                </a:lnTo>
+                <a:lnTo>
+                  <a:pt x="1475" y="890"/>
+                </a:lnTo>
+                <a:lnTo>
+                  <a:pt x="1468" y="844"/>
+                </a:lnTo>
+                <a:lnTo>
+                  <a:pt x="1457" y="798"/>
+                </a:lnTo>
+                <a:lnTo>
+                  <a:pt x="1447" y="754"/>
+                </a:lnTo>
+                <a:lnTo>
+                  <a:pt x="1435" y="709"/>
+                </a:lnTo>
+                <a:lnTo>
+                  <a:pt x="1422" y="664"/>
+                </a:lnTo>
+                <a:lnTo>
+                  <a:pt x="1407" y="620"/>
+                </a:lnTo>
+                <a:lnTo>
+                  <a:pt x="1390" y="577"/>
+                </a:lnTo>
+                <a:lnTo>
+                  <a:pt x="1420" y="571"/>
+                </a:lnTo>
+                <a:lnTo>
+                  <a:pt x="1449" y="568"/>
+                </a:lnTo>
+                <a:lnTo>
+                  <a:pt x="1480" y="567"/>
+                </a:lnTo>
+                <a:lnTo>
+                  <a:pt x="1511" y="567"/>
+                </a:lnTo>
+                <a:lnTo>
+                  <a:pt x="1540" y="570"/>
+                </a:lnTo>
+                <a:lnTo>
+                  <a:pt x="1571" y="575"/>
+                </a:lnTo>
+                <a:lnTo>
+                  <a:pt x="1601" y="580"/>
+                </a:lnTo>
+                <a:lnTo>
+                  <a:pt x="1629" y="587"/>
+                </a:lnTo>
+                <a:lnTo>
+                  <a:pt x="1658" y="597"/>
+                </a:lnTo>
+                <a:lnTo>
+                  <a:pt x="1686" y="608"/>
+                </a:lnTo>
+                <a:lnTo>
+                  <a:pt x="1712" y="621"/>
+                </a:lnTo>
+                <a:lnTo>
+                  <a:pt x="1738" y="636"/>
+                </a:lnTo>
+                <a:lnTo>
+                  <a:pt x="1762" y="653"/>
+                </a:lnTo>
+                <a:lnTo>
+                  <a:pt x="1786" y="671"/>
+                </a:lnTo>
+                <a:lnTo>
+                  <a:pt x="1808" y="691"/>
+                </a:lnTo>
+                <a:lnTo>
+                  <a:pt x="1827" y="712"/>
+                </a:lnTo>
+                <a:lnTo>
+                  <a:pt x="1848" y="753"/>
+                </a:lnTo>
+                <a:lnTo>
+                  <a:pt x="1868" y="795"/>
+                </a:lnTo>
+                <a:lnTo>
+                  <a:pt x="1886" y="836"/>
+                </a:lnTo>
+                <a:lnTo>
+                  <a:pt x="1904" y="879"/>
+                </a:lnTo>
+                <a:lnTo>
+                  <a:pt x="1918" y="921"/>
+                </a:lnTo>
+                <a:lnTo>
+                  <a:pt x="1930" y="963"/>
+                </a:lnTo>
+                <a:lnTo>
+                  <a:pt x="1939" y="1006"/>
+                </a:lnTo>
+                <a:lnTo>
+                  <a:pt x="1945" y="1049"/>
+                </a:lnTo>
+                <a:lnTo>
+                  <a:pt x="1925" y="1041"/>
+                </a:lnTo>
+                <a:lnTo>
+                  <a:pt x="1904" y="1035"/>
+                </a:lnTo>
+                <a:lnTo>
+                  <a:pt x="1881" y="1030"/>
+                </a:lnTo>
+                <a:lnTo>
+                  <a:pt x="1858" y="1023"/>
+                </a:lnTo>
+                <a:lnTo>
+                  <a:pt x="1833" y="1019"/>
+                </a:lnTo>
+                <a:lnTo>
+                  <a:pt x="1809" y="1015"/>
+                </a:lnTo>
+                <a:lnTo>
+                  <a:pt x="1786" y="1012"/>
+                </a:lnTo>
+                <a:lnTo>
+                  <a:pt x="1764" y="1009"/>
+                </a:lnTo>
+                <a:lnTo>
+                  <a:pt x="1764" y="1084"/>
+                </a:lnTo>
+                <a:lnTo>
+                  <a:pt x="1784" y="1085"/>
+                </a:lnTo>
+                <a:lnTo>
+                  <a:pt x="1806" y="1087"/>
+                </a:lnTo>
+                <a:lnTo>
+                  <a:pt x="1828" y="1089"/>
+                </a:lnTo>
+                <a:lnTo>
+                  <a:pt x="1851" y="1091"/>
+                </a:lnTo>
+                <a:lnTo>
+                  <a:pt x="1874" y="1093"/>
+                </a:lnTo>
+                <a:lnTo>
+                  <a:pt x="1897" y="1095"/>
+                </a:lnTo>
+                <a:lnTo>
+                  <a:pt x="1918" y="1097"/>
+                </a:lnTo>
+                <a:lnTo>
+                  <a:pt x="1938" y="1099"/>
+                </a:lnTo>
+                <a:lnTo>
+                  <a:pt x="1937" y="1112"/>
+                </a:lnTo>
+                <a:lnTo>
+                  <a:pt x="1933" y="1148"/>
+                </a:lnTo>
+                <a:lnTo>
+                  <a:pt x="1929" y="1203"/>
+                </a:lnTo>
+                <a:lnTo>
+                  <a:pt x="1923" y="1273"/>
+                </a:lnTo>
+                <a:lnTo>
+                  <a:pt x="1915" y="1355"/>
+                </a:lnTo>
+                <a:lnTo>
+                  <a:pt x="1907" y="1446"/>
+                </a:lnTo>
+                <a:lnTo>
+                  <a:pt x="1899" y="1542"/>
+                </a:lnTo>
+                <a:lnTo>
+                  <a:pt x="1891" y="1639"/>
+                </a:lnTo>
+                <a:lnTo>
+                  <a:pt x="1989" y="1639"/>
+                </a:lnTo>
+                <a:lnTo>
+                  <a:pt x="2006" y="1516"/>
+                </a:lnTo>
+                <a:lnTo>
+                  <a:pt x="2020" y="1393"/>
+                </a:lnTo>
+                <a:lnTo>
+                  <a:pt x="2029" y="1270"/>
+                </a:lnTo>
+                <a:lnTo>
+                  <a:pt x="2029" y="1148"/>
+                </a:lnTo>
+                <a:lnTo>
+                  <a:pt x="2020" y="1028"/>
+                </a:lnTo>
+                <a:lnTo>
+                  <a:pt x="1997" y="909"/>
+                </a:lnTo>
+                <a:lnTo>
+                  <a:pt x="1958" y="793"/>
+                </a:lnTo>
+                <a:lnTo>
+                  <a:pt x="1902" y="681"/>
+                </a:lnTo>
+                <a:lnTo>
+                  <a:pt x="1890" y="668"/>
+                </a:lnTo>
+                <a:lnTo>
+                  <a:pt x="1877" y="654"/>
+                </a:lnTo>
+                <a:lnTo>
+                  <a:pt x="1865" y="641"/>
+                </a:lnTo>
+                <a:lnTo>
+                  <a:pt x="1851" y="628"/>
+                </a:lnTo>
+                <a:lnTo>
+                  <a:pt x="1838" y="617"/>
+                </a:lnTo>
+                <a:lnTo>
+                  <a:pt x="1823" y="605"/>
+                </a:lnTo>
+                <a:lnTo>
+                  <a:pt x="1808" y="594"/>
+                </a:lnTo>
+                <a:lnTo>
+                  <a:pt x="1793" y="583"/>
+                </a:lnTo>
+                <a:lnTo>
+                  <a:pt x="1777" y="574"/>
+                </a:lnTo>
+                <a:lnTo>
+                  <a:pt x="1761" y="564"/>
+                </a:lnTo>
+                <a:lnTo>
+                  <a:pt x="1745" y="555"/>
+                </a:lnTo>
+                <a:lnTo>
+                  <a:pt x="1729" y="546"/>
+                </a:lnTo>
+                <a:lnTo>
+                  <a:pt x="1712" y="539"/>
+                </a:lnTo>
+                <a:lnTo>
+                  <a:pt x="1695" y="531"/>
+                </a:lnTo>
+                <a:lnTo>
+                  <a:pt x="1678" y="524"/>
+                </a:lnTo>
+                <a:lnTo>
+                  <a:pt x="1661" y="518"/>
+                </a:lnTo>
+                <a:lnTo>
+                  <a:pt x="1650" y="513"/>
+                </a:lnTo>
+                <a:lnTo>
+                  <a:pt x="1638" y="510"/>
+                </a:lnTo>
+                <a:lnTo>
+                  <a:pt x="1626" y="507"/>
+                </a:lnTo>
+                <a:lnTo>
+                  <a:pt x="1614" y="504"/>
+                </a:lnTo>
+                <a:lnTo>
+                  <a:pt x="1603" y="501"/>
+                </a:lnTo>
+                <a:lnTo>
+                  <a:pt x="1590" y="498"/>
+                </a:lnTo>
+                <a:lnTo>
+                  <a:pt x="1579" y="495"/>
+                </a:lnTo>
+                <a:lnTo>
+                  <a:pt x="1567" y="493"/>
+                </a:lnTo>
+                <a:lnTo>
+                  <a:pt x="1554" y="491"/>
+                </a:lnTo>
+                <a:lnTo>
+                  <a:pt x="1543" y="490"/>
+                </a:lnTo>
+                <a:lnTo>
+                  <a:pt x="1530" y="488"/>
+                </a:lnTo>
+                <a:lnTo>
+                  <a:pt x="1518" y="487"/>
+                </a:lnTo>
+                <a:lnTo>
+                  <a:pt x="1506" y="486"/>
+                </a:lnTo>
+                <a:lnTo>
+                  <a:pt x="1494" y="486"/>
+                </a:lnTo>
+                <a:lnTo>
+                  <a:pt x="1481" y="485"/>
+                </a:lnTo>
+                <a:lnTo>
+                  <a:pt x="1469" y="485"/>
+                </a:lnTo>
+                <a:lnTo>
+                  <a:pt x="1466" y="470"/>
+                </a:lnTo>
+                <a:lnTo>
+                  <a:pt x="1461" y="450"/>
+                </a:lnTo>
+                <a:lnTo>
+                  <a:pt x="1453" y="429"/>
+                </a:lnTo>
+                <a:lnTo>
+                  <a:pt x="1446" y="410"/>
+                </a:lnTo>
+                <a:lnTo>
+                  <a:pt x="1379" y="410"/>
+                </a:lnTo>
+                <a:lnTo>
+                  <a:pt x="1383" y="420"/>
+                </a:lnTo>
+                <a:lnTo>
+                  <a:pt x="1388" y="431"/>
+                </a:lnTo>
+                <a:lnTo>
+                  <a:pt x="1394" y="442"/>
+                </a:lnTo>
+                <a:lnTo>
+                  <a:pt x="1399" y="453"/>
+                </a:lnTo>
+                <a:lnTo>
+                  <a:pt x="1405" y="465"/>
+                </a:lnTo>
+                <a:lnTo>
+                  <a:pt x="1411" y="475"/>
+                </a:lnTo>
+                <a:lnTo>
+                  <a:pt x="1415" y="484"/>
+                </a:lnTo>
+                <a:lnTo>
+                  <a:pt x="1421" y="492"/>
+                </a:lnTo>
+                <a:lnTo>
+                  <a:pt x="1408" y="493"/>
+                </a:lnTo>
+                <a:lnTo>
+                  <a:pt x="1396" y="494"/>
+                </a:lnTo>
+                <a:lnTo>
+                  <a:pt x="1383" y="496"/>
+                </a:lnTo>
+                <a:lnTo>
+                  <a:pt x="1370" y="499"/>
+                </a:lnTo>
+                <a:lnTo>
+                  <a:pt x="1356" y="501"/>
+                </a:lnTo>
+                <a:lnTo>
+                  <a:pt x="1343" y="503"/>
+                </a:lnTo>
+                <a:lnTo>
+                  <a:pt x="1331" y="506"/>
+                </a:lnTo>
+                <a:lnTo>
+                  <a:pt x="1318" y="509"/>
+                </a:lnTo>
+                <a:lnTo>
+                  <a:pt x="1315" y="474"/>
+                </a:lnTo>
+                <a:lnTo>
+                  <a:pt x="1313" y="431"/>
+                </a:lnTo>
+                <a:lnTo>
+                  <a:pt x="1312" y="393"/>
+                </a:lnTo>
+                <a:lnTo>
+                  <a:pt x="1312" y="377"/>
+                </a:lnTo>
+                <a:lnTo>
+                  <a:pt x="1359" y="370"/>
+                </a:lnTo>
+                <a:lnTo>
+                  <a:pt x="1364" y="379"/>
+                </a:lnTo>
+                <a:lnTo>
+                  <a:pt x="1370" y="389"/>
+                </a:lnTo>
+                <a:lnTo>
+                  <a:pt x="1374" y="399"/>
+                </a:lnTo>
+                <a:lnTo>
+                  <a:pt x="1379" y="410"/>
+                </a:lnTo>
+                <a:lnTo>
+                  <a:pt x="1446" y="410"/>
+                </a:lnTo>
+                <a:lnTo>
+                  <a:pt x="1439" y="394"/>
+                </a:lnTo>
+                <a:lnTo>
+                  <a:pt x="1433" y="379"/>
+                </a:lnTo>
+                <a:lnTo>
+                  <a:pt x="1427" y="366"/>
+                </a:lnTo>
+                <a:lnTo>
+                  <a:pt x="1421" y="353"/>
+                </a:lnTo>
+                <a:lnTo>
+                  <a:pt x="1416" y="342"/>
+                </a:lnTo>
+                <a:lnTo>
+                  <a:pt x="1413" y="335"/>
+                </a:lnTo>
+                <a:lnTo>
+                  <a:pt x="1411" y="330"/>
+                </a:lnTo>
+                <a:lnTo>
+                  <a:pt x="1409" y="328"/>
+                </a:lnTo>
+                <a:lnTo>
+                  <a:pt x="1409" y="326"/>
+                </a:lnTo>
+                <a:lnTo>
+                  <a:pt x="1409" y="326"/>
+                </a:lnTo>
+                <a:lnTo>
+                  <a:pt x="1409" y="326"/>
+                </a:lnTo>
+                <a:lnTo>
+                  <a:pt x="1408" y="325"/>
+                </a:lnTo>
+                <a:lnTo>
+                  <a:pt x="1405" y="321"/>
+                </a:lnTo>
+                <a:lnTo>
+                  <a:pt x="1400" y="318"/>
+                </a:lnTo>
+                <a:lnTo>
+                  <a:pt x="1394" y="316"/>
+                </a:lnTo>
+                <a:lnTo>
+                  <a:pt x="1387" y="315"/>
+                </a:lnTo>
+                <a:lnTo>
+                  <a:pt x="1379" y="316"/>
+                </a:lnTo>
+                <a:lnTo>
+                  <a:pt x="1371" y="317"/>
+                </a:lnTo>
+                <a:lnTo>
+                  <a:pt x="1363" y="319"/>
+                </a:lnTo>
+                <a:lnTo>
+                  <a:pt x="1356" y="321"/>
+                </a:lnTo>
+                <a:lnTo>
+                  <a:pt x="1354" y="298"/>
+                </a:lnTo>
+                <a:lnTo>
+                  <a:pt x="1350" y="275"/>
+                </a:lnTo>
+                <a:lnTo>
+                  <a:pt x="1345" y="254"/>
+                </a:lnTo>
+                <a:lnTo>
+                  <a:pt x="1338" y="232"/>
+                </a:lnTo>
+                <a:lnTo>
+                  <a:pt x="1329" y="211"/>
+                </a:lnTo>
+                <a:lnTo>
+                  <a:pt x="1320" y="192"/>
+                </a:lnTo>
+                <a:lnTo>
+                  <a:pt x="1309" y="173"/>
+                </a:lnTo>
+                <a:lnTo>
+                  <a:pt x="1297" y="155"/>
+                </a:lnTo>
+                <a:lnTo>
+                  <a:pt x="1283" y="138"/>
+                </a:lnTo>
+                <a:lnTo>
+                  <a:pt x="1269" y="123"/>
+                </a:lnTo>
+                <a:lnTo>
+                  <a:pt x="1255" y="108"/>
+                </a:lnTo>
+                <a:lnTo>
+                  <a:pt x="1239" y="93"/>
+                </a:lnTo>
+                <a:lnTo>
+                  <a:pt x="1222" y="79"/>
+                </a:lnTo>
+                <a:lnTo>
+                  <a:pt x="1203" y="68"/>
+                </a:lnTo>
+                <a:lnTo>
+                  <a:pt x="1185" y="56"/>
+                </a:lnTo>
+                <a:lnTo>
+                  <a:pt x="1166" y="46"/>
+                </a:lnTo>
+                <a:lnTo>
+                  <a:pt x="1154" y="40"/>
+                </a:lnTo>
+                <a:lnTo>
+                  <a:pt x="1142" y="34"/>
+                </a:lnTo>
+                <a:lnTo>
+                  <a:pt x="1129" y="30"/>
+                </a:lnTo>
+                <a:lnTo>
+                  <a:pt x="1117" y="24"/>
+                </a:lnTo>
+                <a:lnTo>
+                  <a:pt x="1104" y="20"/>
+                </a:lnTo>
+                <a:lnTo>
+                  <a:pt x="1092" y="16"/>
+                </a:lnTo>
+                <a:lnTo>
+                  <a:pt x="1079" y="13"/>
+                </a:lnTo>
+                <a:lnTo>
+                  <a:pt x="1067" y="10"/>
+                </a:lnTo>
+                <a:lnTo>
+                  <a:pt x="1053" y="8"/>
+                </a:lnTo>
+                <a:lnTo>
+                  <a:pt x="1041" y="4"/>
+                </a:lnTo>
+                <a:lnTo>
+                  <a:pt x="1027" y="3"/>
+                </a:lnTo>
+                <a:lnTo>
+                  <a:pt x="1014" y="1"/>
+                </a:lnTo>
+                <a:lnTo>
+                  <a:pt x="1001" y="0"/>
+                </a:lnTo>
+                <a:lnTo>
+                  <a:pt x="987" y="0"/>
+                </a:lnTo>
+                <a:lnTo>
+                  <a:pt x="975" y="0"/>
+                </a:lnTo>
+                <a:lnTo>
+                  <a:pt x="961" y="0"/>
+                </a:lnTo>
+                <a:lnTo>
+                  <a:pt x="942" y="1"/>
+                </a:lnTo>
+                <a:lnTo>
+                  <a:pt x="922" y="2"/>
+                </a:lnTo>
+                <a:lnTo>
+                  <a:pt x="903" y="5"/>
+                </a:lnTo>
+                <a:lnTo>
+                  <a:pt x="883" y="8"/>
+                </a:lnTo>
+                <a:lnTo>
+                  <a:pt x="863" y="12"/>
+                </a:lnTo>
+                <a:lnTo>
+                  <a:pt x="844" y="16"/>
+                </a:lnTo>
+                <a:lnTo>
+                  <a:pt x="824" y="20"/>
+                </a:lnTo>
+                <a:lnTo>
+                  <a:pt x="805" y="26"/>
+                </a:lnTo>
+                <a:lnTo>
+                  <a:pt x="786" y="32"/>
+                </a:lnTo>
+                <a:lnTo>
+                  <a:pt x="766" y="38"/>
+                </a:lnTo>
+                <a:lnTo>
+                  <a:pt x="748" y="45"/>
+                </a:lnTo>
+                <a:lnTo>
+                  <a:pt x="729" y="52"/>
+                </a:lnTo>
+                <a:lnTo>
+                  <a:pt x="710" y="60"/>
+                </a:lnTo>
+                <a:lnTo>
+                  <a:pt x="691" y="69"/>
+                </a:lnTo>
+                <a:lnTo>
+                  <a:pt x="673" y="77"/>
+                </a:lnTo>
+                <a:lnTo>
+                  <a:pt x="655" y="87"/>
+                </a:lnTo>
+                <a:lnTo>
+                  <a:pt x="636" y="96"/>
+                </a:lnTo>
+                <a:lnTo>
+                  <a:pt x="619" y="106"/>
+                </a:lnTo>
+                <a:lnTo>
+                  <a:pt x="601" y="116"/>
+                </a:lnTo>
+                <a:lnTo>
+                  <a:pt x="584" y="127"/>
+                </a:lnTo>
+                <a:lnTo>
+                  <a:pt x="567" y="138"/>
+                </a:lnTo>
+                <a:lnTo>
+                  <a:pt x="550" y="150"/>
+                </a:lnTo>
+                <a:lnTo>
+                  <a:pt x="534" y="162"/>
+                </a:lnTo>
+                <a:lnTo>
+                  <a:pt x="518" y="173"/>
+                </a:lnTo>
+                <a:lnTo>
+                  <a:pt x="502" y="186"/>
+                </a:lnTo>
+                <a:lnTo>
+                  <a:pt x="486" y="199"/>
+                </a:lnTo>
+                <a:lnTo>
+                  <a:pt x="471" y="211"/>
+                </a:lnTo>
+                <a:lnTo>
+                  <a:pt x="457" y="224"/>
+                </a:lnTo>
+                <a:lnTo>
+                  <a:pt x="443" y="237"/>
+                </a:lnTo>
+                <a:lnTo>
+                  <a:pt x="429" y="250"/>
+                </a:lnTo>
+                <a:lnTo>
+                  <a:pt x="416" y="263"/>
+                </a:lnTo>
+                <a:lnTo>
+                  <a:pt x="403" y="277"/>
+                </a:lnTo>
+                <a:lnTo>
+                  <a:pt x="361" y="333"/>
+                </a:lnTo>
+                <a:lnTo>
+                  <a:pt x="332" y="392"/>
+                </a:lnTo>
+                <a:lnTo>
+                  <a:pt x="315" y="455"/>
+                </a:lnTo>
+                <a:lnTo>
+                  <a:pt x="310" y="520"/>
+                </a:lnTo>
+                <a:lnTo>
+                  <a:pt x="311" y="586"/>
+                </a:lnTo>
+                <a:lnTo>
+                  <a:pt x="321" y="652"/>
+                </a:lnTo>
+                <a:lnTo>
+                  <a:pt x="336" y="717"/>
+                </a:lnTo>
+                <a:lnTo>
+                  <a:pt x="355" y="781"/>
+                </a:lnTo>
+                <a:lnTo>
+                  <a:pt x="370" y="819"/>
+                </a:lnTo>
+                <a:lnTo>
+                  <a:pt x="387" y="854"/>
+                </a:lnTo>
+                <a:lnTo>
+                  <a:pt x="406" y="887"/>
+                </a:lnTo>
+                <a:lnTo>
+                  <a:pt x="427" y="920"/>
+                </a:lnTo>
+                <a:lnTo>
+                  <a:pt x="450" y="951"/>
+                </a:lnTo>
+                <a:lnTo>
+                  <a:pt x="474" y="980"/>
+                </a:lnTo>
+                <a:lnTo>
+                  <a:pt x="499" y="1010"/>
+                </a:lnTo>
+                <a:lnTo>
+                  <a:pt x="524" y="1038"/>
+                </a:lnTo>
+                <a:lnTo>
+                  <a:pt x="549" y="1067"/>
+                </a:lnTo>
+                <a:lnTo>
+                  <a:pt x="574" y="1096"/>
+                </a:lnTo>
+                <a:lnTo>
+                  <a:pt x="599" y="1125"/>
+                </a:lnTo>
+                <a:lnTo>
+                  <a:pt x="623" y="1155"/>
+                </a:lnTo>
+                <a:lnTo>
+                  <a:pt x="646" y="1187"/>
+                </a:lnTo>
+                <a:lnTo>
+                  <a:pt x="666" y="1220"/>
+                </a:lnTo>
+                <a:lnTo>
+                  <a:pt x="685" y="1254"/>
+                </a:lnTo>
+                <a:lnTo>
+                  <a:pt x="702" y="1291"/>
+                </a:lnTo>
+                <a:lnTo>
+                  <a:pt x="724" y="1383"/>
+                </a:lnTo>
+                <a:lnTo>
+                  <a:pt x="717" y="1452"/>
+                </a:lnTo>
+                <a:lnTo>
+                  <a:pt x="705" y="1471"/>
+                </a:lnTo>
+                <a:lnTo>
+                  <a:pt x="692" y="1493"/>
+                </a:lnTo>
+                <a:lnTo>
+                  <a:pt x="680" y="1519"/>
+                </a:lnTo>
+                <a:lnTo>
+                  <a:pt x="664" y="1544"/>
+                </a:lnTo>
+                <a:lnTo>
+                  <a:pt x="644" y="1569"/>
+                </a:lnTo>
+                <a:lnTo>
+                  <a:pt x="619" y="1591"/>
+                </a:lnTo>
+                <a:lnTo>
+                  <a:pt x="589" y="1609"/>
+                </a:lnTo>
+                <a:lnTo>
+                  <a:pt x="551" y="1622"/>
+                </a:lnTo>
+                <a:lnTo>
+                  <a:pt x="523" y="1626"/>
+                </a:lnTo>
+                <a:lnTo>
+                  <a:pt x="493" y="1631"/>
+                </a:lnTo>
+                <a:lnTo>
+                  <a:pt x="462" y="1635"/>
+                </a:lnTo>
+                <a:lnTo>
+                  <a:pt x="430" y="1638"/>
+                </a:lnTo>
+                <a:lnTo>
+                  <a:pt x="398" y="1641"/>
+                </a:lnTo>
+                <a:lnTo>
+                  <a:pt x="367" y="1643"/>
+                </a:lnTo>
+                <a:lnTo>
+                  <a:pt x="335" y="1643"/>
+                </a:lnTo>
+                <a:lnTo>
+                  <a:pt x="302" y="1643"/>
+                </a:lnTo>
+                <a:lnTo>
+                  <a:pt x="270" y="1641"/>
+                </a:lnTo>
+                <a:lnTo>
+                  <a:pt x="239" y="1637"/>
+                </a:lnTo>
+                <a:lnTo>
+                  <a:pt x="208" y="1631"/>
+                </a:lnTo>
+                <a:lnTo>
+                  <a:pt x="180" y="1623"/>
+                </a:lnTo>
+                <a:lnTo>
+                  <a:pt x="151" y="1613"/>
+                </a:lnTo>
+                <a:lnTo>
+                  <a:pt x="124" y="1600"/>
+                </a:lnTo>
+                <a:lnTo>
+                  <a:pt x="99" y="1584"/>
+                </a:lnTo>
+                <a:lnTo>
+                  <a:pt x="76" y="1566"/>
+                </a:lnTo>
+                <a:lnTo>
+                  <a:pt x="0" y="1613"/>
+                </a:lnTo>
+                <a:lnTo>
+                  <a:pt x="14" y="1626"/>
+                </a:lnTo>
+                <a:lnTo>
+                  <a:pt x="28" y="1640"/>
+                </a:lnTo>
+                <a:lnTo>
+                  <a:pt x="43" y="1652"/>
+                </a:lnTo>
+                <a:lnTo>
+                  <a:pt x="58" y="1662"/>
+                </a:lnTo>
+                <a:lnTo>
+                  <a:pt x="75" y="1673"/>
+                </a:lnTo>
+                <a:lnTo>
+                  <a:pt x="91" y="1681"/>
+                </a:lnTo>
+                <a:lnTo>
+                  <a:pt x="108" y="1690"/>
+                </a:lnTo>
+                <a:lnTo>
+                  <a:pt x="126" y="1697"/>
+                </a:lnTo>
+                <a:lnTo>
+                  <a:pt x="138" y="1701"/>
+                </a:lnTo>
+                <a:lnTo>
+                  <a:pt x="150" y="1706"/>
+                </a:lnTo>
+                <a:lnTo>
+                  <a:pt x="162" y="1709"/>
+                </a:lnTo>
+                <a:lnTo>
+                  <a:pt x="174" y="1713"/>
+                </a:lnTo>
+                <a:lnTo>
+                  <a:pt x="186" y="1716"/>
+                </a:lnTo>
+                <a:lnTo>
+                  <a:pt x="198" y="1718"/>
+                </a:lnTo>
+                <a:lnTo>
+                  <a:pt x="211" y="1721"/>
+                </a:lnTo>
+                <a:lnTo>
+                  <a:pt x="223" y="1723"/>
+                </a:lnTo>
+                <a:lnTo>
+                  <a:pt x="236" y="1725"/>
+                </a:lnTo>
+                <a:lnTo>
+                  <a:pt x="248" y="1727"/>
+                </a:lnTo>
+                <a:lnTo>
+                  <a:pt x="261" y="1728"/>
+                </a:lnTo>
+                <a:lnTo>
+                  <a:pt x="273" y="1729"/>
+                </a:lnTo>
+                <a:lnTo>
+                  <a:pt x="286" y="1730"/>
+                </a:lnTo>
+                <a:lnTo>
+                  <a:pt x="298" y="1731"/>
+                </a:lnTo>
+                <a:lnTo>
+                  <a:pt x="311" y="1731"/>
+                </a:lnTo>
+                <a:lnTo>
+                  <a:pt x="323" y="1731"/>
+                </a:lnTo>
+                <a:lnTo>
+                  <a:pt x="350" y="1731"/>
+                </a:lnTo>
+                <a:lnTo>
+                  <a:pt x="376" y="1731"/>
+                </a:lnTo>
+                <a:lnTo>
+                  <a:pt x="403" y="1730"/>
+                </a:lnTo>
+                <a:lnTo>
+                  <a:pt x="429" y="1729"/>
+                </a:lnTo>
+                <a:lnTo>
+                  <a:pt x="457" y="1727"/>
+                </a:lnTo>
+                <a:lnTo>
+                  <a:pt x="483" y="1725"/>
+                </a:lnTo>
+                <a:lnTo>
+                  <a:pt x="509" y="1720"/>
+                </a:lnTo>
+                <a:lnTo>
+                  <a:pt x="535" y="1715"/>
+                </a:lnTo>
+                <a:lnTo>
+                  <a:pt x="560" y="1709"/>
+                </a:lnTo>
+                <a:lnTo>
+                  <a:pt x="586" y="1700"/>
+                </a:lnTo>
+                <a:lnTo>
+                  <a:pt x="610" y="1691"/>
+                </a:lnTo>
+                <a:lnTo>
+                  <a:pt x="634" y="1679"/>
+                </a:lnTo>
+                <a:lnTo>
+                  <a:pt x="658" y="1665"/>
+                </a:lnTo>
+                <a:lnTo>
+                  <a:pt x="680" y="1650"/>
+                </a:lnTo>
+                <a:lnTo>
+                  <a:pt x="701" y="1632"/>
+                </a:lnTo>
+                <a:lnTo>
+                  <a:pt x="722" y="1610"/>
+                </a:lnTo>
+                <a:lnTo>
+                  <a:pt x="804" y="1483"/>
+                </a:lnTo>
+                <a:lnTo>
+                  <a:pt x="814" y="1445"/>
+                </a:lnTo>
+                <a:lnTo>
+                  <a:pt x="819" y="1410"/>
+                </a:lnTo>
+                <a:lnTo>
+                  <a:pt x="819" y="1378"/>
+                </a:lnTo>
+                <a:lnTo>
+                  <a:pt x="815" y="1351"/>
+                </a:lnTo>
+                <a:lnTo>
+                  <a:pt x="809" y="1329"/>
+                </a:lnTo>
+                <a:lnTo>
+                  <a:pt x="804" y="1312"/>
+                </a:lnTo>
+                <a:lnTo>
+                  <a:pt x="800" y="1301"/>
+                </a:lnTo>
+                <a:lnTo>
+                  <a:pt x="798" y="1297"/>
+                </a:lnTo>
+                <a:lnTo>
+                  <a:pt x="787" y="1273"/>
+                </a:lnTo>
+                <a:lnTo>
+                  <a:pt x="775" y="1249"/>
+                </a:lnTo>
+                <a:lnTo>
+                  <a:pt x="764" y="1225"/>
+                </a:lnTo>
+                <a:lnTo>
+                  <a:pt x="751" y="1202"/>
+                </a:lnTo>
+                <a:lnTo>
+                  <a:pt x="739" y="1178"/>
+                </a:lnTo>
+                <a:lnTo>
+                  <a:pt x="726" y="1154"/>
+                </a:lnTo>
+                <a:lnTo>
+                  <a:pt x="714" y="1131"/>
+                </a:lnTo>
+                <a:lnTo>
+                  <a:pt x="700" y="1108"/>
+                </a:lnTo>
+                <a:lnTo>
+                  <a:pt x="687" y="1086"/>
+                </a:lnTo>
+                <a:lnTo>
+                  <a:pt x="673" y="1062"/>
+                </a:lnTo>
+                <a:lnTo>
+                  <a:pt x="658" y="1040"/>
+                </a:lnTo>
+                <a:lnTo>
+                  <a:pt x="643" y="1018"/>
+                </a:lnTo>
+                <a:lnTo>
+                  <a:pt x="628" y="996"/>
+                </a:lnTo>
+                <a:lnTo>
+                  <a:pt x="613" y="974"/>
+                </a:lnTo>
+                <a:lnTo>
+                  <a:pt x="595" y="952"/>
+                </a:lnTo>
+                <a:lnTo>
+                  <a:pt x="578" y="929"/>
+                </a:lnTo>
+                <a:lnTo>
+                  <a:pt x="548" y="888"/>
+                </a:lnTo>
+                <a:lnTo>
+                  <a:pt x="520" y="847"/>
+                </a:lnTo>
+                <a:lnTo>
+                  <a:pt x="495" y="805"/>
+                </a:lnTo>
+                <a:lnTo>
+                  <a:pt x="474" y="764"/>
+                </a:lnTo>
+                <a:lnTo>
+                  <a:pt x="455" y="721"/>
+                </a:lnTo>
+                <a:lnTo>
+                  <a:pt x="441" y="679"/>
+                </a:lnTo>
+                <a:lnTo>
+                  <a:pt x="428" y="639"/>
+                </a:lnTo>
+                <a:lnTo>
+                  <a:pt x="419" y="599"/>
+                </a:lnTo>
+                <a:lnTo>
+                  <a:pt x="413" y="560"/>
+                </a:lnTo>
+                <a:lnTo>
+                  <a:pt x="410" y="523"/>
+                </a:lnTo>
+                <a:lnTo>
+                  <a:pt x="410" y="488"/>
+                </a:lnTo>
+                <a:lnTo>
+                  <a:pt x="412" y="455"/>
+                </a:lnTo>
+                <a:lnTo>
+                  <a:pt x="419" y="425"/>
+                </a:lnTo>
+                <a:lnTo>
+                  <a:pt x="427" y="397"/>
+                </a:lnTo>
+                <a:lnTo>
+                  <a:pt x="439" y="373"/>
+                </a:lnTo>
+                <a:lnTo>
+                  <a:pt x="454" y="352"/>
+                </a:lnTo>
+                <a:lnTo>
+                  <a:pt x="476" y="328"/>
+                </a:lnTo>
+                <a:lnTo>
+                  <a:pt x="498" y="304"/>
+                </a:lnTo>
+                <a:lnTo>
+                  <a:pt x="521" y="281"/>
+                </a:lnTo>
+                <a:lnTo>
+                  <a:pt x="546" y="258"/>
+                </a:lnTo>
+                <a:lnTo>
+                  <a:pt x="573" y="236"/>
+                </a:lnTo>
+                <a:lnTo>
+                  <a:pt x="600" y="215"/>
+                </a:lnTo>
+                <a:lnTo>
+                  <a:pt x="628" y="193"/>
+                </a:lnTo>
+                <a:lnTo>
+                  <a:pt x="658" y="174"/>
+                </a:lnTo>
+                <a:lnTo>
+                  <a:pt x="688" y="155"/>
+                </a:lnTo>
+                <a:lnTo>
+                  <a:pt x="718" y="138"/>
+                </a:lnTo>
+                <a:lnTo>
+                  <a:pt x="750" y="124"/>
+                </a:lnTo>
+                <a:lnTo>
+                  <a:pt x="783" y="110"/>
+                </a:lnTo>
+                <a:lnTo>
+                  <a:pt x="816" y="98"/>
+                </a:lnTo>
+                <a:lnTo>
+                  <a:pt x="849" y="89"/>
+                </a:lnTo>
+                <a:lnTo>
+                  <a:pt x="883" y="81"/>
+                </a:lnTo>
+                <a:lnTo>
+                  <a:pt x="918" y="76"/>
+                </a:lnTo>
+                <a:lnTo>
+                  <a:pt x="939" y="74"/>
+                </a:lnTo>
+                <a:lnTo>
+                  <a:pt x="961" y="74"/>
+                </a:lnTo>
+                <a:lnTo>
+                  <a:pt x="981" y="74"/>
+                </a:lnTo>
+                <a:lnTo>
+                  <a:pt x="1003" y="76"/>
+                </a:lnTo>
+                <a:lnTo>
+                  <a:pt x="1024" y="80"/>
+                </a:lnTo>
+                <a:lnTo>
+                  <a:pt x="1044" y="85"/>
+                </a:lnTo>
+                <a:lnTo>
+                  <a:pt x="1063" y="91"/>
+                </a:lnTo>
+                <a:lnTo>
+                  <a:pt x="1083" y="98"/>
+                </a:lnTo>
+                <a:lnTo>
+                  <a:pt x="1101" y="107"/>
+                </a:lnTo>
+                <a:lnTo>
+                  <a:pt x="1119" y="115"/>
+                </a:lnTo>
+                <a:lnTo>
+                  <a:pt x="1137" y="126"/>
+                </a:lnTo>
+                <a:lnTo>
+                  <a:pt x="1154" y="136"/>
+                </a:lnTo>
+                <a:lnTo>
+                  <a:pt x="1170" y="148"/>
+                </a:lnTo>
+                <a:lnTo>
+                  <a:pt x="1186" y="161"/>
+                </a:lnTo>
+                <a:lnTo>
+                  <a:pt x="1200" y="174"/>
+                </a:lnTo>
+                <a:lnTo>
+                  <a:pt x="1215" y="188"/>
+                </a:lnTo>
+                <a:lnTo>
+                  <a:pt x="1227" y="204"/>
+                </a:lnTo>
+                <a:lnTo>
+                  <a:pt x="1240" y="220"/>
+                </a:lnTo>
+                <a:lnTo>
+                  <a:pt x="1250" y="236"/>
+                </a:lnTo>
+                <a:lnTo>
+                  <a:pt x="1260" y="253"/>
+                </a:lnTo>
+                <a:lnTo>
+                  <a:pt x="1269" y="270"/>
+                </a:lnTo>
+                <a:lnTo>
+                  <a:pt x="1277" y="288"/>
+                </a:lnTo>
+                <a:lnTo>
+                  <a:pt x="1283" y="307"/>
+                </a:lnTo>
+                <a:lnTo>
+                  <a:pt x="1289" y="326"/>
+                </a:lnTo>
+                <a:lnTo>
+                  <a:pt x="1252" y="351"/>
+                </a:lnTo>
+                <a:lnTo>
+                  <a:pt x="1249" y="392"/>
+                </a:lnTo>
+                <a:lnTo>
+                  <a:pt x="1251" y="438"/>
+                </a:lnTo>
+                <a:lnTo>
+                  <a:pt x="1256" y="484"/>
+                </a:lnTo>
+                <a:lnTo>
+                  <a:pt x="1261" y="525"/>
+                </a:lnTo>
+                <a:lnTo>
+                  <a:pt x="1240" y="534"/>
+                </a:lnTo>
+                <a:lnTo>
+                  <a:pt x="1218" y="545"/>
+                </a:lnTo>
+                <a:lnTo>
+                  <a:pt x="1198" y="558"/>
+                </a:lnTo>
+                <a:lnTo>
+                  <a:pt x="1178" y="570"/>
+                </a:lnTo>
+                <a:lnTo>
+                  <a:pt x="1159" y="584"/>
+                </a:lnTo>
+                <a:lnTo>
+                  <a:pt x="1141" y="599"/>
+                </a:lnTo>
+                <a:lnTo>
+                  <a:pt x="1123" y="615"/>
+                </a:lnTo>
+                <a:lnTo>
+                  <a:pt x="1105" y="632"/>
+                </a:lnTo>
+                <a:lnTo>
+                  <a:pt x="1090" y="649"/>
+                </a:lnTo>
+                <a:lnTo>
+                  <a:pt x="1075" y="668"/>
+                </a:lnTo>
+                <a:lnTo>
+                  <a:pt x="1061" y="685"/>
+                </a:lnTo>
+                <a:lnTo>
+                  <a:pt x="1049" y="704"/>
+                </a:lnTo>
+                <a:lnTo>
+                  <a:pt x="1036" y="725"/>
+                </a:lnTo>
+                <a:lnTo>
+                  <a:pt x="1026" y="746"/>
+                </a:lnTo>
+                <a:lnTo>
+                  <a:pt x="1017" y="767"/>
+                </a:lnTo>
+                <a:lnTo>
+                  <a:pt x="1009" y="788"/>
+                </a:lnTo>
+                <a:lnTo>
+                  <a:pt x="989" y="850"/>
+                </a:lnTo>
+                <a:lnTo>
+                  <a:pt x="973" y="913"/>
+                </a:lnTo>
+                <a:lnTo>
+                  <a:pt x="963" y="973"/>
+                </a:lnTo>
+                <a:lnTo>
+                  <a:pt x="956" y="1033"/>
+                </a:lnTo>
+                <a:lnTo>
+                  <a:pt x="954" y="1094"/>
+                </a:lnTo>
+                <a:lnTo>
+                  <a:pt x="956" y="1155"/>
+                </a:lnTo>
+                <a:lnTo>
+                  <a:pt x="963" y="1218"/>
+                </a:lnTo>
+                <a:lnTo>
+                  <a:pt x="976" y="1282"/>
+                </a:lnTo>
+                <a:lnTo>
+                  <a:pt x="976" y="1288"/>
+                </a:lnTo>
+                <a:lnTo>
+                  <a:pt x="979" y="1304"/>
+                </a:lnTo>
+                <a:lnTo>
+                  <a:pt x="986" y="1327"/>
+                </a:lnTo>
+                <a:lnTo>
+                  <a:pt x="995" y="1357"/>
+                </a:lnTo>
+                <a:lnTo>
+                  <a:pt x="1006" y="1393"/>
+                </a:lnTo>
+                <a:lnTo>
+                  <a:pt x="1020" y="1433"/>
+                </a:lnTo>
+                <a:lnTo>
+                  <a:pt x="1036" y="1477"/>
+                </a:lnTo>
+                <a:lnTo>
+                  <a:pt x="1053" y="1524"/>
+                </a:lnTo>
+                <a:lnTo>
+                  <a:pt x="1071" y="1571"/>
+                </a:lnTo>
+                <a:lnTo>
+                  <a:pt x="1091" y="1620"/>
+                </a:lnTo>
+                <a:lnTo>
+                  <a:pt x="1110" y="1667"/>
+                </a:lnTo>
+                <a:lnTo>
+                  <a:pt x="1132" y="1714"/>
+                </a:lnTo>
+                <a:lnTo>
+                  <a:pt x="1152" y="1757"/>
+                </a:lnTo>
+                <a:lnTo>
+                  <a:pt x="1174" y="1796"/>
+                </a:lnTo>
+                <a:lnTo>
+                  <a:pt x="1194" y="1831"/>
+                </a:lnTo>
+                <a:lnTo>
+                  <a:pt x="1215" y="1861"/>
+                </a:lnTo>
+                <a:lnTo>
+                  <a:pt x="1227" y="1888"/>
+                </a:lnTo>
+                <a:lnTo>
+                  <a:pt x="1247" y="1925"/>
+                </a:lnTo>
+                <a:lnTo>
+                  <a:pt x="1271" y="1969"/>
+                </a:lnTo>
+                <a:lnTo>
+                  <a:pt x="1297" y="2015"/>
+                </a:lnTo>
+                <a:lnTo>
+                  <a:pt x="1322" y="2058"/>
+                </a:lnTo>
+                <a:lnTo>
+                  <a:pt x="1346" y="2094"/>
+                </a:lnTo>
+                <a:lnTo>
+                  <a:pt x="1365" y="2118"/>
+                </a:lnTo>
+                <a:lnTo>
+                  <a:pt x="1378" y="2127"/>
+                </a:lnTo>
+                <a:lnTo>
+                  <a:pt x="1947" y="1961"/>
+                </a:lnTo>
+                <a:lnTo>
+                  <a:pt x="1950" y="1923"/>
+                </a:lnTo>
+                <a:lnTo>
+                  <a:pt x="1955" y="1883"/>
+                </a:lnTo>
+                <a:lnTo>
+                  <a:pt x="1960" y="1843"/>
+                </a:lnTo>
+                <a:lnTo>
+                  <a:pt x="1965" y="1802"/>
+                </a:lnTo>
+                <a:lnTo>
+                  <a:pt x="1971" y="1759"/>
+                </a:lnTo>
+                <a:lnTo>
+                  <a:pt x="1976" y="1718"/>
+                </a:lnTo>
+                <a:lnTo>
+                  <a:pt x="1983" y="1678"/>
+                </a:lnTo>
+                <a:lnTo>
+                  <a:pt x="1989" y="1639"/>
+                </a:lnTo>
+                <a:lnTo>
+                  <a:pt x="1891" y="1639"/>
+                </a:lnTo>
+                <a:close/>
+              </a:path>
+            </a:pathLst>
+          </a:custGeom>
+          <a:solidFill>
+            <a:schemeClr val="bg1">
+              <a:lumMod val="65000"/>
+            </a:schemeClr>
+          </a:solidFill>
+          <a:ln w="9525">
+            <a:solidFill>
+              <a:schemeClr val="bg1">
+                <a:lumMod val="65000"/>
+              </a:schemeClr>
+            </a:solidFill>
+            <a:round/>
+            <a:headEnd/>
+            <a:tailEnd/>
+          </a:ln>
+        </p:spPr>
+        <p:txBody>
+          <a:bodyPr vert="horz" wrap="square" lIns="91440" tIns="45720" rIns="91440" bIns="45720" numCol="1" anchor="t" anchorCtr="0" compatLnSpc="1">
+            <a:prstTxWarp prst="textNoShape">
+              <a:avLst/>
+            </a:prstTxWarp>
+          </a:bodyPr>
+          <a:lstStyle/>
+          <a:p>
+            <a:endParaRPr lang="en-SG"/>
+          </a:p>
+        </p:txBody>
+      </p:sp>
+      <p:sp>
+        <p:nvSpPr>
+          <p:cNvPr id="172" name="Freeform 10"/>
+          <p:cNvSpPr>
+            <a:spLocks/>
+          </p:cNvSpPr>
+          <p:nvPr/>
+        </p:nvSpPr>
+        <p:spPr bwMode="auto">
+          <a:xfrm>
+            <a:off x="6469063" y="1939646"/>
+            <a:ext cx="0" cy="1588"/>
+          </a:xfrm>
+          <a:custGeom>
+            <a:avLst/>
+            <a:gdLst>
+              <a:gd name="T0" fmla="*/ 2 w 2"/>
+              <a:gd name="T1" fmla="*/ 0 h 3"/>
+              <a:gd name="T2" fmla="*/ 0 w 2"/>
+              <a:gd name="T3" fmla="*/ 3 h 3"/>
+              <a:gd name="T4" fmla="*/ 0 w 2"/>
+              <a:gd name="T5" fmla="*/ 3 h 3"/>
+              <a:gd name="T6" fmla="*/ 0 w 2"/>
+              <a:gd name="T7" fmla="*/ 3 h 3"/>
+              <a:gd name="T8" fmla="*/ 0 w 2"/>
+              <a:gd name="T9" fmla="*/ 3 h 3"/>
+              <a:gd name="T10" fmla="*/ 0 w 2"/>
+              <a:gd name="T11" fmla="*/ 3 h 3"/>
+              <a:gd name="T12" fmla="*/ 2 w 2"/>
+              <a:gd name="T13" fmla="*/ 0 h 3"/>
+            </a:gdLst>
+            <a:ahLst/>
+            <a:cxnLst>
+              <a:cxn ang="0">
+                <a:pos x="T0" y="T1"/>
+              </a:cxn>
+              <a:cxn ang="0">
+                <a:pos x="T2" y="T3"/>
+              </a:cxn>
+              <a:cxn ang="0">
+                <a:pos x="T4" y="T5"/>
+              </a:cxn>
+              <a:cxn ang="0">
+                <a:pos x="T6" y="T7"/>
+              </a:cxn>
+              <a:cxn ang="0">
+                <a:pos x="T8" y="T9"/>
+              </a:cxn>
+              <a:cxn ang="0">
+                <a:pos x="T10" y="T11"/>
+              </a:cxn>
+              <a:cxn ang="0">
+                <a:pos x="T12" y="T13"/>
+              </a:cxn>
+            </a:cxnLst>
+            <a:rect l="0" t="0" r="r" b="b"/>
+            <a:pathLst>
+              <a:path w="2" h="3">
+                <a:moveTo>
+                  <a:pt x="2" y="0"/>
+                </a:moveTo>
+                <a:lnTo>
+                  <a:pt x="0" y="3"/>
+                </a:lnTo>
+                <a:lnTo>
+                  <a:pt x="0" y="3"/>
+                </a:lnTo>
+                <a:lnTo>
+                  <a:pt x="0" y="3"/>
+                </a:lnTo>
+                <a:lnTo>
+                  <a:pt x="0" y="3"/>
+                </a:lnTo>
+                <a:lnTo>
+                  <a:pt x="0" y="3"/>
+                </a:lnTo>
+                <a:lnTo>
+                  <a:pt x="2" y="0"/>
+                </a:lnTo>
+                <a:close/>
+              </a:path>
+            </a:pathLst>
+          </a:custGeom>
+          <a:solidFill>
+            <a:srgbClr val="000000"/>
+          </a:solidFill>
+          <a:ln>
+            <a:noFill/>
+          </a:ln>
+          <a:extLst>
+            <a:ext uri="{91240B29-F687-4F45-9708-019B960494DF}">
+              <a14:hiddenLine xmlns:a14="http://schemas.microsoft.com/office/drawing/2010/main" w="9525">
+                <a:solidFill>
+                  <a:srgbClr val="000000"/>
+                </a:solidFill>
+                <a:round/>
+                <a:headEnd/>
+                <a:tailEnd/>
+              </a14:hiddenLine>
+            </a:ext>
+          </a:extLst>
+        </p:spPr>
+        <p:txBody>
+          <a:bodyPr vert="horz" wrap="square" lIns="91440" tIns="45720" rIns="91440" bIns="45720" numCol="1" anchor="t" anchorCtr="0" compatLnSpc="1">
+            <a:prstTxWarp prst="textNoShape">
+              <a:avLst/>
+            </a:prstTxWarp>
+          </a:bodyPr>
+          <a:lstStyle/>
+          <a:p>
+            <a:endParaRPr lang="en-SG"/>
+          </a:p>
+        </p:txBody>
+      </p:sp>
+      <p:grpSp>
+        <p:nvGrpSpPr>
+          <p:cNvPr id="173" name="Group 172"/>
+          <p:cNvGrpSpPr/>
+          <p:nvPr/>
+        </p:nvGrpSpPr>
+        <p:grpSpPr>
+          <a:xfrm>
+            <a:off x="5622925" y="1287462"/>
+            <a:ext cx="298983" cy="520531"/>
+            <a:chOff x="638861" y="309422"/>
+            <a:chExt cx="298983" cy="520531"/>
+          </a:xfrm>
+        </p:grpSpPr>
+        <p:sp>
+          <p:nvSpPr>
+            <p:cNvPr id="174" name="Flowchart: Connector 173"/>
+            <p:cNvSpPr/>
+            <p:nvPr/>
+          </p:nvSpPr>
+          <p:spPr>
+            <a:xfrm>
+              <a:off x="678021" y="309422"/>
+              <a:ext cx="220662" cy="220662"/>
+            </a:xfrm>
+            <a:prstGeom prst="flowChartConnector">
+              <a:avLst/>
+            </a:prstGeom>
+            <a:solidFill>
+              <a:schemeClr val="bg1"/>
+            </a:solidFill>
+          </p:spPr>
+          <p:style>
+            <a:lnRef idx="2">
+              <a:schemeClr val="accent1">
+                <a:shade val="50000"/>
+              </a:schemeClr>
+            </a:lnRef>
+            <a:fillRef idx="1">
+              <a:schemeClr val="accent1"/>
+            </a:fillRef>
+            <a:effectRef idx="0">
+              <a:schemeClr val="accent1"/>
+            </a:effectRef>
+            <a:fontRef idx="minor">
+              <a:schemeClr val="lt1"/>
+            </a:fontRef>
+          </p:style>
+          <p:txBody>
+            <a:bodyPr rtlCol="0" anchor="ctr"/>
+            <a:lstStyle/>
+            <a:p>
+              <a:pPr algn="ctr"/>
+              <a:endParaRPr lang="en-SG"/>
+            </a:p>
+          </p:txBody>
+        </p:sp>
+        <p:grpSp>
+          <p:nvGrpSpPr>
+            <p:cNvPr id="175" name="Group 174"/>
+            <p:cNvGrpSpPr/>
+            <p:nvPr/>
+          </p:nvGrpSpPr>
+          <p:grpSpPr>
+            <a:xfrm>
+              <a:off x="638861" y="549600"/>
+              <a:ext cx="298983" cy="280353"/>
+              <a:chOff x="638861" y="549600"/>
+              <a:chExt cx="298983" cy="280353"/>
+            </a:xfrm>
+          </p:grpSpPr>
+          <p:sp>
+            <p:nvSpPr>
+              <p:cNvPr id="178" name="Flowchart: Delay 177"/>
+              <p:cNvSpPr/>
+              <p:nvPr/>
+            </p:nvSpPr>
+            <p:spPr>
+              <a:xfrm rot="16200000">
+                <a:off x="648176" y="540285"/>
+                <a:ext cx="280353" cy="298983"/>
+              </a:xfrm>
+              <a:prstGeom prst="flowChartDelay">
+                <a:avLst/>
+              </a:prstGeom>
+              <a:solidFill>
+                <a:schemeClr val="bg1"/>
+              </a:solidFill>
+            </p:spPr>
+            <p:style>
+              <a:lnRef idx="2">
+                <a:schemeClr val="accent1">
+                  <a:shade val="50000"/>
+                </a:schemeClr>
+              </a:lnRef>
+              <a:fillRef idx="1">
+                <a:schemeClr val="accent1"/>
+              </a:fillRef>
+              <a:effectRef idx="0">
+                <a:schemeClr val="accent1"/>
+              </a:effectRef>
+              <a:fontRef idx="minor">
+                <a:schemeClr val="lt1"/>
+              </a:fontRef>
+            </p:style>
+            <p:txBody>
+              <a:bodyPr rtlCol="0" anchor="ctr"/>
+              <a:lstStyle/>
+              <a:p>
+                <a:pPr algn="ctr"/>
+                <a:endParaRPr lang="en-SG"/>
+              </a:p>
+            </p:txBody>
+          </p:sp>
+          <p:sp>
+            <p:nvSpPr>
+              <p:cNvPr id="179" name="Freeform 178"/>
+              <p:cNvSpPr/>
+              <p:nvPr/>
+            </p:nvSpPr>
+            <p:spPr>
+              <a:xfrm>
+                <a:off x="737215" y="552954"/>
+                <a:ext cx="102393" cy="235744"/>
+              </a:xfrm>
+              <a:custGeom>
+                <a:avLst/>
+                <a:gdLst>
+                  <a:gd name="connsiteX0" fmla="*/ 47625 w 102393"/>
+                  <a:gd name="connsiteY0" fmla="*/ 0 h 235744"/>
+                  <a:gd name="connsiteX1" fmla="*/ 0 w 102393"/>
+                  <a:gd name="connsiteY1" fmla="*/ 185738 h 235744"/>
+                  <a:gd name="connsiteX2" fmla="*/ 57150 w 102393"/>
+                  <a:gd name="connsiteY2" fmla="*/ 235744 h 235744"/>
+                  <a:gd name="connsiteX3" fmla="*/ 102393 w 102393"/>
+                  <a:gd name="connsiteY3" fmla="*/ 171450 h 235744"/>
+                  <a:gd name="connsiteX4" fmla="*/ 47625 w 102393"/>
+                  <a:gd name="connsiteY4" fmla="*/ 0 h 235744"/>
+                </a:gdLst>
+                <a:ahLst/>
+                <a:cxnLst>
+                  <a:cxn ang="0">
+                    <a:pos x="connsiteX0" y="connsiteY0"/>
+                  </a:cxn>
+                  <a:cxn ang="0">
+                    <a:pos x="connsiteX1" y="connsiteY1"/>
+                  </a:cxn>
+                  <a:cxn ang="0">
+                    <a:pos x="connsiteX2" y="connsiteY2"/>
+                  </a:cxn>
+                  <a:cxn ang="0">
+                    <a:pos x="connsiteX3" y="connsiteY3"/>
+                  </a:cxn>
+                  <a:cxn ang="0">
+                    <a:pos x="connsiteX4" y="connsiteY4"/>
+                  </a:cxn>
+                </a:cxnLst>
+                <a:rect l="l" t="t" r="r" b="b"/>
+                <a:pathLst>
+                  <a:path w="102393" h="235744">
+                    <a:moveTo>
+                      <a:pt x="47625" y="0"/>
+                    </a:moveTo>
+                    <a:lnTo>
+                      <a:pt x="0" y="185738"/>
+                    </a:lnTo>
+                    <a:lnTo>
+                      <a:pt x="57150" y="235744"/>
+                    </a:lnTo>
+                    <a:lnTo>
+                      <a:pt x="102393" y="171450"/>
+                    </a:lnTo>
+                    <a:lnTo>
+                      <a:pt x="47625" y="0"/>
+                    </a:lnTo>
+                    <a:close/>
+                  </a:path>
+                </a:pathLst>
+              </a:custGeom>
+              <a:solidFill>
+                <a:schemeClr val="bg1"/>
+              </a:solidFill>
+            </p:spPr>
+            <p:style>
+              <a:lnRef idx="2">
+                <a:schemeClr val="accent1">
+                  <a:shade val="50000"/>
+                </a:schemeClr>
+              </a:lnRef>
+              <a:fillRef idx="1">
+                <a:schemeClr val="accent1"/>
+              </a:fillRef>
+              <a:effectRef idx="0">
+                <a:schemeClr val="accent1"/>
+              </a:effectRef>
+              <a:fontRef idx="minor">
+                <a:schemeClr val="lt1"/>
+              </a:fontRef>
+            </p:style>
+            <p:txBody>
+              <a:bodyPr rtlCol="0" anchor="ctr"/>
+              <a:lstStyle/>
+              <a:p>
+                <a:pPr algn="ctr"/>
+                <a:endParaRPr lang="en-SG"/>
+              </a:p>
+            </p:txBody>
+          </p:sp>
+        </p:grpSp>
+        <p:sp>
+          <p:nvSpPr>
+            <p:cNvPr id="176" name="Freeform 175"/>
+            <p:cNvSpPr/>
+            <p:nvPr/>
+          </p:nvSpPr>
+          <p:spPr>
+            <a:xfrm>
+              <a:off x="882472" y="469611"/>
+              <a:ext cx="50006" cy="19050"/>
+            </a:xfrm>
+            <a:custGeom>
+              <a:avLst/>
+              <a:gdLst>
+                <a:gd name="connsiteX0" fmla="*/ 0 w 50006"/>
+                <a:gd name="connsiteY0" fmla="*/ 0 h 19050"/>
+                <a:gd name="connsiteX1" fmla="*/ 0 w 50006"/>
+                <a:gd name="connsiteY1" fmla="*/ 0 h 19050"/>
+                <a:gd name="connsiteX2" fmla="*/ 21431 w 50006"/>
+                <a:gd name="connsiteY2" fmla="*/ 4762 h 19050"/>
+                <a:gd name="connsiteX3" fmla="*/ 28575 w 50006"/>
+                <a:gd name="connsiteY3" fmla="*/ 9525 h 19050"/>
+                <a:gd name="connsiteX4" fmla="*/ 38100 w 50006"/>
+                <a:gd name="connsiteY4" fmla="*/ 14287 h 19050"/>
+                <a:gd name="connsiteX5" fmla="*/ 50006 w 50006"/>
+                <a:gd name="connsiteY5" fmla="*/ 19050 h 19050"/>
+              </a:gdLst>
+              <a:ahLst/>
+              <a:cxnLst>
+                <a:cxn ang="0">
+                  <a:pos x="connsiteX0" y="connsiteY0"/>
+                </a:cxn>
+                <a:cxn ang="0">
+                  <a:pos x="connsiteX1" y="connsiteY1"/>
+                </a:cxn>
+                <a:cxn ang="0">
+                  <a:pos x="connsiteX2" y="connsiteY2"/>
+                </a:cxn>
+                <a:cxn ang="0">
+                  <a:pos x="connsiteX3" y="connsiteY3"/>
+                </a:cxn>
+                <a:cxn ang="0">
+                  <a:pos x="connsiteX4" y="connsiteY4"/>
+                </a:cxn>
+                <a:cxn ang="0">
+                  <a:pos x="connsiteX5" y="connsiteY5"/>
+                </a:cxn>
+              </a:cxnLst>
+              <a:rect l="l" t="t" r="r" b="b"/>
+              <a:pathLst>
+                <a:path w="50006" h="19050">
+                  <a:moveTo>
+                    <a:pt x="0" y="0"/>
+                  </a:moveTo>
+                  <a:lnTo>
+                    <a:pt x="0" y="0"/>
+                  </a:lnTo>
+                  <a:cubicBezTo>
+                    <a:pt x="7144" y="1587"/>
+                    <a:pt x="14489" y="2448"/>
+                    <a:pt x="21431" y="4762"/>
+                  </a:cubicBezTo>
+                  <a:cubicBezTo>
+                    <a:pt x="24146" y="5667"/>
+                    <a:pt x="26090" y="8105"/>
+                    <a:pt x="28575" y="9525"/>
+                  </a:cubicBezTo>
+                  <a:cubicBezTo>
+                    <a:pt x="31657" y="11286"/>
+                    <a:pt x="34837" y="12889"/>
+                    <a:pt x="38100" y="14287"/>
+                  </a:cubicBezTo>
+                  <a:cubicBezTo>
+                    <a:pt x="58672" y="23103"/>
+                    <a:pt x="34691" y="11391"/>
+                    <a:pt x="50006" y="19050"/>
+                  </a:cubicBezTo>
+                </a:path>
+              </a:pathLst>
+            </a:custGeom>
+            <a:solidFill>
+              <a:schemeClr val="bg1"/>
+            </a:solidFill>
+          </p:spPr>
+          <p:style>
+            <a:lnRef idx="2">
+              <a:schemeClr val="accent1">
+                <a:shade val="50000"/>
+              </a:schemeClr>
+            </a:lnRef>
+            <a:fillRef idx="1">
+              <a:schemeClr val="accent1"/>
+            </a:fillRef>
+            <a:effectRef idx="0">
+              <a:schemeClr val="accent1"/>
+            </a:effectRef>
+            <a:fontRef idx="minor">
+              <a:schemeClr val="lt1"/>
+            </a:fontRef>
+          </p:style>
+          <p:txBody>
+            <a:bodyPr rtlCol="0" anchor="ctr"/>
+            <a:lstStyle/>
+            <a:p>
+              <a:pPr algn="ctr"/>
+              <a:endParaRPr lang="en-SG"/>
+            </a:p>
+          </p:txBody>
+        </p:sp>
+        <p:sp>
+          <p:nvSpPr>
+            <p:cNvPr id="177" name="Flowchart: Connector 176"/>
+            <p:cNvSpPr/>
+            <p:nvPr/>
+          </p:nvSpPr>
+          <p:spPr>
+            <a:xfrm>
+              <a:off x="800257" y="354516"/>
+              <a:ext cx="45719" cy="45719"/>
+            </a:xfrm>
+            <a:prstGeom prst="flowChartConnector">
+              <a:avLst/>
+            </a:prstGeom>
+            <a:solidFill>
+              <a:schemeClr val="bg1"/>
+            </a:solidFill>
+            <a:ln>
+              <a:solidFill>
+                <a:schemeClr val="accent1">
+                  <a:lumMod val="75000"/>
+                </a:schemeClr>
+              </a:solidFill>
+            </a:ln>
+          </p:spPr>
+          <p:style>
+            <a:lnRef idx="2">
+              <a:schemeClr val="accent1">
+                <a:shade val="50000"/>
+              </a:schemeClr>
+            </a:lnRef>
+            <a:fillRef idx="1">
+              <a:schemeClr val="accent1"/>
+            </a:fillRef>
+            <a:effectRef idx="0">
+              <a:schemeClr val="accent1"/>
+            </a:effectRef>
+            <a:fontRef idx="minor">
+              <a:schemeClr val="lt1"/>
+            </a:fontRef>
+          </p:style>
+          <p:txBody>
+            <a:bodyPr rtlCol="0" anchor="ctr"/>
+            <a:lstStyle/>
+            <a:p>
+              <a:pPr algn="ctr"/>
+              <a:endParaRPr lang="en-SG"/>
+            </a:p>
+          </p:txBody>
+        </p:sp>
+      </p:grpSp>
     </p:spTree>
     <p:extLst>
       <p:ext uri="{BB962C8B-B14F-4D97-AF65-F5344CB8AC3E}">

</xml_diff>

<commit_message>
Issue 1120: home page: rename button to 'Request FREE Instructor Account' Update Issue 1120
</commit_message>
<xml_diff>
--- a/doc/mockups/homepage image.pptx
+++ b/doc/mockups/homepage image.pptx
@@ -196,7 +196,7 @@
           <a:p>
             <a:fld id="{A4537E34-E1A6-4BBF-AF99-84C669929841}" type="datetimeFigureOut">
               <a:rPr lang="en-SG" smtClean="0"/>
-              <a:t>3/8/2013</a:t>
+              <a:t>9/8/2013</a:t>
             </a:fld>
             <a:endParaRPr lang="en-SG"/>
           </a:p>
@@ -735,7 +735,7 @@
             <a:fld id="{1D8BD707-D9CF-40AE-B4C6-C98DA3205C09}" type="datetimeFigureOut">
               <a:rPr lang="en-US" smtClean="0"/>
               <a:pPr/>
-              <a:t>8/3/2013</a:t>
+              <a:t>8/9/2013</a:t>
             </a:fld>
             <a:endParaRPr lang="en-US"/>
           </a:p>
@@ -902,7 +902,7 @@
             <a:fld id="{1D8BD707-D9CF-40AE-B4C6-C98DA3205C09}" type="datetimeFigureOut">
               <a:rPr lang="en-US" smtClean="0"/>
               <a:pPr/>
-              <a:t>8/3/2013</a:t>
+              <a:t>8/9/2013</a:t>
             </a:fld>
             <a:endParaRPr lang="en-US"/>
           </a:p>
@@ -1079,7 +1079,7 @@
             <a:fld id="{1D8BD707-D9CF-40AE-B4C6-C98DA3205C09}" type="datetimeFigureOut">
               <a:rPr lang="en-US" smtClean="0"/>
               <a:pPr/>
-              <a:t>8/3/2013</a:t>
+              <a:t>8/9/2013</a:t>
             </a:fld>
             <a:endParaRPr lang="en-US"/>
           </a:p>
@@ -1246,7 +1246,7 @@
             <a:fld id="{1D8BD707-D9CF-40AE-B4C6-C98DA3205C09}" type="datetimeFigureOut">
               <a:rPr lang="en-US" smtClean="0"/>
               <a:pPr/>
-              <a:t>8/3/2013</a:t>
+              <a:t>8/9/2013</a:t>
             </a:fld>
             <a:endParaRPr lang="en-US"/>
           </a:p>
@@ -1489,7 +1489,7 @@
             <a:fld id="{1D8BD707-D9CF-40AE-B4C6-C98DA3205C09}" type="datetimeFigureOut">
               <a:rPr lang="en-US" smtClean="0"/>
               <a:pPr/>
-              <a:t>8/3/2013</a:t>
+              <a:t>8/9/2013</a:t>
             </a:fld>
             <a:endParaRPr lang="en-US"/>
           </a:p>
@@ -1774,7 +1774,7 @@
             <a:fld id="{1D8BD707-D9CF-40AE-B4C6-C98DA3205C09}" type="datetimeFigureOut">
               <a:rPr lang="en-US" smtClean="0"/>
               <a:pPr/>
-              <a:t>8/3/2013</a:t>
+              <a:t>8/9/2013</a:t>
             </a:fld>
             <a:endParaRPr lang="en-US"/>
           </a:p>
@@ -2193,7 +2193,7 @@
             <a:fld id="{1D8BD707-D9CF-40AE-B4C6-C98DA3205C09}" type="datetimeFigureOut">
               <a:rPr lang="en-US" smtClean="0"/>
               <a:pPr/>
-              <a:t>8/3/2013</a:t>
+              <a:t>8/9/2013</a:t>
             </a:fld>
             <a:endParaRPr lang="en-US"/>
           </a:p>
@@ -2308,7 +2308,7 @@
             <a:fld id="{1D8BD707-D9CF-40AE-B4C6-C98DA3205C09}" type="datetimeFigureOut">
               <a:rPr lang="en-US" smtClean="0"/>
               <a:pPr/>
-              <a:t>8/3/2013</a:t>
+              <a:t>8/9/2013</a:t>
             </a:fld>
             <a:endParaRPr lang="en-US"/>
           </a:p>
@@ -2400,7 +2400,7 @@
             <a:fld id="{1D8BD707-D9CF-40AE-B4C6-C98DA3205C09}" type="datetimeFigureOut">
               <a:rPr lang="en-US" smtClean="0"/>
               <a:pPr/>
-              <a:t>8/3/2013</a:t>
+              <a:t>8/9/2013</a:t>
             </a:fld>
             <a:endParaRPr lang="en-US"/>
           </a:p>
@@ -2674,7 +2674,7 @@
             <a:fld id="{1D8BD707-D9CF-40AE-B4C6-C98DA3205C09}" type="datetimeFigureOut">
               <a:rPr lang="en-US" smtClean="0"/>
               <a:pPr/>
-              <a:t>8/3/2013</a:t>
+              <a:t>8/9/2013</a:t>
             </a:fld>
             <a:endParaRPr lang="en-US"/>
           </a:p>
@@ -2924,7 +2924,7 @@
             <a:fld id="{1D8BD707-D9CF-40AE-B4C6-C98DA3205C09}" type="datetimeFigureOut">
               <a:rPr lang="en-US" smtClean="0"/>
               <a:pPr/>
-              <a:t>8/3/2013</a:t>
+              <a:t>8/9/2013</a:t>
             </a:fld>
             <a:endParaRPr lang="en-US"/>
           </a:p>
@@ -3134,7 +3134,7 @@
             <a:fld id="{1D8BD707-D9CF-40AE-B4C6-C98DA3205C09}" type="datetimeFigureOut">
               <a:rPr lang="en-US" smtClean="0"/>
               <a:pPr/>
-              <a:t>8/3/2013</a:t>
+              <a:t>8/9/2013</a:t>
             </a:fld>
             <a:endParaRPr lang="en-US"/>
           </a:p>
@@ -10064,7 +10064,7 @@
         <p:spPr>
           <a:xfrm>
             <a:off x="2955925" y="1630362"/>
-            <a:ext cx="1219200" cy="381000"/>
+            <a:ext cx="1524000" cy="381000"/>
           </a:xfrm>
           <a:prstGeom prst="roundRect">
             <a:avLst>
@@ -10094,14 +10094,26 @@
           <a:bodyPr rtlCol="0" anchor="ctr"/>
           <a:lstStyle/>
           <a:p>
-            <a:pPr algn="ctr"/>
+            <a:pPr algn="ctr">
+              <a:lnSpc>
+                <a:spcPts val="1100"/>
+              </a:lnSpc>
+            </a:pPr>
             <a:r>
               <a:rPr lang="en-US" dirty="0" smtClean="0"/>
-              <a:t>Request for a </a:t>
+              <a:t>Request a </a:t>
             </a:r>
             <a:r>
               <a:rPr lang="en-US" b="1" dirty="0" smtClean="0"/>
-              <a:t>FREE Account</a:t>
+              <a:t>FREE </a:t>
+            </a:r>
+            <a:r>
+              <a:rPr lang="en-US" dirty="0" smtClean="0"/>
+              <a:t>Instructor </a:t>
+            </a:r>
+            <a:r>
+              <a:rPr lang="en-US" b="1" dirty="0" smtClean="0"/>
+              <a:t>Account</a:t>
             </a:r>
             <a:endParaRPr lang="en-US" b="1" dirty="0"/>
           </a:p>
@@ -10418,7 +10430,7 @@
       </p:cxnSp>
       <p:pic>
         <p:nvPicPr>
-          <p:cNvPr id="1026" name="Picture 2"/>
+          <p:cNvPr id="3" name="Picture 3"/>
           <p:cNvPicPr>
             <a:picLocks noChangeAspect="1" noChangeArrowheads="1"/>
           </p:cNvPicPr>
@@ -10432,13 +10444,13 @@
               </a:ext>
             </a:extLst>
           </a:blip>
-          <a:srcRect t="5956" b="14420"/>
+          <a:srcRect t="3082" b="7876"/>
           <a:stretch/>
         </p:blipFill>
         <p:spPr bwMode="auto">
           <a:xfrm>
-            <a:off x="2962275" y="2472384"/>
-            <a:ext cx="1249362" cy="403225"/>
+            <a:off x="2925763" y="2449514"/>
+            <a:ext cx="1554162" cy="412750"/>
           </a:xfrm>
           <a:prstGeom prst="rect">
             <a:avLst/>

</xml_diff>